<commit_message>
Included Late Tasks Slide template
</commit_message>
<xml_diff>
--- a/PMMPresentation/Modules/Templates/PMM Template.pptx
+++ b/PMMPresentation/Modules/Templates/PMM Template.pptx
@@ -5,18 +5,19 @@
     <p:sldMasterId id="2147483648" r:id="rId4"/>
   </p:sldMasterIdLst>
   <p:notesMasterIdLst>
-    <p:notesMasterId r:id="rId11"/>
+    <p:notesMasterId r:id="rId12"/>
   </p:notesMasterIdLst>
   <p:handoutMasterIdLst>
-    <p:handoutMasterId r:id="rId12"/>
+    <p:handoutMasterId r:id="rId13"/>
   </p:handoutMasterIdLst>
   <p:sldIdLst>
     <p:sldId id="628" r:id="rId5"/>
     <p:sldId id="629" r:id="rId6"/>
     <p:sldId id="630" r:id="rId7"/>
     <p:sldId id="634" r:id="rId8"/>
-    <p:sldId id="632" r:id="rId9"/>
-    <p:sldId id="633" r:id="rId10"/>
+    <p:sldId id="635" r:id="rId9"/>
+    <p:sldId id="632" r:id="rId10"/>
+    <p:sldId id="633" r:id="rId11"/>
   </p:sldIdLst>
   <p:sldSz cx="9144000" cy="6858000" type="screen4x3"/>
   <p:notesSz cx="7010400" cy="9296400"/>
@@ -284,11 +285,11 @@
         </c:dLbls>
         <c:gapWidth val="150"/>
         <c:overlap val="100"/>
-        <c:axId val="53504512"/>
-        <c:axId val="57268992"/>
+        <c:axId val="35467776"/>
+        <c:axId val="71207168"/>
       </c:barChart>
       <c:catAx>
-        <c:axId val="53504512"/>
+        <c:axId val="35467776"/>
         <c:scaling>
           <c:orientation val="maxMin"/>
         </c:scaling>
@@ -297,7 +298,7 @@
         <c:majorTickMark val="out"/>
         <c:minorTickMark val="none"/>
         <c:tickLblPos val="nextTo"/>
-        <c:crossAx val="57268992"/>
+        <c:crossAx val="71207168"/>
         <c:crosses val="autoZero"/>
         <c:auto val="1"/>
         <c:lblAlgn val="ctr"/>
@@ -305,7 +306,7 @@
         <c:noMultiLvlLbl val="0"/>
       </c:catAx>
       <c:valAx>
-        <c:axId val="57268992"/>
+        <c:axId val="71207168"/>
         <c:scaling>
           <c:orientation val="minMax"/>
         </c:scaling>
@@ -316,7 +317,7 @@
         <c:majorTickMark val="out"/>
         <c:minorTickMark val="none"/>
         <c:tickLblPos val="nextTo"/>
-        <c:crossAx val="53504512"/>
+        <c:crossAx val="35467776"/>
         <c:crosses val="autoZero"/>
         <c:crossBetween val="between"/>
       </c:valAx>
@@ -2973,9 +2974,10 @@
               <a:buNone/>
             </a:pPr>
             <a:r>
-              <a:rPr lang="en-US" b="1" dirty="0" smtClean="0"/>
+              <a:rPr lang="en-US" b="1" smtClean="0"/>
               <a:t>Completed Tasks</a:t>
             </a:r>
+            <a:endParaRPr lang="en-US" b="1" dirty="0" smtClean="0"/>
           </a:p>
           <a:p>
             <a:r>
@@ -3006,6 +3008,625 @@
 </file>
 
 <file path=ppt/slides/slide5.xml><?xml version="1.0" encoding="utf-8"?>
+<p:sld xmlns:a="http://schemas.openxmlformats.org/drawingml/2006/main" xmlns:r="http://schemas.openxmlformats.org/officeDocument/2006/relationships" xmlns:p="http://schemas.openxmlformats.org/presentationml/2006/main">
+  <p:cSld>
+    <p:spTree>
+      <p:nvGrpSpPr>
+        <p:cNvPr id="1" name=""/>
+        <p:cNvGrpSpPr/>
+        <p:nvPr/>
+      </p:nvGrpSpPr>
+      <p:grpSpPr>
+        <a:xfrm>
+          <a:off x="0" y="0"/>
+          <a:ext cx="0" cy="0"/>
+          <a:chOff x="0" y="0"/>
+          <a:chExt cx="0" cy="0"/>
+        </a:xfrm>
+      </p:grpSpPr>
+      <p:sp>
+        <p:nvSpPr>
+          <p:cNvPr id="2" name="Title 1"/>
+          <p:cNvSpPr>
+            <a:spLocks noGrp="1"/>
+          </p:cNvSpPr>
+          <p:nvPr>
+            <p:ph type="title"/>
+          </p:nvPr>
+        </p:nvSpPr>
+        <p:spPr/>
+        <p:txBody>
+          <a:bodyPr/>
+          <a:lstStyle/>
+          <a:p>
+            <a:r>
+              <a:rPr lang="en-US" dirty="0" smtClean="0"/>
+              <a:t>Late Tasks</a:t>
+            </a:r>
+            <a:endParaRPr lang="en-US" dirty="0"/>
+          </a:p>
+        </p:txBody>
+      </p:sp>
+      <p:graphicFrame>
+        <p:nvGraphicFramePr>
+          <p:cNvPr id="6" name="Content Placeholder 5"/>
+          <p:cNvGraphicFramePr>
+            <a:graphicFrameLocks noGrp="1"/>
+          </p:cNvGraphicFramePr>
+          <p:nvPr>
+            <p:ph idx="1"/>
+            <p:extLst>
+              <p:ext uri="{D42A27DB-BD31-4B8C-83A1-F6EECF244321}">
+                <p14:modId xmlns:p14="http://schemas.microsoft.com/office/powerpoint/2010/main" val="1760334785"/>
+              </p:ext>
+            </p:extLst>
+          </p:nvPr>
+        </p:nvGraphicFramePr>
+        <p:xfrm>
+          <a:off x="152400" y="1295400"/>
+          <a:ext cx="8839195" cy="1376680"/>
+        </p:xfrm>
+        <a:graphic>
+          <a:graphicData uri="http://schemas.openxmlformats.org/drawingml/2006/table">
+            <a:tbl>
+              <a:tblPr firstRow="1" bandRow="1">
+                <a:tableStyleId>{5C22544A-7EE6-4342-B048-85BDC9FD1C3A}</a:tableStyleId>
+              </a:tblPr>
+              <a:tblGrid>
+                <a:gridCol w="592998"/>
+                <a:gridCol w="592998"/>
+                <a:gridCol w="977716"/>
+                <a:gridCol w="208280"/>
+                <a:gridCol w="592998"/>
+                <a:gridCol w="592998"/>
+                <a:gridCol w="592998"/>
+                <a:gridCol w="592998"/>
+                <a:gridCol w="592998"/>
+                <a:gridCol w="531657"/>
+                <a:gridCol w="654338"/>
+                <a:gridCol w="606015"/>
+                <a:gridCol w="635753"/>
+                <a:gridCol w="537225"/>
+                <a:gridCol w="537225"/>
+              </a:tblGrid>
+              <a:tr h="370840">
+                <a:tc>
+                  <a:txBody>
+                    <a:bodyPr/>
+                    <a:lstStyle/>
+                    <a:p>
+                      <a:r>
+                        <a:rPr lang="en-US" sz="1000" b="0" i="0" kern="1200" baseline="0" dirty="0" smtClean="0">
+                          <a:solidFill>
+                            <a:schemeClr val="lt1"/>
+                          </a:solidFill>
+                          <a:effectLst/>
+                          <a:latin typeface="+mn-lt"/>
+                          <a:ea typeface="+mn-ea"/>
+                          <a:cs typeface="+mn-cs"/>
+                        </a:rPr>
+                        <a:t>UID</a:t>
+                      </a:r>
+                      <a:endParaRPr lang="en-US" sz="1000" baseline="0" dirty="0"/>
+                    </a:p>
+                  </a:txBody>
+                  <a:tcPr/>
+                </a:tc>
+                <a:tc>
+                  <a:txBody>
+                    <a:bodyPr/>
+                    <a:lstStyle/>
+                    <a:p>
+                      <a:r>
+                        <a:rPr lang="en-US" sz="1000" b="0" i="0" kern="1200" baseline="0" dirty="0" smtClean="0">
+                          <a:solidFill>
+                            <a:schemeClr val="lt1"/>
+                          </a:solidFill>
+                          <a:effectLst/>
+                          <a:latin typeface="+mn-lt"/>
+                          <a:ea typeface="+mn-ea"/>
+                          <a:cs typeface="+mn-cs"/>
+                        </a:rPr>
+                        <a:t>CA </a:t>
+                      </a:r>
+                      <a:endParaRPr lang="en-US" sz="1000" baseline="0" dirty="0"/>
+                    </a:p>
+                  </a:txBody>
+                  <a:tcPr/>
+                </a:tc>
+                <a:tc>
+                  <a:txBody>
+                    <a:bodyPr/>
+                    <a:lstStyle/>
+                    <a:p>
+                      <a:r>
+                        <a:rPr lang="en-US" sz="1000" b="0" baseline="0" dirty="0" smtClean="0"/>
+                        <a:t>TASK NAME</a:t>
+                      </a:r>
+                      <a:endParaRPr lang="en-US" sz="1000" b="0" baseline="0" dirty="0"/>
+                    </a:p>
+                  </a:txBody>
+                  <a:tcPr/>
+                </a:tc>
+                <a:tc>
+                  <a:txBody>
+                    <a:bodyPr/>
+                    <a:lstStyle/>
+                    <a:p>
+                      <a:r>
+                        <a:rPr lang="en-US" sz="1000" b="0" i="0" kern="1200" baseline="0" dirty="0" smtClean="0">
+                          <a:solidFill>
+                            <a:schemeClr val="lt1"/>
+                          </a:solidFill>
+                          <a:effectLst/>
+                          <a:latin typeface="+mn-lt"/>
+                          <a:ea typeface="+mn-ea"/>
+                          <a:cs typeface="+mn-cs"/>
+                        </a:rPr>
+                        <a:t>Slack </a:t>
+                      </a:r>
+                      <a:endParaRPr lang="en-US" sz="1000" baseline="0" dirty="0"/>
+                    </a:p>
+                  </a:txBody>
+                  <a:tcPr/>
+                </a:tc>
+                <a:tc>
+                  <a:txBody>
+                    <a:bodyPr/>
+                    <a:lstStyle/>
+                    <a:p>
+                      <a:r>
+                        <a:rPr lang="en-US" sz="1000" b="0" i="0" kern="1200" baseline="0" dirty="0" smtClean="0">
+                          <a:solidFill>
+                            <a:schemeClr val="lt1"/>
+                          </a:solidFill>
+                          <a:effectLst/>
+                          <a:latin typeface="+mn-lt"/>
+                          <a:ea typeface="+mn-ea"/>
+                          <a:cs typeface="+mn-cs"/>
+                        </a:rPr>
+                        <a:t>Start</a:t>
+                      </a:r>
+                      <a:endParaRPr lang="en-US" sz="1000" baseline="0" dirty="0"/>
+                    </a:p>
+                  </a:txBody>
+                  <a:tcPr/>
+                </a:tc>
+                <a:tc>
+                  <a:txBody>
+                    <a:bodyPr/>
+                    <a:lstStyle/>
+                    <a:p>
+                      <a:r>
+                        <a:rPr lang="en-US" sz="1000" b="0" i="0" kern="1200" baseline="0" dirty="0" smtClean="0">
+                          <a:solidFill>
+                            <a:schemeClr val="lt1"/>
+                          </a:solidFill>
+                          <a:effectLst/>
+                          <a:latin typeface="+mn-lt"/>
+                          <a:ea typeface="+mn-ea"/>
+                          <a:cs typeface="+mn-cs"/>
+                        </a:rPr>
+                        <a:t>Finish</a:t>
+                      </a:r>
+                      <a:endParaRPr lang="en-US" sz="1000" baseline="0" dirty="0"/>
+                    </a:p>
+                  </a:txBody>
+                  <a:tcPr/>
+                </a:tc>
+                <a:tc>
+                  <a:txBody>
+                    <a:bodyPr/>
+                    <a:lstStyle/>
+                    <a:p>
+                      <a:r>
+                        <a:rPr lang="en-US" sz="1000" b="0" i="0" kern="1200" baseline="0" dirty="0" smtClean="0">
+                          <a:solidFill>
+                            <a:schemeClr val="lt1"/>
+                          </a:solidFill>
+                          <a:effectLst/>
+                          <a:latin typeface="+mn-lt"/>
+                          <a:ea typeface="+mn-ea"/>
+                          <a:cs typeface="+mn-cs"/>
+                        </a:rPr>
+                        <a:t>BL Start</a:t>
+                      </a:r>
+                      <a:endParaRPr lang="en-US" sz="1000" baseline="0" dirty="0"/>
+                    </a:p>
+                  </a:txBody>
+                  <a:tcPr/>
+                </a:tc>
+                <a:tc>
+                  <a:txBody>
+                    <a:bodyPr/>
+                    <a:lstStyle/>
+                    <a:p>
+                      <a:r>
+                        <a:rPr lang="en-US" sz="1000" b="0" i="0" kern="1200" baseline="0" dirty="0" smtClean="0">
+                          <a:solidFill>
+                            <a:schemeClr val="lt1"/>
+                          </a:solidFill>
+                          <a:effectLst/>
+                          <a:latin typeface="+mn-lt"/>
+                          <a:ea typeface="+mn-ea"/>
+                          <a:cs typeface="+mn-cs"/>
+                        </a:rPr>
+                        <a:t>BL Finish</a:t>
+                      </a:r>
+                      <a:endParaRPr lang="en-US" sz="1000" baseline="0" dirty="0"/>
+                    </a:p>
+                  </a:txBody>
+                  <a:tcPr/>
+                </a:tc>
+                <a:tc>
+                  <a:txBody>
+                    <a:bodyPr/>
+                    <a:lstStyle/>
+                    <a:p>
+                      <a:r>
+                        <a:rPr lang="en-US" sz="1000" b="0" i="0" kern="1200" baseline="0" dirty="0" smtClean="0">
+                          <a:solidFill>
+                            <a:schemeClr val="lt1"/>
+                          </a:solidFill>
+                          <a:effectLst/>
+                          <a:latin typeface="+mn-lt"/>
+                          <a:ea typeface="+mn-ea"/>
+                          <a:cs typeface="+mn-cs"/>
+                        </a:rPr>
+                        <a:t>Hours</a:t>
+                      </a:r>
+                      <a:endParaRPr lang="en-US" sz="1000" baseline="0" dirty="0"/>
+                    </a:p>
+                  </a:txBody>
+                  <a:tcPr/>
+                </a:tc>
+                <a:tc>
+                  <a:txBody>
+                    <a:bodyPr/>
+                    <a:lstStyle/>
+                    <a:p>
+                      <a:r>
+                        <a:rPr lang="en-US" sz="1000" b="0" i="0" kern="1200" baseline="0" dirty="0" smtClean="0">
+                          <a:solidFill>
+                            <a:schemeClr val="lt1"/>
+                          </a:solidFill>
+                          <a:effectLst/>
+                          <a:latin typeface="+mn-lt"/>
+                          <a:ea typeface="+mn-ea"/>
+                          <a:cs typeface="+mn-cs"/>
+                        </a:rPr>
+                        <a:t>PMT</a:t>
+                      </a:r>
+                      <a:endParaRPr lang="en-US" sz="1000" baseline="0" dirty="0"/>
+                    </a:p>
+                  </a:txBody>
+                  <a:tcPr/>
+                </a:tc>
+                <a:tc>
+                  <a:txBody>
+                    <a:bodyPr/>
+                    <a:lstStyle/>
+                    <a:p>
+                      <a:r>
+                        <a:rPr lang="en-US" sz="1000" b="0" i="0" kern="1200" baseline="0" dirty="0" smtClean="0">
+                          <a:solidFill>
+                            <a:schemeClr val="lt1"/>
+                          </a:solidFill>
+                          <a:effectLst/>
+                          <a:latin typeface="+mn-lt"/>
+                          <a:ea typeface="+mn-ea"/>
+                          <a:cs typeface="+mn-cs"/>
+                        </a:rPr>
+                        <a:t>Reason Recovery</a:t>
+                      </a:r>
+                      <a:endParaRPr lang="en-US" sz="1000" baseline="0" dirty="0"/>
+                    </a:p>
+                  </a:txBody>
+                  <a:tcPr/>
+                </a:tc>
+                <a:tc>
+                  <a:txBody>
+                    <a:bodyPr/>
+                    <a:lstStyle/>
+                    <a:p>
+                      <a:r>
+                        <a:rPr lang="en-US" sz="1000" b="0" i="0" kern="1200" baseline="0" dirty="0" smtClean="0">
+                          <a:solidFill>
+                            <a:schemeClr val="lt1"/>
+                          </a:solidFill>
+                          <a:effectLst/>
+                          <a:latin typeface="+mn-lt"/>
+                          <a:ea typeface="+mn-ea"/>
+                          <a:cs typeface="+mn-cs"/>
+                        </a:rPr>
+                        <a:t>Impacted Task Name</a:t>
+                      </a:r>
+                      <a:endParaRPr lang="en-US" sz="1000" baseline="0" dirty="0"/>
+                    </a:p>
+                  </a:txBody>
+                  <a:tcPr/>
+                </a:tc>
+                <a:tc>
+                  <a:txBody>
+                    <a:bodyPr/>
+                    <a:lstStyle/>
+                    <a:p>
+                      <a:r>
+                        <a:rPr lang="en-US" sz="1000" b="0" i="0" kern="1200" baseline="0" dirty="0" smtClean="0">
+                          <a:solidFill>
+                            <a:schemeClr val="lt1"/>
+                          </a:solidFill>
+                          <a:effectLst/>
+                          <a:latin typeface="+mn-lt"/>
+                          <a:ea typeface="+mn-ea"/>
+                          <a:cs typeface="+mn-cs"/>
+                        </a:rPr>
+                        <a:t>Duration</a:t>
+                      </a:r>
+                      <a:endParaRPr lang="en-US" sz="1000" baseline="0" dirty="0"/>
+                    </a:p>
+                  </a:txBody>
+                  <a:tcPr/>
+                </a:tc>
+                <a:tc>
+                  <a:txBody>
+                    <a:bodyPr/>
+                    <a:lstStyle/>
+                    <a:p>
+                      <a:pPr marL="0" marR="0" indent="0" algn="l" defTabSz="914400" rtl="0" eaLnBrk="1" fontAlgn="auto" latinLnBrk="0" hangingPunct="1">
+                        <a:lnSpc>
+                          <a:spcPct val="100000"/>
+                        </a:lnSpc>
+                        <a:spcBef>
+                          <a:spcPts val="0"/>
+                        </a:spcBef>
+                        <a:spcAft>
+                          <a:spcPts val="0"/>
+                        </a:spcAft>
+                        <a:buClrTx/>
+                        <a:buSzTx/>
+                        <a:buFontTx/>
+                        <a:buNone/>
+                        <a:tabLst/>
+                        <a:defRPr/>
+                      </a:pPr>
+                      <a:r>
+                        <a:rPr lang="en-US" sz="1000" b="0" i="0" kern="1200" baseline="0" dirty="0" err="1" smtClean="0">
+                          <a:solidFill>
+                            <a:schemeClr val="lt1"/>
+                          </a:solidFill>
+                          <a:effectLst/>
+                          <a:latin typeface="+mn-lt"/>
+                          <a:ea typeface="+mn-ea"/>
+                          <a:cs typeface="+mn-cs"/>
+                        </a:rPr>
+                        <a:t>Est</a:t>
+                      </a:r>
+                      <a:r>
+                        <a:rPr lang="en-US" sz="1000" b="0" i="0" kern="1200" baseline="0" dirty="0" smtClean="0">
+                          <a:solidFill>
+                            <a:schemeClr val="lt1"/>
+                          </a:solidFill>
+                          <a:effectLst/>
+                          <a:latin typeface="+mn-lt"/>
+                          <a:ea typeface="+mn-ea"/>
+                          <a:cs typeface="+mn-cs"/>
+                        </a:rPr>
+                        <a:t> Start</a:t>
+                      </a:r>
+                      <a:endParaRPr lang="en-US" sz="1000" baseline="0" dirty="0" smtClean="0"/>
+                    </a:p>
+                    <a:p>
+                      <a:endParaRPr lang="en-US" sz="1000" baseline="0" dirty="0"/>
+                    </a:p>
+                  </a:txBody>
+                  <a:tcPr/>
+                </a:tc>
+                <a:tc>
+                  <a:txBody>
+                    <a:bodyPr/>
+                    <a:lstStyle/>
+                    <a:p>
+                      <a:r>
+                        <a:rPr lang="en-US" sz="1000" b="0" i="0" kern="1200" baseline="0" dirty="0" err="1" smtClean="0">
+                          <a:solidFill>
+                            <a:schemeClr val="lt1"/>
+                          </a:solidFill>
+                          <a:effectLst/>
+                          <a:latin typeface="+mn-lt"/>
+                          <a:ea typeface="+mn-ea"/>
+                          <a:cs typeface="+mn-cs"/>
+                        </a:rPr>
+                        <a:t>Est</a:t>
+                      </a:r>
+                      <a:r>
+                        <a:rPr lang="en-US" sz="1000" b="0" i="0" kern="1200" baseline="0" dirty="0" smtClean="0">
+                          <a:solidFill>
+                            <a:schemeClr val="lt1"/>
+                          </a:solidFill>
+                          <a:effectLst/>
+                          <a:latin typeface="+mn-lt"/>
+                          <a:ea typeface="+mn-ea"/>
+                          <a:cs typeface="+mn-cs"/>
+                        </a:rPr>
+                        <a:t> Finish</a:t>
+                      </a:r>
+                      <a:endParaRPr lang="en-US" sz="1000" baseline="0" dirty="0"/>
+                    </a:p>
+                  </a:txBody>
+                  <a:tcPr/>
+                </a:tc>
+              </a:tr>
+              <a:tr h="370840">
+                <a:tc>
+                  <a:txBody>
+                    <a:bodyPr/>
+                    <a:lstStyle/>
+                    <a:p>
+                      <a:endParaRPr lang="en-US" sz="1000" baseline="0" dirty="0"/>
+                    </a:p>
+                  </a:txBody>
+                  <a:tcPr/>
+                </a:tc>
+                <a:tc>
+                  <a:txBody>
+                    <a:bodyPr/>
+                    <a:lstStyle/>
+                    <a:p>
+                      <a:endParaRPr lang="en-US" sz="1000" baseline="0" dirty="0"/>
+                    </a:p>
+                  </a:txBody>
+                  <a:tcPr/>
+                </a:tc>
+                <a:tc>
+                  <a:txBody>
+                    <a:bodyPr/>
+                    <a:lstStyle/>
+                    <a:p>
+                      <a:endParaRPr lang="en-US" sz="1000" baseline="0" dirty="0"/>
+                    </a:p>
+                  </a:txBody>
+                  <a:tcPr/>
+                </a:tc>
+                <a:tc>
+                  <a:txBody>
+                    <a:bodyPr/>
+                    <a:lstStyle/>
+                    <a:p>
+                      <a:endParaRPr lang="en-US" sz="1000" baseline="0" dirty="0"/>
+                    </a:p>
+                  </a:txBody>
+                  <a:tcPr/>
+                </a:tc>
+                <a:tc>
+                  <a:txBody>
+                    <a:bodyPr/>
+                    <a:lstStyle/>
+                    <a:p>
+                      <a:endParaRPr lang="en-US" sz="1000" baseline="0"/>
+                    </a:p>
+                  </a:txBody>
+                  <a:tcPr/>
+                </a:tc>
+                <a:tc>
+                  <a:txBody>
+                    <a:bodyPr/>
+                    <a:lstStyle/>
+                    <a:p>
+                      <a:endParaRPr lang="en-US" sz="1000" baseline="0"/>
+                    </a:p>
+                  </a:txBody>
+                  <a:tcPr/>
+                </a:tc>
+                <a:tc>
+                  <a:txBody>
+                    <a:bodyPr/>
+                    <a:lstStyle/>
+                    <a:p>
+                      <a:endParaRPr lang="en-US" sz="1000" baseline="0"/>
+                    </a:p>
+                  </a:txBody>
+                  <a:tcPr/>
+                </a:tc>
+                <a:tc>
+                  <a:txBody>
+                    <a:bodyPr/>
+                    <a:lstStyle/>
+                    <a:p>
+                      <a:endParaRPr lang="en-US" sz="1000" baseline="0"/>
+                    </a:p>
+                  </a:txBody>
+                  <a:tcPr/>
+                </a:tc>
+                <a:tc>
+                  <a:txBody>
+                    <a:bodyPr/>
+                    <a:lstStyle/>
+                    <a:p>
+                      <a:endParaRPr lang="en-US" sz="1000" baseline="0"/>
+                    </a:p>
+                  </a:txBody>
+                  <a:tcPr/>
+                </a:tc>
+                <a:tc>
+                  <a:txBody>
+                    <a:bodyPr/>
+                    <a:lstStyle/>
+                    <a:p>
+                      <a:endParaRPr lang="en-US" sz="1000" baseline="0"/>
+                    </a:p>
+                  </a:txBody>
+                  <a:tcPr/>
+                </a:tc>
+                <a:tc>
+                  <a:txBody>
+                    <a:bodyPr/>
+                    <a:lstStyle/>
+                    <a:p>
+                      <a:endParaRPr lang="en-US" sz="1000" baseline="0"/>
+                    </a:p>
+                  </a:txBody>
+                  <a:tcPr/>
+                </a:tc>
+                <a:tc>
+                  <a:txBody>
+                    <a:bodyPr/>
+                    <a:lstStyle/>
+                    <a:p>
+                      <a:endParaRPr lang="en-US" sz="1000" baseline="0"/>
+                    </a:p>
+                  </a:txBody>
+                  <a:tcPr/>
+                </a:tc>
+                <a:tc>
+                  <a:txBody>
+                    <a:bodyPr/>
+                    <a:lstStyle/>
+                    <a:p>
+                      <a:endParaRPr lang="en-US" sz="1000" baseline="0"/>
+                    </a:p>
+                  </a:txBody>
+                  <a:tcPr/>
+                </a:tc>
+                <a:tc>
+                  <a:txBody>
+                    <a:bodyPr/>
+                    <a:lstStyle/>
+                    <a:p>
+                      <a:endParaRPr lang="en-US" sz="1000" baseline="0" dirty="0"/>
+                    </a:p>
+                  </a:txBody>
+                  <a:tcPr/>
+                </a:tc>
+                <a:tc>
+                  <a:txBody>
+                    <a:bodyPr/>
+                    <a:lstStyle/>
+                    <a:p>
+                      <a:endParaRPr lang="en-US" sz="1000" baseline="0" dirty="0"/>
+                    </a:p>
+                  </a:txBody>
+                  <a:tcPr/>
+                </a:tc>
+              </a:tr>
+            </a:tbl>
+          </a:graphicData>
+        </a:graphic>
+      </p:graphicFrame>
+    </p:spTree>
+    <p:extLst>
+      <p:ext uri="{BB962C8B-B14F-4D97-AF65-F5344CB8AC3E}">
+        <p14:creationId xmlns:p14="http://schemas.microsoft.com/office/powerpoint/2010/main" val="3217937833"/>
+      </p:ext>
+    </p:extLst>
+  </p:cSld>
+  <p:clrMapOvr>
+    <a:masterClrMapping/>
+  </p:clrMapOvr>
+</p:sld>
+</file>
+
+<file path=ppt/slides/slide6.xml><?xml version="1.0" encoding="utf-8"?>
 <p:sld xmlns:a="http://schemas.openxmlformats.org/drawingml/2006/main" xmlns:r="http://schemas.openxmlformats.org/officeDocument/2006/relationships" xmlns:p="http://schemas.openxmlformats.org/presentationml/2006/main">
   <p:cSld>
     <p:spTree>
@@ -3101,7 +3722,7 @@
 </p:sld>
 </file>
 
-<file path=ppt/slides/slide6.xml><?xml version="1.0" encoding="utf-8"?>
+<file path=ppt/slides/slide7.xml><?xml version="1.0" encoding="utf-8"?>
 <p:sld xmlns:a="http://schemas.openxmlformats.org/drawingml/2006/main" xmlns:r="http://schemas.openxmlformats.org/officeDocument/2006/relationships" xmlns:p="http://schemas.openxmlformats.org/presentationml/2006/main">
   <p:cSld>
     <p:spTree>

</xml_diff>

<commit_message>
Make SLide Types Dynamic
</commit_message>
<xml_diff>
--- a/PMMPresentation/Modules/Templates/PMM Template.pptx
+++ b/PMMPresentation/Modules/Templates/PMM Template.pptx
@@ -13,10 +13,10 @@
   <p:sldIdLst>
     <p:sldId id="628" r:id="rId5"/>
     <p:sldId id="629" r:id="rId6"/>
-    <p:sldId id="630" r:id="rId7"/>
-    <p:sldId id="634" r:id="rId8"/>
-    <p:sldId id="635" r:id="rId9"/>
-    <p:sldId id="632" r:id="rId10"/>
+    <p:sldId id="634" r:id="rId7"/>
+    <p:sldId id="651" r:id="rId8"/>
+    <p:sldId id="632" r:id="rId9"/>
+    <p:sldId id="637" r:id="rId10"/>
     <p:sldId id="633" r:id="rId11"/>
   </p:sldIdLst>
   <p:sldSz cx="9144000" cy="6858000" type="screen4x3"/>
@@ -285,11 +285,11 @@
         </c:dLbls>
         <c:gapWidth val="150"/>
         <c:overlap val="100"/>
-        <c:axId val="35467776"/>
-        <c:axId val="71207168"/>
+        <c:axId val="69184000"/>
+        <c:axId val="57987584"/>
       </c:barChart>
       <c:catAx>
-        <c:axId val="35467776"/>
+        <c:axId val="69184000"/>
         <c:scaling>
           <c:orientation val="maxMin"/>
         </c:scaling>
@@ -298,7 +298,7 @@
         <c:majorTickMark val="out"/>
         <c:minorTickMark val="none"/>
         <c:tickLblPos val="nextTo"/>
-        <c:crossAx val="71207168"/>
+        <c:crossAx val="57987584"/>
         <c:crosses val="autoZero"/>
         <c:auto val="1"/>
         <c:lblAlgn val="ctr"/>
@@ -306,7 +306,7 @@
         <c:noMultiLvlLbl val="0"/>
       </c:catAx>
       <c:valAx>
-        <c:axId val="71207168"/>
+        <c:axId val="57987584"/>
         <c:scaling>
           <c:orientation val="minMax"/>
         </c:scaling>
@@ -317,7 +317,7 @@
         <c:majorTickMark val="out"/>
         <c:minorTickMark val="none"/>
         <c:tickLblPos val="nextTo"/>
-        <c:crossAx val="35467776"/>
+        <c:crossAx val="69184000"/>
         <c:crosses val="autoZero"/>
         <c:crossBetween val="between"/>
       </c:valAx>
@@ -2744,9 +2744,106 @@
           <a:lstStyle/>
           <a:p>
             <a:r>
+              <a:rPr lang="en-US" dirty="0" smtClean="0"/>
+              <a:t>Complete Tasks</a:t>
+            </a:r>
+            <a:endParaRPr lang="en-US" dirty="0"/>
+          </a:p>
+        </p:txBody>
+      </p:sp>
+      <p:sp>
+        <p:nvSpPr>
+          <p:cNvPr id="3" name="Content Placeholder 2"/>
+          <p:cNvSpPr>
+            <a:spLocks noGrp="1"/>
+          </p:cNvSpPr>
+          <p:nvPr>
+            <p:ph idx="1"/>
+          </p:nvPr>
+        </p:nvSpPr>
+        <p:spPr/>
+        <p:txBody>
+          <a:bodyPr/>
+          <a:lstStyle/>
+          <a:p>
+            <a:pPr marL="0" indent="0">
+              <a:buNone/>
+            </a:pPr>
+            <a:r>
+              <a:rPr lang="en-US" b="1" smtClean="0"/>
+              <a:t>Completed Tasks</a:t>
+            </a:r>
+            <a:endParaRPr lang="en-US" b="1" dirty="0" smtClean="0"/>
+          </a:p>
+          <a:p>
+            <a:r>
+              <a:rPr lang="en-US" dirty="0" smtClean="0"/>
+              <a:t>Bullet1</a:t>
+            </a:r>
+          </a:p>
+          <a:p>
+            <a:r>
+              <a:rPr lang="en-US" dirty="0" smtClean="0"/>
+              <a:t>Bullet2</a:t>
+            </a:r>
+            <a:endParaRPr lang="en-US" dirty="0"/>
+          </a:p>
+        </p:txBody>
+      </p:sp>
+    </p:spTree>
+    <p:extLst>
+      <p:ext uri="{BB962C8B-B14F-4D97-AF65-F5344CB8AC3E}">
+        <p14:creationId xmlns:p14="http://schemas.microsoft.com/office/powerpoint/2010/main" val="2878378399"/>
+      </p:ext>
+    </p:extLst>
+  </p:cSld>
+  <p:clrMapOvr>
+    <a:masterClrMapping/>
+  </p:clrMapOvr>
+</p:sld>
+</file>
+
+<file path=ppt/slides/slide4.xml><?xml version="1.0" encoding="utf-8"?>
+<p:sld xmlns:a="http://schemas.openxmlformats.org/drawingml/2006/main" xmlns:r="http://schemas.openxmlformats.org/officeDocument/2006/relationships" xmlns:p="http://schemas.openxmlformats.org/presentationml/2006/main">
+  <p:cSld>
+    <p:spTree>
+      <p:nvGrpSpPr>
+        <p:cNvPr id="1" name=""/>
+        <p:cNvGrpSpPr/>
+        <p:nvPr/>
+      </p:nvGrpSpPr>
+      <p:grpSpPr>
+        <a:xfrm>
+          <a:off x="0" y="0"/>
+          <a:ext cx="0" cy="0"/>
+          <a:chOff x="0" y="0"/>
+          <a:chExt cx="0" cy="0"/>
+        </a:xfrm>
+      </p:grpSpPr>
+      <p:sp>
+        <p:nvSpPr>
+          <p:cNvPr id="2" name="Title 1"/>
+          <p:cNvSpPr>
+            <a:spLocks noGrp="1"/>
+          </p:cNvSpPr>
+          <p:nvPr>
+            <p:ph type="title"/>
+          </p:nvPr>
+        </p:nvSpPr>
+        <p:spPr/>
+        <p:txBody>
+          <a:bodyPr/>
+          <a:lstStyle/>
+          <a:p>
+            <a:r>
               <a:rPr lang="en-US" dirty="0"/>
-              <a:t>Driving Path Template</a:t>
+              <a:t>Driving </a:t>
             </a:r>
+            <a:r>
+              <a:rPr lang="en-US" dirty="0" smtClean="0"/>
+              <a:t>Path</a:t>
+            </a:r>
+            <a:endParaRPr lang="en-US" dirty="0"/>
           </a:p>
         </p:txBody>
       </p:sp>
@@ -2778,7 +2875,7 @@
           <p:nvPr>
             <p:extLst>
               <p:ext uri="{D42A27DB-BD31-4B8C-83A1-F6EECF244321}">
-                <p14:modId xmlns:p14="http://schemas.microsoft.com/office/powerpoint/2010/main" val="1248873126"/>
+                <p14:modId xmlns:p14="http://schemas.microsoft.com/office/powerpoint/2010/main" val="520240611"/>
               </p:ext>
             </p:extLst>
           </p:nvPr>
@@ -2909,7 +3006,7 @@
     </p:spTree>
     <p:extLst>
       <p:ext uri="{BB962C8B-B14F-4D97-AF65-F5344CB8AC3E}">
-        <p14:creationId xmlns:p14="http://schemas.microsoft.com/office/powerpoint/2010/main" val="325862024"/>
+        <p14:creationId xmlns:p14="http://schemas.microsoft.com/office/powerpoint/2010/main" val="645323306"/>
       </p:ext>
     </p:extLst>
   </p:cSld>
@@ -2919,7 +3016,7 @@
 </p:sld>
 </file>
 
-<file path=ppt/slides/slide4.xml><?xml version="1.0" encoding="utf-8"?>
+<file path=ppt/slides/slide5.xml><?xml version="1.0" encoding="utf-8"?>
 <p:sld xmlns:a="http://schemas.openxmlformats.org/drawingml/2006/main" xmlns:r="http://schemas.openxmlformats.org/officeDocument/2006/relationships" xmlns:p="http://schemas.openxmlformats.org/presentationml/2006/main">
   <p:cSld>
     <p:spTree>
@@ -2951,7 +3048,11 @@
           <a:bodyPr/>
           <a:lstStyle/>
           <a:p>
-            <a:endParaRPr lang="en-US"/>
+            <a:r>
+              <a:rPr lang="en-US" sz="2400" dirty="0" smtClean="0"/>
+              <a:t>Chart</a:t>
+            </a:r>
+            <a:endParaRPr lang="en-US" dirty="0"/>
           </a:p>
         </p:txBody>
       </p:sp>
@@ -2970,34 +3071,38 @@
           <a:bodyPr/>
           <a:lstStyle/>
           <a:p>
-            <a:pPr marL="0" indent="0">
-              <a:buNone/>
-            </a:pPr>
-            <a:r>
-              <a:rPr lang="en-US" b="1" smtClean="0"/>
-              <a:t>Completed Tasks</a:t>
-            </a:r>
-            <a:endParaRPr lang="en-US" b="1" dirty="0" smtClean="0"/>
-          </a:p>
-          <a:p>
-            <a:r>
-              <a:rPr lang="en-US" dirty="0" smtClean="0"/>
-              <a:t>Bullet1</a:t>
-            </a:r>
-          </a:p>
-          <a:p>
-            <a:r>
-              <a:rPr lang="en-US" dirty="0" smtClean="0"/>
-              <a:t>Bullet2</a:t>
-            </a:r>
             <a:endParaRPr lang="en-US" dirty="0"/>
           </a:p>
         </p:txBody>
       </p:sp>
+      <p:graphicFrame>
+        <p:nvGraphicFramePr>
+          <p:cNvPr id="4" name="Content Placeholder 14"/>
+          <p:cNvGraphicFramePr>
+            <a:graphicFrameLocks/>
+          </p:cNvGraphicFramePr>
+          <p:nvPr>
+            <p:extLst>
+              <p:ext uri="{D42A27DB-BD31-4B8C-83A1-F6EECF244321}">
+                <p14:modId xmlns:p14="http://schemas.microsoft.com/office/powerpoint/2010/main" val="1061286466"/>
+              </p:ext>
+            </p:extLst>
+          </p:nvPr>
+        </p:nvGraphicFramePr>
+        <p:xfrm>
+          <a:off x="457200" y="1600200"/>
+          <a:ext cx="8229600" cy="4525963"/>
+        </p:xfrm>
+        <a:graphic>
+          <a:graphicData uri="http://schemas.openxmlformats.org/drawingml/2006/chart">
+            <c:chart xmlns:c="http://schemas.openxmlformats.org/drawingml/2006/chart" xmlns:r="http://schemas.openxmlformats.org/officeDocument/2006/relationships" r:id="rId2"/>
+          </a:graphicData>
+        </a:graphic>
+      </p:graphicFrame>
     </p:spTree>
     <p:extLst>
       <p:ext uri="{BB962C8B-B14F-4D97-AF65-F5344CB8AC3E}">
-        <p14:creationId xmlns:p14="http://schemas.microsoft.com/office/powerpoint/2010/main" val="2878378399"/>
+        <p14:creationId xmlns:p14="http://schemas.microsoft.com/office/powerpoint/2010/main" val="2601612557"/>
       </p:ext>
     </p:extLst>
   </p:cSld>
@@ -3007,7 +3112,7 @@
 </p:sld>
 </file>
 
-<file path=ppt/slides/slide5.xml><?xml version="1.0" encoding="utf-8"?>
+<file path=ppt/slides/slide6.xml><?xml version="1.0" encoding="utf-8"?>
 <p:sld xmlns:a="http://schemas.openxmlformats.org/drawingml/2006/main" xmlns:r="http://schemas.openxmlformats.org/officeDocument/2006/relationships" xmlns:p="http://schemas.openxmlformats.org/presentationml/2006/main">
   <p:cSld>
     <p:spTree>
@@ -3057,7 +3162,7 @@
             <p:ph idx="1"/>
             <p:extLst>
               <p:ext uri="{D42A27DB-BD31-4B8C-83A1-F6EECF244321}">
-                <p14:modId xmlns:p14="http://schemas.microsoft.com/office/powerpoint/2010/main" val="1760334785"/>
+                <p14:modId xmlns:p14="http://schemas.microsoft.com/office/powerpoint/2010/main" val="3946693266"/>
               </p:ext>
             </p:extLst>
           </p:nvPr>
@@ -3616,103 +3721,7 @@
     </p:spTree>
     <p:extLst>
       <p:ext uri="{BB962C8B-B14F-4D97-AF65-F5344CB8AC3E}">
-        <p14:creationId xmlns:p14="http://schemas.microsoft.com/office/powerpoint/2010/main" val="3217937833"/>
-      </p:ext>
-    </p:extLst>
-  </p:cSld>
-  <p:clrMapOvr>
-    <a:masterClrMapping/>
-  </p:clrMapOvr>
-</p:sld>
-</file>
-
-<file path=ppt/slides/slide6.xml><?xml version="1.0" encoding="utf-8"?>
-<p:sld xmlns:a="http://schemas.openxmlformats.org/drawingml/2006/main" xmlns:r="http://schemas.openxmlformats.org/officeDocument/2006/relationships" xmlns:p="http://schemas.openxmlformats.org/presentationml/2006/main">
-  <p:cSld>
-    <p:spTree>
-      <p:nvGrpSpPr>
-        <p:cNvPr id="1" name=""/>
-        <p:cNvGrpSpPr/>
-        <p:nvPr/>
-      </p:nvGrpSpPr>
-      <p:grpSpPr>
-        <a:xfrm>
-          <a:off x="0" y="0"/>
-          <a:ext cx="0" cy="0"/>
-          <a:chOff x="0" y="0"/>
-          <a:chExt cx="0" cy="0"/>
-        </a:xfrm>
-      </p:grpSpPr>
-      <p:sp>
-        <p:nvSpPr>
-          <p:cNvPr id="2" name="Title 1"/>
-          <p:cNvSpPr>
-            <a:spLocks noGrp="1"/>
-          </p:cNvSpPr>
-          <p:nvPr>
-            <p:ph type="title"/>
-          </p:nvPr>
-        </p:nvSpPr>
-        <p:spPr/>
-        <p:txBody>
-          <a:bodyPr/>
-          <a:lstStyle/>
-          <a:p>
-            <a:r>
-              <a:rPr lang="en-US" sz="2400" dirty="0"/>
-              <a:t>Chart Template</a:t>
-            </a:r>
-            <a:endParaRPr lang="en-US" dirty="0"/>
-          </a:p>
-        </p:txBody>
-      </p:sp>
-      <p:sp>
-        <p:nvSpPr>
-          <p:cNvPr id="3" name="Content Placeholder 2"/>
-          <p:cNvSpPr>
-            <a:spLocks noGrp="1"/>
-          </p:cNvSpPr>
-          <p:nvPr>
-            <p:ph idx="1"/>
-          </p:nvPr>
-        </p:nvSpPr>
-        <p:spPr/>
-        <p:txBody>
-          <a:bodyPr/>
-          <a:lstStyle/>
-          <a:p>
-            <a:endParaRPr lang="en-US" dirty="0"/>
-          </a:p>
-        </p:txBody>
-      </p:sp>
-      <p:graphicFrame>
-        <p:nvGraphicFramePr>
-          <p:cNvPr id="4" name="Content Placeholder 14"/>
-          <p:cNvGraphicFramePr>
-            <a:graphicFrameLocks/>
-          </p:cNvGraphicFramePr>
-          <p:nvPr>
-            <p:extLst>
-              <p:ext uri="{D42A27DB-BD31-4B8C-83A1-F6EECF244321}">
-                <p14:modId xmlns:p14="http://schemas.microsoft.com/office/powerpoint/2010/main" val="1061286466"/>
-              </p:ext>
-            </p:extLst>
-          </p:nvPr>
-        </p:nvGraphicFramePr>
-        <p:xfrm>
-          <a:off x="457200" y="1600200"/>
-          <a:ext cx="8229600" cy="4525963"/>
-        </p:xfrm>
-        <a:graphic>
-          <a:graphicData uri="http://schemas.openxmlformats.org/drawingml/2006/chart">
-            <c:chart xmlns:c="http://schemas.openxmlformats.org/drawingml/2006/chart" xmlns:r="http://schemas.openxmlformats.org/officeDocument/2006/relationships" r:id="rId2"/>
-          </a:graphicData>
-        </a:graphic>
-      </p:graphicFrame>
-    </p:spTree>
-    <p:extLst>
-      <p:ext uri="{BB962C8B-B14F-4D97-AF65-F5344CB8AC3E}">
-        <p14:creationId xmlns:p14="http://schemas.microsoft.com/office/powerpoint/2010/main" val="2601612557"/>
+        <p14:creationId xmlns:p14="http://schemas.microsoft.com/office/powerpoint/2010/main" val="2854321287"/>
       </p:ext>
     </p:extLst>
   </p:cSld>

</xml_diff>

<commit_message>
A Table version with Simplified Security, Setings page and New Presentation Page call all the event handlers with new Security mechanism
</commit_message>
<xml_diff>
--- a/PMMPresentation/Modules/Templates/PMM Template.pptx
+++ b/PMMPresentation/Modules/Templates/PMM Template.pptx
@@ -170,10 +170,10 @@
           <c:layoutTarget val="inner"/>
           <c:xMode val="edge"/>
           <c:yMode val="edge"/>
-          <c:x val="0.10803623505395159"/>
+          <c:x val="0.10803623505395173"/>
           <c:y val="6.5983968494660691E-2"/>
           <c:w val="0.86898536988432007"/>
-          <c:h val="0.90314967223549991"/>
+          <c:h val="0.90314967223550113"/>
         </c:manualLayout>
       </c:layout>
       <c:barChart>
@@ -193,7 +193,7 @@
               <c:strCache>
                 <c:ptCount val="1"/>
                 <c:pt idx="0">
-                  <c:v>Task 1: 03/19</c:v>
+                  <c:v>Task 1:  12/20</c:v>
                 </c:pt>
               </c:strCache>
             </c:strRef>
@@ -205,7 +205,7 @@
                 <c:formatCode>m/d/yy;@</c:formatCode>
                 <c:ptCount val="1"/>
                 <c:pt idx="0">
-                  <c:v>41352</c:v>
+                  <c:v>41628</c:v>
                 </c:pt>
               </c:numCache>
             </c:numRef>
@@ -214,14 +214,69 @@
         <c:ser>
           <c:idx val="1"/>
           <c:order val="1"/>
+          <c:spPr>
+            <a:gradFill>
+              <a:gsLst>
+                <a:gs pos="0">
+                  <a:schemeClr val="accent1">
+                    <a:tint val="66000"/>
+                    <a:satMod val="160000"/>
+                  </a:schemeClr>
+                </a:gs>
+                <a:gs pos="50000">
+                  <a:schemeClr val="accent1">
+                    <a:tint val="44500"/>
+                    <a:satMod val="160000"/>
+                  </a:schemeClr>
+                </a:gs>
+                <a:gs pos="100000">
+                  <a:schemeClr val="accent1">
+                    <a:tint val="23500"/>
+                    <a:satMod val="160000"/>
+                  </a:schemeClr>
+                </a:gs>
+              </a:gsLst>
+              <a:lin ang="5400000" scaled="0"/>
+            </a:gradFill>
+          </c:spPr>
           <c:invertIfNegative val="0"/>
+          <c:dPt>
+            <c:idx val="0"/>
+            <c:invertIfNegative val="0"/>
+            <c:bubble3D val="0"/>
+            <c:spPr>
+              <a:gradFill>
+                <a:gsLst>
+                  <a:gs pos="0">
+                    <a:schemeClr val="accent1">
+                      <a:tint val="66000"/>
+                      <a:satMod val="160000"/>
+                    </a:schemeClr>
+                  </a:gs>
+                  <a:gs pos="50000">
+                    <a:schemeClr val="accent1">
+                      <a:tint val="44500"/>
+                      <a:satMod val="160000"/>
+                    </a:schemeClr>
+                  </a:gs>
+                  <a:gs pos="100000">
+                    <a:schemeClr val="accent1">
+                      <a:tint val="23500"/>
+                      <a:satMod val="160000"/>
+                    </a:schemeClr>
+                  </a:gs>
+                </a:gsLst>
+                <a:lin ang="5400000" scaled="0"/>
+              </a:gradFill>
+            </c:spPr>
+          </c:dPt>
           <c:dLbls>
             <c:dLbl>
               <c:idx val="0"/>
               <c:layout>
                 <c:manualLayout>
-                  <c:x val="0.17404466802760765"/>
-                  <c:y val="-2.8055907659872608E-3"/>
+                  <c:x val="0.17404466802760771"/>
+                  <c:y val="-2.8055907659872673E-3"/>
                 </c:manualLayout>
               </c:layout>
               <c:dLblPos val="ctr"/>
@@ -257,7 +312,7 @@
               <c:strCache>
                 <c:ptCount val="1"/>
                 <c:pt idx="0">
-                  <c:v>Task 1: 03/19</c:v>
+                  <c:v>Task 1:  12/20</c:v>
                 </c:pt>
               </c:strCache>
             </c:strRef>
@@ -269,7 +324,7 @@
                 <c:formatCode>General</c:formatCode>
                 <c:ptCount val="1"/>
                 <c:pt idx="0">
-                  <c:v>10</c:v>
+                  <c:v>1</c:v>
                 </c:pt>
               </c:numCache>
             </c:numRef>
@@ -285,11 +340,11 @@
         </c:dLbls>
         <c:gapWidth val="150"/>
         <c:overlap val="100"/>
-        <c:axId val="7758336"/>
-        <c:axId val="54844736"/>
+        <c:axId val="34197504"/>
+        <c:axId val="57404224"/>
       </c:barChart>
       <c:catAx>
-        <c:axId val="7758336"/>
+        <c:axId val="34197504"/>
         <c:scaling>
           <c:orientation val="maxMin"/>
         </c:scaling>
@@ -298,7 +353,7 @@
         <c:majorTickMark val="out"/>
         <c:minorTickMark val="none"/>
         <c:tickLblPos val="nextTo"/>
-        <c:crossAx val="54844736"/>
+        <c:crossAx val="57404224"/>
         <c:crosses val="autoZero"/>
         <c:auto val="1"/>
         <c:lblAlgn val="ctr"/>
@@ -306,7 +361,7 @@
         <c:noMultiLvlLbl val="0"/>
       </c:catAx>
       <c:valAx>
-        <c:axId val="54844736"/>
+        <c:axId val="57404224"/>
         <c:scaling>
           <c:orientation val="minMax"/>
         </c:scaling>
@@ -317,7 +372,7 @@
         <c:majorTickMark val="out"/>
         <c:minorTickMark val="none"/>
         <c:tickLblPos val="nextTo"/>
-        <c:crossAx val="7758336"/>
+        <c:crossAx val="34197504"/>
         <c:crosses val="autoZero"/>
         <c:crossBetween val="between"/>
       </c:valAx>
@@ -1141,7 +1196,7 @@
         <p:nvSpPr>
           <p:cNvPr id="8" name="Rectangle 7"/>
           <p:cNvSpPr/>
-          <p:nvPr userDrawn="1"/>
+          <p:nvPr/>
         </p:nvSpPr>
         <p:spPr bwMode="auto">
           <a:xfrm>
@@ -1214,7 +1269,7 @@
           <p:cNvPicPr>
             <a:picLocks noChangeAspect="1"/>
           </p:cNvPicPr>
-          <p:nvPr userDrawn="1"/>
+          <p:nvPr/>
         </p:nvPicPr>
         <p:blipFill>
           <a:blip r:embed="rId3" cstate="print"/>
@@ -1237,7 +1292,7 @@
         <p:nvSpPr>
           <p:cNvPr id="9" name="Rectangle 8"/>
           <p:cNvSpPr/>
-          <p:nvPr userDrawn="1"/>
+          <p:nvPr/>
         </p:nvSpPr>
         <p:spPr bwMode="auto">
           <a:xfrm>
@@ -1313,7 +1368,7 @@
           <p:cNvSpPr>
             <a:spLocks noChangeArrowheads="1"/>
           </p:cNvSpPr>
-          <p:nvPr userDrawn="1"/>
+          <p:nvPr/>
         </p:nvSpPr>
         <p:spPr bwMode="auto">
           <a:xfrm>
@@ -1490,7 +1545,7 @@
           <p:cNvSpPr txBox="1">
             <a:spLocks noChangeArrowheads="1"/>
           </p:cNvSpPr>
-          <p:nvPr userDrawn="1"/>
+          <p:nvPr/>
         </p:nvSpPr>
         <p:spPr bwMode="auto">
           <a:xfrm>
@@ -1995,7 +2050,7 @@
           <a:p>
             <a:r>
               <a:rPr lang="en-US" dirty="0" smtClean="0"/>
-              <a:t>Slide Title</a:t>
+              <a:t>NGJ PMM Review</a:t>
             </a:r>
             <a:endParaRPr lang="en-US" dirty="0"/>
           </a:p>
@@ -2028,7 +2083,10 @@
             <a:pPr>
               <a:buNone/>
             </a:pPr>
-            <a:endParaRPr lang="en-US" dirty="0" smtClean="0"/>
+            <a:endParaRPr lang="en-US" dirty="0" smtClean="0">
+              <a:latin typeface="Arial" pitchFamily="34" charset="0"/>
+              <a:cs typeface="Arial" pitchFamily="34" charset="0"/>
+            </a:endParaRPr>
           </a:p>
         </p:txBody>
       </p:sp>
@@ -2042,7 +2100,7 @@
         </p:nvSpPr>
         <p:spPr bwMode="auto">
           <a:xfrm>
-            <a:off x="685800" y="2130425"/>
+            <a:off x="935182" y="3163579"/>
             <a:ext cx="7772400" cy="1470025"/>
           </a:xfrm>
           <a:prstGeom prst="rect">
@@ -2222,402 +2280,14 @@
           </a:lstStyle>
           <a:p>
             <a:r>
-              <a:rPr lang="en-US" smtClean="0"/>
-              <a:t>Title Slide</a:t>
+              <a:rPr lang="en-US" dirty="0" smtClean="0"/>
+              <a:t>Next Generation Jammer Weekly Review </a:t>
             </a:r>
-            <a:endParaRPr lang="en-US" dirty="0"/>
-          </a:p>
-        </p:txBody>
-      </p:sp>
-      <p:sp>
-        <p:nvSpPr>
-          <p:cNvPr id="5" name="Title 1"/>
-          <p:cNvSpPr txBox="1">
-            <a:spLocks/>
-          </p:cNvSpPr>
-          <p:nvPr/>
-        </p:nvSpPr>
-        <p:spPr bwMode="auto">
-          <a:xfrm>
-            <a:off x="685800" y="2130425"/>
-            <a:ext cx="7772400" cy="1470025"/>
-          </a:xfrm>
-          <a:prstGeom prst="rect">
-            <a:avLst/>
-          </a:prstGeom>
-          <a:noFill/>
-          <a:ln w="9525">
-            <a:noFill/>
-            <a:miter lim="800000"/>
-            <a:headEnd/>
-            <a:tailEnd/>
-          </a:ln>
-          <a:effectLst/>
-        </p:spPr>
-        <p:txBody>
-          <a:bodyPr vert="horz" wrap="square" lIns="91440" tIns="45720" rIns="91440" bIns="45720" numCol="1" anchor="ctr" anchorCtr="0" compatLnSpc="1">
-            <a:prstTxWarp prst="textNoShape">
-              <a:avLst/>
-            </a:prstTxWarp>
-          </a:bodyPr>
-          <a:lstStyle>
-            <a:lvl1pPr algn="l" rtl="0" fontAlgn="base">
-              <a:lnSpc>
-                <a:spcPct val="85000"/>
-              </a:lnSpc>
-              <a:spcBef>
-                <a:spcPct val="20000"/>
-              </a:spcBef>
-              <a:spcAft>
-                <a:spcPct val="0"/>
-              </a:spcAft>
-              <a:defRPr sz="2200" b="1" i="1" baseline="0">
-                <a:solidFill>
-                  <a:srgbClr val="404040"/>
-                </a:solidFill>
-                <a:latin typeface="+mj-lt"/>
-                <a:ea typeface="+mj-ea"/>
-                <a:cs typeface="+mj-cs"/>
-              </a:defRPr>
-            </a:lvl1pPr>
-            <a:lvl2pPr algn="l" rtl="0" fontAlgn="base">
-              <a:lnSpc>
-                <a:spcPct val="85000"/>
-              </a:lnSpc>
-              <a:spcBef>
-                <a:spcPct val="20000"/>
-              </a:spcBef>
-              <a:spcAft>
-                <a:spcPct val="0"/>
-              </a:spcAft>
-              <a:defRPr sz="2600" b="1">
-                <a:solidFill>
-                  <a:schemeClr val="bg1"/>
-                </a:solidFill>
-                <a:latin typeface="Arial" charset="0"/>
-              </a:defRPr>
-            </a:lvl2pPr>
-            <a:lvl3pPr algn="l" rtl="0" fontAlgn="base">
-              <a:lnSpc>
-                <a:spcPct val="85000"/>
-              </a:lnSpc>
-              <a:spcBef>
-                <a:spcPct val="20000"/>
-              </a:spcBef>
-              <a:spcAft>
-                <a:spcPct val="0"/>
-              </a:spcAft>
-              <a:defRPr sz="2600" b="1">
-                <a:solidFill>
-                  <a:schemeClr val="bg1"/>
-                </a:solidFill>
-                <a:latin typeface="Arial" charset="0"/>
-              </a:defRPr>
-            </a:lvl3pPr>
-            <a:lvl4pPr algn="l" rtl="0" fontAlgn="base">
-              <a:lnSpc>
-                <a:spcPct val="85000"/>
-              </a:lnSpc>
-              <a:spcBef>
-                <a:spcPct val="20000"/>
-              </a:spcBef>
-              <a:spcAft>
-                <a:spcPct val="0"/>
-              </a:spcAft>
-              <a:defRPr sz="2600" b="1">
-                <a:solidFill>
-                  <a:schemeClr val="bg1"/>
-                </a:solidFill>
-                <a:latin typeface="Arial" charset="0"/>
-              </a:defRPr>
-            </a:lvl4pPr>
-            <a:lvl5pPr algn="l" rtl="0" fontAlgn="base">
-              <a:lnSpc>
-                <a:spcPct val="85000"/>
-              </a:lnSpc>
-              <a:spcBef>
-                <a:spcPct val="20000"/>
-              </a:spcBef>
-              <a:spcAft>
-                <a:spcPct val="0"/>
-              </a:spcAft>
-              <a:defRPr sz="2600" b="1">
-                <a:solidFill>
-                  <a:schemeClr val="bg1"/>
-                </a:solidFill>
-                <a:latin typeface="Arial" charset="0"/>
-              </a:defRPr>
-            </a:lvl5pPr>
-            <a:lvl6pPr marL="457200" algn="l" rtl="0" fontAlgn="base">
-              <a:lnSpc>
-                <a:spcPct val="85000"/>
-              </a:lnSpc>
-              <a:spcBef>
-                <a:spcPct val="20000"/>
-              </a:spcBef>
-              <a:spcAft>
-                <a:spcPct val="0"/>
-              </a:spcAft>
-              <a:defRPr sz="2600" b="1">
-                <a:solidFill>
-                  <a:schemeClr val="bg1"/>
-                </a:solidFill>
-                <a:latin typeface="Arial" charset="0"/>
-              </a:defRPr>
-            </a:lvl6pPr>
-            <a:lvl7pPr marL="914400" algn="l" rtl="0" fontAlgn="base">
-              <a:lnSpc>
-                <a:spcPct val="85000"/>
-              </a:lnSpc>
-              <a:spcBef>
-                <a:spcPct val="20000"/>
-              </a:spcBef>
-              <a:spcAft>
-                <a:spcPct val="0"/>
-              </a:spcAft>
-              <a:defRPr sz="2600" b="1">
-                <a:solidFill>
-                  <a:schemeClr val="bg1"/>
-                </a:solidFill>
-                <a:latin typeface="Arial" charset="0"/>
-              </a:defRPr>
-            </a:lvl7pPr>
-            <a:lvl8pPr marL="1371600" algn="l" rtl="0" fontAlgn="base">
-              <a:lnSpc>
-                <a:spcPct val="85000"/>
-              </a:lnSpc>
-              <a:spcBef>
-                <a:spcPct val="20000"/>
-              </a:spcBef>
-              <a:spcAft>
-                <a:spcPct val="0"/>
-              </a:spcAft>
-              <a:defRPr sz="2600" b="1">
-                <a:solidFill>
-                  <a:schemeClr val="bg1"/>
-                </a:solidFill>
-                <a:latin typeface="Arial" charset="0"/>
-              </a:defRPr>
-            </a:lvl8pPr>
-            <a:lvl9pPr marL="1828800" algn="l" rtl="0" fontAlgn="base">
-              <a:lnSpc>
-                <a:spcPct val="85000"/>
-              </a:lnSpc>
-              <a:spcBef>
-                <a:spcPct val="20000"/>
-              </a:spcBef>
-              <a:spcAft>
-                <a:spcPct val="0"/>
-              </a:spcAft>
-              <a:defRPr sz="2600" b="1">
-                <a:solidFill>
-                  <a:schemeClr val="bg1"/>
-                </a:solidFill>
-                <a:latin typeface="Arial" charset="0"/>
-              </a:defRPr>
-            </a:lvl9pPr>
-          </a:lstStyle>
+          </a:p>
           <a:p>
             <a:r>
-              <a:rPr lang="en-US" smtClean="0"/>
-              <a:t>Title Slide</a:t>
-            </a:r>
-            <a:endParaRPr lang="en-US" dirty="0"/>
-          </a:p>
-        </p:txBody>
-      </p:sp>
-      <p:sp>
-        <p:nvSpPr>
-          <p:cNvPr id="6" name="Title 1"/>
-          <p:cNvSpPr txBox="1">
-            <a:spLocks/>
-          </p:cNvSpPr>
-          <p:nvPr/>
-        </p:nvSpPr>
-        <p:spPr bwMode="auto">
-          <a:xfrm>
-            <a:off x="685800" y="2130425"/>
-            <a:ext cx="7772400" cy="1470025"/>
-          </a:xfrm>
-          <a:prstGeom prst="rect">
-            <a:avLst/>
-          </a:prstGeom>
-          <a:noFill/>
-          <a:ln w="9525">
-            <a:noFill/>
-            <a:miter lim="800000"/>
-            <a:headEnd/>
-            <a:tailEnd/>
-          </a:ln>
-          <a:effectLst/>
-        </p:spPr>
-        <p:txBody>
-          <a:bodyPr vert="horz" wrap="square" lIns="91440" tIns="45720" rIns="91440" bIns="45720" numCol="1" anchor="ctr" anchorCtr="0" compatLnSpc="1">
-            <a:prstTxWarp prst="textNoShape">
-              <a:avLst/>
-            </a:prstTxWarp>
-          </a:bodyPr>
-          <a:lstStyle>
-            <a:lvl1pPr algn="l" rtl="0" fontAlgn="base">
-              <a:lnSpc>
-                <a:spcPct val="85000"/>
-              </a:lnSpc>
-              <a:spcBef>
-                <a:spcPct val="20000"/>
-              </a:spcBef>
-              <a:spcAft>
-                <a:spcPct val="0"/>
-              </a:spcAft>
-              <a:defRPr sz="2200" b="1" i="1" baseline="0">
-                <a:solidFill>
-                  <a:srgbClr val="404040"/>
-                </a:solidFill>
-                <a:latin typeface="+mj-lt"/>
-                <a:ea typeface="+mj-ea"/>
-                <a:cs typeface="+mj-cs"/>
-              </a:defRPr>
-            </a:lvl1pPr>
-            <a:lvl2pPr algn="l" rtl="0" fontAlgn="base">
-              <a:lnSpc>
-                <a:spcPct val="85000"/>
-              </a:lnSpc>
-              <a:spcBef>
-                <a:spcPct val="20000"/>
-              </a:spcBef>
-              <a:spcAft>
-                <a:spcPct val="0"/>
-              </a:spcAft>
-              <a:defRPr sz="2600" b="1">
-                <a:solidFill>
-                  <a:schemeClr val="bg1"/>
-                </a:solidFill>
-                <a:latin typeface="Arial" charset="0"/>
-              </a:defRPr>
-            </a:lvl2pPr>
-            <a:lvl3pPr algn="l" rtl="0" fontAlgn="base">
-              <a:lnSpc>
-                <a:spcPct val="85000"/>
-              </a:lnSpc>
-              <a:spcBef>
-                <a:spcPct val="20000"/>
-              </a:spcBef>
-              <a:spcAft>
-                <a:spcPct val="0"/>
-              </a:spcAft>
-              <a:defRPr sz="2600" b="1">
-                <a:solidFill>
-                  <a:schemeClr val="bg1"/>
-                </a:solidFill>
-                <a:latin typeface="Arial" charset="0"/>
-              </a:defRPr>
-            </a:lvl3pPr>
-            <a:lvl4pPr algn="l" rtl="0" fontAlgn="base">
-              <a:lnSpc>
-                <a:spcPct val="85000"/>
-              </a:lnSpc>
-              <a:spcBef>
-                <a:spcPct val="20000"/>
-              </a:spcBef>
-              <a:spcAft>
-                <a:spcPct val="0"/>
-              </a:spcAft>
-              <a:defRPr sz="2600" b="1">
-                <a:solidFill>
-                  <a:schemeClr val="bg1"/>
-                </a:solidFill>
-                <a:latin typeface="Arial" charset="0"/>
-              </a:defRPr>
-            </a:lvl4pPr>
-            <a:lvl5pPr algn="l" rtl="0" fontAlgn="base">
-              <a:lnSpc>
-                <a:spcPct val="85000"/>
-              </a:lnSpc>
-              <a:spcBef>
-                <a:spcPct val="20000"/>
-              </a:spcBef>
-              <a:spcAft>
-                <a:spcPct val="0"/>
-              </a:spcAft>
-              <a:defRPr sz="2600" b="1">
-                <a:solidFill>
-                  <a:schemeClr val="bg1"/>
-                </a:solidFill>
-                <a:latin typeface="Arial" charset="0"/>
-              </a:defRPr>
-            </a:lvl5pPr>
-            <a:lvl6pPr marL="457200" algn="l" rtl="0" fontAlgn="base">
-              <a:lnSpc>
-                <a:spcPct val="85000"/>
-              </a:lnSpc>
-              <a:spcBef>
-                <a:spcPct val="20000"/>
-              </a:spcBef>
-              <a:spcAft>
-                <a:spcPct val="0"/>
-              </a:spcAft>
-              <a:defRPr sz="2600" b="1">
-                <a:solidFill>
-                  <a:schemeClr val="bg1"/>
-                </a:solidFill>
-                <a:latin typeface="Arial" charset="0"/>
-              </a:defRPr>
-            </a:lvl6pPr>
-            <a:lvl7pPr marL="914400" algn="l" rtl="0" fontAlgn="base">
-              <a:lnSpc>
-                <a:spcPct val="85000"/>
-              </a:lnSpc>
-              <a:spcBef>
-                <a:spcPct val="20000"/>
-              </a:spcBef>
-              <a:spcAft>
-                <a:spcPct val="0"/>
-              </a:spcAft>
-              <a:defRPr sz="2600" b="1">
-                <a:solidFill>
-                  <a:schemeClr val="bg1"/>
-                </a:solidFill>
-                <a:latin typeface="Arial" charset="0"/>
-              </a:defRPr>
-            </a:lvl7pPr>
-            <a:lvl8pPr marL="1371600" algn="l" rtl="0" fontAlgn="base">
-              <a:lnSpc>
-                <a:spcPct val="85000"/>
-              </a:lnSpc>
-              <a:spcBef>
-                <a:spcPct val="20000"/>
-              </a:spcBef>
-              <a:spcAft>
-                <a:spcPct val="0"/>
-              </a:spcAft>
-              <a:defRPr sz="2600" b="1">
-                <a:solidFill>
-                  <a:schemeClr val="bg1"/>
-                </a:solidFill>
-                <a:latin typeface="Arial" charset="0"/>
-              </a:defRPr>
-            </a:lvl8pPr>
-            <a:lvl9pPr marL="1828800" algn="l" rtl="0" fontAlgn="base">
-              <a:lnSpc>
-                <a:spcPct val="85000"/>
-              </a:lnSpc>
-              <a:spcBef>
-                <a:spcPct val="20000"/>
-              </a:spcBef>
-              <a:spcAft>
-                <a:spcPct val="0"/>
-              </a:spcAft>
-              <a:defRPr sz="2600" b="1">
-                <a:solidFill>
-                  <a:schemeClr val="bg1"/>
-                </a:solidFill>
-                <a:latin typeface="Arial" charset="0"/>
-              </a:defRPr>
-            </a:lvl9pPr>
-          </a:lstStyle>
-          <a:p>
-            <a:r>
-              <a:rPr lang="en-US" smtClean="0"/>
-              <a:t>Title Slide</a:t>
+              <a:rPr lang="en-US" dirty="0" smtClean="0"/>
+              <a:t>PMM</a:t>
             </a:r>
             <a:endParaRPr lang="en-US" dirty="0"/>
           </a:p>
@@ -2628,6 +2298,13 @@
   <p:clrMapOvr>
     <a:masterClrMapping/>
   </p:clrMapOvr>
+  <p:timing>
+    <p:tnLst>
+      <p:par>
+        <p:cTn id="1" dur="indefinite" restart="never" nodeType="tmRoot"/>
+      </p:par>
+    </p:tnLst>
+  </p:timing>
 </p:sld>
 </file>
 
@@ -2663,7 +2340,11 @@
           <a:bodyPr/>
           <a:lstStyle/>
           <a:p>
-            <a:endParaRPr lang="en-US"/>
+            <a:r>
+              <a:rPr lang="en-US" dirty="0" smtClean="0"/>
+              <a:t>Agenda</a:t>
+            </a:r>
+            <a:endParaRPr lang="en-US" dirty="0"/>
           </a:p>
         </p:txBody>
       </p:sp>
@@ -2684,13 +2365,31 @@
           <a:p>
             <a:r>
               <a:rPr lang="en-US" dirty="0" smtClean="0"/>
-              <a:t>Bullet 1</a:t>
+              <a:t>Driving path tasks</a:t>
             </a:r>
           </a:p>
           <a:p>
             <a:r>
               <a:rPr lang="en-US" dirty="0" smtClean="0"/>
-              <a:t>Bullet 2</a:t>
+              <a:t>Milestone Summary</a:t>
+            </a:r>
+          </a:p>
+          <a:p>
+            <a:r>
+              <a:rPr lang="en-US" dirty="0" smtClean="0"/>
+              <a:t>Upcoming reviews </a:t>
+            </a:r>
+          </a:p>
+          <a:p>
+            <a:r>
+              <a:rPr lang="en-US" dirty="0" smtClean="0"/>
+              <a:t>Late tasks</a:t>
+            </a:r>
+          </a:p>
+          <a:p>
+            <a:r>
+              <a:rPr lang="en-US" dirty="0" smtClean="0"/>
+              <a:t>Performance indicators</a:t>
             </a:r>
           </a:p>
           <a:p>
@@ -2708,6 +2407,13 @@
   <p:clrMapOvr>
     <a:masterClrMapping/>
   </p:clrMapOvr>
+  <p:timing>
+    <p:tnLst>
+      <p:par>
+        <p:cTn id="1" dur="indefinite" restart="never" nodeType="tmRoot"/>
+      </p:par>
+    </p:tnLst>
+  </p:timing>
 </p:sld>
 </file>
 
@@ -2783,14 +2489,14 @@
           <p:nvPr>
             <p:extLst>
               <p:ext uri="{D42A27DB-BD31-4B8C-83A1-F6EECF244321}">
-                <p14:modId xmlns:p14="http://schemas.microsoft.com/office/powerpoint/2010/main" val="1248873126"/>
+                <p14:modId xmlns:p14="http://schemas.microsoft.com/office/powerpoint/2010/main" val="3601572078"/>
               </p:ext>
             </p:extLst>
           </p:nvPr>
         </p:nvGraphicFramePr>
         <p:xfrm>
-          <a:off x="457200" y="1600200"/>
-          <a:ext cx="8305800" cy="457200"/>
+          <a:off x="694707" y="1303317"/>
+          <a:ext cx="8305800" cy="304800"/>
         </p:xfrm>
         <a:graphic>
           <a:graphicData uri="http://schemas.openxmlformats.org/drawingml/2006/table">
@@ -2814,13 +2520,19 @@
                     <a:lstStyle/>
                     <a:p>
                       <a:r>
-                        <a:rPr lang="en-US" sz="1200" dirty="0" smtClean="0"/>
+                        <a:rPr lang="en-US" sz="1100" dirty="0" smtClean="0">
+                          <a:latin typeface="Arial" pitchFamily="34" charset="0"/>
+                          <a:cs typeface="Arial" pitchFamily="34" charset="0"/>
+                        </a:rPr>
                         <a:t>ID</a:t>
                       </a:r>
-                      <a:endParaRPr lang="en-US" sz="1200" b="1" dirty="0"/>
+                      <a:endParaRPr lang="en-US" sz="1100" b="1" dirty="0">
+                        <a:latin typeface="Arial" pitchFamily="34" charset="0"/>
+                        <a:cs typeface="Arial" pitchFamily="34" charset="0"/>
+                      </a:endParaRPr>
                     </a:p>
                   </a:txBody>
-                  <a:tcPr/>
+                  <a:tcPr marL="45720" marR="45720"/>
                 </a:tc>
                 <a:tc>
                   <a:txBody>
@@ -2828,13 +2540,19 @@
                     <a:lstStyle/>
                     <a:p>
                       <a:r>
-                        <a:rPr lang="en-US" sz="1200" dirty="0" smtClean="0"/>
+                        <a:rPr lang="en-US" sz="1100" dirty="0" smtClean="0">
+                          <a:latin typeface="Arial" pitchFamily="34" charset="0"/>
+                          <a:cs typeface="Arial" pitchFamily="34" charset="0"/>
+                        </a:rPr>
                         <a:t>Unique ID</a:t>
                       </a:r>
-                      <a:endParaRPr lang="en-US" sz="1200" b="1" dirty="0"/>
+                      <a:endParaRPr lang="en-US" sz="1100" b="1" dirty="0">
+                        <a:latin typeface="Arial" pitchFamily="34" charset="0"/>
+                        <a:cs typeface="Arial" pitchFamily="34" charset="0"/>
+                      </a:endParaRPr>
                     </a:p>
                   </a:txBody>
-                  <a:tcPr/>
+                  <a:tcPr marL="45720" marR="45720"/>
                 </a:tc>
                 <a:tc>
                   <a:txBody>
@@ -2842,13 +2560,19 @@
                     <a:lstStyle/>
                     <a:p>
                       <a:r>
-                        <a:rPr lang="en-US" sz="1200" dirty="0" smtClean="0"/>
+                        <a:rPr lang="en-US" sz="1100" dirty="0" smtClean="0">
+                          <a:latin typeface="Arial" pitchFamily="34" charset="0"/>
+                          <a:cs typeface="Arial" pitchFamily="34" charset="0"/>
+                        </a:rPr>
                         <a:t>Task</a:t>
                       </a:r>
-                      <a:endParaRPr lang="en-US" sz="1200" b="1" dirty="0"/>
+                      <a:endParaRPr lang="en-US" sz="1100" b="1" dirty="0">
+                        <a:latin typeface="Arial" pitchFamily="34" charset="0"/>
+                        <a:cs typeface="Arial" pitchFamily="34" charset="0"/>
+                      </a:endParaRPr>
                     </a:p>
                   </a:txBody>
-                  <a:tcPr/>
+                  <a:tcPr marL="45720" marR="45720"/>
                 </a:tc>
                 <a:tc>
                   <a:txBody>
@@ -2856,13 +2580,19 @@
                     <a:lstStyle/>
                     <a:p>
                       <a:r>
-                        <a:rPr lang="en-US" sz="1200" dirty="0" smtClean="0"/>
+                        <a:rPr lang="en-US" sz="1100" dirty="0" smtClean="0">
+                          <a:latin typeface="Arial" pitchFamily="34" charset="0"/>
+                          <a:cs typeface="Arial" pitchFamily="34" charset="0"/>
+                        </a:rPr>
                         <a:t>Duration</a:t>
                       </a:r>
-                      <a:endParaRPr lang="en-US" sz="1200" b="1" dirty="0"/>
+                      <a:endParaRPr lang="en-US" sz="1100" b="1" dirty="0">
+                        <a:latin typeface="Arial" pitchFamily="34" charset="0"/>
+                        <a:cs typeface="Arial" pitchFamily="34" charset="0"/>
+                      </a:endParaRPr>
                     </a:p>
                   </a:txBody>
-                  <a:tcPr/>
+                  <a:tcPr marL="45720" marR="45720"/>
                 </a:tc>
                 <a:tc>
                   <a:txBody>
@@ -2870,13 +2600,19 @@
                     <a:lstStyle/>
                     <a:p>
                       <a:r>
-                        <a:rPr lang="en-US" sz="1200" dirty="0" smtClean="0"/>
+                        <a:rPr lang="en-US" sz="1100" dirty="0" smtClean="0">
+                          <a:latin typeface="Arial" pitchFamily="34" charset="0"/>
+                          <a:cs typeface="Arial" pitchFamily="34" charset="0"/>
+                        </a:rPr>
                         <a:t>Predecessor</a:t>
                       </a:r>
-                      <a:endParaRPr lang="en-US" sz="1200" b="1" dirty="0"/>
+                      <a:endParaRPr lang="en-US" sz="1100" b="1" dirty="0">
+                        <a:latin typeface="Arial" pitchFamily="34" charset="0"/>
+                        <a:cs typeface="Arial" pitchFamily="34" charset="0"/>
+                      </a:endParaRPr>
                     </a:p>
                   </a:txBody>
-                  <a:tcPr/>
+                  <a:tcPr marL="45720" marR="45720"/>
                 </a:tc>
                 <a:tc>
                   <a:txBody>
@@ -2884,13 +2620,19 @@
                     <a:lstStyle/>
                     <a:p>
                       <a:r>
-                        <a:rPr lang="en-US" sz="1200" dirty="0" smtClean="0"/>
+                        <a:rPr lang="en-US" sz="1100" dirty="0" smtClean="0">
+                          <a:latin typeface="Arial" pitchFamily="34" charset="0"/>
+                          <a:cs typeface="Arial" pitchFamily="34" charset="0"/>
+                        </a:rPr>
                         <a:t>Start</a:t>
                       </a:r>
-                      <a:endParaRPr lang="en-US" sz="1200" b="1" dirty="0"/>
+                      <a:endParaRPr lang="en-US" sz="1100" b="1" dirty="0">
+                        <a:latin typeface="Arial" pitchFamily="34" charset="0"/>
+                        <a:cs typeface="Arial" pitchFamily="34" charset="0"/>
+                      </a:endParaRPr>
                     </a:p>
                   </a:txBody>
-                  <a:tcPr/>
+                  <a:tcPr marL="45720" marR="45720"/>
                 </a:tc>
                 <a:tc>
                   <a:txBody>
@@ -2898,19 +2640,61 @@
                     <a:lstStyle/>
                     <a:p>
                       <a:r>
-                        <a:rPr lang="en-US" sz="1200" dirty="0" smtClean="0"/>
+                        <a:rPr lang="en-US" sz="1100" dirty="0" smtClean="0">
+                          <a:latin typeface="Arial" pitchFamily="34" charset="0"/>
+                          <a:cs typeface="Arial" pitchFamily="34" charset="0"/>
+                        </a:rPr>
                         <a:t>Finish</a:t>
                       </a:r>
-                      <a:endParaRPr lang="en-US" sz="1200" b="1" dirty="0"/>
+                      <a:endParaRPr lang="en-US" sz="1100" b="1" dirty="0">
+                        <a:latin typeface="Arial" pitchFamily="34" charset="0"/>
+                        <a:cs typeface="Arial" pitchFamily="34" charset="0"/>
+                      </a:endParaRPr>
                     </a:p>
                   </a:txBody>
-                  <a:tcPr/>
+                  <a:tcPr marL="45720" marR="45720"/>
                 </a:tc>
               </a:tr>
             </a:tbl>
           </a:graphicData>
         </a:graphic>
       </p:graphicFrame>
+      <p:sp>
+        <p:nvSpPr>
+          <p:cNvPr id="3" name="TextBox 2"/>
+          <p:cNvSpPr txBox="1"/>
+          <p:nvPr/>
+        </p:nvSpPr>
+        <p:spPr>
+          <a:xfrm>
+            <a:off x="6602681" y="439386"/>
+            <a:ext cx="2541320" cy="461665"/>
+          </a:xfrm>
+          <a:prstGeom prst="rect">
+            <a:avLst/>
+          </a:prstGeom>
+          <a:noFill/>
+        </p:spPr>
+        <p:txBody>
+          <a:bodyPr wrap="square" rtlCol="0">
+            <a:spAutoFit/>
+          </a:bodyPr>
+          <a:lstStyle/>
+          <a:p>
+            <a:r>
+              <a:rPr lang="en-US" dirty="0" smtClean="0">
+                <a:latin typeface="Arial" pitchFamily="34" charset="0"/>
+                <a:cs typeface="Arial" pitchFamily="34" charset="0"/>
+              </a:rPr>
+              <a:t>Driving Path</a:t>
+            </a:r>
+            <a:endParaRPr lang="en-US" dirty="0">
+              <a:latin typeface="Arial" pitchFamily="34" charset="0"/>
+              <a:cs typeface="Arial" pitchFamily="34" charset="0"/>
+            </a:endParaRPr>
+          </a:p>
+        </p:txBody>
+      </p:sp>
     </p:spTree>
     <p:extLst>
       <p:ext uri="{BB962C8B-B14F-4D97-AF65-F5344CB8AC3E}">
@@ -2921,6 +2705,13 @@
   <p:clrMapOvr>
     <a:masterClrMapping/>
   </p:clrMapOvr>
+  <p:timing>
+    <p:tnLst>
+      <p:par>
+        <p:cTn id="1" dur="indefinite" restart="never" nodeType="tmRoot"/>
+      </p:par>
+    </p:tnLst>
+  </p:timing>
 </p:sld>
 </file>
 
@@ -3003,6 +2794,43 @@
           </a:p>
         </p:txBody>
       </p:sp>
+      <p:sp>
+        <p:nvSpPr>
+          <p:cNvPr id="4" name="TextBox 3"/>
+          <p:cNvSpPr txBox="1"/>
+          <p:nvPr/>
+        </p:nvSpPr>
+        <p:spPr>
+          <a:xfrm>
+            <a:off x="5367647" y="481056"/>
+            <a:ext cx="3776354" cy="338554"/>
+          </a:xfrm>
+          <a:prstGeom prst="rect">
+            <a:avLst/>
+          </a:prstGeom>
+          <a:noFill/>
+        </p:spPr>
+        <p:txBody>
+          <a:bodyPr wrap="square" rtlCol="0">
+            <a:spAutoFit/>
+          </a:bodyPr>
+          <a:lstStyle/>
+          <a:p>
+            <a:pPr algn="r"/>
+            <a:r>
+              <a:rPr lang="en-US" sz="1600" b="1" dirty="0" smtClean="0">
+                <a:latin typeface="Arial" pitchFamily="34" charset="0"/>
+                <a:cs typeface="Arial" pitchFamily="34" charset="0"/>
+              </a:rPr>
+              <a:t>Tasks Completed this Fiscal Month</a:t>
+            </a:r>
+            <a:endParaRPr lang="en-US" sz="1600" b="1" dirty="0">
+              <a:latin typeface="Arial" pitchFamily="34" charset="0"/>
+              <a:cs typeface="Arial" pitchFamily="34" charset="0"/>
+            </a:endParaRPr>
+          </a:p>
+        </p:txBody>
+      </p:sp>
     </p:spTree>
     <p:extLst>
       <p:ext uri="{BB962C8B-B14F-4D97-AF65-F5344CB8AC3E}">
@@ -3013,6 +2841,13 @@
   <p:clrMapOvr>
     <a:masterClrMapping/>
   </p:clrMapOvr>
+  <p:timing>
+    <p:tnLst>
+      <p:par>
+        <p:cTn id="1" dur="indefinite" restart="never" nodeType="tmRoot"/>
+      </p:par>
+    </p:tnLst>
+  </p:timing>
 </p:sld>
 </file>
 
@@ -3066,7 +2901,7 @@
             <p:ph idx="1"/>
             <p:extLst>
               <p:ext uri="{D42A27DB-BD31-4B8C-83A1-F6EECF244321}">
-                <p14:modId xmlns:p14="http://schemas.microsoft.com/office/powerpoint/2010/main" val="3433586142"/>
+                <p14:modId xmlns:p14="http://schemas.microsoft.com/office/powerpoint/2010/main" val="2402396504"/>
               </p:ext>
             </p:extLst>
           </p:nvPr>
@@ -3090,12 +2925,12 @@
                 <a:gridCol w="510639"/>
                 <a:gridCol w="581891"/>
                 <a:gridCol w="629392"/>
-                <a:gridCol w="344384"/>
-                <a:gridCol w="415886"/>
+                <a:gridCol w="403761"/>
+                <a:gridCol w="356509"/>
                 <a:gridCol w="654338"/>
                 <a:gridCol w="829828"/>
-                <a:gridCol w="380011"/>
-                <a:gridCol w="569154"/>
+                <a:gridCol w="415637"/>
+                <a:gridCol w="533528"/>
                 <a:gridCol w="537225"/>
               </a:tblGrid>
               <a:tr h="235941">
@@ -3105,18 +2940,21 @@
                     <a:lstStyle/>
                     <a:p>
                       <a:r>
-                        <a:rPr lang="en-US" sz="1000" b="0" i="0" kern="1200" baseline="0" dirty="0" smtClean="0">
+                        <a:rPr lang="en-US" sz="900" b="0" i="0" kern="1200" baseline="0" dirty="0" smtClean="0">
                           <a:solidFill>
                             <a:schemeClr val="lt1"/>
                           </a:solidFill>
                           <a:effectLst/>
-                          <a:latin typeface="+mn-lt"/>
+                          <a:latin typeface="Arial" pitchFamily="34" charset="0"/>
                           <a:ea typeface="+mn-ea"/>
-                          <a:cs typeface="+mn-cs"/>
+                          <a:cs typeface="Arial" pitchFamily="34" charset="0"/>
                         </a:rPr>
                         <a:t>UID</a:t>
                       </a:r>
-                      <a:endParaRPr lang="en-US" sz="1000" baseline="0" dirty="0"/>
+                      <a:endParaRPr lang="en-US" sz="900" baseline="0" dirty="0">
+                        <a:latin typeface="Arial" pitchFamily="34" charset="0"/>
+                        <a:cs typeface="Arial" pitchFamily="34" charset="0"/>
+                      </a:endParaRPr>
                     </a:p>
                   </a:txBody>
                   <a:tcPr marL="45720" marR="45720" marB="0"/>
@@ -3127,18 +2965,21 @@
                     <a:lstStyle/>
                     <a:p>
                       <a:r>
-                        <a:rPr lang="en-US" sz="1000" b="0" i="0" kern="1200" baseline="0" dirty="0" smtClean="0">
+                        <a:rPr lang="en-US" sz="900" b="0" i="0" kern="1200" baseline="0" dirty="0" smtClean="0">
                           <a:solidFill>
                             <a:schemeClr val="lt1"/>
                           </a:solidFill>
                           <a:effectLst/>
-                          <a:latin typeface="+mn-lt"/>
+                          <a:latin typeface="Arial" pitchFamily="34" charset="0"/>
                           <a:ea typeface="+mn-ea"/>
-                          <a:cs typeface="+mn-cs"/>
+                          <a:cs typeface="Arial" pitchFamily="34" charset="0"/>
                         </a:rPr>
                         <a:t>CA </a:t>
                       </a:r>
-                      <a:endParaRPr lang="en-US" sz="1000" baseline="0" dirty="0"/>
+                      <a:endParaRPr lang="en-US" sz="900" baseline="0" dirty="0">
+                        <a:latin typeface="Arial" pitchFamily="34" charset="0"/>
+                        <a:cs typeface="Arial" pitchFamily="34" charset="0"/>
+                      </a:endParaRPr>
                     </a:p>
                   </a:txBody>
                   <a:tcPr marL="45720" marR="45720" marB="0"/>
@@ -3149,10 +2990,16 @@
                     <a:lstStyle/>
                     <a:p>
                       <a:r>
-                        <a:rPr lang="en-US" sz="1000" b="0" baseline="0" dirty="0" smtClean="0"/>
+                        <a:rPr lang="en-US" sz="900" b="0" baseline="0" dirty="0" smtClean="0">
+                          <a:latin typeface="Arial" pitchFamily="34" charset="0"/>
+                          <a:cs typeface="Arial" pitchFamily="34" charset="0"/>
+                        </a:rPr>
                         <a:t>TASK NAME</a:t>
                       </a:r>
-                      <a:endParaRPr lang="en-US" sz="1000" b="0" baseline="0" dirty="0"/>
+                      <a:endParaRPr lang="en-US" sz="900" b="0" baseline="0" dirty="0">
+                        <a:latin typeface="Arial" pitchFamily="34" charset="0"/>
+                        <a:cs typeface="Arial" pitchFamily="34" charset="0"/>
+                      </a:endParaRPr>
                     </a:p>
                   </a:txBody>
                   <a:tcPr marL="45720" marR="45720" marB="0"/>
@@ -3163,30 +3010,21 @@
                     <a:lstStyle/>
                     <a:p>
                       <a:r>
-                        <a:rPr lang="en-US" sz="1000" b="0" i="0" kern="1200" baseline="0" dirty="0" smtClean="0">
+                        <a:rPr lang="en-US" sz="900" b="0" i="0" kern="1200" baseline="0" dirty="0" smtClean="0">
                           <a:solidFill>
                             <a:schemeClr val="lt1"/>
                           </a:solidFill>
                           <a:effectLst/>
-                          <a:latin typeface="+mn-lt"/>
+                          <a:latin typeface="Arial" pitchFamily="34" charset="0"/>
                           <a:ea typeface="+mn-ea"/>
-                          <a:cs typeface="+mn-cs"/>
+                          <a:cs typeface="Arial" pitchFamily="34" charset="0"/>
                         </a:rPr>
-                        <a:t>TS</a:t>
+                        <a:t>TS </a:t>
                       </a:r>
-                      <a:r>
-                        <a:rPr lang="en-US" sz="1000" b="0" i="0" kern="1200" baseline="0" dirty="0" smtClean="0">
-                          <a:solidFill>
-                            <a:schemeClr val="lt1"/>
-                          </a:solidFill>
-                          <a:effectLst/>
-                          <a:latin typeface="+mn-lt"/>
-                          <a:ea typeface="+mn-ea"/>
-                          <a:cs typeface="+mn-cs"/>
-                        </a:rPr>
-                        <a:t> </a:t>
-                      </a:r>
-                      <a:endParaRPr lang="en-US" sz="1000" baseline="0" dirty="0"/>
+                      <a:endParaRPr lang="en-US" sz="900" baseline="0" dirty="0">
+                        <a:latin typeface="Arial" pitchFamily="34" charset="0"/>
+                        <a:cs typeface="Arial" pitchFamily="34" charset="0"/>
+                      </a:endParaRPr>
                     </a:p>
                   </a:txBody>
                   <a:tcPr marL="45720" marR="45720" marB="0"/>
@@ -3197,18 +3035,21 @@
                     <a:lstStyle/>
                     <a:p>
                       <a:r>
-                        <a:rPr lang="en-US" sz="1000" b="0" i="0" kern="1200" baseline="0" dirty="0" smtClean="0">
+                        <a:rPr lang="en-US" sz="900" b="0" i="0" kern="1200" baseline="0" dirty="0" smtClean="0">
                           <a:solidFill>
                             <a:schemeClr val="lt1"/>
                           </a:solidFill>
                           <a:effectLst/>
-                          <a:latin typeface="+mn-lt"/>
+                          <a:latin typeface="Arial" pitchFamily="34" charset="0"/>
                           <a:ea typeface="+mn-ea"/>
-                          <a:cs typeface="+mn-cs"/>
+                          <a:cs typeface="Arial" pitchFamily="34" charset="0"/>
                         </a:rPr>
                         <a:t>Start</a:t>
                       </a:r>
-                      <a:endParaRPr lang="en-US" sz="1000" baseline="0" dirty="0"/>
+                      <a:endParaRPr lang="en-US" sz="900" baseline="0" dirty="0">
+                        <a:latin typeface="Arial" pitchFamily="34" charset="0"/>
+                        <a:cs typeface="Arial" pitchFamily="34" charset="0"/>
+                      </a:endParaRPr>
                     </a:p>
                   </a:txBody>
                   <a:tcPr marL="45720" marR="45720" marB="0"/>
@@ -3219,18 +3060,21 @@
                     <a:lstStyle/>
                     <a:p>
                       <a:r>
-                        <a:rPr lang="en-US" sz="1000" b="0" i="0" kern="1200" baseline="0" dirty="0" smtClean="0">
+                        <a:rPr lang="en-US" sz="900" b="0" i="0" kern="1200" baseline="0" dirty="0" smtClean="0">
                           <a:solidFill>
                             <a:schemeClr val="lt1"/>
                           </a:solidFill>
                           <a:effectLst/>
-                          <a:latin typeface="+mn-lt"/>
+                          <a:latin typeface="Arial" pitchFamily="34" charset="0"/>
                           <a:ea typeface="+mn-ea"/>
-                          <a:cs typeface="+mn-cs"/>
+                          <a:cs typeface="Arial" pitchFamily="34" charset="0"/>
                         </a:rPr>
                         <a:t>Finish</a:t>
                       </a:r>
-                      <a:endParaRPr lang="en-US" sz="1000" baseline="0" dirty="0"/>
+                      <a:endParaRPr lang="en-US" sz="900" baseline="0" dirty="0">
+                        <a:latin typeface="Arial" pitchFamily="34" charset="0"/>
+                        <a:cs typeface="Arial" pitchFamily="34" charset="0"/>
+                      </a:endParaRPr>
                     </a:p>
                   </a:txBody>
                   <a:tcPr marL="45720" marR="45720" marB="0"/>
@@ -3241,18 +3085,21 @@
                     <a:lstStyle/>
                     <a:p>
                       <a:r>
-                        <a:rPr lang="en-US" sz="1000" b="0" i="0" kern="1200" baseline="0" dirty="0" smtClean="0">
+                        <a:rPr lang="en-US" sz="900" b="0" i="0" kern="1200" baseline="0" dirty="0" smtClean="0">
                           <a:solidFill>
                             <a:schemeClr val="lt1"/>
                           </a:solidFill>
                           <a:effectLst/>
-                          <a:latin typeface="+mn-lt"/>
+                          <a:latin typeface="Arial" pitchFamily="34" charset="0"/>
                           <a:ea typeface="+mn-ea"/>
-                          <a:cs typeface="+mn-cs"/>
+                          <a:cs typeface="Arial" pitchFamily="34" charset="0"/>
                         </a:rPr>
                         <a:t>BL Start</a:t>
                       </a:r>
-                      <a:endParaRPr lang="en-US" sz="1000" baseline="0" dirty="0"/>
+                      <a:endParaRPr lang="en-US" sz="900" baseline="0" dirty="0">
+                        <a:latin typeface="Arial" pitchFamily="34" charset="0"/>
+                        <a:cs typeface="Arial" pitchFamily="34" charset="0"/>
+                      </a:endParaRPr>
                     </a:p>
                   </a:txBody>
                   <a:tcPr marL="45720" marR="45720" marB="0"/>
@@ -3263,106 +3110,21 @@
                     <a:lstStyle/>
                     <a:p>
                       <a:r>
-                        <a:rPr lang="en-US" sz="1000" b="0" i="0" kern="1200" baseline="0" dirty="0" smtClean="0">
+                        <a:rPr lang="en-US" sz="900" b="0" i="0" kern="1200" baseline="0" dirty="0" smtClean="0">
                           <a:solidFill>
                             <a:schemeClr val="lt1"/>
                           </a:solidFill>
                           <a:effectLst/>
-                          <a:latin typeface="+mn-lt"/>
+                          <a:latin typeface="Arial" pitchFamily="34" charset="0"/>
                           <a:ea typeface="+mn-ea"/>
-                          <a:cs typeface="+mn-cs"/>
+                          <a:cs typeface="Arial" pitchFamily="34" charset="0"/>
                         </a:rPr>
                         <a:t>BL Finish</a:t>
                       </a:r>
-                      <a:endParaRPr lang="en-US" sz="1000" baseline="0" dirty="0"/>
-                    </a:p>
-                  </a:txBody>
-                  <a:tcPr marL="45720" marR="45720" marB="0"/>
-                </a:tc>
-                <a:tc>
-                  <a:txBody>
-                    <a:bodyPr/>
-                    <a:lstStyle/>
-                    <a:p>
-                      <a:r>
-                        <a:rPr lang="en-US" sz="1000" b="0" i="0" kern="1200" baseline="0" dirty="0" smtClean="0">
-                          <a:solidFill>
-                            <a:schemeClr val="lt1"/>
-                          </a:solidFill>
-                          <a:effectLst/>
-                          <a:latin typeface="+mn-lt"/>
-                          <a:ea typeface="+mn-ea"/>
-                          <a:cs typeface="+mn-cs"/>
-                        </a:rPr>
-                        <a:t>HRs</a:t>
-                      </a:r>
-                      <a:endParaRPr lang="en-US" sz="1000" baseline="0" dirty="0"/>
-                    </a:p>
-                  </a:txBody>
-                  <a:tcPr marL="45720" marR="45720" marB="0"/>
-                </a:tc>
-                <a:tc>
-                  <a:txBody>
-                    <a:bodyPr/>
-                    <a:lstStyle/>
-                    <a:p>
-                      <a:r>
-                        <a:rPr lang="en-US" sz="1000" b="0" i="0" kern="1200" baseline="0" dirty="0" smtClean="0">
-                          <a:solidFill>
-                            <a:schemeClr val="lt1"/>
-                          </a:solidFill>
-                          <a:effectLst/>
-                          <a:latin typeface="+mn-lt"/>
-                          <a:ea typeface="+mn-ea"/>
-                          <a:cs typeface="+mn-cs"/>
-                        </a:rPr>
-                        <a:t>PMT</a:t>
-                      </a:r>
-                      <a:endParaRPr lang="en-US" sz="1000" baseline="0" dirty="0"/>
-                    </a:p>
-                  </a:txBody>
-                  <a:tcPr marL="45720" marR="45720" marB="0"/>
-                </a:tc>
-                <a:tc>
-                  <a:txBody>
-                    <a:bodyPr/>
-                    <a:lstStyle/>
-                    <a:p>
-                      <a:r>
-                        <a:rPr lang="en-US" sz="1000" b="0" i="0" kern="1200" baseline="0" dirty="0" smtClean="0">
-                          <a:solidFill>
-                            <a:schemeClr val="lt1"/>
-                          </a:solidFill>
-                          <a:effectLst/>
-                          <a:latin typeface="+mn-lt"/>
-                          <a:ea typeface="+mn-ea"/>
-                          <a:cs typeface="+mn-cs"/>
-                        </a:rPr>
-                        <a:t>Reason</a:t>
-                      </a:r>
-                      <a:endParaRPr lang="en-US" sz="1000" baseline="0" dirty="0"/>
-                    </a:p>
-                  </a:txBody>
-                  <a:tcPr marL="45720" marR="45720" marB="0"/>
-                </a:tc>
-                <a:tc>
-                  <a:txBody>
-                    <a:bodyPr/>
-                    <a:lstStyle/>
-                    <a:p>
-                      <a:r>
-                        <a:rPr lang="en-US" sz="1000" b="0" i="0" kern="1200" baseline="0" dirty="0" smtClean="0">
-                          <a:solidFill>
-                            <a:schemeClr val="lt1"/>
-                          </a:solidFill>
-                          <a:effectLst/>
-                          <a:latin typeface="+mn-lt"/>
-                          <a:ea typeface="+mn-ea"/>
-                          <a:cs typeface="+mn-cs"/>
-                        </a:rPr>
-                        <a:t>Impacted</a:t>
-                      </a:r>
-                      <a:endParaRPr lang="en-US" sz="1000" baseline="0" dirty="0"/>
+                      <a:endParaRPr lang="en-US" sz="900" baseline="0" dirty="0">
+                        <a:latin typeface="Arial" pitchFamily="34" charset="0"/>
+                        <a:cs typeface="Arial" pitchFamily="34" charset="0"/>
+                      </a:endParaRPr>
                     </a:p>
                   </a:txBody>
                   <a:tcPr marL="45720" marR="45720" marB="0"/>
@@ -3378,13 +3140,116 @@
                             <a:schemeClr val="lt1"/>
                           </a:solidFill>
                           <a:effectLst/>
-                          <a:latin typeface="+mn-lt"/>
+                          <a:latin typeface="Arial" pitchFamily="34" charset="0"/>
                           <a:ea typeface="+mn-ea"/>
-                          <a:cs typeface="+mn-cs"/>
+                          <a:cs typeface="Arial" pitchFamily="34" charset="0"/>
+                        </a:rPr>
+                        <a:t>HRs</a:t>
+                      </a:r>
+                      <a:endParaRPr lang="en-US" sz="900" baseline="0" dirty="0">
+                        <a:latin typeface="Arial" pitchFamily="34" charset="0"/>
+                        <a:cs typeface="Arial" pitchFamily="34" charset="0"/>
+                      </a:endParaRPr>
+                    </a:p>
+                  </a:txBody>
+                  <a:tcPr marL="45720" marR="45720" marB="0"/>
+                </a:tc>
+                <a:tc>
+                  <a:txBody>
+                    <a:bodyPr/>
+                    <a:lstStyle/>
+                    <a:p>
+                      <a:r>
+                        <a:rPr lang="en-US" sz="900" b="0" i="0" kern="1200" baseline="0" dirty="0" smtClean="0">
+                          <a:solidFill>
+                            <a:schemeClr val="lt1"/>
+                          </a:solidFill>
+                          <a:effectLst/>
+                          <a:latin typeface="Arial" pitchFamily="34" charset="0"/>
+                          <a:ea typeface="+mn-ea"/>
+                          <a:cs typeface="Arial" pitchFamily="34" charset="0"/>
+                        </a:rPr>
+                        <a:t>PMT</a:t>
+                      </a:r>
+                      <a:endParaRPr lang="en-US" sz="900" baseline="0" dirty="0">
+                        <a:latin typeface="Arial" pitchFamily="34" charset="0"/>
+                        <a:cs typeface="Arial" pitchFamily="34" charset="0"/>
+                      </a:endParaRPr>
+                    </a:p>
+                  </a:txBody>
+                  <a:tcPr marL="45720" marR="45720" marB="0"/>
+                </a:tc>
+                <a:tc>
+                  <a:txBody>
+                    <a:bodyPr/>
+                    <a:lstStyle/>
+                    <a:p>
+                      <a:r>
+                        <a:rPr lang="en-US" sz="900" b="0" i="0" kern="1200" baseline="0" dirty="0" smtClean="0">
+                          <a:solidFill>
+                            <a:schemeClr val="lt1"/>
+                          </a:solidFill>
+                          <a:effectLst/>
+                          <a:latin typeface="Arial" pitchFamily="34" charset="0"/>
+                          <a:ea typeface="+mn-ea"/>
+                          <a:cs typeface="Arial" pitchFamily="34" charset="0"/>
+                        </a:rPr>
+                        <a:t>Reason</a:t>
+                      </a:r>
+                      <a:endParaRPr lang="en-US" sz="900" baseline="0" dirty="0">
+                        <a:latin typeface="Arial" pitchFamily="34" charset="0"/>
+                        <a:cs typeface="Arial" pitchFamily="34" charset="0"/>
+                      </a:endParaRPr>
+                    </a:p>
+                  </a:txBody>
+                  <a:tcPr marL="45720" marR="45720" marB="0"/>
+                </a:tc>
+                <a:tc>
+                  <a:txBody>
+                    <a:bodyPr/>
+                    <a:lstStyle/>
+                    <a:p>
+                      <a:r>
+                        <a:rPr lang="en-US" sz="900" b="0" i="0" kern="1200" baseline="0" dirty="0" smtClean="0">
+                          <a:solidFill>
+                            <a:schemeClr val="lt1"/>
+                          </a:solidFill>
+                          <a:effectLst/>
+                          <a:latin typeface="Arial" pitchFamily="34" charset="0"/>
+                          <a:ea typeface="+mn-ea"/>
+                          <a:cs typeface="Arial" pitchFamily="34" charset="0"/>
+                        </a:rPr>
+                        <a:t>Impacted</a:t>
+                      </a:r>
+                      <a:endParaRPr lang="en-US" sz="900" baseline="0" dirty="0">
+                        <a:latin typeface="Arial" pitchFamily="34" charset="0"/>
+                        <a:cs typeface="Arial" pitchFamily="34" charset="0"/>
+                      </a:endParaRPr>
+                    </a:p>
+                  </a:txBody>
+                  <a:tcPr marL="45720" marR="45720" marB="0"/>
+                </a:tc>
+                <a:tc>
+                  <a:txBody>
+                    <a:bodyPr/>
+                    <a:lstStyle/>
+                    <a:p>
+                      <a:r>
+                        <a:rPr lang="en-US" sz="700" b="0" i="0" kern="1200" baseline="0" dirty="0" smtClean="0">
+                          <a:solidFill>
+                            <a:schemeClr val="lt1"/>
+                          </a:solidFill>
+                          <a:effectLst/>
+                          <a:latin typeface="Arial" pitchFamily="34" charset="0"/>
+                          <a:ea typeface="+mn-ea"/>
+                          <a:cs typeface="Arial" pitchFamily="34" charset="0"/>
                         </a:rPr>
                         <a:t>DUR</a:t>
                       </a:r>
-                      <a:endParaRPr lang="en-US" sz="800" baseline="0" dirty="0"/>
+                      <a:endParaRPr lang="en-US" sz="700" baseline="0" dirty="0">
+                        <a:latin typeface="Arial" pitchFamily="34" charset="0"/>
+                        <a:cs typeface="Arial" pitchFamily="34" charset="0"/>
+                      </a:endParaRPr>
                     </a:p>
                   </a:txBody>
                   <a:tcPr marL="45720" marR="45720" marB="0"/>
@@ -3412,42 +3277,33 @@
                         <a:defRPr/>
                       </a:pPr>
                       <a:r>
-                        <a:rPr lang="en-US" sz="1000" b="0" i="0" kern="1200" baseline="0" dirty="0" err="1" smtClean="0">
+                        <a:rPr lang="en-US" sz="900" b="0" i="0" kern="1200" baseline="0" dirty="0" err="1" smtClean="0">
                           <a:solidFill>
                             <a:schemeClr val="lt1"/>
                           </a:solidFill>
                           <a:effectLst/>
-                          <a:latin typeface="+mn-lt"/>
+                          <a:latin typeface="Arial" pitchFamily="34" charset="0"/>
                           <a:ea typeface="+mn-ea"/>
-                          <a:cs typeface="+mn-cs"/>
+                          <a:cs typeface="Arial" pitchFamily="34" charset="0"/>
                         </a:rPr>
                         <a:t>Est</a:t>
                       </a:r>
                       <a:r>
-                        <a:rPr lang="en-US" sz="1000" b="0" i="0" kern="1200" baseline="0" dirty="0" smtClean="0">
+                        <a:rPr lang="en-US" sz="900" b="0" i="0" kern="1200" baseline="0" dirty="0" smtClean="0">
                           <a:solidFill>
                             <a:schemeClr val="lt1"/>
                           </a:solidFill>
                           <a:effectLst/>
-                          <a:latin typeface="+mn-lt"/>
+                          <a:latin typeface="Arial" pitchFamily="34" charset="0"/>
                           <a:ea typeface="+mn-ea"/>
-                          <a:cs typeface="+mn-cs"/>
+                          <a:cs typeface="Arial" pitchFamily="34" charset="0"/>
                         </a:rPr>
-                        <a:t> </a:t>
+                        <a:t> Start</a:t>
                       </a:r>
-                      <a:r>
-                        <a:rPr lang="en-US" sz="1000" b="0" i="0" kern="1200" baseline="0" dirty="0" smtClean="0">
-                          <a:solidFill>
-                            <a:schemeClr val="lt1"/>
-                          </a:solidFill>
-                          <a:effectLst/>
-                          <a:latin typeface="+mn-lt"/>
-                          <a:ea typeface="+mn-ea"/>
-                          <a:cs typeface="+mn-cs"/>
-                        </a:rPr>
-                        <a:t>Start</a:t>
-                      </a:r>
-                      <a:endParaRPr lang="en-US" sz="1000" baseline="0" dirty="0"/>
+                      <a:endParaRPr lang="en-US" sz="900" baseline="0" dirty="0">
+                        <a:latin typeface="Arial" pitchFamily="34" charset="0"/>
+                        <a:cs typeface="Arial" pitchFamily="34" charset="0"/>
+                      </a:endParaRPr>
                     </a:p>
                   </a:txBody>
                   <a:tcPr marL="45720" marR="45720" marB="0"/>
@@ -3458,42 +3314,33 @@
                     <a:lstStyle/>
                     <a:p>
                       <a:r>
-                        <a:rPr lang="en-US" sz="1000" b="0" i="0" kern="1200" baseline="0" dirty="0" err="1" smtClean="0">
+                        <a:rPr lang="en-US" sz="900" b="0" i="0" kern="1200" baseline="0" dirty="0" err="1" smtClean="0">
                           <a:solidFill>
                             <a:schemeClr val="lt1"/>
                           </a:solidFill>
                           <a:effectLst/>
-                          <a:latin typeface="+mn-lt"/>
+                          <a:latin typeface="Arial" pitchFamily="34" charset="0"/>
                           <a:ea typeface="+mn-ea"/>
-                          <a:cs typeface="+mn-cs"/>
+                          <a:cs typeface="Arial" pitchFamily="34" charset="0"/>
                         </a:rPr>
                         <a:t>Est</a:t>
                       </a:r>
                       <a:r>
-                        <a:rPr lang="en-US" sz="1000" b="0" i="0" kern="1200" baseline="0" dirty="0" smtClean="0">
+                        <a:rPr lang="en-US" sz="900" b="0" i="0" kern="1200" baseline="0" dirty="0" smtClean="0">
                           <a:solidFill>
                             <a:schemeClr val="lt1"/>
                           </a:solidFill>
                           <a:effectLst/>
-                          <a:latin typeface="+mn-lt"/>
+                          <a:latin typeface="Arial" pitchFamily="34" charset="0"/>
                           <a:ea typeface="+mn-ea"/>
-                          <a:cs typeface="+mn-cs"/>
+                          <a:cs typeface="Arial" pitchFamily="34" charset="0"/>
                         </a:rPr>
-                        <a:t> </a:t>
+                        <a:t> Fin</a:t>
                       </a:r>
-                      <a:r>
-                        <a:rPr lang="en-US" sz="1000" b="0" i="0" kern="1200" baseline="0" dirty="0" smtClean="0">
-                          <a:solidFill>
-                            <a:schemeClr val="lt1"/>
-                          </a:solidFill>
-                          <a:effectLst/>
-                          <a:latin typeface="+mn-lt"/>
-                          <a:ea typeface="+mn-ea"/>
-                          <a:cs typeface="+mn-cs"/>
-                        </a:rPr>
-                        <a:t>Fin</a:t>
-                      </a:r>
-                      <a:endParaRPr lang="en-US" sz="1000" baseline="0" dirty="0"/>
+                      <a:endParaRPr lang="en-US" sz="900" baseline="0" dirty="0">
+                        <a:latin typeface="Arial" pitchFamily="34" charset="0"/>
+                        <a:cs typeface="Arial" pitchFamily="34" charset="0"/>
+                      </a:endParaRPr>
                     </a:p>
                   </a:txBody>
                   <a:tcPr marL="45720" marR="45720" marB="0"/>
@@ -3513,6 +3360,13 @@
   <p:clrMapOvr>
     <a:masterClrMapping/>
   </p:clrMapOvr>
+  <p:timing>
+    <p:tnLst>
+      <p:par>
+        <p:cTn id="1" dur="indefinite" restart="never" nodeType="tmRoot"/>
+      </p:par>
+    </p:tnLst>
+  </p:timing>
 </p:sld>
 </file>
 
@@ -3584,7 +3438,7 @@
           <p:nvPr>
             <p:extLst>
               <p:ext uri="{D42A27DB-BD31-4B8C-83A1-F6EECF244321}">
-                <p14:modId xmlns:p14="http://schemas.microsoft.com/office/powerpoint/2010/main" val="1061286466"/>
+                <p14:modId xmlns:p14="http://schemas.microsoft.com/office/powerpoint/2010/main" val="1273810074"/>
               </p:ext>
             </p:extLst>
           </p:nvPr>
@@ -3609,6 +3463,13 @@
   <p:clrMapOvr>
     <a:masterClrMapping/>
   </p:clrMapOvr>
+  <p:timing>
+    <p:tnLst>
+      <p:par>
+        <p:cTn id="1" dur="indefinite" restart="never" nodeType="tmRoot"/>
+      </p:par>
+    </p:tnLst>
+  </p:timing>
 </p:sld>
 </file>
 
@@ -5246,14 +5107,14 @@
 <file path=customXml/itemProps2.xml><?xml version="1.0" encoding="utf-8"?>
 <ds:datastoreItem xmlns:ds="http://schemas.openxmlformats.org/officeDocument/2006/customXml" ds:itemID="{F08FFFF7-6ACE-4B4C-AA05-EAF8BD457E72}">
   <ds:schemaRefs>
+    <ds:schemaRef ds:uri="http://www.w3.org/XML/1998/namespace"/>
+    <ds:schemaRef ds:uri="http://schemas.microsoft.com/office/infopath/2007/PartnerControls"/>
     <ds:schemaRef ds:uri="http://schemas.microsoft.com/office/2006/metadata/properties"/>
+    <ds:schemaRef ds:uri="http://purl.org/dc/dcmitype/"/>
+    <ds:schemaRef ds:uri="http://purl.org/dc/elements/1.1/"/>
     <ds:schemaRef ds:uri="http://schemas.microsoft.com/office/2006/documentManagement/types"/>
-    <ds:schemaRef ds:uri="http://purl.org/dc/dcmitype/"/>
-    <ds:schemaRef ds:uri="http://www.w3.org/XML/1998/namespace"/>
-    <ds:schemaRef ds:uri="http://purl.org/dc/elements/1.1/"/>
+    <ds:schemaRef ds:uri="http://schemas.openxmlformats.org/package/2006/metadata/core-properties"/>
     <ds:schemaRef ds:uri="http://purl.org/dc/terms/"/>
-    <ds:schemaRef ds:uri="http://schemas.microsoft.com/office/infopath/2007/PartnerControls"/>
-    <ds:schemaRef ds:uri="http://schemas.openxmlformats.org/package/2006/metadata/core-properties"/>
   </ds:schemaRefs>
 </ds:datastoreItem>
 </file>

</xml_diff>

<commit_message>
A stable version that includes simplified security mechanism and PMM Settings and NEW PMM page modified
</commit_message>
<xml_diff>
--- a/PMMPresentation/Modules/Templates/PMM Template.pptx
+++ b/PMMPresentation/Modules/Templates/PMM Template.pptx
@@ -244,31 +244,6 @@
             <c:idx val="0"/>
             <c:invertIfNegative val="0"/>
             <c:bubble3D val="0"/>
-            <c:spPr>
-              <a:gradFill>
-                <a:gsLst>
-                  <a:gs pos="0">
-                    <a:schemeClr val="accent1">
-                      <a:tint val="66000"/>
-                      <a:satMod val="160000"/>
-                    </a:schemeClr>
-                  </a:gs>
-                  <a:gs pos="50000">
-                    <a:schemeClr val="accent1">
-                      <a:tint val="44500"/>
-                      <a:satMod val="160000"/>
-                    </a:schemeClr>
-                  </a:gs>
-                  <a:gs pos="100000">
-                    <a:schemeClr val="accent1">
-                      <a:tint val="23500"/>
-                      <a:satMod val="160000"/>
-                    </a:schemeClr>
-                  </a:gs>
-                </a:gsLst>
-                <a:lin ang="5400000" scaled="0"/>
-              </a:gradFill>
-            </c:spPr>
           </c:dPt>
           <c:dLbls>
             <c:dLbl>
@@ -340,11 +315,11 @@
         </c:dLbls>
         <c:gapWidth val="150"/>
         <c:overlap val="100"/>
-        <c:axId val="34197504"/>
-        <c:axId val="57404224"/>
+        <c:axId val="69912576"/>
+        <c:axId val="69734912"/>
       </c:barChart>
       <c:catAx>
-        <c:axId val="34197504"/>
+        <c:axId val="69912576"/>
         <c:scaling>
           <c:orientation val="maxMin"/>
         </c:scaling>
@@ -353,7 +328,7 @@
         <c:majorTickMark val="out"/>
         <c:minorTickMark val="none"/>
         <c:tickLblPos val="nextTo"/>
-        <c:crossAx val="57404224"/>
+        <c:crossAx val="69734912"/>
         <c:crosses val="autoZero"/>
         <c:auto val="1"/>
         <c:lblAlgn val="ctr"/>
@@ -361,7 +336,7 @@
         <c:noMultiLvlLbl val="0"/>
       </c:catAx>
       <c:valAx>
-        <c:axId val="57404224"/>
+        <c:axId val="69734912"/>
         <c:scaling>
           <c:orientation val="minMax"/>
         </c:scaling>
@@ -372,7 +347,7 @@
         <c:majorTickMark val="out"/>
         <c:minorTickMark val="none"/>
         <c:tickLblPos val="nextTo"/>
-        <c:crossAx val="34197504"/>
+        <c:crossAx val="69912576"/>
         <c:crosses val="autoZero"/>
         <c:crossBetween val="between"/>
       </c:valAx>
@@ -2048,10 +2023,6 @@
           <a:bodyPr/>
           <a:lstStyle/>
           <a:p>
-            <a:r>
-              <a:rPr lang="en-US" dirty="0" smtClean="0"/>
-              <a:t>NGJ PMM Review</a:t>
-            </a:r>
             <a:endParaRPr lang="en-US" dirty="0"/>
           </a:p>
         </p:txBody>
@@ -2092,7 +2063,7 @@
       </p:sp>
       <p:sp>
         <p:nvSpPr>
-          <p:cNvPr id="4" name="Title 1"/>
+          <p:cNvPr id="4" name="Content Placeholder 2"/>
           <p:cNvSpPr txBox="1">
             <a:spLocks/>
           </p:cNvSpPr>
@@ -2100,7 +2071,219 @@
         </p:nvSpPr>
         <p:spPr bwMode="auto">
           <a:xfrm>
-            <a:off x="935182" y="3163579"/>
+            <a:off x="152400" y="1152900"/>
+            <a:ext cx="8839200" cy="5181600"/>
+          </a:xfrm>
+          <a:prstGeom prst="rect">
+            <a:avLst/>
+          </a:prstGeom>
+          <a:noFill/>
+          <a:ln w="9525">
+            <a:noFill/>
+            <a:miter lim="800000"/>
+            <a:headEnd/>
+            <a:tailEnd/>
+          </a:ln>
+          <a:effectLst/>
+        </p:spPr>
+        <p:txBody>
+          <a:bodyPr vert="horz" wrap="square" lIns="91440" tIns="45720" rIns="91440" bIns="45720" numCol="1" anchor="t" anchorCtr="0" compatLnSpc="1">
+            <a:prstTxWarp prst="textNoShape">
+              <a:avLst/>
+            </a:prstTxWarp>
+          </a:bodyPr>
+          <a:lstStyle>
+            <a:lvl1pPr marL="225425" indent="-225425" algn="l" rtl="0" fontAlgn="base">
+              <a:lnSpc>
+                <a:spcPct val="85000"/>
+              </a:lnSpc>
+              <a:spcBef>
+                <a:spcPct val="20000"/>
+              </a:spcBef>
+              <a:spcAft>
+                <a:spcPct val="20000"/>
+              </a:spcAft>
+              <a:buChar char="•"/>
+              <a:defRPr sz="2000">
+                <a:solidFill>
+                  <a:srgbClr val="404040"/>
+                </a:solidFill>
+                <a:latin typeface="+mn-lt"/>
+                <a:ea typeface="+mn-ea"/>
+                <a:cs typeface="+mn-cs"/>
+              </a:defRPr>
+            </a:lvl1pPr>
+            <a:lvl2pPr marL="460375" indent="-234950" algn="l" rtl="0" fontAlgn="base">
+              <a:lnSpc>
+                <a:spcPct val="85000"/>
+              </a:lnSpc>
+              <a:spcBef>
+                <a:spcPct val="20000"/>
+              </a:spcBef>
+              <a:spcAft>
+                <a:spcPct val="20000"/>
+              </a:spcAft>
+              <a:buChar char="–"/>
+              <a:defRPr sz="1800">
+                <a:solidFill>
+                  <a:srgbClr val="404040"/>
+                </a:solidFill>
+                <a:latin typeface="+mn-lt"/>
+              </a:defRPr>
+            </a:lvl2pPr>
+            <a:lvl3pPr marL="573088" indent="-173038" algn="l" rtl="0" fontAlgn="base">
+              <a:lnSpc>
+                <a:spcPct val="85000"/>
+              </a:lnSpc>
+              <a:spcBef>
+                <a:spcPct val="20000"/>
+              </a:spcBef>
+              <a:spcAft>
+                <a:spcPct val="20000"/>
+              </a:spcAft>
+              <a:buSzPct val="75000"/>
+              <a:buFont typeface="Wingdings" charset="2"/>
+              <a:buChar char="§"/>
+              <a:defRPr sz="1600">
+                <a:solidFill>
+                  <a:srgbClr val="404040"/>
+                </a:solidFill>
+                <a:latin typeface="+mn-lt"/>
+              </a:defRPr>
+            </a:lvl3pPr>
+            <a:lvl4pPr marL="798513" indent="-225425" algn="l" rtl="0" fontAlgn="base">
+              <a:lnSpc>
+                <a:spcPct val="85000"/>
+              </a:lnSpc>
+              <a:spcBef>
+                <a:spcPct val="20000"/>
+              </a:spcBef>
+              <a:spcAft>
+                <a:spcPct val="20000"/>
+              </a:spcAft>
+              <a:buChar char="»"/>
+              <a:defRPr sz="1400">
+                <a:solidFill>
+                  <a:srgbClr val="404040"/>
+                </a:solidFill>
+                <a:latin typeface="+mn-lt"/>
+              </a:defRPr>
+            </a:lvl4pPr>
+            <a:lvl5pPr marL="911225" indent="-163513" algn="l" rtl="0" fontAlgn="base">
+              <a:lnSpc>
+                <a:spcPct val="85000"/>
+              </a:lnSpc>
+              <a:spcBef>
+                <a:spcPct val="20000"/>
+              </a:spcBef>
+              <a:spcAft>
+                <a:spcPct val="20000"/>
+              </a:spcAft>
+              <a:buChar char="–"/>
+              <a:defRPr sz="1400">
+                <a:solidFill>
+                  <a:srgbClr val="404040"/>
+                </a:solidFill>
+                <a:latin typeface="+mn-lt"/>
+              </a:defRPr>
+            </a:lvl5pPr>
+            <a:lvl6pPr marL="2514600" indent="-228600" algn="l" rtl="0" fontAlgn="base">
+              <a:lnSpc>
+                <a:spcPct val="85000"/>
+              </a:lnSpc>
+              <a:spcBef>
+                <a:spcPct val="20000"/>
+              </a:spcBef>
+              <a:spcAft>
+                <a:spcPct val="20000"/>
+              </a:spcAft>
+              <a:buChar char="–"/>
+              <a:defRPr sz="1600">
+                <a:solidFill>
+                  <a:schemeClr val="tx2"/>
+                </a:solidFill>
+                <a:latin typeface="+mn-lt"/>
+              </a:defRPr>
+            </a:lvl6pPr>
+            <a:lvl7pPr marL="2971800" indent="-228600" algn="l" rtl="0" fontAlgn="base">
+              <a:lnSpc>
+                <a:spcPct val="85000"/>
+              </a:lnSpc>
+              <a:spcBef>
+                <a:spcPct val="20000"/>
+              </a:spcBef>
+              <a:spcAft>
+                <a:spcPct val="20000"/>
+              </a:spcAft>
+              <a:buChar char="–"/>
+              <a:defRPr sz="1600">
+                <a:solidFill>
+                  <a:schemeClr val="tx2"/>
+                </a:solidFill>
+                <a:latin typeface="+mn-lt"/>
+              </a:defRPr>
+            </a:lvl7pPr>
+            <a:lvl8pPr marL="3429000" indent="-228600" algn="l" rtl="0" fontAlgn="base">
+              <a:lnSpc>
+                <a:spcPct val="85000"/>
+              </a:lnSpc>
+              <a:spcBef>
+                <a:spcPct val="20000"/>
+              </a:spcBef>
+              <a:spcAft>
+                <a:spcPct val="20000"/>
+              </a:spcAft>
+              <a:buChar char="–"/>
+              <a:defRPr sz="1600">
+                <a:solidFill>
+                  <a:schemeClr val="tx2"/>
+                </a:solidFill>
+                <a:latin typeface="+mn-lt"/>
+              </a:defRPr>
+            </a:lvl8pPr>
+            <a:lvl9pPr marL="3886200" indent="-228600" algn="l" rtl="0" fontAlgn="base">
+              <a:lnSpc>
+                <a:spcPct val="85000"/>
+              </a:lnSpc>
+              <a:spcBef>
+                <a:spcPct val="20000"/>
+              </a:spcBef>
+              <a:spcAft>
+                <a:spcPct val="20000"/>
+              </a:spcAft>
+              <a:buChar char="–"/>
+              <a:defRPr sz="1600">
+                <a:solidFill>
+                  <a:schemeClr val="tx2"/>
+                </a:solidFill>
+                <a:latin typeface="+mn-lt"/>
+              </a:defRPr>
+            </a:lvl9pPr>
+          </a:lstStyle>
+          <a:p>
+            <a:pPr lvl="1"/>
+            <a:endParaRPr lang="en-US" smtClean="0"/>
+          </a:p>
+          <a:p>
+            <a:pPr>
+              <a:buFontTx/>
+              <a:buNone/>
+            </a:pPr>
+            <a:endParaRPr lang="en-US" dirty="0" smtClean="0"/>
+          </a:p>
+        </p:txBody>
+      </p:sp>
+      <p:sp>
+        <p:nvSpPr>
+          <p:cNvPr id="5" name="Title 1"/>
+          <p:cNvSpPr txBox="1">
+            <a:spLocks/>
+          </p:cNvSpPr>
+          <p:nvPr/>
+        </p:nvSpPr>
+        <p:spPr bwMode="auto">
+          <a:xfrm>
+            <a:off x="852055" y="3639560"/>
             <a:ext cx="7772400" cy="1470025"/>
           </a:xfrm>
           <a:prstGeom prst="rect">
@@ -2279,20 +2462,130 @@
             </a:lvl9pPr>
           </a:lstStyle>
           <a:p>
+            <a:pPr algn="r"/>
             <a:r>
               <a:rPr lang="en-US" dirty="0" smtClean="0"/>
-              <a:t>Next Generation Jammer Weekly Review </a:t>
+              <a:t>Next Generation Jammer</a:t>
             </a:r>
           </a:p>
           <a:p>
+            <a:pPr algn="r"/>
             <a:r>
               <a:rPr lang="en-US" dirty="0" smtClean="0"/>
-              <a:t>PMM</a:t>
+              <a:t>PMM Review</a:t>
             </a:r>
             <a:endParaRPr lang="en-US" dirty="0"/>
           </a:p>
         </p:txBody>
       </p:sp>
+      <p:pic>
+        <p:nvPicPr>
+          <p:cNvPr id="6" name="Picture 4"/>
+          <p:cNvPicPr>
+            <a:picLocks noChangeAspect="1" noChangeArrowheads="1"/>
+          </p:cNvPicPr>
+          <p:nvPr/>
+        </p:nvPicPr>
+        <p:blipFill>
+          <a:blip r:embed="rId2">
+            <a:extLst>
+              <a:ext uri="{28A0092B-C50C-407E-A947-70E740481C1C}">
+                <a14:useLocalDpi xmlns:a14="http://schemas.microsoft.com/office/drawing/2010/main" val="0"/>
+              </a:ext>
+            </a:extLst>
+          </a:blip>
+          <a:srcRect/>
+          <a:stretch>
+            <a:fillRect/>
+          </a:stretch>
+        </p:blipFill>
+        <p:spPr bwMode="auto">
+          <a:xfrm>
+            <a:off x="301026" y="2854189"/>
+            <a:ext cx="4988395" cy="3742822"/>
+          </a:xfrm>
+          <a:prstGeom prst="rect">
+            <a:avLst/>
+          </a:prstGeom>
+          <a:noFill/>
+          <a:ln>
+            <a:noFill/>
+          </a:ln>
+          <a:extLst>
+            <a:ext uri="{909E8E84-426E-40DD-AFC4-6F175D3DCCD1}">
+              <a14:hiddenFill xmlns:a14="http://schemas.microsoft.com/office/drawing/2010/main">
+                <a:solidFill>
+                  <a:schemeClr val="accent1"/>
+                </a:solidFill>
+              </a14:hiddenFill>
+            </a:ext>
+            <a:ext uri="{91240B29-F687-4F45-9708-019B960494DF}">
+              <a14:hiddenLine xmlns:a14="http://schemas.microsoft.com/office/drawing/2010/main" w="9525">
+                <a:solidFill>
+                  <a:schemeClr val="tx1"/>
+                </a:solidFill>
+                <a:miter lim="800000"/>
+                <a:headEnd/>
+                <a:tailEnd/>
+              </a14:hiddenLine>
+            </a:ext>
+          </a:extLst>
+        </p:spPr>
+      </p:pic>
+      <p:pic>
+        <p:nvPicPr>
+          <p:cNvPr id="7" name="Picture 2"/>
+          <p:cNvPicPr>
+            <a:picLocks noChangeAspect="1" noChangeArrowheads="1"/>
+          </p:cNvPicPr>
+          <p:nvPr/>
+        </p:nvPicPr>
+        <p:blipFill>
+          <a:blip r:embed="rId3">
+            <a:extLst>
+              <a:ext uri="{28A0092B-C50C-407E-A947-70E740481C1C}">
+                <a14:useLocalDpi xmlns:a14="http://schemas.microsoft.com/office/drawing/2010/main" val="0"/>
+              </a:ext>
+            </a:extLst>
+          </a:blip>
+          <a:srcRect/>
+          <a:stretch>
+            <a:fillRect/>
+          </a:stretch>
+        </p:blipFill>
+        <p:spPr bwMode="auto">
+          <a:xfrm>
+            <a:off x="1214975" y="1897371"/>
+            <a:ext cx="7409479" cy="1107086"/>
+          </a:xfrm>
+          <a:prstGeom prst="rect">
+            <a:avLst/>
+          </a:prstGeom>
+          <a:noFill/>
+          <a:ln>
+            <a:noFill/>
+          </a:ln>
+          <a:extLst>
+            <a:ext uri="{909E8E84-426E-40DD-AFC4-6F175D3DCCD1}">
+              <a14:hiddenFill xmlns:a14="http://schemas.microsoft.com/office/drawing/2010/main">
+                <a:solidFill>
+                  <a:schemeClr val="accent1"/>
+                </a:solidFill>
+              </a14:hiddenFill>
+            </a:ext>
+            <a:ext uri="{91240B29-F687-4F45-9708-019B960494DF}">
+              <a14:hiddenLine xmlns:a14="http://schemas.microsoft.com/office/drawing/2010/main" w="9525">
+                <a:solidFill>
+                  <a:schemeClr val="tx1"/>
+                </a:solidFill>
+                <a:miter lim="800000"/>
+                <a:headEnd/>
+                <a:tailEnd/>
+              </a14:hiddenLine>
+            </a:ext>
+          </a:extLst>
+        </p:spPr>
+      </p:pic>
     </p:spTree>
   </p:cSld>
   <p:clrMapOvr>
@@ -2659,42 +2952,6 @@
           </a:graphicData>
         </a:graphic>
       </p:graphicFrame>
-      <p:sp>
-        <p:nvSpPr>
-          <p:cNvPr id="3" name="TextBox 2"/>
-          <p:cNvSpPr txBox="1"/>
-          <p:nvPr/>
-        </p:nvSpPr>
-        <p:spPr>
-          <a:xfrm>
-            <a:off x="6602681" y="439386"/>
-            <a:ext cx="2541320" cy="461665"/>
-          </a:xfrm>
-          <a:prstGeom prst="rect">
-            <a:avLst/>
-          </a:prstGeom>
-          <a:noFill/>
-        </p:spPr>
-        <p:txBody>
-          <a:bodyPr wrap="square" rtlCol="0">
-            <a:spAutoFit/>
-          </a:bodyPr>
-          <a:lstStyle/>
-          <a:p>
-            <a:r>
-              <a:rPr lang="en-US" dirty="0" smtClean="0">
-                <a:latin typeface="Arial" pitchFamily="34" charset="0"/>
-                <a:cs typeface="Arial" pitchFamily="34" charset="0"/>
-              </a:rPr>
-              <a:t>Driving Path</a:t>
-            </a:r>
-            <a:endParaRPr lang="en-US" dirty="0">
-              <a:latin typeface="Arial" pitchFamily="34" charset="0"/>
-              <a:cs typeface="Arial" pitchFamily="34" charset="0"/>
-            </a:endParaRPr>
-          </a:p>
-        </p:txBody>
-      </p:sp>
     </p:spTree>
     <p:extLst>
       <p:ext uri="{BB962C8B-B14F-4D97-AF65-F5344CB8AC3E}">
@@ -2774,10 +3031,9 @@
               <a:buNone/>
             </a:pPr>
             <a:r>
-              <a:rPr lang="en-US" b="1" smtClean="0"/>
+              <a:rPr lang="en-US" b="1" dirty="0" smtClean="0"/>
               <a:t>Completed Tasks</a:t>
             </a:r>
-            <a:endParaRPr lang="en-US" b="1" dirty="0" smtClean="0"/>
           </a:p>
           <a:p>
             <a:r>
@@ -2791,43 +3047,6 @@
               <a:t>Bullet2</a:t>
             </a:r>
             <a:endParaRPr lang="en-US" dirty="0"/>
-          </a:p>
-        </p:txBody>
-      </p:sp>
-      <p:sp>
-        <p:nvSpPr>
-          <p:cNvPr id="4" name="TextBox 3"/>
-          <p:cNvSpPr txBox="1"/>
-          <p:nvPr/>
-        </p:nvSpPr>
-        <p:spPr>
-          <a:xfrm>
-            <a:off x="5367647" y="481056"/>
-            <a:ext cx="3776354" cy="338554"/>
-          </a:xfrm>
-          <a:prstGeom prst="rect">
-            <a:avLst/>
-          </a:prstGeom>
-          <a:noFill/>
-        </p:spPr>
-        <p:txBody>
-          <a:bodyPr wrap="square" rtlCol="0">
-            <a:spAutoFit/>
-          </a:bodyPr>
-          <a:lstStyle/>
-          <a:p>
-            <a:pPr algn="r"/>
-            <a:r>
-              <a:rPr lang="en-US" sz="1600" b="1" dirty="0" smtClean="0">
-                <a:latin typeface="Arial" pitchFamily="34" charset="0"/>
-                <a:cs typeface="Arial" pitchFamily="34" charset="0"/>
-              </a:rPr>
-              <a:t>Tasks Completed this Fiscal Month</a:t>
-            </a:r>
-            <a:endParaRPr lang="en-US" sz="1600" b="1" dirty="0">
-              <a:latin typeface="Arial" pitchFamily="34" charset="0"/>
-              <a:cs typeface="Arial" pitchFamily="34" charset="0"/>
-            </a:endParaRPr>
           </a:p>
         </p:txBody>
       </p:sp>
@@ -5107,14 +5326,14 @@
 <file path=customXml/itemProps2.xml><?xml version="1.0" encoding="utf-8"?>
 <ds:datastoreItem xmlns:ds="http://schemas.openxmlformats.org/officeDocument/2006/customXml" ds:itemID="{F08FFFF7-6ACE-4B4C-AA05-EAF8BD457E72}">
   <ds:schemaRefs>
-    <ds:schemaRef ds:uri="http://www.w3.org/XML/1998/namespace"/>
     <ds:schemaRef ds:uri="http://schemas.microsoft.com/office/infopath/2007/PartnerControls"/>
-    <ds:schemaRef ds:uri="http://schemas.microsoft.com/office/2006/metadata/properties"/>
-    <ds:schemaRef ds:uri="http://purl.org/dc/dcmitype/"/>
     <ds:schemaRef ds:uri="http://purl.org/dc/elements/1.1/"/>
+    <ds:schemaRef ds:uri="http://purl.org/dc/terms/"/>
     <ds:schemaRef ds:uri="http://schemas.microsoft.com/office/2006/documentManagement/types"/>
     <ds:schemaRef ds:uri="http://schemas.openxmlformats.org/package/2006/metadata/core-properties"/>
-    <ds:schemaRef ds:uri="http://purl.org/dc/terms/"/>
+    <ds:schemaRef ds:uri="http://purl.org/dc/dcmitype/"/>
+    <ds:schemaRef ds:uri="http://www.w3.org/XML/1998/namespace"/>
+    <ds:schemaRef ds:uri="http://schemas.microsoft.com/office/2006/metadata/properties"/>
   </ds:schemaRefs>
 </ds:datastoreItem>
 </file>

</xml_diff>

<commit_message>
New Slide Type Added PS BaseLine Start Slide added
</commit_message>
<xml_diff>
--- a/PMMPresentation/Modules/Templates/PMM Template.pptx
+++ b/PMMPresentation/Modules/Templates/PMM Template.pptx
@@ -5,10 +5,10 @@
     <p:sldMasterId id="2147483648" r:id="rId4"/>
   </p:sldMasterIdLst>
   <p:notesMasterIdLst>
-    <p:notesMasterId r:id="rId12"/>
+    <p:notesMasterId r:id="rId13"/>
   </p:notesMasterIdLst>
   <p:handoutMasterIdLst>
-    <p:handoutMasterId r:id="rId13"/>
+    <p:handoutMasterId r:id="rId14"/>
   </p:handoutMasterIdLst>
   <p:sldIdLst>
     <p:sldId id="628" r:id="rId5"/>
@@ -17,7 +17,8 @@
     <p:sldId id="634" r:id="rId8"/>
     <p:sldId id="635" r:id="rId9"/>
     <p:sldId id="632" r:id="rId10"/>
-    <p:sldId id="633" r:id="rId11"/>
+    <p:sldId id="638" r:id="rId11"/>
+    <p:sldId id="633" r:id="rId12"/>
   </p:sldIdLst>
   <p:sldSz cx="9144000" cy="6858000" type="screen4x3"/>
   <p:notesSz cx="7010400" cy="9296400"/>
@@ -170,10 +171,10 @@
           <c:layoutTarget val="inner"/>
           <c:xMode val="edge"/>
           <c:yMode val="edge"/>
-          <c:x val="0.10803623505395173"/>
+          <c:x val="0.10803623505395178"/>
           <c:y val="6.5983968494660691E-2"/>
           <c:w val="0.86898536988432007"/>
-          <c:h val="0.90314967223550113"/>
+          <c:h val="0.90314967223550169"/>
         </c:manualLayout>
       </c:layout>
       <c:barChart>
@@ -240,18 +241,13 @@
             </a:gradFill>
           </c:spPr>
           <c:invertIfNegative val="0"/>
-          <c:dPt>
-            <c:idx val="0"/>
-            <c:invertIfNegative val="0"/>
-            <c:bubble3D val="0"/>
-          </c:dPt>
           <c:dLbls>
             <c:dLbl>
               <c:idx val="0"/>
               <c:layout>
                 <c:manualLayout>
                   <c:x val="0.17404466802760771"/>
-                  <c:y val="-2.8055907659872673E-3"/>
+                  <c:y val="-2.8055907659872694E-3"/>
                 </c:manualLayout>
               </c:layout>
               <c:dLblPos val="ctr"/>
@@ -315,11 +311,11 @@
         </c:dLbls>
         <c:gapWidth val="150"/>
         <c:overlap val="100"/>
-        <c:axId val="69912576"/>
-        <c:axId val="69734912"/>
+        <c:axId val="32182272"/>
+        <c:axId val="64376768"/>
       </c:barChart>
       <c:catAx>
-        <c:axId val="69912576"/>
+        <c:axId val="32182272"/>
         <c:scaling>
           <c:orientation val="maxMin"/>
         </c:scaling>
@@ -328,7 +324,7 @@
         <c:majorTickMark val="out"/>
         <c:minorTickMark val="none"/>
         <c:tickLblPos val="nextTo"/>
-        <c:crossAx val="69734912"/>
+        <c:crossAx val="64376768"/>
         <c:crosses val="autoZero"/>
         <c:auto val="1"/>
         <c:lblAlgn val="ctr"/>
@@ -336,7 +332,7 @@
         <c:noMultiLvlLbl val="0"/>
       </c:catAx>
       <c:valAx>
-        <c:axId val="69734912"/>
+        <c:axId val="64376768"/>
         <c:scaling>
           <c:orientation val="minMax"/>
         </c:scaling>
@@ -347,7 +343,7 @@
         <c:majorTickMark val="out"/>
         <c:minorTickMark val="none"/>
         <c:tickLblPos val="nextTo"/>
-        <c:crossAx val="69912576"/>
+        <c:crossAx val="32182272"/>
         <c:crosses val="autoZero"/>
         <c:crossBetween val="between"/>
       </c:valAx>
@@ -356,6 +352,433 @@
     <c:dispBlanksAs val="gap"/>
     <c:showDLblsOverMax val="0"/>
   </c:chart>
+  <c:externalData r:id="rId1">
+    <c:autoUpdate val="0"/>
+  </c:externalData>
+</c:chartSpace>
+</file>
+
+<file path=ppt/charts/chart2.xml><?xml version="1.0" encoding="utf-8"?>
+<c:chartSpace xmlns:c="http://schemas.openxmlformats.org/drawingml/2006/chart" xmlns:a="http://schemas.openxmlformats.org/drawingml/2006/main" xmlns:r="http://schemas.openxmlformats.org/officeDocument/2006/relationships">
+  <c:date1904 val="0"/>
+  <c:lang val="en-US"/>
+  <c:roundedCorners val="0"/>
+  <mc:AlternateContent xmlns:mc="http://schemas.openxmlformats.org/markup-compatibility/2006">
+    <mc:Choice xmlns:c14="http://schemas.microsoft.com/office/drawing/2007/8/2/chart" Requires="c14">
+      <c14:style val="102"/>
+    </mc:Choice>
+    <mc:Fallback>
+      <c:style val="2"/>
+    </mc:Fallback>
+  </mc:AlternateContent>
+  <c:chart>
+    <c:autoTitleDeleted val="0"/>
+    <c:plotArea>
+      <c:layout/>
+      <c:barChart>
+        <c:barDir val="col"/>
+        <c:grouping val="clustered"/>
+        <c:varyColors val="0"/>
+        <c:ser>
+          <c:idx val="0"/>
+          <c:order val="0"/>
+          <c:tx>
+            <c:strRef>
+              <c:f>Sheet1!$B$1</c:f>
+              <c:strCache>
+                <c:ptCount val="1"/>
+                <c:pt idx="0">
+                  <c:v>Completed Starts</c:v>
+                </c:pt>
+              </c:strCache>
+            </c:strRef>
+          </c:tx>
+          <c:spPr>
+            <a:solidFill>
+              <a:srgbClr val="59A583"/>
+            </a:solidFill>
+          </c:spPr>
+          <c:invertIfNegative val="0"/>
+          <c:cat>
+            <c:strRef>
+              <c:f>Sheet1!$A$2:$A$6</c:f>
+              <c:strCache>
+                <c:ptCount val="1"/>
+                <c:pt idx="0">
+                  <c:v>Cat</c:v>
+                </c:pt>
+              </c:strCache>
+            </c:strRef>
+          </c:cat>
+          <c:val>
+            <c:numRef>
+              <c:f>Sheet1!$B$2:$B$6</c:f>
+              <c:numCache>
+                <c:formatCode>General</c:formatCode>
+                <c:ptCount val="5"/>
+                <c:pt idx="0">
+                  <c:v>1</c:v>
+                </c:pt>
+              </c:numCache>
+            </c:numRef>
+          </c:val>
+        </c:ser>
+        <c:ser>
+          <c:idx val="1"/>
+          <c:order val="1"/>
+          <c:tx>
+            <c:strRef>
+              <c:f>Sheet1!$D$1</c:f>
+              <c:strCache>
+                <c:ptCount val="1"/>
+                <c:pt idx="0">
+                  <c:v>Deliquent Starts</c:v>
+                </c:pt>
+              </c:strCache>
+            </c:strRef>
+          </c:tx>
+          <c:spPr>
+            <a:solidFill>
+              <a:srgbClr val="CD6B57"/>
+            </a:solidFill>
+          </c:spPr>
+          <c:invertIfNegative val="0"/>
+          <c:cat>
+            <c:strRef>
+              <c:f>Sheet1!$A$2:$A$6</c:f>
+              <c:strCache>
+                <c:ptCount val="1"/>
+                <c:pt idx="0">
+                  <c:v>Cat</c:v>
+                </c:pt>
+              </c:strCache>
+            </c:strRef>
+          </c:cat>
+          <c:val>
+            <c:numRef>
+              <c:f>Sheet1!$D$2:$D$6</c:f>
+              <c:numCache>
+                <c:formatCode>General</c:formatCode>
+                <c:ptCount val="5"/>
+                <c:pt idx="0">
+                  <c:v>1</c:v>
+                </c:pt>
+              </c:numCache>
+            </c:numRef>
+          </c:val>
+        </c:ser>
+        <c:ser>
+          <c:idx val="2"/>
+          <c:order val="2"/>
+          <c:tx>
+            <c:strRef>
+              <c:f>Sheet1!$C$1</c:f>
+              <c:strCache>
+                <c:ptCount val="1"/>
+                <c:pt idx="0">
+                  <c:v>Forecasted Completed Starts</c:v>
+                </c:pt>
+              </c:strCache>
+            </c:strRef>
+          </c:tx>
+          <c:spPr>
+            <a:solidFill>
+              <a:srgbClr val="E0E0E0"/>
+            </a:solidFill>
+          </c:spPr>
+          <c:invertIfNegative val="0"/>
+          <c:cat>
+            <c:strRef>
+              <c:f>Sheet1!$A$2:$A$6</c:f>
+              <c:strCache>
+                <c:ptCount val="1"/>
+                <c:pt idx="0">
+                  <c:v>Cat</c:v>
+                </c:pt>
+              </c:strCache>
+            </c:strRef>
+          </c:cat>
+          <c:val>
+            <c:numRef>
+              <c:f>Sheet1!$C$2:$C$6</c:f>
+              <c:numCache>
+                <c:formatCode>General</c:formatCode>
+                <c:ptCount val="5"/>
+                <c:pt idx="0">
+                  <c:v>1</c:v>
+                </c:pt>
+              </c:numCache>
+            </c:numRef>
+          </c:val>
+        </c:ser>
+        <c:ser>
+          <c:idx val="3"/>
+          <c:order val="3"/>
+          <c:tx>
+            <c:strRef>
+              <c:f>Sheet1!$E$1</c:f>
+              <c:strCache>
+                <c:ptCount val="1"/>
+                <c:pt idx="0">
+                  <c:v>Forecasted Delequint Starts</c:v>
+                </c:pt>
+              </c:strCache>
+            </c:strRef>
+          </c:tx>
+          <c:spPr>
+            <a:solidFill>
+              <a:schemeClr val="bg1">
+                <a:lumMod val="65000"/>
+              </a:schemeClr>
+            </a:solidFill>
+          </c:spPr>
+          <c:invertIfNegative val="0"/>
+          <c:cat>
+            <c:strRef>
+              <c:f>Sheet1!$A$2:$A$6</c:f>
+              <c:strCache>
+                <c:ptCount val="1"/>
+                <c:pt idx="0">
+                  <c:v>Cat</c:v>
+                </c:pt>
+              </c:strCache>
+            </c:strRef>
+          </c:cat>
+          <c:val>
+            <c:numRef>
+              <c:f>Sheet1!$E$2:$E$6</c:f>
+              <c:numCache>
+                <c:formatCode>General</c:formatCode>
+                <c:ptCount val="5"/>
+                <c:pt idx="0">
+                  <c:v>1</c:v>
+                </c:pt>
+              </c:numCache>
+            </c:numRef>
+          </c:val>
+        </c:ser>
+        <c:dLbls>
+          <c:showLegendKey val="0"/>
+          <c:showVal val="0"/>
+          <c:showCatName val="0"/>
+          <c:showSerName val="0"/>
+          <c:showPercent val="0"/>
+          <c:showBubbleSize val="0"/>
+        </c:dLbls>
+        <c:gapWidth val="150"/>
+        <c:axId val="32130048"/>
+        <c:axId val="64379072"/>
+      </c:barChart>
+      <c:lineChart>
+        <c:grouping val="standard"/>
+        <c:varyColors val="0"/>
+        <c:ser>
+          <c:idx val="5"/>
+          <c:order val="4"/>
+          <c:tx>
+            <c:strRef>
+              <c:f>Sheet1!$F$1</c:f>
+              <c:strCache>
+                <c:ptCount val="1"/>
+                <c:pt idx="0">
+                  <c:v>Cum Open Delequient Charts</c:v>
+                </c:pt>
+              </c:strCache>
+            </c:strRef>
+          </c:tx>
+          <c:spPr>
+            <a:ln>
+              <a:solidFill>
+                <a:schemeClr val="tx1"/>
+              </a:solidFill>
+            </a:ln>
+            <a:effectLst>
+              <a:outerShdw blurRad="50800" dist="50800" dir="5400000" algn="ctr" rotWithShape="0">
+                <a:schemeClr val="tx1"/>
+              </a:outerShdw>
+            </a:effectLst>
+          </c:spPr>
+          <c:marker>
+            <c:symbol val="x"/>
+            <c:size val="7"/>
+            <c:spPr>
+              <a:solidFill>
+                <a:schemeClr val="tx1"/>
+              </a:solidFill>
+              <a:ln>
+                <a:solidFill>
+                  <a:schemeClr val="tx1"/>
+                </a:solidFill>
+              </a:ln>
+              <a:effectLst>
+                <a:outerShdw blurRad="50800" dist="50800" dir="5400000" algn="ctr" rotWithShape="0">
+                  <a:schemeClr val="tx1"/>
+                </a:outerShdw>
+              </a:effectLst>
+            </c:spPr>
+          </c:marker>
+          <c:cat>
+            <c:strRef>
+              <c:f>Sheet1!$A$2:$A$6</c:f>
+              <c:strCache>
+                <c:ptCount val="1"/>
+                <c:pt idx="0">
+                  <c:v>Cat</c:v>
+                </c:pt>
+              </c:strCache>
+            </c:strRef>
+          </c:cat>
+          <c:val>
+            <c:numRef>
+              <c:f>Sheet1!$F$2:$F$6</c:f>
+              <c:numCache>
+                <c:formatCode>General</c:formatCode>
+                <c:ptCount val="5"/>
+                <c:pt idx="0">
+                  <c:v>1</c:v>
+                </c:pt>
+              </c:numCache>
+            </c:numRef>
+          </c:val>
+          <c:smooth val="0"/>
+        </c:ser>
+        <c:ser>
+          <c:idx val="4"/>
+          <c:order val="5"/>
+          <c:tx>
+            <c:strRef>
+              <c:f>Sheet1!$G$1</c:f>
+              <c:strCache>
+                <c:ptCount val="1"/>
+                <c:pt idx="0">
+                  <c:v>Forecasted Cum Open Delequeint Charts</c:v>
+                </c:pt>
+              </c:strCache>
+            </c:strRef>
+          </c:tx>
+          <c:spPr>
+            <a:ln>
+              <a:solidFill>
+                <a:prstClr val="black"/>
+              </a:solidFill>
+              <a:prstDash val="sysDash"/>
+            </a:ln>
+          </c:spPr>
+          <c:marker>
+            <c:symbol val="square"/>
+            <c:size val="7"/>
+            <c:spPr>
+              <a:solidFill>
+                <a:prstClr val="black"/>
+              </a:solidFill>
+              <a:ln>
+                <a:solidFill>
+                  <a:prstClr val="black"/>
+                </a:solidFill>
+              </a:ln>
+            </c:spPr>
+          </c:marker>
+          <c:cat>
+            <c:strRef>
+              <c:f>Sheet1!$A$2:$A$6</c:f>
+              <c:strCache>
+                <c:ptCount val="1"/>
+                <c:pt idx="0">
+                  <c:v>Cat</c:v>
+                </c:pt>
+              </c:strCache>
+            </c:strRef>
+          </c:cat>
+          <c:val>
+            <c:numRef>
+              <c:f>Sheet1!$G$2:$G$6</c:f>
+              <c:numCache>
+                <c:formatCode>General</c:formatCode>
+                <c:ptCount val="5"/>
+                <c:pt idx="0">
+                  <c:v>1</c:v>
+                </c:pt>
+              </c:numCache>
+            </c:numRef>
+          </c:val>
+          <c:smooth val="0"/>
+        </c:ser>
+        <c:dLbls>
+          <c:showLegendKey val="0"/>
+          <c:showVal val="0"/>
+          <c:showCatName val="0"/>
+          <c:showSerName val="0"/>
+          <c:showPercent val="0"/>
+          <c:showBubbleSize val="0"/>
+        </c:dLbls>
+        <c:marker val="1"/>
+        <c:smooth val="0"/>
+        <c:axId val="32130048"/>
+        <c:axId val="64379072"/>
+      </c:lineChart>
+      <c:catAx>
+        <c:axId val="32130048"/>
+        <c:scaling>
+          <c:orientation val="minMax"/>
+        </c:scaling>
+        <c:delete val="0"/>
+        <c:axPos val="b"/>
+        <c:numFmt formatCode="General" sourceLinked="1"/>
+        <c:majorTickMark val="out"/>
+        <c:minorTickMark val="none"/>
+        <c:tickLblPos val="nextTo"/>
+        <c:crossAx val="64379072"/>
+        <c:crosses val="autoZero"/>
+        <c:auto val="1"/>
+        <c:lblAlgn val="ctr"/>
+        <c:lblOffset val="100"/>
+        <c:noMultiLvlLbl val="0"/>
+      </c:catAx>
+      <c:valAx>
+        <c:axId val="64379072"/>
+        <c:scaling>
+          <c:orientation val="minMax"/>
+        </c:scaling>
+        <c:delete val="0"/>
+        <c:axPos val="l"/>
+        <c:majorGridlines/>
+        <c:numFmt formatCode="General" sourceLinked="1"/>
+        <c:majorTickMark val="out"/>
+        <c:minorTickMark val="none"/>
+        <c:tickLblPos val="nextTo"/>
+        <c:crossAx val="32130048"/>
+        <c:crosses val="autoZero"/>
+        <c:crossBetween val="between"/>
+      </c:valAx>
+    </c:plotArea>
+    <c:legend>
+      <c:legendPos val="r"/>
+      <c:layout>
+        <c:manualLayout>
+          <c:xMode val="edge"/>
+          <c:yMode val="edge"/>
+          <c:x val="0.65963141460765751"/>
+          <c:y val="0.23904122278832804"/>
+          <c:w val="0.33174789573717101"/>
+          <c:h val="0.75476069167824655"/>
+        </c:manualLayout>
+      </c:layout>
+      <c:overlay val="0"/>
+    </c:legend>
+    <c:plotVisOnly val="1"/>
+    <c:dispBlanksAs val="gap"/>
+    <c:showDLblsOverMax val="0"/>
+  </c:chart>
+  <c:txPr>
+    <a:bodyPr/>
+    <a:lstStyle/>
+    <a:p>
+      <a:pPr>
+        <a:defRPr sz="1800"/>
+      </a:pPr>
+      <a:endParaRPr lang="en-US"/>
+    </a:p>
+  </c:txPr>
   <c:externalData r:id="rId1">
     <c:autoUpdate val="0"/>
   </c:externalData>
@@ -2487,7 +2910,7 @@
           <p:nvPr/>
         </p:nvPicPr>
         <p:blipFill>
-          <a:blip r:embed="rId2">
+          <a:blip r:embed="rId2" cstate="print">
             <a:extLst>
               <a:ext uri="{28A0092B-C50C-407E-A947-70E740481C1C}">
                 <a14:useLocalDpi xmlns:a14="http://schemas.microsoft.com/office/drawing/2010/main" val="0"/>
@@ -2541,7 +2964,7 @@
           <p:nvPr/>
         </p:nvPicPr>
         <p:blipFill>
-          <a:blip r:embed="rId3">
+          <a:blip r:embed="rId3" cstate="print">
             <a:extLst>
               <a:ext uri="{28A0092B-C50C-407E-A947-70E740481C1C}">
                 <a14:useLocalDpi xmlns:a14="http://schemas.microsoft.com/office/drawing/2010/main" val="0"/>
@@ -3693,6 +4116,79 @@
 </file>
 
 <file path=ppt/slides/slide7.xml><?xml version="1.0" encoding="utf-8"?>
+<p:sld xmlns:a="http://schemas.openxmlformats.org/drawingml/2006/main" xmlns:r="http://schemas.openxmlformats.org/officeDocument/2006/relationships" xmlns:p="http://schemas.openxmlformats.org/presentationml/2006/main">
+  <p:cSld>
+    <p:spTree>
+      <p:nvGrpSpPr>
+        <p:cNvPr id="1" name=""/>
+        <p:cNvGrpSpPr/>
+        <p:nvPr/>
+      </p:nvGrpSpPr>
+      <p:grpSpPr>
+        <a:xfrm>
+          <a:off x="0" y="0"/>
+          <a:ext cx="0" cy="0"/>
+          <a:chOff x="0" y="0"/>
+          <a:chExt cx="0" cy="0"/>
+        </a:xfrm>
+      </p:grpSpPr>
+      <p:sp>
+        <p:nvSpPr>
+          <p:cNvPr id="2" name="Title 1"/>
+          <p:cNvSpPr>
+            <a:spLocks noGrp="1"/>
+          </p:cNvSpPr>
+          <p:nvPr>
+            <p:ph type="title"/>
+          </p:nvPr>
+        </p:nvSpPr>
+        <p:spPr/>
+        <p:txBody>
+          <a:bodyPr/>
+          <a:lstStyle/>
+          <a:p>
+            <a:r>
+              <a:rPr lang="en-US" dirty="0" smtClean="0"/>
+              <a:t>Schedule Performance – Delinquent Starts to BL</a:t>
+            </a:r>
+            <a:endParaRPr lang="en-US" dirty="0"/>
+          </a:p>
+        </p:txBody>
+      </p:sp>
+      <p:graphicFrame>
+        <p:nvGraphicFramePr>
+          <p:cNvPr id="4" name="Content Placeholder 3"/>
+          <p:cNvGraphicFramePr>
+            <a:graphicFrameLocks noGrp="1"/>
+          </p:cNvGraphicFramePr>
+          <p:nvPr>
+            <p:ph idx="1"/>
+            <p:extLst>
+              <p:ext uri="{D42A27DB-BD31-4B8C-83A1-F6EECF244321}">
+                <p14:modId xmlns:p14="http://schemas.microsoft.com/office/powerpoint/2010/main" val="3809287909"/>
+              </p:ext>
+            </p:extLst>
+          </p:nvPr>
+        </p:nvGraphicFramePr>
+        <p:xfrm>
+          <a:off x="152400" y="1295400"/>
+          <a:ext cx="8839200" cy="5181600"/>
+        </p:xfrm>
+        <a:graphic>
+          <a:graphicData uri="http://schemas.openxmlformats.org/drawingml/2006/chart">
+            <c:chart xmlns:c="http://schemas.openxmlformats.org/drawingml/2006/chart" xmlns:r="http://schemas.openxmlformats.org/officeDocument/2006/relationships" r:id="rId2"/>
+          </a:graphicData>
+        </a:graphic>
+      </p:graphicFrame>
+    </p:spTree>
+  </p:cSld>
+  <p:clrMapOvr>
+    <a:masterClrMapping/>
+  </p:clrMapOvr>
+</p:sld>
+</file>
+
+<file path=ppt/slides/slide8.xml><?xml version="1.0" encoding="utf-8"?>
 <p:sld xmlns:a="http://schemas.openxmlformats.org/drawingml/2006/main" xmlns:r="http://schemas.openxmlformats.org/officeDocument/2006/relationships" xmlns:p="http://schemas.openxmlformats.org/presentationml/2006/main">
   <p:cSld>
     <p:spTree>
@@ -5187,21 +5683,6 @@
 </file>
 
 <file path=customXml/item1.xml><?xml version="1.0" encoding="utf-8"?>
-<?mso-contentType ?>
-<FormTemplates xmlns="http://schemas.microsoft.com/sharepoint/v3/contenttype/forms">
-  <Display>DocumentLibraryForm</Display>
-  <Edit>DocumentLibraryForm</Edit>
-  <New>DocumentLibraryForm</New>
-</FormTemplates>
-</file>
-
-<file path=customXml/item2.xml><?xml version="1.0" encoding="utf-8"?>
-<p:properties xmlns:p="http://schemas.microsoft.com/office/2006/metadata/properties" xmlns:xsi="http://www.w3.org/2001/XMLSchema-instance" xmlns:pc="http://schemas.microsoft.com/office/infopath/2007/PartnerControls">
-  <documentManagement/>
-</p:properties>
-</file>
-
-<file path=customXml/item3.xml><?xml version="1.0" encoding="utf-8"?>
 <ct:contentTypeSchema xmlns:ct="http://schemas.microsoft.com/office/2006/metadata/contentType" xmlns:ma="http://schemas.microsoft.com/office/2006/metadata/properties/metaAttributes" ct:_="" ma:_="" ma:contentTypeName="Document" ma:contentTypeID="0x010100EF867D41FF4F6741B2566D0C48EB59D2" ma:contentTypeVersion="0" ma:contentTypeDescription="Create a new document." ma:contentTypeScope="" ma:versionID="c6cc6be9b7085f5a7c9c7d9b3dbd5dc1">
   <xsd:schema xmlns:xsd="http://www.w3.org/2001/XMLSchema" xmlns:xs="http://www.w3.org/2001/XMLSchema" xmlns:p="http://schemas.microsoft.com/office/2006/metadata/properties" targetNamespace="http://schemas.microsoft.com/office/2006/metadata/properties" ma:root="true" ma:fieldsID="c64490b4aec6201516c3a874156f37b2">
     <xsd:element name="properties">
@@ -5315,10 +5796,33 @@
 </ct:contentTypeSchema>
 </file>
 
+<file path=customXml/item2.xml><?xml version="1.0" encoding="utf-8"?>
+<p:properties xmlns:p="http://schemas.microsoft.com/office/2006/metadata/properties" xmlns:xsi="http://www.w3.org/2001/XMLSchema-instance" xmlns:pc="http://schemas.microsoft.com/office/infopath/2007/PartnerControls">
+  <documentManagement/>
+</p:properties>
+</file>
+
+<file path=customXml/item3.xml><?xml version="1.0" encoding="utf-8"?>
+<?mso-contentType ?>
+<FormTemplates xmlns="http://schemas.microsoft.com/sharepoint/v3/contenttype/forms">
+  <Display>DocumentLibraryForm</Display>
+  <Edit>DocumentLibraryForm</Edit>
+  <New>DocumentLibraryForm</New>
+</FormTemplates>
+</file>
+
 <file path=customXml/itemProps1.xml><?xml version="1.0" encoding="utf-8"?>
-<ds:datastoreItem xmlns:ds="http://schemas.openxmlformats.org/officeDocument/2006/customXml" ds:itemID="{362DF851-7E51-44C7-BE33-35BF0C957E71}">
+<ds:datastoreItem xmlns:ds="http://schemas.openxmlformats.org/officeDocument/2006/customXml" ds:itemID="{776C13B3-8EDC-4A1B-8FE1-1561EBD711EC}">
   <ds:schemaRefs>
-    <ds:schemaRef ds:uri="http://schemas.microsoft.com/sharepoint/v3/contenttype/forms"/>
+    <ds:schemaRef ds:uri="http://schemas.microsoft.com/office/2006/metadata/contentType"/>
+    <ds:schemaRef ds:uri="http://schemas.microsoft.com/office/2006/metadata/properties/metaAttributes"/>
+    <ds:schemaRef ds:uri="http://www.w3.org/2001/XMLSchema"/>
+    <ds:schemaRef ds:uri="http://schemas.microsoft.com/office/2006/metadata/properties"/>
+    <ds:schemaRef ds:uri="http://schemas.openxmlformats.org/package/2006/metadata/core-properties"/>
+    <ds:schemaRef ds:uri="http://purl.org/dc/elements/1.1/"/>
+    <ds:schemaRef ds:uri="http://purl.org/dc/terms/"/>
+    <ds:schemaRef ds:uri="http://schemas.microsoft.com/internal/obd"/>
+    <ds:schemaRef ds:uri="http://schemas.microsoft.com/office/infopath/2007/PartnerControls"/>
   </ds:schemaRefs>
 </ds:datastoreItem>
 </file>
@@ -5339,17 +5843,9 @@
 </file>
 
 <file path=customXml/itemProps3.xml><?xml version="1.0" encoding="utf-8"?>
-<ds:datastoreItem xmlns:ds="http://schemas.openxmlformats.org/officeDocument/2006/customXml" ds:itemID="{776C13B3-8EDC-4A1B-8FE1-1561EBD711EC}">
+<ds:datastoreItem xmlns:ds="http://schemas.openxmlformats.org/officeDocument/2006/customXml" ds:itemID="{362DF851-7E51-44C7-BE33-35BF0C957E71}">
   <ds:schemaRefs>
-    <ds:schemaRef ds:uri="http://schemas.microsoft.com/office/2006/metadata/contentType"/>
-    <ds:schemaRef ds:uri="http://schemas.microsoft.com/office/2006/metadata/properties/metaAttributes"/>
-    <ds:schemaRef ds:uri="http://www.w3.org/2001/XMLSchema"/>
-    <ds:schemaRef ds:uri="http://schemas.microsoft.com/office/2006/metadata/properties"/>
-    <ds:schemaRef ds:uri="http://schemas.openxmlformats.org/package/2006/metadata/core-properties"/>
-    <ds:schemaRef ds:uri="http://purl.org/dc/elements/1.1/"/>
-    <ds:schemaRef ds:uri="http://purl.org/dc/terms/"/>
-    <ds:schemaRef ds:uri="http://schemas.microsoft.com/internal/obd"/>
-    <ds:schemaRef ds:uri="http://schemas.microsoft.com/office/infopath/2007/PartnerControls"/>
+    <ds:schemaRef ds:uri="http://schemas.microsoft.com/sharepoint/v3/contenttype/forms"/>
   </ds:schemaRefs>
 </ds:datastoreItem>
 </file>
</xml_diff>

<commit_message>
Completed Finishes Slide included
</commit_message>
<xml_diff>
--- a/PMMPresentation/Modules/Templates/PMM Template.pptx
+++ b/PMMPresentation/Modules/Templates/PMM Template.pptx
@@ -5,10 +5,10 @@
     <p:sldMasterId id="2147483648" r:id="rId4"/>
   </p:sldMasterIdLst>
   <p:notesMasterIdLst>
-    <p:notesMasterId r:id="rId13"/>
+    <p:notesMasterId r:id="rId14"/>
   </p:notesMasterIdLst>
   <p:handoutMasterIdLst>
-    <p:handoutMasterId r:id="rId14"/>
+    <p:handoutMasterId r:id="rId15"/>
   </p:handoutMasterIdLst>
   <p:sldIdLst>
     <p:sldId id="628" r:id="rId5"/>
@@ -18,7 +18,8 @@
     <p:sldId id="635" r:id="rId9"/>
     <p:sldId id="632" r:id="rId10"/>
     <p:sldId id="638" r:id="rId11"/>
-    <p:sldId id="633" r:id="rId12"/>
+    <p:sldId id="639" r:id="rId12"/>
+    <p:sldId id="633" r:id="rId13"/>
   </p:sldIdLst>
   <p:sldSz cx="9144000" cy="6858000" type="screen4x3"/>
   <p:notesSz cx="7010400" cy="9296400"/>
@@ -311,11 +312,11 @@
         </c:dLbls>
         <c:gapWidth val="150"/>
         <c:overlap val="100"/>
-        <c:axId val="32182272"/>
-        <c:axId val="64376768"/>
+        <c:axId val="31297024"/>
+        <c:axId val="101139008"/>
       </c:barChart>
       <c:catAx>
-        <c:axId val="32182272"/>
+        <c:axId val="31297024"/>
         <c:scaling>
           <c:orientation val="maxMin"/>
         </c:scaling>
@@ -324,7 +325,7 @@
         <c:majorTickMark val="out"/>
         <c:minorTickMark val="none"/>
         <c:tickLblPos val="nextTo"/>
-        <c:crossAx val="64376768"/>
+        <c:crossAx val="101139008"/>
         <c:crosses val="autoZero"/>
         <c:auto val="1"/>
         <c:lblAlgn val="ctr"/>
@@ -332,7 +333,7 @@
         <c:noMultiLvlLbl val="0"/>
       </c:catAx>
       <c:valAx>
-        <c:axId val="64376768"/>
+        <c:axId val="101139008"/>
         <c:scaling>
           <c:orientation val="minMax"/>
         </c:scaling>
@@ -343,7 +344,7 @@
         <c:majorTickMark val="out"/>
         <c:minorTickMark val="none"/>
         <c:tickLblPos val="nextTo"/>
-        <c:crossAx val="32182272"/>
+        <c:crossAx val="31297024"/>
         <c:crosses val="autoZero"/>
         <c:crossBetween val="between"/>
       </c:valAx>
@@ -566,8 +567,8 @@
           <c:showBubbleSize val="0"/>
         </c:dLbls>
         <c:gapWidth val="150"/>
-        <c:axId val="32130048"/>
-        <c:axId val="64379072"/>
+        <c:axId val="31364096"/>
+        <c:axId val="101141312"/>
       </c:barChart>
       <c:lineChart>
         <c:grouping val="standard"/>
@@ -581,7 +582,7 @@
               <c:strCache>
                 <c:ptCount val="1"/>
                 <c:pt idx="0">
-                  <c:v>Cum Open Delequient Charts</c:v>
+                  <c:v>Cum Open Delequient Starts</c:v>
                 </c:pt>
               </c:strCache>
             </c:strRef>
@@ -651,7 +652,7 @@
               <c:strCache>
                 <c:ptCount val="1"/>
                 <c:pt idx="0">
-                  <c:v>Forecasted Cum Open Delequeint Charts</c:v>
+                  <c:v>Forecasted Cum Open Delequeint Starts</c:v>
                 </c:pt>
               </c:strCache>
             </c:strRef>
@@ -713,11 +714,11 @@
         </c:dLbls>
         <c:marker val="1"/>
         <c:smooth val="0"/>
-        <c:axId val="32130048"/>
-        <c:axId val="64379072"/>
+        <c:axId val="31364096"/>
+        <c:axId val="101141312"/>
       </c:lineChart>
       <c:catAx>
-        <c:axId val="32130048"/>
+        <c:axId val="31364096"/>
         <c:scaling>
           <c:orientation val="minMax"/>
         </c:scaling>
@@ -727,7 +728,7 @@
         <c:majorTickMark val="out"/>
         <c:minorTickMark val="none"/>
         <c:tickLblPos val="nextTo"/>
-        <c:crossAx val="64379072"/>
+        <c:crossAx val="101141312"/>
         <c:crosses val="autoZero"/>
         <c:auto val="1"/>
         <c:lblAlgn val="ctr"/>
@@ -735,7 +736,7 @@
         <c:noMultiLvlLbl val="0"/>
       </c:catAx>
       <c:valAx>
-        <c:axId val="64379072"/>
+        <c:axId val="101141312"/>
         <c:scaling>
           <c:orientation val="minMax"/>
         </c:scaling>
@@ -746,7 +747,434 @@
         <c:majorTickMark val="out"/>
         <c:minorTickMark val="none"/>
         <c:tickLblPos val="nextTo"/>
-        <c:crossAx val="32130048"/>
+        <c:crossAx val="31364096"/>
+        <c:crosses val="autoZero"/>
+        <c:crossBetween val="between"/>
+      </c:valAx>
+    </c:plotArea>
+    <c:legend>
+      <c:legendPos val="r"/>
+      <c:layout>
+        <c:manualLayout>
+          <c:xMode val="edge"/>
+          <c:yMode val="edge"/>
+          <c:x val="0.65963141460765751"/>
+          <c:y val="0.23904122278832804"/>
+          <c:w val="0.33174789573717101"/>
+          <c:h val="0.75476069167824655"/>
+        </c:manualLayout>
+      </c:layout>
+      <c:overlay val="0"/>
+    </c:legend>
+    <c:plotVisOnly val="1"/>
+    <c:dispBlanksAs val="gap"/>
+    <c:showDLblsOverMax val="0"/>
+  </c:chart>
+  <c:txPr>
+    <a:bodyPr/>
+    <a:lstStyle/>
+    <a:p>
+      <a:pPr>
+        <a:defRPr sz="1800"/>
+      </a:pPr>
+      <a:endParaRPr lang="en-US"/>
+    </a:p>
+  </c:txPr>
+  <c:externalData r:id="rId1">
+    <c:autoUpdate val="0"/>
+  </c:externalData>
+</c:chartSpace>
+</file>
+
+<file path=ppt/charts/chart3.xml><?xml version="1.0" encoding="utf-8"?>
+<c:chartSpace xmlns:c="http://schemas.openxmlformats.org/drawingml/2006/chart" xmlns:a="http://schemas.openxmlformats.org/drawingml/2006/main" xmlns:r="http://schemas.openxmlformats.org/officeDocument/2006/relationships">
+  <c:date1904 val="0"/>
+  <c:lang val="en-US"/>
+  <c:roundedCorners val="0"/>
+  <mc:AlternateContent xmlns:mc="http://schemas.openxmlformats.org/markup-compatibility/2006">
+    <mc:Choice xmlns:c14="http://schemas.microsoft.com/office/drawing/2007/8/2/chart" Requires="c14">
+      <c14:style val="102"/>
+    </mc:Choice>
+    <mc:Fallback>
+      <c:style val="2"/>
+    </mc:Fallback>
+  </mc:AlternateContent>
+  <c:chart>
+    <c:autoTitleDeleted val="0"/>
+    <c:plotArea>
+      <c:layout/>
+      <c:barChart>
+        <c:barDir val="col"/>
+        <c:grouping val="clustered"/>
+        <c:varyColors val="0"/>
+        <c:ser>
+          <c:idx val="0"/>
+          <c:order val="0"/>
+          <c:tx>
+            <c:strRef>
+              <c:f>Sheet1!$B$1</c:f>
+              <c:strCache>
+                <c:ptCount val="1"/>
+                <c:pt idx="0">
+                  <c:v>Completed Finishes</c:v>
+                </c:pt>
+              </c:strCache>
+            </c:strRef>
+          </c:tx>
+          <c:spPr>
+            <a:solidFill>
+              <a:srgbClr val="59A583"/>
+            </a:solidFill>
+          </c:spPr>
+          <c:invertIfNegative val="0"/>
+          <c:cat>
+            <c:strRef>
+              <c:f>Sheet1!$A$2:$A$6</c:f>
+              <c:strCache>
+                <c:ptCount val="1"/>
+                <c:pt idx="0">
+                  <c:v>Cat</c:v>
+                </c:pt>
+              </c:strCache>
+            </c:strRef>
+          </c:cat>
+          <c:val>
+            <c:numRef>
+              <c:f>Sheet1!$B$2:$B$6</c:f>
+              <c:numCache>
+                <c:formatCode>General</c:formatCode>
+                <c:ptCount val="5"/>
+                <c:pt idx="0">
+                  <c:v>1</c:v>
+                </c:pt>
+              </c:numCache>
+            </c:numRef>
+          </c:val>
+        </c:ser>
+        <c:ser>
+          <c:idx val="1"/>
+          <c:order val="1"/>
+          <c:tx>
+            <c:strRef>
+              <c:f>Sheet1!$D$1</c:f>
+              <c:strCache>
+                <c:ptCount val="1"/>
+                <c:pt idx="0">
+                  <c:v>Deliquent Finishes</c:v>
+                </c:pt>
+              </c:strCache>
+            </c:strRef>
+          </c:tx>
+          <c:spPr>
+            <a:solidFill>
+              <a:srgbClr val="CD6B57"/>
+            </a:solidFill>
+          </c:spPr>
+          <c:invertIfNegative val="0"/>
+          <c:cat>
+            <c:strRef>
+              <c:f>Sheet1!$A$2:$A$6</c:f>
+              <c:strCache>
+                <c:ptCount val="1"/>
+                <c:pt idx="0">
+                  <c:v>Cat</c:v>
+                </c:pt>
+              </c:strCache>
+            </c:strRef>
+          </c:cat>
+          <c:val>
+            <c:numRef>
+              <c:f>Sheet1!$D$2:$D$6</c:f>
+              <c:numCache>
+                <c:formatCode>General</c:formatCode>
+                <c:ptCount val="5"/>
+                <c:pt idx="0">
+                  <c:v>1</c:v>
+                </c:pt>
+              </c:numCache>
+            </c:numRef>
+          </c:val>
+        </c:ser>
+        <c:ser>
+          <c:idx val="2"/>
+          <c:order val="2"/>
+          <c:tx>
+            <c:strRef>
+              <c:f>Sheet1!$C$1</c:f>
+              <c:strCache>
+                <c:ptCount val="1"/>
+                <c:pt idx="0">
+                  <c:v>Forecasted Completed Finishes</c:v>
+                </c:pt>
+              </c:strCache>
+            </c:strRef>
+          </c:tx>
+          <c:spPr>
+            <a:solidFill>
+              <a:srgbClr val="E0E0E0"/>
+            </a:solidFill>
+          </c:spPr>
+          <c:invertIfNegative val="0"/>
+          <c:cat>
+            <c:strRef>
+              <c:f>Sheet1!$A$2:$A$6</c:f>
+              <c:strCache>
+                <c:ptCount val="1"/>
+                <c:pt idx="0">
+                  <c:v>Cat</c:v>
+                </c:pt>
+              </c:strCache>
+            </c:strRef>
+          </c:cat>
+          <c:val>
+            <c:numRef>
+              <c:f>Sheet1!$C$2:$C$6</c:f>
+              <c:numCache>
+                <c:formatCode>General</c:formatCode>
+                <c:ptCount val="5"/>
+                <c:pt idx="0">
+                  <c:v>1</c:v>
+                </c:pt>
+              </c:numCache>
+            </c:numRef>
+          </c:val>
+        </c:ser>
+        <c:ser>
+          <c:idx val="3"/>
+          <c:order val="3"/>
+          <c:tx>
+            <c:strRef>
+              <c:f>Sheet1!$E$1</c:f>
+              <c:strCache>
+                <c:ptCount val="1"/>
+                <c:pt idx="0">
+                  <c:v>Forecasted Delequint Finishes</c:v>
+                </c:pt>
+              </c:strCache>
+            </c:strRef>
+          </c:tx>
+          <c:spPr>
+            <a:solidFill>
+              <a:schemeClr val="bg1">
+                <a:lumMod val="65000"/>
+              </a:schemeClr>
+            </a:solidFill>
+          </c:spPr>
+          <c:invertIfNegative val="0"/>
+          <c:cat>
+            <c:strRef>
+              <c:f>Sheet1!$A$2:$A$6</c:f>
+              <c:strCache>
+                <c:ptCount val="1"/>
+                <c:pt idx="0">
+                  <c:v>Cat</c:v>
+                </c:pt>
+              </c:strCache>
+            </c:strRef>
+          </c:cat>
+          <c:val>
+            <c:numRef>
+              <c:f>Sheet1!$E$2:$E$6</c:f>
+              <c:numCache>
+                <c:formatCode>General</c:formatCode>
+                <c:ptCount val="5"/>
+                <c:pt idx="0">
+                  <c:v>1</c:v>
+                </c:pt>
+              </c:numCache>
+            </c:numRef>
+          </c:val>
+        </c:ser>
+        <c:dLbls>
+          <c:showLegendKey val="0"/>
+          <c:showVal val="0"/>
+          <c:showCatName val="0"/>
+          <c:showSerName val="0"/>
+          <c:showPercent val="0"/>
+          <c:showBubbleSize val="0"/>
+        </c:dLbls>
+        <c:gapWidth val="150"/>
+        <c:axId val="118944256"/>
+        <c:axId val="32367744"/>
+      </c:barChart>
+      <c:lineChart>
+        <c:grouping val="standard"/>
+        <c:varyColors val="0"/>
+        <c:ser>
+          <c:idx val="5"/>
+          <c:order val="4"/>
+          <c:tx>
+            <c:strRef>
+              <c:f>Sheet1!$F$1</c:f>
+              <c:strCache>
+                <c:ptCount val="1"/>
+                <c:pt idx="0">
+                  <c:v>Cum Open Delequient Finishes</c:v>
+                </c:pt>
+              </c:strCache>
+            </c:strRef>
+          </c:tx>
+          <c:spPr>
+            <a:ln>
+              <a:solidFill>
+                <a:schemeClr val="tx1"/>
+              </a:solidFill>
+            </a:ln>
+            <a:effectLst>
+              <a:outerShdw blurRad="50800" dist="50800" dir="5400000" algn="ctr" rotWithShape="0">
+                <a:schemeClr val="tx1"/>
+              </a:outerShdw>
+            </a:effectLst>
+          </c:spPr>
+          <c:marker>
+            <c:symbol val="x"/>
+            <c:size val="7"/>
+            <c:spPr>
+              <a:solidFill>
+                <a:schemeClr val="tx1"/>
+              </a:solidFill>
+              <a:ln>
+                <a:solidFill>
+                  <a:schemeClr val="tx1"/>
+                </a:solidFill>
+              </a:ln>
+              <a:effectLst>
+                <a:outerShdw blurRad="50800" dist="50800" dir="5400000" algn="ctr" rotWithShape="0">
+                  <a:schemeClr val="tx1"/>
+                </a:outerShdw>
+              </a:effectLst>
+            </c:spPr>
+          </c:marker>
+          <c:cat>
+            <c:strRef>
+              <c:f>Sheet1!$A$2:$A$6</c:f>
+              <c:strCache>
+                <c:ptCount val="1"/>
+                <c:pt idx="0">
+                  <c:v>Cat</c:v>
+                </c:pt>
+              </c:strCache>
+            </c:strRef>
+          </c:cat>
+          <c:val>
+            <c:numRef>
+              <c:f>Sheet1!$F$2:$F$6</c:f>
+              <c:numCache>
+                <c:formatCode>General</c:formatCode>
+                <c:ptCount val="5"/>
+                <c:pt idx="0">
+                  <c:v>1</c:v>
+                </c:pt>
+              </c:numCache>
+            </c:numRef>
+          </c:val>
+          <c:smooth val="0"/>
+        </c:ser>
+        <c:ser>
+          <c:idx val="4"/>
+          <c:order val="5"/>
+          <c:tx>
+            <c:strRef>
+              <c:f>Sheet1!$G$1</c:f>
+              <c:strCache>
+                <c:ptCount val="1"/>
+                <c:pt idx="0">
+                  <c:v>Forecasted Cum Open Delequeint Finishes</c:v>
+                </c:pt>
+              </c:strCache>
+            </c:strRef>
+          </c:tx>
+          <c:spPr>
+            <a:ln>
+              <a:solidFill>
+                <a:prstClr val="black"/>
+              </a:solidFill>
+              <a:prstDash val="sysDash"/>
+            </a:ln>
+          </c:spPr>
+          <c:marker>
+            <c:symbol val="square"/>
+            <c:size val="7"/>
+            <c:spPr>
+              <a:solidFill>
+                <a:prstClr val="black"/>
+              </a:solidFill>
+              <a:ln>
+                <a:solidFill>
+                  <a:prstClr val="black"/>
+                </a:solidFill>
+              </a:ln>
+            </c:spPr>
+          </c:marker>
+          <c:cat>
+            <c:strRef>
+              <c:f>Sheet1!$A$2:$A$6</c:f>
+              <c:strCache>
+                <c:ptCount val="1"/>
+                <c:pt idx="0">
+                  <c:v>Cat</c:v>
+                </c:pt>
+              </c:strCache>
+            </c:strRef>
+          </c:cat>
+          <c:val>
+            <c:numRef>
+              <c:f>Sheet1!$G$2:$G$6</c:f>
+              <c:numCache>
+                <c:formatCode>General</c:formatCode>
+                <c:ptCount val="5"/>
+                <c:pt idx="0">
+                  <c:v>1</c:v>
+                </c:pt>
+              </c:numCache>
+            </c:numRef>
+          </c:val>
+          <c:smooth val="0"/>
+        </c:ser>
+        <c:dLbls>
+          <c:showLegendKey val="0"/>
+          <c:showVal val="0"/>
+          <c:showCatName val="0"/>
+          <c:showSerName val="0"/>
+          <c:showPercent val="0"/>
+          <c:showBubbleSize val="0"/>
+        </c:dLbls>
+        <c:marker val="1"/>
+        <c:smooth val="0"/>
+        <c:axId val="118944256"/>
+        <c:axId val="32367744"/>
+      </c:lineChart>
+      <c:catAx>
+        <c:axId val="118944256"/>
+        <c:scaling>
+          <c:orientation val="minMax"/>
+        </c:scaling>
+        <c:delete val="0"/>
+        <c:axPos val="b"/>
+        <c:numFmt formatCode="General" sourceLinked="1"/>
+        <c:majorTickMark val="out"/>
+        <c:minorTickMark val="none"/>
+        <c:tickLblPos val="nextTo"/>
+        <c:crossAx val="32367744"/>
+        <c:crosses val="autoZero"/>
+        <c:auto val="1"/>
+        <c:lblAlgn val="ctr"/>
+        <c:lblOffset val="100"/>
+        <c:noMultiLvlLbl val="0"/>
+      </c:catAx>
+      <c:valAx>
+        <c:axId val="32367744"/>
+        <c:scaling>
+          <c:orientation val="minMax"/>
+        </c:scaling>
+        <c:delete val="0"/>
+        <c:axPos val="l"/>
+        <c:majorGridlines/>
+        <c:numFmt formatCode="General" sourceLinked="1"/>
+        <c:majorTickMark val="out"/>
+        <c:minorTickMark val="none"/>
+        <c:tickLblPos val="nextTo"/>
+        <c:crossAx val="118944256"/>
         <c:crosses val="autoZero"/>
         <c:crossBetween val="between"/>
       </c:valAx>
@@ -4165,7 +4593,7 @@
             <p:ph idx="1"/>
             <p:extLst>
               <p:ext uri="{D42A27DB-BD31-4B8C-83A1-F6EECF244321}">
-                <p14:modId xmlns:p14="http://schemas.microsoft.com/office/powerpoint/2010/main" val="3809287909"/>
+                <p14:modId xmlns:p14="http://schemas.microsoft.com/office/powerpoint/2010/main" val="1696187049"/>
               </p:ext>
             </p:extLst>
           </p:nvPr>
@@ -4189,6 +4617,84 @@
 </file>
 
 <file path=ppt/slides/slide8.xml><?xml version="1.0" encoding="utf-8"?>
+<p:sld xmlns:a="http://schemas.openxmlformats.org/drawingml/2006/main" xmlns:r="http://schemas.openxmlformats.org/officeDocument/2006/relationships" xmlns:p="http://schemas.openxmlformats.org/presentationml/2006/main">
+  <p:cSld>
+    <p:spTree>
+      <p:nvGrpSpPr>
+        <p:cNvPr id="1" name=""/>
+        <p:cNvGrpSpPr/>
+        <p:nvPr/>
+      </p:nvGrpSpPr>
+      <p:grpSpPr>
+        <a:xfrm>
+          <a:off x="0" y="0"/>
+          <a:ext cx="0" cy="0"/>
+          <a:chOff x="0" y="0"/>
+          <a:chExt cx="0" cy="0"/>
+        </a:xfrm>
+      </p:grpSpPr>
+      <p:sp>
+        <p:nvSpPr>
+          <p:cNvPr id="2" name="Title 1"/>
+          <p:cNvSpPr>
+            <a:spLocks noGrp="1"/>
+          </p:cNvSpPr>
+          <p:nvPr>
+            <p:ph type="title"/>
+          </p:nvPr>
+        </p:nvSpPr>
+        <p:spPr/>
+        <p:txBody>
+          <a:bodyPr/>
+          <a:lstStyle/>
+          <a:p>
+            <a:r>
+              <a:rPr lang="en-US" dirty="0"/>
+              <a:t>Schedule Performance – Delinquent Finishes to BL</a:t>
+            </a:r>
+            <a:endParaRPr lang="en-US" dirty="0"/>
+          </a:p>
+        </p:txBody>
+      </p:sp>
+      <p:graphicFrame>
+        <p:nvGraphicFramePr>
+          <p:cNvPr id="4" name="Content Placeholder 3"/>
+          <p:cNvGraphicFramePr>
+            <a:graphicFrameLocks noGrp="1"/>
+          </p:cNvGraphicFramePr>
+          <p:nvPr>
+            <p:ph idx="1"/>
+            <p:extLst>
+              <p:ext uri="{D42A27DB-BD31-4B8C-83A1-F6EECF244321}">
+                <p14:modId xmlns:p14="http://schemas.microsoft.com/office/powerpoint/2010/main" val="2786666796"/>
+              </p:ext>
+            </p:extLst>
+          </p:nvPr>
+        </p:nvGraphicFramePr>
+        <p:xfrm>
+          <a:off x="152400" y="1295400"/>
+          <a:ext cx="8839200" cy="5181600"/>
+        </p:xfrm>
+        <a:graphic>
+          <a:graphicData uri="http://schemas.openxmlformats.org/drawingml/2006/chart">
+            <c:chart xmlns:c="http://schemas.openxmlformats.org/drawingml/2006/chart" xmlns:r="http://schemas.openxmlformats.org/officeDocument/2006/relationships" r:id="rId2"/>
+          </a:graphicData>
+        </a:graphic>
+      </p:graphicFrame>
+    </p:spTree>
+    <p:extLst>
+      <p:ext uri="{BB962C8B-B14F-4D97-AF65-F5344CB8AC3E}">
+        <p14:creationId xmlns:p14="http://schemas.microsoft.com/office/powerpoint/2010/main" val="686075037"/>
+      </p:ext>
+    </p:extLst>
+  </p:cSld>
+  <p:clrMapOvr>
+    <a:masterClrMapping/>
+  </p:clrMapOvr>
+</p:sld>
+</file>
+
+<file path=ppt/slides/slide9.xml><?xml version="1.0" encoding="utf-8"?>
 <p:sld xmlns:a="http://schemas.openxmlformats.org/drawingml/2006/main" xmlns:r="http://schemas.openxmlformats.org/officeDocument/2006/relationships" xmlns:p="http://schemas.openxmlformats.org/presentationml/2006/main">
   <p:cSld>
     <p:spTree>
@@ -5683,6 +6189,21 @@
 </file>
 
 <file path=customXml/item1.xml><?xml version="1.0" encoding="utf-8"?>
+<?mso-contentType ?>
+<FormTemplates xmlns="http://schemas.microsoft.com/sharepoint/v3/contenttype/forms">
+  <Display>DocumentLibraryForm</Display>
+  <Edit>DocumentLibraryForm</Edit>
+  <New>DocumentLibraryForm</New>
+</FormTemplates>
+</file>
+
+<file path=customXml/item2.xml><?xml version="1.0" encoding="utf-8"?>
+<p:properties xmlns:p="http://schemas.microsoft.com/office/2006/metadata/properties" xmlns:xsi="http://www.w3.org/2001/XMLSchema-instance" xmlns:pc="http://schemas.microsoft.com/office/infopath/2007/PartnerControls">
+  <documentManagement/>
+</p:properties>
+</file>
+
+<file path=customXml/item3.xml><?xml version="1.0" encoding="utf-8"?>
 <ct:contentTypeSchema xmlns:ct="http://schemas.microsoft.com/office/2006/metadata/contentType" xmlns:ma="http://schemas.microsoft.com/office/2006/metadata/properties/metaAttributes" ct:_="" ma:_="" ma:contentTypeName="Document" ma:contentTypeID="0x010100EF867D41FF4F6741B2566D0C48EB59D2" ma:contentTypeVersion="0" ma:contentTypeDescription="Create a new document." ma:contentTypeScope="" ma:versionID="c6cc6be9b7085f5a7c9c7d9b3dbd5dc1">
   <xsd:schema xmlns:xsd="http://www.w3.org/2001/XMLSchema" xmlns:xs="http://www.w3.org/2001/XMLSchema" xmlns:p="http://schemas.microsoft.com/office/2006/metadata/properties" targetNamespace="http://schemas.microsoft.com/office/2006/metadata/properties" ma:root="true" ma:fieldsID="c64490b4aec6201516c3a874156f37b2">
     <xsd:element name="properties">
@@ -5796,33 +6317,10 @@
 </ct:contentTypeSchema>
 </file>
 
-<file path=customXml/item2.xml><?xml version="1.0" encoding="utf-8"?>
-<p:properties xmlns:p="http://schemas.microsoft.com/office/2006/metadata/properties" xmlns:xsi="http://www.w3.org/2001/XMLSchema-instance" xmlns:pc="http://schemas.microsoft.com/office/infopath/2007/PartnerControls">
-  <documentManagement/>
-</p:properties>
-</file>
-
-<file path=customXml/item3.xml><?xml version="1.0" encoding="utf-8"?>
-<?mso-contentType ?>
-<FormTemplates xmlns="http://schemas.microsoft.com/sharepoint/v3/contenttype/forms">
-  <Display>DocumentLibraryForm</Display>
-  <Edit>DocumentLibraryForm</Edit>
-  <New>DocumentLibraryForm</New>
-</FormTemplates>
-</file>
-
 <file path=customXml/itemProps1.xml><?xml version="1.0" encoding="utf-8"?>
-<ds:datastoreItem xmlns:ds="http://schemas.openxmlformats.org/officeDocument/2006/customXml" ds:itemID="{776C13B3-8EDC-4A1B-8FE1-1561EBD711EC}">
+<ds:datastoreItem xmlns:ds="http://schemas.openxmlformats.org/officeDocument/2006/customXml" ds:itemID="{362DF851-7E51-44C7-BE33-35BF0C957E71}">
   <ds:schemaRefs>
-    <ds:schemaRef ds:uri="http://schemas.microsoft.com/office/2006/metadata/contentType"/>
-    <ds:schemaRef ds:uri="http://schemas.microsoft.com/office/2006/metadata/properties/metaAttributes"/>
-    <ds:schemaRef ds:uri="http://www.w3.org/2001/XMLSchema"/>
-    <ds:schemaRef ds:uri="http://schemas.microsoft.com/office/2006/metadata/properties"/>
-    <ds:schemaRef ds:uri="http://schemas.openxmlformats.org/package/2006/metadata/core-properties"/>
-    <ds:schemaRef ds:uri="http://purl.org/dc/elements/1.1/"/>
-    <ds:schemaRef ds:uri="http://purl.org/dc/terms/"/>
-    <ds:schemaRef ds:uri="http://schemas.microsoft.com/internal/obd"/>
-    <ds:schemaRef ds:uri="http://schemas.microsoft.com/office/infopath/2007/PartnerControls"/>
+    <ds:schemaRef ds:uri="http://schemas.microsoft.com/sharepoint/v3/contenttype/forms"/>
   </ds:schemaRefs>
 </ds:datastoreItem>
 </file>
@@ -5843,9 +6341,17 @@
 </file>
 
 <file path=customXml/itemProps3.xml><?xml version="1.0" encoding="utf-8"?>
-<ds:datastoreItem xmlns:ds="http://schemas.openxmlformats.org/officeDocument/2006/customXml" ds:itemID="{362DF851-7E51-44C7-BE33-35BF0C957E71}">
+<ds:datastoreItem xmlns:ds="http://schemas.openxmlformats.org/officeDocument/2006/customXml" ds:itemID="{776C13B3-8EDC-4A1B-8FE1-1561EBD711EC}">
   <ds:schemaRefs>
-    <ds:schemaRef ds:uri="http://schemas.microsoft.com/sharepoint/v3/contenttype/forms"/>
+    <ds:schemaRef ds:uri="http://schemas.microsoft.com/office/2006/metadata/contentType"/>
+    <ds:schemaRef ds:uri="http://schemas.microsoft.com/office/2006/metadata/properties/metaAttributes"/>
+    <ds:schemaRef ds:uri="http://www.w3.org/2001/XMLSchema"/>
+    <ds:schemaRef ds:uri="http://schemas.microsoft.com/office/2006/metadata/properties"/>
+    <ds:schemaRef ds:uri="http://schemas.openxmlformats.org/package/2006/metadata/core-properties"/>
+    <ds:schemaRef ds:uri="http://purl.org/dc/elements/1.1/"/>
+    <ds:schemaRef ds:uri="http://purl.org/dc/terms/"/>
+    <ds:schemaRef ds:uri="http://schemas.microsoft.com/internal/obd"/>
+    <ds:schemaRef ds:uri="http://schemas.microsoft.com/office/infopath/2007/PartnerControls"/>
   </ds:schemaRefs>
 </ds:datastoreItem>
 </file>
</xml_diff>

<commit_message>
Late Task business rules revisited and Finish date issue in Driving Path slide grid fixed
</commit_message>
<xml_diff>
--- a/PMMPresentation/Modules/Templates/PMM Template.pptx
+++ b/PMMPresentation/Modules/Templates/PMM Template.pptx
@@ -17,8 +17,8 @@
     <p:sldId id="634" r:id="rId8"/>
     <p:sldId id="635" r:id="rId9"/>
     <p:sldId id="632" r:id="rId10"/>
-    <p:sldId id="638" r:id="rId11"/>
-    <p:sldId id="639" r:id="rId12"/>
+    <p:sldId id="636" r:id="rId11"/>
+    <p:sldId id="637" r:id="rId12"/>
     <p:sldId id="633" r:id="rId13"/>
   </p:sldIdLst>
   <p:sldSz cx="9144000" cy="6858000" type="screen4x3"/>
@@ -172,10 +172,10 @@
           <c:layoutTarget val="inner"/>
           <c:xMode val="edge"/>
           <c:yMode val="edge"/>
-          <c:x val="0.10803623505395178"/>
+          <c:x val="0.10803623505395173"/>
           <c:y val="6.5983968494660691E-2"/>
           <c:w val="0.86898536988432007"/>
-          <c:h val="0.90314967223550169"/>
+          <c:h val="0.90314967223550113"/>
         </c:manualLayout>
       </c:layout>
       <c:barChart>
@@ -242,13 +242,18 @@
             </a:gradFill>
           </c:spPr>
           <c:invertIfNegative val="0"/>
+          <c:dPt>
+            <c:idx val="0"/>
+            <c:invertIfNegative val="0"/>
+            <c:bubble3D val="0"/>
+          </c:dPt>
           <c:dLbls>
             <c:dLbl>
               <c:idx val="0"/>
               <c:layout>
                 <c:manualLayout>
                   <c:x val="0.17404466802760771"/>
-                  <c:y val="-2.8055907659872694E-3"/>
+                  <c:y val="-2.8055907659872673E-3"/>
                 </c:manualLayout>
               </c:layout>
               <c:dLblPos val="ctr"/>
@@ -312,11 +317,11 @@
         </c:dLbls>
         <c:gapWidth val="150"/>
         <c:overlap val="100"/>
-        <c:axId val="31297024"/>
-        <c:axId val="101139008"/>
+        <c:axId val="31452672"/>
+        <c:axId val="35939456"/>
       </c:barChart>
       <c:catAx>
-        <c:axId val="31297024"/>
+        <c:axId val="31452672"/>
         <c:scaling>
           <c:orientation val="maxMin"/>
         </c:scaling>
@@ -325,7 +330,7 @@
         <c:majorTickMark val="out"/>
         <c:minorTickMark val="none"/>
         <c:tickLblPos val="nextTo"/>
-        <c:crossAx val="101139008"/>
+        <c:crossAx val="35939456"/>
         <c:crosses val="autoZero"/>
         <c:auto val="1"/>
         <c:lblAlgn val="ctr"/>
@@ -333,7 +338,7 @@
         <c:noMultiLvlLbl val="0"/>
       </c:catAx>
       <c:valAx>
-        <c:axId val="101139008"/>
+        <c:axId val="35939456"/>
         <c:scaling>
           <c:orientation val="minMax"/>
         </c:scaling>
@@ -344,7 +349,7 @@
         <c:majorTickMark val="out"/>
         <c:minorTickMark val="none"/>
         <c:tickLblPos val="nextTo"/>
-        <c:crossAx val="31297024"/>
+        <c:crossAx val="31452672"/>
         <c:crosses val="autoZero"/>
         <c:crossBetween val="between"/>
       </c:valAx>
@@ -567,8 +572,8 @@
           <c:showBubbleSize val="0"/>
         </c:dLbls>
         <c:gapWidth val="150"/>
-        <c:axId val="31364096"/>
-        <c:axId val="101141312"/>
+        <c:axId val="133042688"/>
+        <c:axId val="132973696"/>
       </c:barChart>
       <c:lineChart>
         <c:grouping val="standard"/>
@@ -714,11 +719,11 @@
         </c:dLbls>
         <c:marker val="1"/>
         <c:smooth val="0"/>
-        <c:axId val="31364096"/>
-        <c:axId val="101141312"/>
+        <c:axId val="133042688"/>
+        <c:axId val="132973696"/>
       </c:lineChart>
       <c:catAx>
-        <c:axId val="31364096"/>
+        <c:axId val="133042688"/>
         <c:scaling>
           <c:orientation val="minMax"/>
         </c:scaling>
@@ -728,7 +733,7 @@
         <c:majorTickMark val="out"/>
         <c:minorTickMark val="none"/>
         <c:tickLblPos val="nextTo"/>
-        <c:crossAx val="101141312"/>
+        <c:crossAx val="132973696"/>
         <c:crosses val="autoZero"/>
         <c:auto val="1"/>
         <c:lblAlgn val="ctr"/>
@@ -736,7 +741,7 @@
         <c:noMultiLvlLbl val="0"/>
       </c:catAx>
       <c:valAx>
-        <c:axId val="101141312"/>
+        <c:axId val="132973696"/>
         <c:scaling>
           <c:orientation val="minMax"/>
         </c:scaling>
@@ -747,7 +752,7 @@
         <c:majorTickMark val="out"/>
         <c:minorTickMark val="none"/>
         <c:tickLblPos val="nextTo"/>
-        <c:crossAx val="31364096"/>
+        <c:crossAx val="133042688"/>
         <c:crosses val="autoZero"/>
         <c:crossBetween val="between"/>
       </c:valAx>
@@ -994,8 +999,8 @@
           <c:showBubbleSize val="0"/>
         </c:dLbls>
         <c:gapWidth val="150"/>
-        <c:axId val="118944256"/>
-        <c:axId val="32367744"/>
+        <c:axId val="131821056"/>
+        <c:axId val="134754816"/>
       </c:barChart>
       <c:lineChart>
         <c:grouping val="standard"/>
@@ -1141,11 +1146,11 @@
         </c:dLbls>
         <c:marker val="1"/>
         <c:smooth val="0"/>
-        <c:axId val="118944256"/>
-        <c:axId val="32367744"/>
+        <c:axId val="131821056"/>
+        <c:axId val="134754816"/>
       </c:lineChart>
       <c:catAx>
-        <c:axId val="118944256"/>
+        <c:axId val="131821056"/>
         <c:scaling>
           <c:orientation val="minMax"/>
         </c:scaling>
@@ -1155,7 +1160,7 @@
         <c:majorTickMark val="out"/>
         <c:minorTickMark val="none"/>
         <c:tickLblPos val="nextTo"/>
-        <c:crossAx val="32367744"/>
+        <c:crossAx val="134754816"/>
         <c:crosses val="autoZero"/>
         <c:auto val="1"/>
         <c:lblAlgn val="ctr"/>
@@ -1163,7 +1168,7 @@
         <c:noMultiLvlLbl val="0"/>
       </c:catAx>
       <c:valAx>
-        <c:axId val="32367744"/>
+        <c:axId val="134754816"/>
         <c:scaling>
           <c:orientation val="minMax"/>
         </c:scaling>
@@ -1174,7 +1179,7 @@
         <c:majorTickMark val="out"/>
         <c:minorTickMark val="none"/>
         <c:tickLblPos val="nextTo"/>
-        <c:crossAx val="118944256"/>
+        <c:crossAx val="131821056"/>
         <c:crosses val="autoZero"/>
         <c:crossBetween val="between"/>
       </c:valAx>
@@ -3338,7 +3343,7 @@
           <p:nvPr/>
         </p:nvPicPr>
         <p:blipFill>
-          <a:blip r:embed="rId2" cstate="print">
+          <a:blip r:embed="rId2">
             <a:extLst>
               <a:ext uri="{28A0092B-C50C-407E-A947-70E740481C1C}">
                 <a14:useLocalDpi xmlns:a14="http://schemas.microsoft.com/office/drawing/2010/main" val="0"/>
@@ -3392,7 +3397,7 @@
           <p:nvPr/>
         </p:nvPicPr>
         <p:blipFill>
-          <a:blip r:embed="rId3" cstate="print">
+          <a:blip r:embed="rId3">
             <a:extLst>
               <a:ext uri="{28A0092B-C50C-407E-A947-70E740481C1C}">
                 <a14:useLocalDpi xmlns:a14="http://schemas.microsoft.com/office/drawing/2010/main" val="0"/>
@@ -3502,14 +3507,19 @@
             <p:ph idx="1"/>
           </p:nvPr>
         </p:nvSpPr>
-        <p:spPr/>
+        <p:spPr>
+          <a:xfrm>
+            <a:off x="323849" y="1504949"/>
+            <a:ext cx="8315325" cy="4581525"/>
+          </a:xfrm>
+        </p:spPr>
         <p:txBody>
           <a:bodyPr/>
           <a:lstStyle/>
           <a:p>
             <a:r>
               <a:rPr lang="en-US" dirty="0" smtClean="0"/>
-              <a:t>Driving path tasks</a:t>
+              <a:t>Driving path tasks and tasks completed on driving path</a:t>
             </a:r>
           </a:p>
           <a:p>
@@ -3633,14 +3643,14 @@
           <p:nvPr>
             <p:extLst>
               <p:ext uri="{D42A27DB-BD31-4B8C-83A1-F6EECF244321}">
-                <p14:modId xmlns:p14="http://schemas.microsoft.com/office/powerpoint/2010/main" val="3601572078"/>
+                <p14:modId xmlns:p14="http://schemas.microsoft.com/office/powerpoint/2010/main" val="3618147038"/>
               </p:ext>
             </p:extLst>
           </p:nvPr>
         </p:nvGraphicFramePr>
         <p:xfrm>
-          <a:off x="694707" y="1303317"/>
-          <a:ext cx="8305800" cy="304800"/>
+          <a:off x="142875" y="1303317"/>
+          <a:ext cx="8857632" cy="213360"/>
         </p:xfrm>
         <a:graphic>
           <a:graphicData uri="http://schemas.openxmlformats.org/drawingml/2006/table">
@@ -3649,28 +3659,28 @@
                 <a:tableStyleId>{5C22544A-7EE6-4342-B048-85BDC9FD1C3A}</a:tableStyleId>
               </a:tblPr>
               <a:tblGrid>
-                <a:gridCol w="611579"/>
-                <a:gridCol w="2665021"/>
-                <a:gridCol w="1295400"/>
-                <a:gridCol w="762000"/>
-                <a:gridCol w="990600"/>
-                <a:gridCol w="990600"/>
-                <a:gridCol w="990600"/>
+                <a:gridCol w="371475"/>
+                <a:gridCol w="2733675"/>
+                <a:gridCol w="2638425"/>
+                <a:gridCol w="542925"/>
+                <a:gridCol w="1047750"/>
+                <a:gridCol w="733425"/>
+                <a:gridCol w="789957"/>
               </a:tblGrid>
-              <a:tr h="304800">
+              <a:tr h="211158">
                 <a:tc>
                   <a:txBody>
                     <a:bodyPr/>
                     <a:lstStyle/>
                     <a:p>
                       <a:r>
-                        <a:rPr lang="en-US" sz="1100" dirty="0" smtClean="0">
+                        <a:rPr lang="en-US" sz="800" b="0" dirty="0" smtClean="0">
                           <a:latin typeface="Arial" pitchFamily="34" charset="0"/>
                           <a:cs typeface="Arial" pitchFamily="34" charset="0"/>
                         </a:rPr>
                         <a:t>ID</a:t>
                       </a:r>
-                      <a:endParaRPr lang="en-US" sz="1100" b="1" dirty="0">
+                      <a:endParaRPr lang="en-US" sz="800" b="0" dirty="0">
                         <a:latin typeface="Arial" pitchFamily="34" charset="0"/>
                         <a:cs typeface="Arial" pitchFamily="34" charset="0"/>
                       </a:endParaRPr>
@@ -3684,13 +3694,13 @@
                     <a:lstStyle/>
                     <a:p>
                       <a:r>
-                        <a:rPr lang="en-US" sz="1100" dirty="0" smtClean="0">
+                        <a:rPr lang="en-US" sz="800" b="0" dirty="0" smtClean="0">
                           <a:latin typeface="Arial" pitchFamily="34" charset="0"/>
                           <a:cs typeface="Arial" pitchFamily="34" charset="0"/>
                         </a:rPr>
                         <a:t>Unique ID</a:t>
                       </a:r>
-                      <a:endParaRPr lang="en-US" sz="1100" b="1" dirty="0">
+                      <a:endParaRPr lang="en-US" sz="800" b="0" dirty="0">
                         <a:latin typeface="Arial" pitchFamily="34" charset="0"/>
                         <a:cs typeface="Arial" pitchFamily="34" charset="0"/>
                       </a:endParaRPr>
@@ -3704,13 +3714,13 @@
                     <a:lstStyle/>
                     <a:p>
                       <a:r>
-                        <a:rPr lang="en-US" sz="1100" dirty="0" smtClean="0">
+                        <a:rPr lang="en-US" sz="800" b="0" dirty="0" smtClean="0">
                           <a:latin typeface="Arial" pitchFamily="34" charset="0"/>
                           <a:cs typeface="Arial" pitchFamily="34" charset="0"/>
                         </a:rPr>
-                        <a:t>Task</a:t>
+                        <a:t>Task Name</a:t>
                       </a:r>
-                      <a:endParaRPr lang="en-US" sz="1100" b="1" dirty="0">
+                      <a:endParaRPr lang="en-US" sz="800" b="0" dirty="0">
                         <a:latin typeface="Arial" pitchFamily="34" charset="0"/>
                         <a:cs typeface="Arial" pitchFamily="34" charset="0"/>
                       </a:endParaRPr>
@@ -3724,13 +3734,13 @@
                     <a:lstStyle/>
                     <a:p>
                       <a:r>
-                        <a:rPr lang="en-US" sz="1100" dirty="0" smtClean="0">
+                        <a:rPr lang="en-US" sz="800" b="0" dirty="0" err="1" smtClean="0">
                           <a:latin typeface="Arial" pitchFamily="34" charset="0"/>
                           <a:cs typeface="Arial" pitchFamily="34" charset="0"/>
                         </a:rPr>
-                        <a:t>Duration</a:t>
+                        <a:t>Dur</a:t>
                       </a:r>
-                      <a:endParaRPr lang="en-US" sz="1100" b="1" dirty="0">
+                      <a:endParaRPr lang="en-US" sz="800" b="0" dirty="0">
                         <a:latin typeface="Arial" pitchFamily="34" charset="0"/>
                         <a:cs typeface="Arial" pitchFamily="34" charset="0"/>
                       </a:endParaRPr>
@@ -3744,13 +3754,13 @@
                     <a:lstStyle/>
                     <a:p>
                       <a:r>
-                        <a:rPr lang="en-US" sz="1100" dirty="0" smtClean="0">
+                        <a:rPr lang="en-US" sz="800" b="0" dirty="0" smtClean="0">
                           <a:latin typeface="Arial" pitchFamily="34" charset="0"/>
                           <a:cs typeface="Arial" pitchFamily="34" charset="0"/>
                         </a:rPr>
                         <a:t>Predecessor</a:t>
                       </a:r>
-                      <a:endParaRPr lang="en-US" sz="1100" b="1" dirty="0">
+                      <a:endParaRPr lang="en-US" sz="800" b="0" dirty="0">
                         <a:latin typeface="Arial" pitchFamily="34" charset="0"/>
                         <a:cs typeface="Arial" pitchFamily="34" charset="0"/>
                       </a:endParaRPr>
@@ -3764,13 +3774,13 @@
                     <a:lstStyle/>
                     <a:p>
                       <a:r>
-                        <a:rPr lang="en-US" sz="1100" dirty="0" smtClean="0">
+                        <a:rPr lang="en-US" sz="800" b="0" dirty="0" smtClean="0">
                           <a:latin typeface="Arial" pitchFamily="34" charset="0"/>
                           <a:cs typeface="Arial" pitchFamily="34" charset="0"/>
                         </a:rPr>
                         <a:t>Start</a:t>
                       </a:r>
-                      <a:endParaRPr lang="en-US" sz="1100" b="1" dirty="0">
+                      <a:endParaRPr lang="en-US" sz="800" b="0" dirty="0">
                         <a:latin typeface="Arial" pitchFamily="34" charset="0"/>
                         <a:cs typeface="Arial" pitchFamily="34" charset="0"/>
                       </a:endParaRPr>
@@ -3784,13 +3794,13 @@
                     <a:lstStyle/>
                     <a:p>
                       <a:r>
-                        <a:rPr lang="en-US" sz="1100" dirty="0" smtClean="0">
+                        <a:rPr lang="en-US" sz="800" b="0" dirty="0" smtClean="0">
                           <a:latin typeface="Arial" pitchFamily="34" charset="0"/>
                           <a:cs typeface="Arial" pitchFamily="34" charset="0"/>
                         </a:rPr>
-                        <a:t>Finish</a:t>
+                        <a:t>Fin</a:t>
                       </a:r>
-                      <a:endParaRPr lang="en-US" sz="1100" b="1" dirty="0">
+                      <a:endParaRPr lang="en-US" sz="800" b="0" dirty="0">
                         <a:latin typeface="Arial" pitchFamily="34" charset="0"/>
                         <a:cs typeface="Arial" pitchFamily="34" charset="0"/>
                       </a:endParaRPr>
@@ -3803,6 +3813,43 @@
           </a:graphicData>
         </a:graphic>
       </p:graphicFrame>
+      <p:sp>
+        <p:nvSpPr>
+          <p:cNvPr id="3" name="TextBox 2"/>
+          <p:cNvSpPr txBox="1"/>
+          <p:nvPr/>
+        </p:nvSpPr>
+        <p:spPr>
+          <a:xfrm>
+            <a:off x="7834119" y="588317"/>
+            <a:ext cx="1300356" cy="338554"/>
+          </a:xfrm>
+          <a:prstGeom prst="rect">
+            <a:avLst/>
+          </a:prstGeom>
+          <a:noFill/>
+        </p:spPr>
+        <p:txBody>
+          <a:bodyPr wrap="none" rtlCol="0">
+            <a:spAutoFit/>
+          </a:bodyPr>
+          <a:lstStyle/>
+          <a:p>
+            <a:pPr algn="r"/>
+            <a:r>
+              <a:rPr lang="en-US" sz="1600" dirty="0" smtClean="0">
+                <a:latin typeface="Arial" pitchFamily="34" charset="0"/>
+                <a:cs typeface="Arial" pitchFamily="34" charset="0"/>
+              </a:rPr>
+              <a:t>Driving Path</a:t>
+            </a:r>
+            <a:endParaRPr lang="en-US" sz="1600" dirty="0">
+              <a:latin typeface="Arial" pitchFamily="34" charset="0"/>
+              <a:cs typeface="Arial" pitchFamily="34" charset="0"/>
+            </a:endParaRPr>
+          </a:p>
+        </p:txBody>
+      </p:sp>
     </p:spTree>
     <p:extLst>
       <p:ext uri="{BB962C8B-B14F-4D97-AF65-F5344CB8AC3E}">
@@ -3857,9 +3904,13 @@
           <a:p>
             <a:r>
               <a:rPr lang="en-US" dirty="0" smtClean="0"/>
-              <a:t>Complete Tasks</a:t>
+              <a:t>Completed Driving Path Tasks </a:t>
             </a:r>
-            <a:endParaRPr lang="en-US" dirty="0"/>
+            <a:r>
+              <a:rPr lang="en-US" sz="1400" dirty="0" smtClean="0"/>
+              <a:t>(current Fiscal Month)</a:t>
+            </a:r>
+            <a:endParaRPr lang="en-US" sz="1400" dirty="0"/>
           </a:p>
         </p:txBody>
       </p:sp>
@@ -3955,9 +4006,13 @@
           <a:p>
             <a:r>
               <a:rPr lang="en-US" dirty="0" smtClean="0"/>
-              <a:t>Late Tasks</a:t>
+              <a:t>Late Tasks </a:t>
             </a:r>
-            <a:endParaRPr lang="en-US" dirty="0"/>
+            <a:r>
+              <a:rPr lang="en-US" sz="1400" dirty="0" smtClean="0"/>
+              <a:t>(current Fiscal Month)</a:t>
+            </a:r>
+            <a:endParaRPr lang="en-US" sz="1400" dirty="0"/>
           </a:p>
         </p:txBody>
       </p:sp>
@@ -4593,7 +4648,7 @@
             <p:ph idx="1"/>
             <p:extLst>
               <p:ext uri="{D42A27DB-BD31-4B8C-83A1-F6EECF244321}">
-                <p14:modId xmlns:p14="http://schemas.microsoft.com/office/powerpoint/2010/main" val="1696187049"/>
+                <p14:modId xmlns:p14="http://schemas.microsoft.com/office/powerpoint/2010/main" val="452837976"/>
               </p:ext>
             </p:extLst>
           </p:nvPr>
@@ -4609,6 +4664,11 @@
         </a:graphic>
       </p:graphicFrame>
     </p:spTree>
+    <p:extLst>
+      <p:ext uri="{BB962C8B-B14F-4D97-AF65-F5344CB8AC3E}">
+        <p14:creationId xmlns:p14="http://schemas.microsoft.com/office/powerpoint/2010/main" val="1098855275"/>
+      </p:ext>
+    </p:extLst>
   </p:cSld>
   <p:clrMapOvr>
     <a:masterClrMapping/>
@@ -4652,7 +4712,6 @@
               <a:rPr lang="en-US" dirty="0"/>
               <a:t>Schedule Performance – Delinquent Finishes to BL</a:t>
             </a:r>
-            <a:endParaRPr lang="en-US" dirty="0"/>
           </a:p>
         </p:txBody>
       </p:sp>
@@ -4666,7 +4725,7 @@
             <p:ph idx="1"/>
             <p:extLst>
               <p:ext uri="{D42A27DB-BD31-4B8C-83A1-F6EECF244321}">
-                <p14:modId xmlns:p14="http://schemas.microsoft.com/office/powerpoint/2010/main" val="2786666796"/>
+                <p14:modId xmlns:p14="http://schemas.microsoft.com/office/powerpoint/2010/main" val="1851299246"/>
               </p:ext>
             </p:extLst>
           </p:nvPr>
@@ -4684,7 +4743,7 @@
     </p:spTree>
     <p:extLst>
       <p:ext uri="{BB962C8B-B14F-4D97-AF65-F5344CB8AC3E}">
-        <p14:creationId xmlns:p14="http://schemas.microsoft.com/office/powerpoint/2010/main" val="686075037"/>
+        <p14:creationId xmlns:p14="http://schemas.microsoft.com/office/powerpoint/2010/main" val="3713926316"/>
       </p:ext>
     </p:extLst>
   </p:cSld>
@@ -4749,20 +4808,27 @@
           <a:lstStyle/>
           <a:p>
             <a:r>
-              <a:rPr lang="en-US" dirty="0"/>
-              <a:t>Bullet 1 – not data driven</a:t>
+              <a:rPr lang="en-US" dirty="0" smtClean="0"/>
+              <a:t>Driving path status</a:t>
             </a:r>
           </a:p>
           <a:p>
             <a:r>
-              <a:rPr lang="en-US" dirty="0"/>
-              <a:t>Bullet 2 – not data </a:t>
+              <a:rPr lang="en-US" dirty="0" smtClean="0"/>
+              <a:t>Key Milestone status </a:t>
             </a:r>
+          </a:p>
+          <a:p>
             <a:r>
               <a:rPr lang="en-US" dirty="0" smtClean="0"/>
-              <a:t>driven</a:t>
+              <a:t>Upcoming reviews</a:t>
             </a:r>
-            <a:endParaRPr lang="en-US" dirty="0"/>
+          </a:p>
+          <a:p>
+            <a:pPr marL="0" indent="0">
+              <a:buNone/>
+            </a:pPr>
+            <a:endParaRPr lang="en-US" dirty="0" smtClean="0"/>
           </a:p>
         </p:txBody>
       </p:sp>
@@ -6328,14 +6394,14 @@
 <file path=customXml/itemProps2.xml><?xml version="1.0" encoding="utf-8"?>
 <ds:datastoreItem xmlns:ds="http://schemas.openxmlformats.org/officeDocument/2006/customXml" ds:itemID="{F08FFFF7-6ACE-4B4C-AA05-EAF8BD457E72}">
   <ds:schemaRefs>
-    <ds:schemaRef ds:uri="http://schemas.microsoft.com/office/infopath/2007/PartnerControls"/>
+    <ds:schemaRef ds:uri="http://www.w3.org/XML/1998/namespace"/>
+    <ds:schemaRef ds:uri="http://schemas.microsoft.com/office/2006/documentManagement/types"/>
     <ds:schemaRef ds:uri="http://purl.org/dc/elements/1.1/"/>
     <ds:schemaRef ds:uri="http://purl.org/dc/terms/"/>
-    <ds:schemaRef ds:uri="http://schemas.microsoft.com/office/2006/documentManagement/types"/>
     <ds:schemaRef ds:uri="http://schemas.openxmlformats.org/package/2006/metadata/core-properties"/>
+    <ds:schemaRef ds:uri="http://schemas.microsoft.com/office/infopath/2007/PartnerControls"/>
+    <ds:schemaRef ds:uri="http://schemas.microsoft.com/office/2006/metadata/properties"/>
     <ds:schemaRef ds:uri="http://purl.org/dc/dcmitype/"/>
-    <ds:schemaRef ds:uri="http://www.w3.org/XML/1998/namespace"/>
-    <ds:schemaRef ds:uri="http://schemas.microsoft.com/office/2006/metadata/properties"/>
   </ds:schemaRefs>
 </ds:datastoreItem>
 </file>

</xml_diff>

<commit_message>
added all the required slides for iteration 2 and also the progress bar as per the SP standards.
</commit_message>
<xml_diff>
--- a/PMMPresentation/Modules/Templates/PMM Template.pptx
+++ b/PMMPresentation/Modules/Templates/PMM Template.pptx
@@ -5,10 +5,10 @@
     <p:sldMasterId id="2147483648" r:id="rId4"/>
   </p:sldMasterIdLst>
   <p:notesMasterIdLst>
-    <p:notesMasterId r:id="rId14"/>
+    <p:notesMasterId r:id="rId16"/>
   </p:notesMasterIdLst>
   <p:handoutMasterIdLst>
-    <p:handoutMasterId r:id="rId15"/>
+    <p:handoutMasterId r:id="rId17"/>
   </p:handoutMasterIdLst>
   <p:sldIdLst>
     <p:sldId id="628" r:id="rId5"/>
@@ -16,10 +16,12 @@
     <p:sldId id="630" r:id="rId7"/>
     <p:sldId id="634" r:id="rId8"/>
     <p:sldId id="635" r:id="rId9"/>
-    <p:sldId id="632" r:id="rId10"/>
-    <p:sldId id="636" r:id="rId11"/>
-    <p:sldId id="637" r:id="rId12"/>
-    <p:sldId id="633" r:id="rId13"/>
+    <p:sldId id="638" r:id="rId10"/>
+    <p:sldId id="632" r:id="rId11"/>
+    <p:sldId id="636" r:id="rId12"/>
+    <p:sldId id="637" r:id="rId13"/>
+    <p:sldId id="639" r:id="rId14"/>
+    <p:sldId id="633" r:id="rId15"/>
   </p:sldIdLst>
   <p:sldSz cx="9144000" cy="6858000" type="screen4x3"/>
   <p:notesSz cx="7010400" cy="9296400"/>
@@ -153,42 +155,29 @@
 
 <file path=ppt/charts/chart1.xml><?xml version="1.0" encoding="utf-8"?>
 <c:chartSpace xmlns:c="http://schemas.openxmlformats.org/drawingml/2006/chart" xmlns:a="http://schemas.openxmlformats.org/drawingml/2006/main" xmlns:r="http://schemas.openxmlformats.org/officeDocument/2006/relationships">
-  <c:date1904 val="0"/>
   <c:lang val="en-US"/>
-  <c:roundedCorners val="0"/>
-  <mc:AlternateContent xmlns:mc="http://schemas.openxmlformats.org/markup-compatibility/2006">
-    <mc:Choice xmlns:c14="http://schemas.microsoft.com/office/drawing/2007/8/2/chart" Requires="c14">
-      <c14:style val="102"/>
-    </mc:Choice>
-    <mc:Fallback>
-      <c:style val="2"/>
-    </mc:Fallback>
-  </mc:AlternateContent>
   <c:chart>
-    <c:autoTitleDeleted val="0"/>
     <c:plotArea>
       <c:layout>
         <c:manualLayout>
           <c:layoutTarget val="inner"/>
           <c:xMode val="edge"/>
           <c:yMode val="edge"/>
-          <c:x val="0.10803623505395173"/>
+          <c:x val="0.10803623505395175"/>
           <c:y val="6.5983968494660691E-2"/>
           <c:w val="0.86898536988432007"/>
-          <c:h val="0.90314967223550113"/>
+          <c:h val="0.90314967223550136"/>
         </c:manualLayout>
       </c:layout>
       <c:barChart>
         <c:barDir val="bar"/>
         <c:grouping val="stacked"/>
-        <c:varyColors val="0"/>
         <c:ser>
           <c:idx val="0"/>
           <c:order val="0"/>
           <c:spPr>
             <a:noFill/>
           </c:spPr>
-          <c:invertIfNegative val="0"/>
           <c:cat>
             <c:strRef>
               <c:f>Sheet1!$A$2</c:f>
@@ -241,11 +230,8 @@
               <a:lin ang="5400000" scaled="0"/>
             </a:gradFill>
           </c:spPr>
-          <c:invertIfNegative val="0"/>
           <c:dPt>
             <c:idx val="0"/>
-            <c:invertIfNegative val="0"/>
-            <c:bubble3D val="0"/>
           </c:dPt>
           <c:dLbls>
             <c:dLbl>
@@ -253,16 +239,11 @@
               <c:layout>
                 <c:manualLayout>
                   <c:x val="0.17404466802760771"/>
-                  <c:y val="-2.8055907659872673E-3"/>
+                  <c:y val="-2.8055907659872681E-3"/>
                 </c:manualLayout>
               </c:layout>
               <c:dLblPos val="ctr"/>
-              <c:showLegendKey val="0"/>
-              <c:showVal val="0"/>
               <c:showCatName val="1"/>
-              <c:showSerName val="0"/>
-              <c:showPercent val="0"/>
-              <c:showBubbleSize val="0"/>
             </c:dLbl>
             <c:txPr>
               <a:bodyPr/>
@@ -275,13 +256,7 @@
               </a:p>
             </c:txPr>
             <c:dLblPos val="inEnd"/>
-            <c:showLegendKey val="0"/>
-            <c:showVal val="0"/>
             <c:showCatName val="1"/>
-            <c:showSerName val="0"/>
-            <c:showPercent val="0"/>
-            <c:showBubbleSize val="0"/>
-            <c:showLeaderLines val="0"/>
           </c:dLbls>
           <c:cat>
             <c:strRef>
@@ -307,84 +282,54 @@
             </c:numRef>
           </c:val>
         </c:ser>
-        <c:dLbls>
-          <c:showLegendKey val="0"/>
-          <c:showVal val="0"/>
-          <c:showCatName val="0"/>
-          <c:showSerName val="0"/>
-          <c:showPercent val="0"/>
-          <c:showBubbleSize val="0"/>
-        </c:dLbls>
-        <c:gapWidth val="150"/>
+        <c:dLbls/>
         <c:overlap val="100"/>
-        <c:axId val="31452672"/>
-        <c:axId val="35939456"/>
+        <c:axId val="51149824"/>
+        <c:axId val="53056256"/>
       </c:barChart>
       <c:catAx>
-        <c:axId val="31452672"/>
+        <c:axId val="51149824"/>
         <c:scaling>
           <c:orientation val="maxMin"/>
         </c:scaling>
-        <c:delete val="0"/>
         <c:axPos val="l"/>
-        <c:majorTickMark val="out"/>
-        <c:minorTickMark val="none"/>
         <c:tickLblPos val="nextTo"/>
-        <c:crossAx val="35939456"/>
+        <c:crossAx val="53056256"/>
         <c:crosses val="autoZero"/>
         <c:auto val="1"/>
         <c:lblAlgn val="ctr"/>
         <c:lblOffset val="100"/>
-        <c:noMultiLvlLbl val="0"/>
       </c:catAx>
       <c:valAx>
-        <c:axId val="35939456"/>
+        <c:axId val="53056256"/>
         <c:scaling>
           <c:orientation val="minMax"/>
         </c:scaling>
-        <c:delete val="0"/>
         <c:axPos val="t"/>
         <c:majorGridlines/>
         <c:numFmt formatCode="m/d;@" sourceLinked="0"/>
-        <c:majorTickMark val="out"/>
-        <c:minorTickMark val="none"/>
         <c:tickLblPos val="nextTo"/>
-        <c:crossAx val="31452672"/>
+        <c:crossAx val="51149824"/>
         <c:crosses val="autoZero"/>
         <c:crossBetween val="between"/>
       </c:valAx>
     </c:plotArea>
     <c:plotVisOnly val="1"/>
     <c:dispBlanksAs val="gap"/>
-    <c:showDLblsOverMax val="0"/>
   </c:chart>
-  <c:externalData r:id="rId1">
-    <c:autoUpdate val="0"/>
-  </c:externalData>
+  <c:externalData r:id="rId1"/>
 </c:chartSpace>
 </file>
 
 <file path=ppt/charts/chart2.xml><?xml version="1.0" encoding="utf-8"?>
 <c:chartSpace xmlns:c="http://schemas.openxmlformats.org/drawingml/2006/chart" xmlns:a="http://schemas.openxmlformats.org/drawingml/2006/main" xmlns:r="http://schemas.openxmlformats.org/officeDocument/2006/relationships">
-  <c:date1904 val="0"/>
   <c:lang val="en-US"/>
-  <c:roundedCorners val="0"/>
-  <mc:AlternateContent xmlns:mc="http://schemas.openxmlformats.org/markup-compatibility/2006">
-    <mc:Choice xmlns:c14="http://schemas.microsoft.com/office/drawing/2007/8/2/chart" Requires="c14">
-      <c14:style val="102"/>
-    </mc:Choice>
-    <mc:Fallback>
-      <c:style val="2"/>
-    </mc:Fallback>
-  </mc:AlternateContent>
   <c:chart>
-    <c:autoTitleDeleted val="0"/>
     <c:plotArea>
       <c:layout/>
       <c:barChart>
         <c:barDir val="col"/>
         <c:grouping val="clustered"/>
-        <c:varyColors val="0"/>
         <c:ser>
           <c:idx val="0"/>
           <c:order val="0"/>
@@ -404,7 +349,6 @@
               <a:srgbClr val="59A583"/>
             </a:solidFill>
           </c:spPr>
-          <c:invertIfNegative val="0"/>
           <c:cat>
             <c:strRef>
               <c:f>Sheet1!$A$2:$A$6</c:f>
@@ -448,7 +392,6 @@
               <a:srgbClr val="CD6B57"/>
             </a:solidFill>
           </c:spPr>
-          <c:invertIfNegative val="0"/>
           <c:cat>
             <c:strRef>
               <c:f>Sheet1!$A$2:$A$6</c:f>
@@ -492,7 +435,6 @@
               <a:srgbClr val="E0E0E0"/>
             </a:solidFill>
           </c:spPr>
-          <c:invertIfNegative val="0"/>
           <c:cat>
             <c:strRef>
               <c:f>Sheet1!$A$2:$A$6</c:f>
@@ -538,7 +480,6 @@
               </a:schemeClr>
             </a:solidFill>
           </c:spPr>
-          <c:invertIfNegative val="0"/>
           <c:cat>
             <c:strRef>
               <c:f>Sheet1!$A$2:$A$6</c:f>
@@ -563,21 +504,12 @@
             </c:numRef>
           </c:val>
         </c:ser>
-        <c:dLbls>
-          <c:showLegendKey val="0"/>
-          <c:showVal val="0"/>
-          <c:showCatName val="0"/>
-          <c:showSerName val="0"/>
-          <c:showPercent val="0"/>
-          <c:showBubbleSize val="0"/>
-        </c:dLbls>
-        <c:gapWidth val="150"/>
-        <c:axId val="133042688"/>
-        <c:axId val="132973696"/>
+        <c:dLbls/>
+        <c:axId val="55298688"/>
+        <c:axId val="55325056"/>
       </c:barChart>
       <c:lineChart>
         <c:grouping val="standard"/>
-        <c:varyColors val="0"/>
         <c:ser>
           <c:idx val="5"/>
           <c:order val="4"/>
@@ -646,7 +578,6 @@
               </c:numCache>
             </c:numRef>
           </c:val>
-          <c:smooth val="0"/>
         </c:ser>
         <c:ser>
           <c:idx val="4"/>
@@ -707,52 +638,36 @@
               </c:numCache>
             </c:numRef>
           </c:val>
-          <c:smooth val="0"/>
         </c:ser>
-        <c:dLbls>
-          <c:showLegendKey val="0"/>
-          <c:showVal val="0"/>
-          <c:showCatName val="0"/>
-          <c:showSerName val="0"/>
-          <c:showPercent val="0"/>
-          <c:showBubbleSize val="0"/>
-        </c:dLbls>
+        <c:dLbls/>
         <c:marker val="1"/>
-        <c:smooth val="0"/>
-        <c:axId val="133042688"/>
-        <c:axId val="132973696"/>
+        <c:axId val="55298688"/>
+        <c:axId val="55325056"/>
       </c:lineChart>
       <c:catAx>
-        <c:axId val="133042688"/>
+        <c:axId val="55298688"/>
         <c:scaling>
           <c:orientation val="minMax"/>
         </c:scaling>
-        <c:delete val="0"/>
         <c:axPos val="b"/>
         <c:numFmt formatCode="General" sourceLinked="1"/>
-        <c:majorTickMark val="out"/>
-        <c:minorTickMark val="none"/>
         <c:tickLblPos val="nextTo"/>
-        <c:crossAx val="132973696"/>
+        <c:crossAx val="55325056"/>
         <c:crosses val="autoZero"/>
         <c:auto val="1"/>
         <c:lblAlgn val="ctr"/>
         <c:lblOffset val="100"/>
-        <c:noMultiLvlLbl val="0"/>
       </c:catAx>
       <c:valAx>
-        <c:axId val="132973696"/>
+        <c:axId val="55325056"/>
         <c:scaling>
           <c:orientation val="minMax"/>
         </c:scaling>
-        <c:delete val="0"/>
         <c:axPos val="l"/>
         <c:majorGridlines/>
         <c:numFmt formatCode="General" sourceLinked="1"/>
-        <c:majorTickMark val="out"/>
-        <c:minorTickMark val="none"/>
         <c:tickLblPos val="nextTo"/>
-        <c:crossAx val="133042688"/>
+        <c:crossAx val="55298688"/>
         <c:crosses val="autoZero"/>
         <c:crossBetween val="between"/>
       </c:valAx>
@@ -763,17 +678,15 @@
         <c:manualLayout>
           <c:xMode val="edge"/>
           <c:yMode val="edge"/>
-          <c:x val="0.65963141460765751"/>
-          <c:y val="0.23904122278832804"/>
-          <c:w val="0.33174789573717101"/>
-          <c:h val="0.75476069167824655"/>
+          <c:x val="0.65963141460765773"/>
+          <c:y val="0.23904122278832807"/>
+          <c:w val="0.33174789573717106"/>
+          <c:h val="0.75476069167824666"/>
         </c:manualLayout>
       </c:layout>
-      <c:overlay val="0"/>
     </c:legend>
     <c:plotVisOnly val="1"/>
     <c:dispBlanksAs val="gap"/>
-    <c:showDLblsOverMax val="0"/>
   </c:chart>
   <c:txPr>
     <a:bodyPr/>
@@ -785,33 +698,19 @@
       <a:endParaRPr lang="en-US"/>
     </a:p>
   </c:txPr>
-  <c:externalData r:id="rId1">
-    <c:autoUpdate val="0"/>
-  </c:externalData>
+  <c:externalData r:id="rId1"/>
 </c:chartSpace>
 </file>
 
 <file path=ppt/charts/chart3.xml><?xml version="1.0" encoding="utf-8"?>
 <c:chartSpace xmlns:c="http://schemas.openxmlformats.org/drawingml/2006/chart" xmlns:a="http://schemas.openxmlformats.org/drawingml/2006/main" xmlns:r="http://schemas.openxmlformats.org/officeDocument/2006/relationships">
-  <c:date1904 val="0"/>
   <c:lang val="en-US"/>
-  <c:roundedCorners val="0"/>
-  <mc:AlternateContent xmlns:mc="http://schemas.openxmlformats.org/markup-compatibility/2006">
-    <mc:Choice xmlns:c14="http://schemas.microsoft.com/office/drawing/2007/8/2/chart" Requires="c14">
-      <c14:style val="102"/>
-    </mc:Choice>
-    <mc:Fallback>
-      <c:style val="2"/>
-    </mc:Fallback>
-  </mc:AlternateContent>
   <c:chart>
-    <c:autoTitleDeleted val="0"/>
     <c:plotArea>
       <c:layout/>
       <c:barChart>
         <c:barDir val="col"/>
         <c:grouping val="clustered"/>
-        <c:varyColors val="0"/>
         <c:ser>
           <c:idx val="0"/>
           <c:order val="0"/>
@@ -831,7 +730,6 @@
               <a:srgbClr val="59A583"/>
             </a:solidFill>
           </c:spPr>
-          <c:invertIfNegative val="0"/>
           <c:cat>
             <c:strRef>
               <c:f>Sheet1!$A$2:$A$6</c:f>
@@ -875,7 +773,6 @@
               <a:srgbClr val="CD6B57"/>
             </a:solidFill>
           </c:spPr>
-          <c:invertIfNegative val="0"/>
           <c:cat>
             <c:strRef>
               <c:f>Sheet1!$A$2:$A$6</c:f>
@@ -919,7 +816,6 @@
               <a:srgbClr val="E0E0E0"/>
             </a:solidFill>
           </c:spPr>
-          <c:invertIfNegative val="0"/>
           <c:cat>
             <c:strRef>
               <c:f>Sheet1!$A$2:$A$6</c:f>
@@ -965,7 +861,6 @@
               </a:schemeClr>
             </a:solidFill>
           </c:spPr>
-          <c:invertIfNegative val="0"/>
           <c:cat>
             <c:strRef>
               <c:f>Sheet1!$A$2:$A$6</c:f>
@@ -990,21 +885,12 @@
             </c:numRef>
           </c:val>
         </c:ser>
-        <c:dLbls>
-          <c:showLegendKey val="0"/>
-          <c:showVal val="0"/>
-          <c:showCatName val="0"/>
-          <c:showSerName val="0"/>
-          <c:showPercent val="0"/>
-          <c:showBubbleSize val="0"/>
-        </c:dLbls>
-        <c:gapWidth val="150"/>
-        <c:axId val="131821056"/>
-        <c:axId val="134754816"/>
+        <c:dLbls/>
+        <c:axId val="64390656"/>
+        <c:axId val="64392192"/>
       </c:barChart>
       <c:lineChart>
         <c:grouping val="standard"/>
-        <c:varyColors val="0"/>
         <c:ser>
           <c:idx val="5"/>
           <c:order val="4"/>
@@ -1073,7 +959,6 @@
               </c:numCache>
             </c:numRef>
           </c:val>
-          <c:smooth val="0"/>
         </c:ser>
         <c:ser>
           <c:idx val="4"/>
@@ -1134,52 +1019,36 @@
               </c:numCache>
             </c:numRef>
           </c:val>
-          <c:smooth val="0"/>
         </c:ser>
-        <c:dLbls>
-          <c:showLegendKey val="0"/>
-          <c:showVal val="0"/>
-          <c:showCatName val="0"/>
-          <c:showSerName val="0"/>
-          <c:showPercent val="0"/>
-          <c:showBubbleSize val="0"/>
-        </c:dLbls>
+        <c:dLbls/>
         <c:marker val="1"/>
-        <c:smooth val="0"/>
-        <c:axId val="131821056"/>
-        <c:axId val="134754816"/>
+        <c:axId val="64390656"/>
+        <c:axId val="64392192"/>
       </c:lineChart>
       <c:catAx>
-        <c:axId val="131821056"/>
+        <c:axId val="64390656"/>
         <c:scaling>
           <c:orientation val="minMax"/>
         </c:scaling>
-        <c:delete val="0"/>
         <c:axPos val="b"/>
         <c:numFmt formatCode="General" sourceLinked="1"/>
-        <c:majorTickMark val="out"/>
-        <c:minorTickMark val="none"/>
         <c:tickLblPos val="nextTo"/>
-        <c:crossAx val="134754816"/>
+        <c:crossAx val="64392192"/>
         <c:crosses val="autoZero"/>
         <c:auto val="1"/>
         <c:lblAlgn val="ctr"/>
         <c:lblOffset val="100"/>
-        <c:noMultiLvlLbl val="0"/>
       </c:catAx>
       <c:valAx>
-        <c:axId val="134754816"/>
+        <c:axId val="64392192"/>
         <c:scaling>
           <c:orientation val="minMax"/>
         </c:scaling>
-        <c:delete val="0"/>
         <c:axPos val="l"/>
         <c:majorGridlines/>
         <c:numFmt formatCode="General" sourceLinked="1"/>
-        <c:majorTickMark val="out"/>
-        <c:minorTickMark val="none"/>
         <c:tickLblPos val="nextTo"/>
-        <c:crossAx val="131821056"/>
+        <c:crossAx val="64390656"/>
         <c:crosses val="autoZero"/>
         <c:crossBetween val="between"/>
       </c:valAx>
@@ -1190,17 +1059,15 @@
         <c:manualLayout>
           <c:xMode val="edge"/>
           <c:yMode val="edge"/>
-          <c:x val="0.65963141460765751"/>
-          <c:y val="0.23904122278832804"/>
-          <c:w val="0.33174789573717101"/>
-          <c:h val="0.75476069167824655"/>
+          <c:x val="0.65963141460765773"/>
+          <c:y val="0.23904122278832807"/>
+          <c:w val="0.33174789573717106"/>
+          <c:h val="0.75476069167824666"/>
         </c:manualLayout>
       </c:layout>
-      <c:overlay val="0"/>
     </c:legend>
     <c:plotVisOnly val="1"/>
     <c:dispBlanksAs val="gap"/>
-    <c:showDLblsOverMax val="0"/>
   </c:chart>
   <c:txPr>
     <a:bodyPr/>
@@ -1212,9 +1079,331 @@
       <a:endParaRPr lang="en-US"/>
     </a:p>
   </c:txPr>
-  <c:externalData r:id="rId1">
-    <c:autoUpdate val="0"/>
-  </c:externalData>
+  <c:externalData r:id="rId1"/>
+</c:chartSpace>
+</file>
+
+<file path=ppt/charts/chart4.xml><?xml version="1.0" encoding="utf-8"?>
+<c:chartSpace xmlns:c="http://schemas.openxmlformats.org/drawingml/2006/chart" xmlns:a="http://schemas.openxmlformats.org/drawingml/2006/main" xmlns:r="http://schemas.openxmlformats.org/officeDocument/2006/relationships">
+  <c:lang val="en-US"/>
+  <c:chart>
+    <c:title>
+      <c:layout/>
+    </c:title>
+    <c:plotArea>
+      <c:layout/>
+      <c:lineChart>
+        <c:grouping val="standard"/>
+        <c:ser>
+          <c:idx val="0"/>
+          <c:order val="0"/>
+          <c:tx>
+            <c:strRef>
+              <c:f>Sheet1!$B$1</c:f>
+              <c:strCache>
+                <c:ptCount val="1"/>
+                <c:pt idx="0">
+                  <c:v>BEI Start</c:v>
+                </c:pt>
+              </c:strCache>
+            </c:strRef>
+          </c:tx>
+          <c:spPr>
+            <a:ln>
+              <a:solidFill>
+                <a:schemeClr val="tx1"/>
+              </a:solidFill>
+            </a:ln>
+          </c:spPr>
+          <c:marker>
+            <c:symbol val="diamond"/>
+            <c:size val="5"/>
+            <c:spPr>
+              <a:solidFill>
+                <a:schemeClr val="tx1"/>
+              </a:solidFill>
+              <a:ln>
+                <a:solidFill>
+                  <a:prstClr val="black"/>
+                </a:solidFill>
+              </a:ln>
+            </c:spPr>
+          </c:marker>
+          <c:cat>
+            <c:strRef>
+              <c:f>Sheet1!$A$2:$A$5</c:f>
+              <c:strCache>
+                <c:ptCount val="1"/>
+                <c:pt idx="0">
+                  <c:v>Category 1</c:v>
+                </c:pt>
+              </c:strCache>
+            </c:strRef>
+          </c:cat>
+          <c:val>
+            <c:numRef>
+              <c:f>Sheet1!$B$2:$B$5</c:f>
+              <c:numCache>
+                <c:formatCode>General</c:formatCode>
+                <c:ptCount val="4"/>
+                <c:pt idx="0">
+                  <c:v>4.3</c:v>
+                </c:pt>
+              </c:numCache>
+            </c:numRef>
+          </c:val>
+        </c:ser>
+        <c:ser>
+          <c:idx val="1"/>
+          <c:order val="1"/>
+          <c:tx>
+            <c:strRef>
+              <c:f>Sheet1!$C$1</c:f>
+              <c:strCache>
+                <c:ptCount val="1"/>
+                <c:pt idx="0">
+                  <c:v>BEI Finish</c:v>
+                </c:pt>
+              </c:strCache>
+            </c:strRef>
+          </c:tx>
+          <c:spPr>
+            <a:ln>
+              <a:solidFill>
+                <a:srgbClr val="FF3399"/>
+              </a:solidFill>
+            </a:ln>
+          </c:spPr>
+          <c:marker>
+            <c:symbol val="square"/>
+            <c:size val="5"/>
+            <c:spPr>
+              <a:solidFill>
+                <a:srgbClr val="FF3399"/>
+              </a:solidFill>
+              <a:ln>
+                <a:solidFill>
+                  <a:srgbClr val="FF3399"/>
+                </a:solidFill>
+              </a:ln>
+            </c:spPr>
+          </c:marker>
+          <c:cat>
+            <c:strRef>
+              <c:f>Sheet1!$A$2:$A$5</c:f>
+              <c:strCache>
+                <c:ptCount val="1"/>
+                <c:pt idx="0">
+                  <c:v>Category 1</c:v>
+                </c:pt>
+              </c:strCache>
+            </c:strRef>
+          </c:cat>
+          <c:val>
+            <c:numRef>
+              <c:f>Sheet1!$C$2:$C$5</c:f>
+              <c:numCache>
+                <c:formatCode>General</c:formatCode>
+                <c:ptCount val="4"/>
+                <c:pt idx="0">
+                  <c:v>2.4</c:v>
+                </c:pt>
+              </c:numCache>
+            </c:numRef>
+          </c:val>
+        </c:ser>
+        <c:ser>
+          <c:idx val="2"/>
+          <c:order val="2"/>
+          <c:tx>
+            <c:strRef>
+              <c:f>Sheet1!$D$1</c:f>
+              <c:strCache>
+                <c:ptCount val="1"/>
+                <c:pt idx="0">
+                  <c:v>BEI Forecast Start</c:v>
+                </c:pt>
+              </c:strCache>
+            </c:strRef>
+          </c:tx>
+          <c:spPr>
+            <a:ln>
+              <a:solidFill>
+                <a:schemeClr val="accent6">
+                  <a:lumMod val="75000"/>
+                </a:schemeClr>
+              </a:solidFill>
+              <a:prstDash val="dash"/>
+            </a:ln>
+          </c:spPr>
+          <c:marker>
+            <c:symbol val="triangle"/>
+            <c:size val="5"/>
+            <c:spPr>
+              <a:solidFill>
+                <a:schemeClr val="accent6">
+                  <a:lumMod val="75000"/>
+                </a:schemeClr>
+              </a:solidFill>
+              <a:ln>
+                <a:solidFill>
+                  <a:srgbClr val="F79646">
+                    <a:lumMod val="75000"/>
+                  </a:srgbClr>
+                </a:solidFill>
+                <a:prstDash val="dash"/>
+              </a:ln>
+            </c:spPr>
+          </c:marker>
+          <c:cat>
+            <c:strRef>
+              <c:f>Sheet1!$A$2:$A$5</c:f>
+              <c:strCache>
+                <c:ptCount val="1"/>
+                <c:pt idx="0">
+                  <c:v>Category 1</c:v>
+                </c:pt>
+              </c:strCache>
+            </c:strRef>
+          </c:cat>
+          <c:val>
+            <c:numRef>
+              <c:f>Sheet1!$D$2:$D$5</c:f>
+              <c:numCache>
+                <c:formatCode>General</c:formatCode>
+                <c:ptCount val="4"/>
+                <c:pt idx="0">
+                  <c:v>2</c:v>
+                </c:pt>
+              </c:numCache>
+            </c:numRef>
+          </c:val>
+        </c:ser>
+        <c:ser>
+          <c:idx val="3"/>
+          <c:order val="3"/>
+          <c:tx>
+            <c:strRef>
+              <c:f>Sheet1!$E$1</c:f>
+              <c:strCache>
+                <c:ptCount val="1"/>
+                <c:pt idx="0">
+                  <c:v>BEI Forecast Finish</c:v>
+                </c:pt>
+              </c:strCache>
+            </c:strRef>
+          </c:tx>
+          <c:spPr>
+            <a:ln>
+              <a:solidFill>
+                <a:schemeClr val="accent5">
+                  <a:lumMod val="60000"/>
+                  <a:lumOff val="40000"/>
+                </a:schemeClr>
+              </a:solidFill>
+              <a:prstDash val="sysDash"/>
+            </a:ln>
+          </c:spPr>
+          <c:marker>
+            <c:symbol val="x"/>
+            <c:size val="5"/>
+            <c:spPr>
+              <a:solidFill>
+                <a:schemeClr val="accent5">
+                  <a:lumMod val="60000"/>
+                  <a:lumOff val="40000"/>
+                </a:schemeClr>
+              </a:solidFill>
+              <a:ln>
+                <a:solidFill>
+                  <a:srgbClr val="4BACC6">
+                    <a:lumMod val="60000"/>
+                    <a:lumOff val="40000"/>
+                  </a:srgbClr>
+                </a:solidFill>
+              </a:ln>
+            </c:spPr>
+          </c:marker>
+          <c:cat>
+            <c:strRef>
+              <c:f>Sheet1!$A$2:$A$5</c:f>
+              <c:strCache>
+                <c:ptCount val="1"/>
+                <c:pt idx="0">
+                  <c:v>Category 1</c:v>
+                </c:pt>
+              </c:strCache>
+            </c:strRef>
+          </c:cat>
+          <c:val>
+            <c:numRef>
+              <c:f>Sheet1!$E$2:$E$5</c:f>
+              <c:numCache>
+                <c:formatCode>General</c:formatCode>
+                <c:ptCount val="4"/>
+                <c:pt idx="0">
+                  <c:v>1</c:v>
+                </c:pt>
+              </c:numCache>
+            </c:numRef>
+          </c:val>
+        </c:ser>
+        <c:dLbls/>
+        <c:marker val="1"/>
+        <c:axId val="73914240"/>
+        <c:axId val="74166272"/>
+      </c:lineChart>
+      <c:catAx>
+        <c:axId val="73914240"/>
+        <c:scaling>
+          <c:orientation val="minMax"/>
+        </c:scaling>
+        <c:axPos val="b"/>
+        <c:majorTickMark val="none"/>
+        <c:tickLblPos val="nextTo"/>
+        <c:crossAx val="74166272"/>
+        <c:crosses val="autoZero"/>
+        <c:auto val="1"/>
+        <c:lblAlgn val="ctr"/>
+        <c:lblOffset val="100"/>
+      </c:catAx>
+      <c:valAx>
+        <c:axId val="74166272"/>
+        <c:scaling>
+          <c:orientation val="minMax"/>
+        </c:scaling>
+        <c:axPos val="l"/>
+        <c:majorGridlines/>
+        <c:title>
+          <c:layout/>
+        </c:title>
+        <c:numFmt formatCode="General" sourceLinked="1"/>
+        <c:majorTickMark val="none"/>
+        <c:tickLblPos val="nextTo"/>
+        <c:crossAx val="73914240"/>
+        <c:crosses val="autoZero"/>
+        <c:crossBetween val="between"/>
+      </c:valAx>
+      <c:dTable>
+        <c:showHorzBorder val="1"/>
+        <c:showVertBorder val="1"/>
+        <c:showOutline val="1"/>
+        <c:showKeys val="1"/>
+      </c:dTable>
+    </c:plotArea>
+    <c:plotVisOnly val="1"/>
+  </c:chart>
+  <c:txPr>
+    <a:bodyPr/>
+    <a:lstStyle/>
+    <a:p>
+      <a:pPr>
+        <a:defRPr sz="1800"/>
+      </a:pPr>
+      <a:endParaRPr lang="en-US"/>
+    </a:p>
+  </c:txPr>
+  <c:externalData r:id="rId1"/>
 </c:chartSpace>
 </file>
 
@@ -1423,7 +1612,7 @@
     </p:spTree>
     <p:extLst>
       <p:ext uri="{BB962C8B-B14F-4D97-AF65-F5344CB8AC3E}">
-        <p14:creationId xmlns:p14="http://schemas.microsoft.com/office/powerpoint/2010/main" val="3029235075"/>
+        <p14:creationId xmlns:p14="http://schemas.microsoft.com/office/powerpoint/2010/main" xmlns="" val="3029235075"/>
       </p:ext>
     </p:extLst>
   </p:cSld>
@@ -1746,7 +1935,7 @@
     </p:spTree>
     <p:extLst>
       <p:ext uri="{BB962C8B-B14F-4D97-AF65-F5344CB8AC3E}">
-        <p14:creationId xmlns:p14="http://schemas.microsoft.com/office/powerpoint/2010/main" val="1174054565"/>
+        <p14:creationId xmlns:p14="http://schemas.microsoft.com/office/powerpoint/2010/main" xmlns="" val="1174054565"/>
       </p:ext>
     </p:extLst>
   </p:cSld>
@@ -3343,10 +3532,10 @@
           <p:nvPr/>
         </p:nvPicPr>
         <p:blipFill>
-          <a:blip r:embed="rId2">
+          <a:blip r:embed="rId2" cstate="print">
             <a:extLst>
               <a:ext uri="{28A0092B-C50C-407E-A947-70E740481C1C}">
-                <a14:useLocalDpi xmlns:a14="http://schemas.microsoft.com/office/drawing/2010/main" val="0"/>
+                <a14:useLocalDpi xmlns:a14="http://schemas.microsoft.com/office/drawing/2010/main" xmlns="" val="0"/>
               </a:ext>
             </a:extLst>
           </a:blip>
@@ -3369,14 +3558,14 @@
           </a:ln>
           <a:extLst>
             <a:ext uri="{909E8E84-426E-40DD-AFC4-6F175D3DCCD1}">
-              <a14:hiddenFill xmlns:a14="http://schemas.microsoft.com/office/drawing/2010/main">
+              <a14:hiddenFill xmlns:a14="http://schemas.microsoft.com/office/drawing/2010/main" xmlns="">
                 <a:solidFill>
                   <a:schemeClr val="accent1"/>
                 </a:solidFill>
               </a14:hiddenFill>
             </a:ext>
             <a:ext uri="{91240B29-F687-4F45-9708-019B960494DF}">
-              <a14:hiddenLine xmlns:a14="http://schemas.microsoft.com/office/drawing/2010/main" w="9525">
+              <a14:hiddenLine xmlns:a14="http://schemas.microsoft.com/office/drawing/2010/main" xmlns="" w="9525">
                 <a:solidFill>
                   <a:schemeClr val="tx1"/>
                 </a:solidFill>
@@ -3397,10 +3586,10 @@
           <p:nvPr/>
         </p:nvPicPr>
         <p:blipFill>
-          <a:blip r:embed="rId3">
+          <a:blip r:embed="rId3" cstate="print">
             <a:extLst>
               <a:ext uri="{28A0092B-C50C-407E-A947-70E740481C1C}">
-                <a14:useLocalDpi xmlns:a14="http://schemas.microsoft.com/office/drawing/2010/main" val="0"/>
+                <a14:useLocalDpi xmlns:a14="http://schemas.microsoft.com/office/drawing/2010/main" xmlns="" val="0"/>
               </a:ext>
             </a:extLst>
           </a:blip>
@@ -3423,14 +3612,14 @@
           </a:ln>
           <a:extLst>
             <a:ext uri="{909E8E84-426E-40DD-AFC4-6F175D3DCCD1}">
-              <a14:hiddenFill xmlns:a14="http://schemas.microsoft.com/office/drawing/2010/main">
+              <a14:hiddenFill xmlns:a14="http://schemas.microsoft.com/office/drawing/2010/main" xmlns="">
                 <a:solidFill>
                   <a:schemeClr val="accent1"/>
                 </a:solidFill>
               </a14:hiddenFill>
             </a:ext>
             <a:ext uri="{91240B29-F687-4F45-9708-019B960494DF}">
-              <a14:hiddenLine xmlns:a14="http://schemas.microsoft.com/office/drawing/2010/main" w="9525">
+              <a14:hiddenLine xmlns:a14="http://schemas.microsoft.com/office/drawing/2010/main" xmlns="" w="9525">
                 <a:solidFill>
                   <a:schemeClr val="tx1"/>
                 </a:solidFill>
@@ -3454,6 +3643,166 @@
       </p:par>
     </p:tnLst>
   </p:timing>
+</p:sld>
+</file>
+
+<file path=ppt/slides/slide10.xml><?xml version="1.0" encoding="utf-8"?>
+<p:sld xmlns:a="http://schemas.openxmlformats.org/drawingml/2006/main" xmlns:r="http://schemas.openxmlformats.org/officeDocument/2006/relationships" xmlns:p="http://schemas.openxmlformats.org/presentationml/2006/main">
+  <p:cSld>
+    <p:spTree>
+      <p:nvGrpSpPr>
+        <p:cNvPr id="1" name=""/>
+        <p:cNvGrpSpPr/>
+        <p:nvPr/>
+      </p:nvGrpSpPr>
+      <p:grpSpPr>
+        <a:xfrm>
+          <a:off x="0" y="0"/>
+          <a:ext cx="0" cy="0"/>
+          <a:chOff x="0" y="0"/>
+          <a:chExt cx="0" cy="0"/>
+        </a:xfrm>
+      </p:grpSpPr>
+      <p:sp>
+        <p:nvSpPr>
+          <p:cNvPr id="2" name="Title 1"/>
+          <p:cNvSpPr>
+            <a:spLocks noGrp="1"/>
+          </p:cNvSpPr>
+          <p:nvPr>
+            <p:ph type="title"/>
+          </p:nvPr>
+        </p:nvSpPr>
+        <p:spPr/>
+        <p:txBody>
+          <a:bodyPr/>
+          <a:lstStyle/>
+          <a:p>
+            <a:r>
+              <a:rPr lang="en-US" dirty="0" smtClean="0"/>
+              <a:t>Schedule Performance – Baseline Execution Index (BEI)</a:t>
+            </a:r>
+            <a:endParaRPr lang="en-US" dirty="0"/>
+          </a:p>
+        </p:txBody>
+      </p:sp>
+      <p:graphicFrame>
+        <p:nvGraphicFramePr>
+          <p:cNvPr id="5" name="Content Placeholder 4"/>
+          <p:cNvGraphicFramePr>
+            <a:graphicFrameLocks noGrp="1"/>
+          </p:cNvGraphicFramePr>
+          <p:nvPr>
+            <p:ph idx="1"/>
+          </p:nvPr>
+        </p:nvGraphicFramePr>
+        <p:xfrm>
+          <a:off x="152400" y="1295400"/>
+          <a:ext cx="8839200" cy="5181600"/>
+        </p:xfrm>
+        <a:graphic>
+          <a:graphicData uri="http://schemas.openxmlformats.org/drawingml/2006/chart">
+            <c:chart xmlns:c="http://schemas.openxmlformats.org/drawingml/2006/chart" xmlns:r="http://schemas.openxmlformats.org/officeDocument/2006/relationships" r:id="rId2"/>
+          </a:graphicData>
+        </a:graphic>
+      </p:graphicFrame>
+    </p:spTree>
+  </p:cSld>
+  <p:clrMapOvr>
+    <a:masterClrMapping/>
+  </p:clrMapOvr>
+</p:sld>
+</file>
+
+<file path=ppt/slides/slide11.xml><?xml version="1.0" encoding="utf-8"?>
+<p:sld xmlns:a="http://schemas.openxmlformats.org/drawingml/2006/main" xmlns:r="http://schemas.openxmlformats.org/officeDocument/2006/relationships" xmlns:p="http://schemas.openxmlformats.org/presentationml/2006/main">
+  <p:cSld>
+    <p:spTree>
+      <p:nvGrpSpPr>
+        <p:cNvPr id="1" name=""/>
+        <p:cNvGrpSpPr/>
+        <p:nvPr/>
+      </p:nvGrpSpPr>
+      <p:grpSpPr>
+        <a:xfrm>
+          <a:off x="0" y="0"/>
+          <a:ext cx="0" cy="0"/>
+          <a:chOff x="0" y="0"/>
+          <a:chExt cx="0" cy="0"/>
+        </a:xfrm>
+      </p:grpSpPr>
+      <p:sp>
+        <p:nvSpPr>
+          <p:cNvPr id="2" name="Title 1"/>
+          <p:cNvSpPr>
+            <a:spLocks noGrp="1"/>
+          </p:cNvSpPr>
+          <p:nvPr>
+            <p:ph type="title"/>
+          </p:nvPr>
+        </p:nvSpPr>
+        <p:spPr/>
+        <p:txBody>
+          <a:bodyPr/>
+          <a:lstStyle/>
+          <a:p>
+            <a:r>
+              <a:rPr lang="en-US" dirty="0"/>
+              <a:t>Summary</a:t>
+            </a:r>
+          </a:p>
+        </p:txBody>
+      </p:sp>
+      <p:sp>
+        <p:nvSpPr>
+          <p:cNvPr id="3" name="Content Placeholder 2"/>
+          <p:cNvSpPr>
+            <a:spLocks noGrp="1"/>
+          </p:cNvSpPr>
+          <p:nvPr>
+            <p:ph idx="1"/>
+          </p:nvPr>
+        </p:nvSpPr>
+        <p:spPr/>
+        <p:txBody>
+          <a:bodyPr/>
+          <a:lstStyle/>
+          <a:p>
+            <a:r>
+              <a:rPr lang="en-US" dirty="0" smtClean="0"/>
+              <a:t>Driving path status</a:t>
+            </a:r>
+          </a:p>
+          <a:p>
+            <a:r>
+              <a:rPr lang="en-US" dirty="0" smtClean="0"/>
+              <a:t>Key Milestone status </a:t>
+            </a:r>
+          </a:p>
+          <a:p>
+            <a:r>
+              <a:rPr lang="en-US" dirty="0" smtClean="0"/>
+              <a:t>Upcoming reviews</a:t>
+            </a:r>
+          </a:p>
+          <a:p>
+            <a:pPr marL="0" indent="0">
+              <a:buNone/>
+            </a:pPr>
+            <a:endParaRPr lang="en-US" dirty="0" smtClean="0"/>
+          </a:p>
+        </p:txBody>
+      </p:sp>
+    </p:spTree>
+    <p:extLst>
+      <p:ext uri="{BB962C8B-B14F-4D97-AF65-F5344CB8AC3E}">
+        <p14:creationId xmlns:p14="http://schemas.microsoft.com/office/powerpoint/2010/main" xmlns="" val="623995057"/>
+      </p:ext>
+    </p:extLst>
+  </p:cSld>
+  <p:clrMapOvr>
+    <a:masterClrMapping/>
+  </p:clrMapOvr>
 </p:sld>
 </file>
 
@@ -3554,7 +3903,7 @@
     </p:spTree>
     <p:extLst>
       <p:ext uri="{BB962C8B-B14F-4D97-AF65-F5344CB8AC3E}">
-        <p14:creationId xmlns:p14="http://schemas.microsoft.com/office/powerpoint/2010/main" val="4106593142"/>
+        <p14:creationId xmlns:p14="http://schemas.microsoft.com/office/powerpoint/2010/main" xmlns="" val="4106593142"/>
       </p:ext>
     </p:extLst>
   </p:cSld>
@@ -3643,7 +3992,7 @@
           <p:nvPr>
             <p:extLst>
               <p:ext uri="{D42A27DB-BD31-4B8C-83A1-F6EECF244321}">
-                <p14:modId xmlns:p14="http://schemas.microsoft.com/office/powerpoint/2010/main" val="3618147038"/>
+                <p14:modId xmlns:p14="http://schemas.microsoft.com/office/powerpoint/2010/main" xmlns="" val="3618147038"/>
               </p:ext>
             </p:extLst>
           </p:nvPr>
@@ -3853,7 +4202,7 @@
     </p:spTree>
     <p:extLst>
       <p:ext uri="{BB962C8B-B14F-4D97-AF65-F5344CB8AC3E}">
-        <p14:creationId xmlns:p14="http://schemas.microsoft.com/office/powerpoint/2010/main" val="325862024"/>
+        <p14:creationId xmlns:p14="http://schemas.microsoft.com/office/powerpoint/2010/main" xmlns="" val="325862024"/>
       </p:ext>
     </p:extLst>
   </p:cSld>
@@ -3955,7 +4304,7 @@
     </p:spTree>
     <p:extLst>
       <p:ext uri="{BB962C8B-B14F-4D97-AF65-F5344CB8AC3E}">
-        <p14:creationId xmlns:p14="http://schemas.microsoft.com/office/powerpoint/2010/main" val="2878378399"/>
+        <p14:creationId xmlns:p14="http://schemas.microsoft.com/office/powerpoint/2010/main" xmlns="" val="2878378399"/>
       </p:ext>
     </p:extLst>
   </p:cSld>
@@ -4026,7 +4375,7 @@
             <p:ph idx="1"/>
             <p:extLst>
               <p:ext uri="{D42A27DB-BD31-4B8C-83A1-F6EECF244321}">
-                <p14:modId xmlns:p14="http://schemas.microsoft.com/office/powerpoint/2010/main" val="2402396504"/>
+                <p14:modId xmlns:p14="http://schemas.microsoft.com/office/powerpoint/2010/main" xmlns="" val="2402396504"/>
               </p:ext>
             </p:extLst>
           </p:nvPr>
@@ -4478,7 +4827,7 @@
     </p:spTree>
     <p:extLst>
       <p:ext uri="{BB962C8B-B14F-4D97-AF65-F5344CB8AC3E}">
-        <p14:creationId xmlns:p14="http://schemas.microsoft.com/office/powerpoint/2010/main" val="3217937833"/>
+        <p14:creationId xmlns:p14="http://schemas.microsoft.com/office/powerpoint/2010/main" xmlns="" val="3217937833"/>
       </p:ext>
     </p:extLst>
   </p:cSld>
@@ -4496,6 +4845,529 @@
 </file>
 
 <file path=ppt/slides/slide6.xml><?xml version="1.0" encoding="utf-8"?>
+<p:sld xmlns:a="http://schemas.openxmlformats.org/drawingml/2006/main" xmlns:r="http://schemas.openxmlformats.org/officeDocument/2006/relationships" xmlns:p="http://schemas.openxmlformats.org/presentationml/2006/main">
+  <p:cSld>
+    <p:spTree>
+      <p:nvGrpSpPr>
+        <p:cNvPr id="1" name=""/>
+        <p:cNvGrpSpPr/>
+        <p:nvPr/>
+      </p:nvGrpSpPr>
+      <p:grpSpPr>
+        <a:xfrm>
+          <a:off x="0" y="0"/>
+          <a:ext cx="0" cy="0"/>
+          <a:chOff x="0" y="0"/>
+          <a:chExt cx="0" cy="0"/>
+        </a:xfrm>
+      </p:grpSpPr>
+      <p:sp>
+        <p:nvSpPr>
+          <p:cNvPr id="2" name="Title 1"/>
+          <p:cNvSpPr>
+            <a:spLocks noGrp="1"/>
+          </p:cNvSpPr>
+          <p:nvPr>
+            <p:ph type="title"/>
+          </p:nvPr>
+        </p:nvSpPr>
+        <p:spPr/>
+        <p:txBody>
+          <a:bodyPr/>
+          <a:lstStyle/>
+          <a:p>
+            <a:r>
+              <a:rPr lang="en-US" dirty="0" smtClean="0"/>
+              <a:t>Upcoming Tasks </a:t>
+            </a:r>
+            <a:r>
+              <a:rPr lang="en-US" sz="1400" dirty="0" smtClean="0"/>
+              <a:t>(current Fiscal Month)</a:t>
+            </a:r>
+            <a:endParaRPr lang="en-US" sz="1400" dirty="0"/>
+          </a:p>
+        </p:txBody>
+      </p:sp>
+      <p:graphicFrame>
+        <p:nvGraphicFramePr>
+          <p:cNvPr id="6" name="Content Placeholder 5"/>
+          <p:cNvGraphicFramePr>
+            <a:graphicFrameLocks noGrp="1"/>
+          </p:cNvGraphicFramePr>
+          <p:nvPr>
+            <p:ph idx="1"/>
+            <p:extLst>
+              <p:ext uri="{D42A27DB-BD31-4B8C-83A1-F6EECF244321}">
+                <p14:modId xmlns:p14="http://schemas.microsoft.com/office/powerpoint/2010/main" xmlns="" val="952249025"/>
+              </p:ext>
+            </p:extLst>
+          </p:nvPr>
+        </p:nvGraphicFramePr>
+        <p:xfrm>
+          <a:off x="211776" y="1531917"/>
+          <a:ext cx="8839195" cy="235941"/>
+        </p:xfrm>
+        <a:graphic>
+          <a:graphicData uri="http://schemas.openxmlformats.org/drawingml/2006/table">
+            <a:tbl>
+              <a:tblPr firstRow="1" bandRow="1">
+                <a:tableStyleId>{5C22544A-7EE6-4342-B048-85BDC9FD1C3A}</a:tableStyleId>
+              </a:tblPr>
+              <a:tblGrid>
+                <a:gridCol w="405740"/>
+                <a:gridCol w="344385"/>
+                <a:gridCol w="1852550"/>
+                <a:gridCol w="308759"/>
+                <a:gridCol w="475013"/>
+                <a:gridCol w="510639"/>
+                <a:gridCol w="581891"/>
+                <a:gridCol w="629392"/>
+                <a:gridCol w="403761"/>
+                <a:gridCol w="356509"/>
+                <a:gridCol w="654338"/>
+                <a:gridCol w="829828"/>
+                <a:gridCol w="415637"/>
+                <a:gridCol w="533528"/>
+                <a:gridCol w="537225"/>
+              </a:tblGrid>
+              <a:tr h="235941">
+                <a:tc>
+                  <a:txBody>
+                    <a:bodyPr/>
+                    <a:lstStyle/>
+                    <a:p>
+                      <a:r>
+                        <a:rPr lang="en-US" sz="900" b="0" i="0" kern="1200" baseline="0" dirty="0" smtClean="0">
+                          <a:solidFill>
+                            <a:schemeClr val="lt1"/>
+                          </a:solidFill>
+                          <a:effectLst/>
+                          <a:latin typeface="Arial" pitchFamily="34" charset="0"/>
+                          <a:ea typeface="+mn-ea"/>
+                          <a:cs typeface="Arial" pitchFamily="34" charset="0"/>
+                        </a:rPr>
+                        <a:t>UID</a:t>
+                      </a:r>
+                      <a:endParaRPr lang="en-US" sz="900" baseline="0" dirty="0">
+                        <a:latin typeface="Arial" pitchFamily="34" charset="0"/>
+                        <a:cs typeface="Arial" pitchFamily="34" charset="0"/>
+                      </a:endParaRPr>
+                    </a:p>
+                  </a:txBody>
+                  <a:tcPr marL="45720" marR="45720" marB="0"/>
+                </a:tc>
+                <a:tc>
+                  <a:txBody>
+                    <a:bodyPr/>
+                    <a:lstStyle/>
+                    <a:p>
+                      <a:r>
+                        <a:rPr lang="en-US" sz="900" b="0" i="0" kern="1200" baseline="0" dirty="0" smtClean="0">
+                          <a:solidFill>
+                            <a:schemeClr val="lt1"/>
+                          </a:solidFill>
+                          <a:effectLst/>
+                          <a:latin typeface="Arial" pitchFamily="34" charset="0"/>
+                          <a:ea typeface="+mn-ea"/>
+                          <a:cs typeface="Arial" pitchFamily="34" charset="0"/>
+                        </a:rPr>
+                        <a:t>CA </a:t>
+                      </a:r>
+                      <a:endParaRPr lang="en-US" sz="900" baseline="0" dirty="0">
+                        <a:latin typeface="Arial" pitchFamily="34" charset="0"/>
+                        <a:cs typeface="Arial" pitchFamily="34" charset="0"/>
+                      </a:endParaRPr>
+                    </a:p>
+                  </a:txBody>
+                  <a:tcPr marL="45720" marR="45720" marB="0"/>
+                </a:tc>
+                <a:tc>
+                  <a:txBody>
+                    <a:bodyPr/>
+                    <a:lstStyle/>
+                    <a:p>
+                      <a:r>
+                        <a:rPr lang="en-US" sz="900" b="0" baseline="0" dirty="0" smtClean="0">
+                          <a:latin typeface="Arial" pitchFamily="34" charset="0"/>
+                          <a:cs typeface="Arial" pitchFamily="34" charset="0"/>
+                        </a:rPr>
+                        <a:t>TASK NAME</a:t>
+                      </a:r>
+                      <a:endParaRPr lang="en-US" sz="900" b="0" baseline="0" dirty="0">
+                        <a:latin typeface="Arial" pitchFamily="34" charset="0"/>
+                        <a:cs typeface="Arial" pitchFamily="34" charset="0"/>
+                      </a:endParaRPr>
+                    </a:p>
+                  </a:txBody>
+                  <a:tcPr marL="45720" marR="45720" marB="0"/>
+                </a:tc>
+                <a:tc>
+                  <a:txBody>
+                    <a:bodyPr/>
+                    <a:lstStyle/>
+                    <a:p>
+                      <a:r>
+                        <a:rPr lang="en-US" sz="900" b="0" i="0" kern="1200" baseline="0" dirty="0" smtClean="0">
+                          <a:solidFill>
+                            <a:schemeClr val="lt1"/>
+                          </a:solidFill>
+                          <a:effectLst/>
+                          <a:latin typeface="Arial" pitchFamily="34" charset="0"/>
+                          <a:ea typeface="+mn-ea"/>
+                          <a:cs typeface="Arial" pitchFamily="34" charset="0"/>
+                        </a:rPr>
+                        <a:t>TS </a:t>
+                      </a:r>
+                      <a:endParaRPr lang="en-US" sz="900" baseline="0" dirty="0">
+                        <a:latin typeface="Arial" pitchFamily="34" charset="0"/>
+                        <a:cs typeface="Arial" pitchFamily="34" charset="0"/>
+                      </a:endParaRPr>
+                    </a:p>
+                  </a:txBody>
+                  <a:tcPr marL="45720" marR="45720" marB="0"/>
+                </a:tc>
+                <a:tc>
+                  <a:txBody>
+                    <a:bodyPr/>
+                    <a:lstStyle/>
+                    <a:p>
+                      <a:r>
+                        <a:rPr lang="en-US" sz="900" b="0" i="0" kern="1200" baseline="0" dirty="0" smtClean="0">
+                          <a:solidFill>
+                            <a:schemeClr val="lt1"/>
+                          </a:solidFill>
+                          <a:effectLst/>
+                          <a:latin typeface="Arial" pitchFamily="34" charset="0"/>
+                          <a:ea typeface="+mn-ea"/>
+                          <a:cs typeface="Arial" pitchFamily="34" charset="0"/>
+                        </a:rPr>
+                        <a:t>Start</a:t>
+                      </a:r>
+                      <a:endParaRPr lang="en-US" sz="900" baseline="0" dirty="0">
+                        <a:latin typeface="Arial" pitchFamily="34" charset="0"/>
+                        <a:cs typeface="Arial" pitchFamily="34" charset="0"/>
+                      </a:endParaRPr>
+                    </a:p>
+                  </a:txBody>
+                  <a:tcPr marL="45720" marR="45720" marB="0"/>
+                </a:tc>
+                <a:tc>
+                  <a:txBody>
+                    <a:bodyPr/>
+                    <a:lstStyle/>
+                    <a:p>
+                      <a:r>
+                        <a:rPr lang="en-US" sz="900" b="0" i="0" kern="1200" baseline="0" dirty="0" smtClean="0">
+                          <a:solidFill>
+                            <a:schemeClr val="lt1"/>
+                          </a:solidFill>
+                          <a:effectLst/>
+                          <a:latin typeface="Arial" pitchFamily="34" charset="0"/>
+                          <a:ea typeface="+mn-ea"/>
+                          <a:cs typeface="Arial" pitchFamily="34" charset="0"/>
+                        </a:rPr>
+                        <a:t>Finish</a:t>
+                      </a:r>
+                      <a:endParaRPr lang="en-US" sz="900" baseline="0" dirty="0">
+                        <a:latin typeface="Arial" pitchFamily="34" charset="0"/>
+                        <a:cs typeface="Arial" pitchFamily="34" charset="0"/>
+                      </a:endParaRPr>
+                    </a:p>
+                  </a:txBody>
+                  <a:tcPr marL="45720" marR="45720" marB="0"/>
+                </a:tc>
+                <a:tc>
+                  <a:txBody>
+                    <a:bodyPr/>
+                    <a:lstStyle/>
+                    <a:p>
+                      <a:r>
+                        <a:rPr lang="en-US" sz="900" b="0" i="0" kern="1200" baseline="0" dirty="0" smtClean="0">
+                          <a:solidFill>
+                            <a:schemeClr val="lt1"/>
+                          </a:solidFill>
+                          <a:effectLst/>
+                          <a:latin typeface="Arial" pitchFamily="34" charset="0"/>
+                          <a:ea typeface="+mn-ea"/>
+                          <a:cs typeface="Arial" pitchFamily="34" charset="0"/>
+                        </a:rPr>
+                        <a:t>BL Start</a:t>
+                      </a:r>
+                      <a:endParaRPr lang="en-US" sz="900" baseline="0" dirty="0">
+                        <a:latin typeface="Arial" pitchFamily="34" charset="0"/>
+                        <a:cs typeface="Arial" pitchFamily="34" charset="0"/>
+                      </a:endParaRPr>
+                    </a:p>
+                  </a:txBody>
+                  <a:tcPr marL="45720" marR="45720" marB="0"/>
+                </a:tc>
+                <a:tc>
+                  <a:txBody>
+                    <a:bodyPr/>
+                    <a:lstStyle/>
+                    <a:p>
+                      <a:r>
+                        <a:rPr lang="en-US" sz="900" b="0" i="0" kern="1200" baseline="0" dirty="0" smtClean="0">
+                          <a:solidFill>
+                            <a:schemeClr val="lt1"/>
+                          </a:solidFill>
+                          <a:effectLst/>
+                          <a:latin typeface="Arial" pitchFamily="34" charset="0"/>
+                          <a:ea typeface="+mn-ea"/>
+                          <a:cs typeface="Arial" pitchFamily="34" charset="0"/>
+                        </a:rPr>
+                        <a:t>BL Finish</a:t>
+                      </a:r>
+                      <a:endParaRPr lang="en-US" sz="900" baseline="0" dirty="0">
+                        <a:latin typeface="Arial" pitchFamily="34" charset="0"/>
+                        <a:cs typeface="Arial" pitchFamily="34" charset="0"/>
+                      </a:endParaRPr>
+                    </a:p>
+                  </a:txBody>
+                  <a:tcPr marL="45720" marR="45720" marB="0"/>
+                </a:tc>
+                <a:tc>
+                  <a:txBody>
+                    <a:bodyPr/>
+                    <a:lstStyle/>
+                    <a:p>
+                      <a:r>
+                        <a:rPr lang="en-US" sz="800" b="0" i="0" kern="1200" baseline="0" dirty="0" smtClean="0">
+                          <a:solidFill>
+                            <a:schemeClr val="lt1"/>
+                          </a:solidFill>
+                          <a:effectLst/>
+                          <a:latin typeface="Arial" pitchFamily="34" charset="0"/>
+                          <a:ea typeface="+mn-ea"/>
+                          <a:cs typeface="Arial" pitchFamily="34" charset="0"/>
+                        </a:rPr>
+                        <a:t>HRs</a:t>
+                      </a:r>
+                      <a:endParaRPr lang="en-US" sz="900" baseline="0" dirty="0">
+                        <a:latin typeface="Arial" pitchFamily="34" charset="0"/>
+                        <a:cs typeface="Arial" pitchFamily="34" charset="0"/>
+                      </a:endParaRPr>
+                    </a:p>
+                  </a:txBody>
+                  <a:tcPr marL="45720" marR="45720" marB="0"/>
+                </a:tc>
+                <a:tc>
+                  <a:txBody>
+                    <a:bodyPr/>
+                    <a:lstStyle/>
+                    <a:p>
+                      <a:r>
+                        <a:rPr lang="en-US" sz="900" b="0" i="0" kern="1200" baseline="0" dirty="0" smtClean="0">
+                          <a:solidFill>
+                            <a:schemeClr val="lt1"/>
+                          </a:solidFill>
+                          <a:effectLst/>
+                          <a:latin typeface="Arial" pitchFamily="34" charset="0"/>
+                          <a:ea typeface="+mn-ea"/>
+                          <a:cs typeface="Arial" pitchFamily="34" charset="0"/>
+                        </a:rPr>
+                        <a:t>PMT</a:t>
+                      </a:r>
+                      <a:endParaRPr lang="en-US" sz="900" baseline="0" dirty="0">
+                        <a:latin typeface="Arial" pitchFamily="34" charset="0"/>
+                        <a:cs typeface="Arial" pitchFamily="34" charset="0"/>
+                      </a:endParaRPr>
+                    </a:p>
+                  </a:txBody>
+                  <a:tcPr marL="45720" marR="45720" marB="0"/>
+                </a:tc>
+                <a:tc>
+                  <a:txBody>
+                    <a:bodyPr/>
+                    <a:lstStyle/>
+                    <a:p>
+                      <a:r>
+                        <a:rPr lang="en-US" sz="900" b="0" i="0" kern="1200" baseline="0" dirty="0" smtClean="0">
+                          <a:solidFill>
+                            <a:schemeClr val="lt1"/>
+                          </a:solidFill>
+                          <a:effectLst/>
+                          <a:latin typeface="Arial" pitchFamily="34" charset="0"/>
+                          <a:ea typeface="+mn-ea"/>
+                          <a:cs typeface="Arial" pitchFamily="34" charset="0"/>
+                        </a:rPr>
+                        <a:t>Reason</a:t>
+                      </a:r>
+                      <a:endParaRPr lang="en-US" sz="900" baseline="0" dirty="0">
+                        <a:latin typeface="Arial" pitchFamily="34" charset="0"/>
+                        <a:cs typeface="Arial" pitchFamily="34" charset="0"/>
+                      </a:endParaRPr>
+                    </a:p>
+                  </a:txBody>
+                  <a:tcPr marL="45720" marR="45720" marB="0"/>
+                </a:tc>
+                <a:tc>
+                  <a:txBody>
+                    <a:bodyPr/>
+                    <a:lstStyle/>
+                    <a:p>
+                      <a:r>
+                        <a:rPr lang="en-US" sz="900" b="0" i="0" kern="1200" baseline="0" dirty="0" smtClean="0">
+                          <a:solidFill>
+                            <a:schemeClr val="lt1"/>
+                          </a:solidFill>
+                          <a:effectLst/>
+                          <a:latin typeface="Arial" pitchFamily="34" charset="0"/>
+                          <a:ea typeface="+mn-ea"/>
+                          <a:cs typeface="Arial" pitchFamily="34" charset="0"/>
+                        </a:rPr>
+                        <a:t>Impacted</a:t>
+                      </a:r>
+                      <a:endParaRPr lang="en-US" sz="900" baseline="0" dirty="0">
+                        <a:latin typeface="Arial" pitchFamily="34" charset="0"/>
+                        <a:cs typeface="Arial" pitchFamily="34" charset="0"/>
+                      </a:endParaRPr>
+                    </a:p>
+                  </a:txBody>
+                  <a:tcPr marL="45720" marR="45720" marB="0"/>
+                </a:tc>
+                <a:tc>
+                  <a:txBody>
+                    <a:bodyPr/>
+                    <a:lstStyle/>
+                    <a:p>
+                      <a:r>
+                        <a:rPr lang="en-US" sz="700" b="0" i="0" kern="1200" baseline="0" dirty="0" smtClean="0">
+                          <a:solidFill>
+                            <a:schemeClr val="lt1"/>
+                          </a:solidFill>
+                          <a:effectLst/>
+                          <a:latin typeface="Arial" pitchFamily="34" charset="0"/>
+                          <a:ea typeface="+mn-ea"/>
+                          <a:cs typeface="Arial" pitchFamily="34" charset="0"/>
+                        </a:rPr>
+                        <a:t>DUR</a:t>
+                      </a:r>
+                      <a:endParaRPr lang="en-US" sz="700" baseline="0" dirty="0">
+                        <a:latin typeface="Arial" pitchFamily="34" charset="0"/>
+                        <a:cs typeface="Arial" pitchFamily="34" charset="0"/>
+                      </a:endParaRPr>
+                    </a:p>
+                  </a:txBody>
+                  <a:tcPr marL="45720" marR="45720" marB="0"/>
+                </a:tc>
+                <a:tc>
+                  <a:txBody>
+                    <a:bodyPr/>
+                    <a:lstStyle/>
+                    <a:p>
+                      <a:pPr marL="0" marR="0" indent="0" algn="l" defTabSz="914400" rtl="0" eaLnBrk="1" fontAlgn="auto" latinLnBrk="0" hangingPunct="1">
+                        <a:lnSpc>
+                          <a:spcPct val="100000"/>
+                        </a:lnSpc>
+                        <a:spcBef>
+                          <a:spcPts val="0"/>
+                        </a:spcBef>
+                        <a:spcAft>
+                          <a:spcPts val="0"/>
+                        </a:spcAft>
+                        <a:buClrTx/>
+                        <a:buSzTx/>
+                        <a:buFontTx/>
+                        <a:buNone/>
+                        <a:tabLst/>
+                        <a:defRPr/>
+                      </a:pPr>
+                      <a:r>
+                        <a:rPr lang="en-US" sz="900" b="0" i="0" kern="1200" baseline="0" dirty="0" err="1" smtClean="0">
+                          <a:solidFill>
+                            <a:schemeClr val="lt1"/>
+                          </a:solidFill>
+                          <a:effectLst/>
+                          <a:latin typeface="Arial" pitchFamily="34" charset="0"/>
+                          <a:ea typeface="+mn-ea"/>
+                          <a:cs typeface="Arial" pitchFamily="34" charset="0"/>
+                        </a:rPr>
+                        <a:t>Est</a:t>
+                      </a:r>
+                      <a:r>
+                        <a:rPr lang="en-US" sz="900" b="0" i="0" kern="1200" baseline="0" dirty="0" smtClean="0">
+                          <a:solidFill>
+                            <a:schemeClr val="lt1"/>
+                          </a:solidFill>
+                          <a:effectLst/>
+                          <a:latin typeface="Arial" pitchFamily="34" charset="0"/>
+                          <a:ea typeface="+mn-ea"/>
+                          <a:cs typeface="Arial" pitchFamily="34" charset="0"/>
+                        </a:rPr>
+                        <a:t> Start</a:t>
+                      </a:r>
+                      <a:endParaRPr lang="en-US" sz="900" baseline="0" dirty="0">
+                        <a:latin typeface="Arial" pitchFamily="34" charset="0"/>
+                        <a:cs typeface="Arial" pitchFamily="34" charset="0"/>
+                      </a:endParaRPr>
+                    </a:p>
+                  </a:txBody>
+                  <a:tcPr marL="45720" marR="45720" marB="0"/>
+                </a:tc>
+                <a:tc>
+                  <a:txBody>
+                    <a:bodyPr/>
+                    <a:lstStyle/>
+                    <a:p>
+                      <a:r>
+                        <a:rPr lang="en-US" sz="900" b="0" i="0" kern="1200" baseline="0" dirty="0" err="1" smtClean="0">
+                          <a:solidFill>
+                            <a:schemeClr val="lt1"/>
+                          </a:solidFill>
+                          <a:effectLst/>
+                          <a:latin typeface="Arial" pitchFamily="34" charset="0"/>
+                          <a:ea typeface="+mn-ea"/>
+                          <a:cs typeface="Arial" pitchFamily="34" charset="0"/>
+                        </a:rPr>
+                        <a:t>Est</a:t>
+                      </a:r>
+                      <a:r>
+                        <a:rPr lang="en-US" sz="900" b="0" i="0" kern="1200" baseline="0" dirty="0" smtClean="0">
+                          <a:solidFill>
+                            <a:schemeClr val="lt1"/>
+                          </a:solidFill>
+                          <a:effectLst/>
+                          <a:latin typeface="Arial" pitchFamily="34" charset="0"/>
+                          <a:ea typeface="+mn-ea"/>
+                          <a:cs typeface="Arial" pitchFamily="34" charset="0"/>
+                        </a:rPr>
+                        <a:t> Fin</a:t>
+                      </a:r>
+                      <a:endParaRPr lang="en-US" sz="900" baseline="0" dirty="0">
+                        <a:latin typeface="Arial" pitchFamily="34" charset="0"/>
+                        <a:cs typeface="Arial" pitchFamily="34" charset="0"/>
+                      </a:endParaRPr>
+                    </a:p>
+                  </a:txBody>
+                  <a:tcPr marL="45720" marR="45720" marB="0"/>
+                </a:tc>
+              </a:tr>
+            </a:tbl>
+          </a:graphicData>
+        </a:graphic>
+      </p:graphicFrame>
+    </p:spTree>
+    <p:extLst>
+      <p:ext uri="{BB962C8B-B14F-4D97-AF65-F5344CB8AC3E}">
+        <p14:creationId xmlns:p14="http://schemas.microsoft.com/office/powerpoint/2010/main" xmlns="" val="2616550347"/>
+      </p:ext>
+    </p:extLst>
+  </p:cSld>
+  <p:clrMapOvr>
+    <a:masterClrMapping/>
+  </p:clrMapOvr>
+  <p:timing>
+    <p:tnLst>
+      <p:par>
+        <p:cTn id="1" dur="indefinite" restart="never" nodeType="tmRoot"/>
+      </p:par>
+    </p:tnLst>
+  </p:timing>
+</p:sld>
+</file>
+
+<file path=ppt/slides/slide7.xml><?xml version="1.0" encoding="utf-8"?>
 <p:sld xmlns:a="http://schemas.openxmlformats.org/drawingml/2006/main" xmlns:r="http://schemas.openxmlformats.org/officeDocument/2006/relationships" xmlns:p="http://schemas.openxmlformats.org/presentationml/2006/main">
   <p:cSld>
     <p:spTree>
@@ -4563,7 +5435,7 @@
           <p:nvPr>
             <p:extLst>
               <p:ext uri="{D42A27DB-BD31-4B8C-83A1-F6EECF244321}">
-                <p14:modId xmlns:p14="http://schemas.microsoft.com/office/powerpoint/2010/main" val="1273810074"/>
+                <p14:modId xmlns:p14="http://schemas.microsoft.com/office/powerpoint/2010/main" xmlns="" val="1273810074"/>
               </p:ext>
             </p:extLst>
           </p:nvPr>
@@ -4581,7 +5453,7 @@
     </p:spTree>
     <p:extLst>
       <p:ext uri="{BB962C8B-B14F-4D97-AF65-F5344CB8AC3E}">
-        <p14:creationId xmlns:p14="http://schemas.microsoft.com/office/powerpoint/2010/main" val="2601612557"/>
+        <p14:creationId xmlns:p14="http://schemas.microsoft.com/office/powerpoint/2010/main" xmlns="" val="2601612557"/>
       </p:ext>
     </p:extLst>
   </p:cSld>
@@ -4598,7 +5470,7 @@
 </p:sld>
 </file>
 
-<file path=ppt/slides/slide7.xml><?xml version="1.0" encoding="utf-8"?>
+<file path=ppt/slides/slide8.xml><?xml version="1.0" encoding="utf-8"?>
 <p:sld xmlns:a="http://schemas.openxmlformats.org/drawingml/2006/main" xmlns:r="http://schemas.openxmlformats.org/officeDocument/2006/relationships" xmlns:p="http://schemas.openxmlformats.org/presentationml/2006/main">
   <p:cSld>
     <p:spTree>
@@ -4648,7 +5520,7 @@
             <p:ph idx="1"/>
             <p:extLst>
               <p:ext uri="{D42A27DB-BD31-4B8C-83A1-F6EECF244321}">
-                <p14:modId xmlns:p14="http://schemas.microsoft.com/office/powerpoint/2010/main" val="452837976"/>
+                <p14:modId xmlns:p14="http://schemas.microsoft.com/office/powerpoint/2010/main" xmlns="" val="452837976"/>
               </p:ext>
             </p:extLst>
           </p:nvPr>
@@ -4666,7 +5538,7 @@
     </p:spTree>
     <p:extLst>
       <p:ext uri="{BB962C8B-B14F-4D97-AF65-F5344CB8AC3E}">
-        <p14:creationId xmlns:p14="http://schemas.microsoft.com/office/powerpoint/2010/main" val="1098855275"/>
+        <p14:creationId xmlns:p14="http://schemas.microsoft.com/office/powerpoint/2010/main" xmlns="" val="1098855275"/>
       </p:ext>
     </p:extLst>
   </p:cSld>
@@ -4676,7 +5548,7 @@
 </p:sld>
 </file>
 
-<file path=ppt/slides/slide8.xml><?xml version="1.0" encoding="utf-8"?>
+<file path=ppt/slides/slide9.xml><?xml version="1.0" encoding="utf-8"?>
 <p:sld xmlns:a="http://schemas.openxmlformats.org/drawingml/2006/main" xmlns:r="http://schemas.openxmlformats.org/officeDocument/2006/relationships" xmlns:p="http://schemas.openxmlformats.org/presentationml/2006/main">
   <p:cSld>
     <p:spTree>
@@ -4725,7 +5597,7 @@
             <p:ph idx="1"/>
             <p:extLst>
               <p:ext uri="{D42A27DB-BD31-4B8C-83A1-F6EECF244321}">
-                <p14:modId xmlns:p14="http://schemas.microsoft.com/office/powerpoint/2010/main" val="1851299246"/>
+                <p14:modId xmlns:p14="http://schemas.microsoft.com/office/powerpoint/2010/main" xmlns="" val="1851299246"/>
               </p:ext>
             </p:extLst>
           </p:nvPr>
@@ -4743,99 +5615,7 @@
     </p:spTree>
     <p:extLst>
       <p:ext uri="{BB962C8B-B14F-4D97-AF65-F5344CB8AC3E}">
-        <p14:creationId xmlns:p14="http://schemas.microsoft.com/office/powerpoint/2010/main" val="3713926316"/>
-      </p:ext>
-    </p:extLst>
-  </p:cSld>
-  <p:clrMapOvr>
-    <a:masterClrMapping/>
-  </p:clrMapOvr>
-</p:sld>
-</file>
-
-<file path=ppt/slides/slide9.xml><?xml version="1.0" encoding="utf-8"?>
-<p:sld xmlns:a="http://schemas.openxmlformats.org/drawingml/2006/main" xmlns:r="http://schemas.openxmlformats.org/officeDocument/2006/relationships" xmlns:p="http://schemas.openxmlformats.org/presentationml/2006/main">
-  <p:cSld>
-    <p:spTree>
-      <p:nvGrpSpPr>
-        <p:cNvPr id="1" name=""/>
-        <p:cNvGrpSpPr/>
-        <p:nvPr/>
-      </p:nvGrpSpPr>
-      <p:grpSpPr>
-        <a:xfrm>
-          <a:off x="0" y="0"/>
-          <a:ext cx="0" cy="0"/>
-          <a:chOff x="0" y="0"/>
-          <a:chExt cx="0" cy="0"/>
-        </a:xfrm>
-      </p:grpSpPr>
-      <p:sp>
-        <p:nvSpPr>
-          <p:cNvPr id="2" name="Title 1"/>
-          <p:cNvSpPr>
-            <a:spLocks noGrp="1"/>
-          </p:cNvSpPr>
-          <p:nvPr>
-            <p:ph type="title"/>
-          </p:nvPr>
-        </p:nvSpPr>
-        <p:spPr/>
-        <p:txBody>
-          <a:bodyPr/>
-          <a:lstStyle/>
-          <a:p>
-            <a:r>
-              <a:rPr lang="en-US" dirty="0"/>
-              <a:t>Summary</a:t>
-            </a:r>
-          </a:p>
-        </p:txBody>
-      </p:sp>
-      <p:sp>
-        <p:nvSpPr>
-          <p:cNvPr id="3" name="Content Placeholder 2"/>
-          <p:cNvSpPr>
-            <a:spLocks noGrp="1"/>
-          </p:cNvSpPr>
-          <p:nvPr>
-            <p:ph idx="1"/>
-          </p:nvPr>
-        </p:nvSpPr>
-        <p:spPr/>
-        <p:txBody>
-          <a:bodyPr/>
-          <a:lstStyle/>
-          <a:p>
-            <a:r>
-              <a:rPr lang="en-US" dirty="0" smtClean="0"/>
-              <a:t>Driving path status</a:t>
-            </a:r>
-          </a:p>
-          <a:p>
-            <a:r>
-              <a:rPr lang="en-US" dirty="0" smtClean="0"/>
-              <a:t>Key Milestone status </a:t>
-            </a:r>
-          </a:p>
-          <a:p>
-            <a:r>
-              <a:rPr lang="en-US" dirty="0" smtClean="0"/>
-              <a:t>Upcoming reviews</a:t>
-            </a:r>
-          </a:p>
-          <a:p>
-            <a:pPr marL="0" indent="0">
-              <a:buNone/>
-            </a:pPr>
-            <a:endParaRPr lang="en-US" dirty="0" smtClean="0"/>
-          </a:p>
-        </p:txBody>
-      </p:sp>
-    </p:spTree>
-    <p:extLst>
-      <p:ext uri="{BB962C8B-B14F-4D97-AF65-F5344CB8AC3E}">
-        <p14:creationId xmlns:p14="http://schemas.microsoft.com/office/powerpoint/2010/main" val="623995057"/>
+        <p14:creationId xmlns:p14="http://schemas.microsoft.com/office/powerpoint/2010/main" xmlns="" val="3713926316"/>
       </p:ext>
     </p:extLst>
   </p:cSld>

</xml_diff>

<commit_message>
Driving Path Bug fixes
</commit_message>
<xml_diff>
--- a/PMMPresentation/Modules/Templates/PMM Template.pptx
+++ b/PMMPresentation/Modules/Templates/PMM Template.pptx
@@ -13,13 +13,13 @@
   <p:sldIdLst>
     <p:sldId id="628" r:id="rId5"/>
     <p:sldId id="629" r:id="rId6"/>
-    <p:sldId id="630" r:id="rId7"/>
+    <p:sldId id="640" r:id="rId7"/>
     <p:sldId id="634" r:id="rId8"/>
-    <p:sldId id="635" r:id="rId9"/>
-    <p:sldId id="638" r:id="rId10"/>
+    <p:sldId id="641" r:id="rId9"/>
+    <p:sldId id="642" r:id="rId10"/>
     <p:sldId id="632" r:id="rId11"/>
-    <p:sldId id="636" r:id="rId12"/>
-    <p:sldId id="637" r:id="rId13"/>
+    <p:sldId id="643" r:id="rId12"/>
+    <p:sldId id="644" r:id="rId13"/>
     <p:sldId id="639" r:id="rId14"/>
     <p:sldId id="633" r:id="rId15"/>
   </p:sldIdLst>
@@ -155,29 +155,42 @@
 
 <file path=ppt/charts/chart1.xml><?xml version="1.0" encoding="utf-8"?>
 <c:chartSpace xmlns:c="http://schemas.openxmlformats.org/drawingml/2006/chart" xmlns:a="http://schemas.openxmlformats.org/drawingml/2006/main" xmlns:r="http://schemas.openxmlformats.org/officeDocument/2006/relationships">
+  <c:date1904 val="0"/>
   <c:lang val="en-US"/>
+  <c:roundedCorners val="0"/>
+  <mc:AlternateContent xmlns:mc="http://schemas.openxmlformats.org/markup-compatibility/2006">
+    <mc:Choice xmlns:c14="http://schemas.microsoft.com/office/drawing/2007/8/2/chart" Requires="c14">
+      <c14:style val="102"/>
+    </mc:Choice>
+    <mc:Fallback>
+      <c:style val="2"/>
+    </mc:Fallback>
+  </mc:AlternateContent>
   <c:chart>
+    <c:autoTitleDeleted val="0"/>
     <c:plotArea>
       <c:layout>
         <c:manualLayout>
           <c:layoutTarget val="inner"/>
           <c:xMode val="edge"/>
           <c:yMode val="edge"/>
-          <c:x val="0.10803623505395175"/>
+          <c:x val="0.30479549431321085"/>
           <c:y val="6.5983968494660691E-2"/>
-          <c:w val="0.86898536988432007"/>
-          <c:h val="0.90314967223550136"/>
+          <c:w val="0.66836808593370289"/>
+          <c:h val="0.90314967223550313"/>
         </c:manualLayout>
       </c:layout>
       <c:barChart>
         <c:barDir val="bar"/>
         <c:grouping val="stacked"/>
+        <c:varyColors val="0"/>
         <c:ser>
           <c:idx val="0"/>
           <c:order val="0"/>
           <c:spPr>
             <a:noFill/>
           </c:spPr>
+          <c:invertIfNegative val="0"/>
           <c:cat>
             <c:strRef>
               <c:f>Sheet1!$A$2</c:f>
@@ -209,10 +222,7 @@
             <a:gradFill>
               <a:gsLst>
                 <a:gs pos="0">
-                  <a:schemeClr val="accent1">
-                    <a:tint val="66000"/>
-                    <a:satMod val="160000"/>
-                  </a:schemeClr>
+                  <a:srgbClr val="002060"/>
                 </a:gs>
                 <a:gs pos="50000">
                   <a:schemeClr val="accent1">
@@ -230,20 +240,23 @@
               <a:lin ang="5400000" scaled="0"/>
             </a:gradFill>
           </c:spPr>
-          <c:dPt>
-            <c:idx val="0"/>
-          </c:dPt>
+          <c:invertIfNegative val="0"/>
           <c:dLbls>
             <c:dLbl>
               <c:idx val="0"/>
               <c:layout>
                 <c:manualLayout>
                   <c:x val="0.17404466802760771"/>
-                  <c:y val="-2.8055907659872681E-3"/>
+                  <c:y val="-2.8055907659872755E-3"/>
                 </c:manualLayout>
               </c:layout>
               <c:dLblPos val="ctr"/>
+              <c:showLegendKey val="0"/>
+              <c:showVal val="0"/>
               <c:showCatName val="1"/>
+              <c:showSerName val="0"/>
+              <c:showPercent val="0"/>
+              <c:showBubbleSize val="0"/>
             </c:dLbl>
             <c:txPr>
               <a:bodyPr/>
@@ -256,7 +269,13 @@
               </a:p>
             </c:txPr>
             <c:dLblPos val="inEnd"/>
+            <c:showLegendKey val="0"/>
+            <c:showVal val="0"/>
             <c:showCatName val="1"/>
+            <c:showSerName val="0"/>
+            <c:showPercent val="0"/>
+            <c:showBubbleSize val="0"/>
+            <c:showLeaderLines val="0"/>
           </c:dLbls>
           <c:cat>
             <c:strRef>
@@ -282,54 +301,96 @@
             </c:numRef>
           </c:val>
         </c:ser>
-        <c:dLbls/>
+        <c:dLbls>
+          <c:showLegendKey val="0"/>
+          <c:showVal val="0"/>
+          <c:showCatName val="0"/>
+          <c:showSerName val="0"/>
+          <c:showPercent val="0"/>
+          <c:showBubbleSize val="0"/>
+        </c:dLbls>
+        <c:gapWidth val="150"/>
         <c:overlap val="100"/>
-        <c:axId val="51149824"/>
-        <c:axId val="53056256"/>
+        <c:axId val="31929856"/>
+        <c:axId val="53109888"/>
       </c:barChart>
       <c:catAx>
-        <c:axId val="51149824"/>
+        <c:axId val="31929856"/>
         <c:scaling>
           <c:orientation val="maxMin"/>
         </c:scaling>
+        <c:delete val="0"/>
         <c:axPos val="l"/>
+        <c:majorTickMark val="out"/>
+        <c:minorTickMark val="none"/>
         <c:tickLblPos val="nextTo"/>
-        <c:crossAx val="53056256"/>
+        <c:txPr>
+          <a:bodyPr/>
+          <a:lstStyle/>
+          <a:p>
+            <a:pPr>
+              <a:defRPr sz="700" baseline="0">
+                <a:latin typeface="Arial" pitchFamily="34" charset="0"/>
+              </a:defRPr>
+            </a:pPr>
+            <a:endParaRPr lang="en-US"/>
+          </a:p>
+        </c:txPr>
+        <c:crossAx val="53109888"/>
         <c:crosses val="autoZero"/>
-        <c:auto val="1"/>
+        <c:auto val="0"/>
         <c:lblAlgn val="ctr"/>
-        <c:lblOffset val="100"/>
+        <c:lblOffset val="1000"/>
+        <c:noMultiLvlLbl val="0"/>
       </c:catAx>
       <c:valAx>
-        <c:axId val="53056256"/>
+        <c:axId val="53109888"/>
         <c:scaling>
           <c:orientation val="minMax"/>
         </c:scaling>
+        <c:delete val="0"/>
         <c:axPos val="t"/>
         <c:majorGridlines/>
         <c:numFmt formatCode="m/d;@" sourceLinked="0"/>
+        <c:majorTickMark val="out"/>
+        <c:minorTickMark val="none"/>
         <c:tickLblPos val="nextTo"/>
-        <c:crossAx val="51149824"/>
+        <c:crossAx val="31929856"/>
         <c:crosses val="autoZero"/>
         <c:crossBetween val="between"/>
       </c:valAx>
     </c:plotArea>
     <c:plotVisOnly val="1"/>
     <c:dispBlanksAs val="gap"/>
+    <c:showDLblsOverMax val="0"/>
   </c:chart>
-  <c:externalData r:id="rId1"/>
+  <c:externalData r:id="rId1">
+    <c:autoUpdate val="0"/>
+  </c:externalData>
 </c:chartSpace>
 </file>
 
 <file path=ppt/charts/chart2.xml><?xml version="1.0" encoding="utf-8"?>
 <c:chartSpace xmlns:c="http://schemas.openxmlformats.org/drawingml/2006/chart" xmlns:a="http://schemas.openxmlformats.org/drawingml/2006/main" xmlns:r="http://schemas.openxmlformats.org/officeDocument/2006/relationships">
+  <c:date1904 val="0"/>
   <c:lang val="en-US"/>
+  <c:roundedCorners val="0"/>
+  <mc:AlternateContent xmlns:mc="http://schemas.openxmlformats.org/markup-compatibility/2006">
+    <mc:Choice xmlns:c14="http://schemas.microsoft.com/office/drawing/2007/8/2/chart" Requires="c14">
+      <c14:style val="102"/>
+    </mc:Choice>
+    <mc:Fallback>
+      <c:style val="2"/>
+    </mc:Fallback>
+  </mc:AlternateContent>
   <c:chart>
+    <c:autoTitleDeleted val="0"/>
     <c:plotArea>
       <c:layout/>
       <c:barChart>
         <c:barDir val="col"/>
         <c:grouping val="clustered"/>
+        <c:varyColors val="0"/>
         <c:ser>
           <c:idx val="0"/>
           <c:order val="0"/>
@@ -346,28 +407,37 @@
           </c:tx>
           <c:spPr>
             <a:solidFill>
-              <a:srgbClr val="59A583"/>
+              <a:srgbClr val="73B496"/>
             </a:solidFill>
+            <a:ln>
+              <a:solidFill>
+                <a:srgbClr val="73B496"/>
+              </a:solidFill>
+            </a:ln>
           </c:spPr>
+          <c:invertIfNegative val="0"/>
           <c:cat>
             <c:strRef>
-              <c:f>Sheet1!$A$2:$A$6</c:f>
+              <c:f>Sheet1!$A$2:$A$11</c:f>
               <c:strCache>
                 <c:ptCount val="1"/>
                 <c:pt idx="0">
-                  <c:v>Cat</c:v>
+                  <c:v>Category 1</c:v>
                 </c:pt>
               </c:strCache>
             </c:strRef>
           </c:cat>
           <c:val>
             <c:numRef>
-              <c:f>Sheet1!$B$2:$B$6</c:f>
+              <c:f>Sheet1!$B$2:$B$11</c:f>
               <c:numCache>
                 <c:formatCode>General</c:formatCode>
-                <c:ptCount val="5"/>
+                <c:ptCount val="10"/>
                 <c:pt idx="0">
                   <c:v>1</c:v>
+                </c:pt>
+                <c:pt idx="6">
+                  <c:v>0</c:v>
                 </c:pt>
               </c:numCache>
             </c:numRef>
@@ -378,37 +448,43 @@
           <c:order val="1"/>
           <c:tx>
             <c:strRef>
-              <c:f>Sheet1!$D$1</c:f>
+              <c:f>Sheet1!$C$1</c:f>
               <c:strCache>
                 <c:ptCount val="1"/>
                 <c:pt idx="0">
-                  <c:v>Deliquent Starts</c:v>
+                  <c:v>Forecast Completed Starts</c:v>
                 </c:pt>
               </c:strCache>
             </c:strRef>
           </c:tx>
           <c:spPr>
             <a:solidFill>
-              <a:srgbClr val="CD6B57"/>
+              <a:srgbClr val="E0E0E0"/>
             </a:solidFill>
+            <a:ln>
+              <a:solidFill>
+                <a:srgbClr val="E0E0E0"/>
+              </a:solidFill>
+            </a:ln>
           </c:spPr>
+          <c:invertIfNegative val="0"/>
           <c:cat>
             <c:strRef>
-              <c:f>Sheet1!$A$2:$A$6</c:f>
+              <c:f>Sheet1!$A$2:$A$11</c:f>
               <c:strCache>
                 <c:ptCount val="1"/>
                 <c:pt idx="0">
-                  <c:v>Cat</c:v>
+                  <c:v>Category 1</c:v>
                 </c:pt>
               </c:strCache>
             </c:strRef>
           </c:cat>
           <c:val>
             <c:numRef>
-              <c:f>Sheet1!$D$2:$D$6</c:f>
+              <c:f>Sheet1!$C$2:$C$11</c:f>
               <c:numCache>
                 <c:formatCode>General</c:formatCode>
-                <c:ptCount val="5"/>
+                <c:ptCount val="10"/>
                 <c:pt idx="0">
                   <c:v>1</c:v>
                 </c:pt>
@@ -421,37 +497,43 @@
           <c:order val="2"/>
           <c:tx>
             <c:strRef>
-              <c:f>Sheet1!$C$1</c:f>
+              <c:f>Sheet1!$D$1</c:f>
               <c:strCache>
                 <c:ptCount val="1"/>
                 <c:pt idx="0">
-                  <c:v>Forecasted Completed Starts</c:v>
+                  <c:v>Delinquent Starts</c:v>
                 </c:pt>
               </c:strCache>
             </c:strRef>
           </c:tx>
           <c:spPr>
             <a:solidFill>
-              <a:srgbClr val="E0E0E0"/>
+              <a:srgbClr val="CD6B57"/>
             </a:solidFill>
+            <a:ln>
+              <a:solidFill>
+                <a:srgbClr val="CD6B57"/>
+              </a:solidFill>
+            </a:ln>
           </c:spPr>
+          <c:invertIfNegative val="0"/>
           <c:cat>
             <c:strRef>
-              <c:f>Sheet1!$A$2:$A$6</c:f>
+              <c:f>Sheet1!$A$2:$A$11</c:f>
               <c:strCache>
                 <c:ptCount val="1"/>
                 <c:pt idx="0">
-                  <c:v>Cat</c:v>
+                  <c:v>Category 1</c:v>
                 </c:pt>
               </c:strCache>
             </c:strRef>
           </c:cat>
           <c:val>
             <c:numRef>
-              <c:f>Sheet1!$C$2:$C$6</c:f>
+              <c:f>Sheet1!$D$2:$D$11</c:f>
               <c:numCache>
                 <c:formatCode>General</c:formatCode>
-                <c:ptCount val="5"/>
+                <c:ptCount val="10"/>
                 <c:pt idx="0">
                   <c:v>1</c:v>
                 </c:pt>
@@ -468,7 +550,7 @@
               <c:strCache>
                 <c:ptCount val="1"/>
                 <c:pt idx="0">
-                  <c:v>Forecasted Delequint Starts</c:v>
+                  <c:v>Forecast Delinquent Starts</c:v>
                 </c:pt>
               </c:strCache>
             </c:strRef>
@@ -479,24 +561,32 @@
                 <a:lumMod val="65000"/>
               </a:schemeClr>
             </a:solidFill>
+            <a:ln>
+              <a:solidFill>
+                <a:schemeClr val="bg1">
+                  <a:lumMod val="65000"/>
+                </a:schemeClr>
+              </a:solidFill>
+            </a:ln>
           </c:spPr>
+          <c:invertIfNegative val="0"/>
           <c:cat>
             <c:strRef>
-              <c:f>Sheet1!$A$2:$A$6</c:f>
+              <c:f>Sheet1!$A$2:$A$11</c:f>
               <c:strCache>
                 <c:ptCount val="1"/>
                 <c:pt idx="0">
-                  <c:v>Cat</c:v>
+                  <c:v>Category 1</c:v>
                 </c:pt>
               </c:strCache>
             </c:strRef>
           </c:cat>
           <c:val>
             <c:numRef>
-              <c:f>Sheet1!$E$2:$E$6</c:f>
+              <c:f>Sheet1!$E$2:$E$11</c:f>
               <c:numCache>
                 <c:formatCode>General</c:formatCode>
-                <c:ptCount val="5"/>
+                <c:ptCount val="10"/>
                 <c:pt idx="0">
                   <c:v>1</c:v>
                 </c:pt>
@@ -504,14 +594,23 @@
             </c:numRef>
           </c:val>
         </c:ser>
-        <c:dLbls/>
-        <c:axId val="55298688"/>
-        <c:axId val="55325056"/>
+        <c:dLbls>
+          <c:showLegendKey val="0"/>
+          <c:showVal val="0"/>
+          <c:showCatName val="0"/>
+          <c:showSerName val="0"/>
+          <c:showPercent val="0"/>
+          <c:showBubbleSize val="0"/>
+        </c:dLbls>
+        <c:gapWidth val="150"/>
+        <c:axId val="31930880"/>
+        <c:axId val="98798400"/>
       </c:barChart>
       <c:lineChart>
         <c:grouping val="standard"/>
+        <c:varyColors val="0"/>
         <c:ser>
-          <c:idx val="5"/>
+          <c:idx val="4"/>
           <c:order val="4"/>
           <c:tx>
             <c:strRef>
@@ -519,7 +618,7 @@
               <c:strCache>
                 <c:ptCount val="1"/>
                 <c:pt idx="0">
-                  <c:v>Cum Open Delequient Starts</c:v>
+                  <c:v>Cum Open Delinquent Starts</c:v>
                 </c:pt>
               </c:strCache>
             </c:strRef>
@@ -530,83 +629,13 @@
                 <a:schemeClr val="tx1"/>
               </a:solidFill>
             </a:ln>
-            <a:effectLst>
-              <a:outerShdw blurRad="50800" dist="50800" dir="5400000" algn="ctr" rotWithShape="0">
-                <a:schemeClr val="tx1"/>
-              </a:outerShdw>
-            </a:effectLst>
           </c:spPr>
           <c:marker>
-            <c:symbol val="x"/>
-            <c:size val="7"/>
+            <c:symbol val="square"/>
+            <c:size val="4"/>
             <c:spPr>
               <a:solidFill>
                 <a:schemeClr val="tx1"/>
-              </a:solidFill>
-              <a:ln>
-                <a:solidFill>
-                  <a:schemeClr val="tx1"/>
-                </a:solidFill>
-              </a:ln>
-              <a:effectLst>
-                <a:outerShdw blurRad="50800" dist="50800" dir="5400000" algn="ctr" rotWithShape="0">
-                  <a:schemeClr val="tx1"/>
-                </a:outerShdw>
-              </a:effectLst>
-            </c:spPr>
-          </c:marker>
-          <c:cat>
-            <c:strRef>
-              <c:f>Sheet1!$A$2:$A$6</c:f>
-              <c:strCache>
-                <c:ptCount val="1"/>
-                <c:pt idx="0">
-                  <c:v>Cat</c:v>
-                </c:pt>
-              </c:strCache>
-            </c:strRef>
-          </c:cat>
-          <c:val>
-            <c:numRef>
-              <c:f>Sheet1!$F$2:$F$6</c:f>
-              <c:numCache>
-                <c:formatCode>General</c:formatCode>
-                <c:ptCount val="5"/>
-                <c:pt idx="0">
-                  <c:v>1</c:v>
-                </c:pt>
-              </c:numCache>
-            </c:numRef>
-          </c:val>
-        </c:ser>
-        <c:ser>
-          <c:idx val="4"/>
-          <c:order val="5"/>
-          <c:tx>
-            <c:strRef>
-              <c:f>Sheet1!$G$1</c:f>
-              <c:strCache>
-                <c:ptCount val="1"/>
-                <c:pt idx="0">
-                  <c:v>Forecasted Cum Open Delequeint Starts</c:v>
-                </c:pt>
-              </c:strCache>
-            </c:strRef>
-          </c:tx>
-          <c:spPr>
-            <a:ln>
-              <a:solidFill>
-                <a:prstClr val="black"/>
-              </a:solidFill>
-              <a:prstDash val="sysDash"/>
-            </a:ln>
-          </c:spPr>
-          <c:marker>
-            <c:symbol val="square"/>
-            <c:size val="7"/>
-            <c:spPr>
-              <a:solidFill>
-                <a:prstClr val="black"/>
               </a:solidFill>
               <a:ln>
                 <a:solidFill>
@@ -617,76 +646,153 @@
           </c:marker>
           <c:cat>
             <c:strRef>
-              <c:f>Sheet1!$A$2:$A$6</c:f>
+              <c:f>Sheet1!$A$2:$A$11</c:f>
               <c:strCache>
                 <c:ptCount val="1"/>
                 <c:pt idx="0">
-                  <c:v>Cat</c:v>
+                  <c:v>Category 1</c:v>
                 </c:pt>
               </c:strCache>
             </c:strRef>
           </c:cat>
           <c:val>
             <c:numRef>
-              <c:f>Sheet1!$G$2:$G$6</c:f>
+              <c:f>Sheet1!$F$2:$F$11</c:f>
               <c:numCache>
                 <c:formatCode>General</c:formatCode>
-                <c:ptCount val="5"/>
+                <c:ptCount val="10"/>
                 <c:pt idx="0">
                   <c:v>1</c:v>
                 </c:pt>
               </c:numCache>
             </c:numRef>
           </c:val>
+          <c:smooth val="0"/>
         </c:ser>
-        <c:dLbls/>
+        <c:ser>
+          <c:idx val="5"/>
+          <c:order val="5"/>
+          <c:tx>
+            <c:strRef>
+              <c:f>Sheet1!$G$1</c:f>
+              <c:strCache>
+                <c:ptCount val="1"/>
+                <c:pt idx="0">
+                  <c:v>Forecast Cum Open Delinquent Starts</c:v>
+                </c:pt>
+              </c:strCache>
+            </c:strRef>
+          </c:tx>
+          <c:spPr>
+            <a:ln>
+              <a:solidFill>
+                <a:prstClr val="black"/>
+              </a:solidFill>
+              <a:prstDash val="dash"/>
+            </a:ln>
+          </c:spPr>
+          <c:marker>
+            <c:symbol val="square"/>
+            <c:size val="4"/>
+            <c:spPr>
+              <a:solidFill>
+                <a:prstClr val="black"/>
+              </a:solidFill>
+            </c:spPr>
+          </c:marker>
+          <c:cat>
+            <c:strRef>
+              <c:f>Sheet1!$A$2:$A$11</c:f>
+              <c:strCache>
+                <c:ptCount val="1"/>
+                <c:pt idx="0">
+                  <c:v>Category 1</c:v>
+                </c:pt>
+              </c:strCache>
+            </c:strRef>
+          </c:cat>
+          <c:val>
+            <c:numRef>
+              <c:f>Sheet1!$G$2:$G$11</c:f>
+              <c:numCache>
+                <c:formatCode>General</c:formatCode>
+                <c:ptCount val="10"/>
+                <c:pt idx="0">
+                  <c:v>1</c:v>
+                </c:pt>
+              </c:numCache>
+            </c:numRef>
+          </c:val>
+          <c:smooth val="0"/>
+        </c:ser>
+        <c:dLbls>
+          <c:showLegendKey val="0"/>
+          <c:showVal val="0"/>
+          <c:showCatName val="0"/>
+          <c:showSerName val="0"/>
+          <c:showPercent val="0"/>
+          <c:showBubbleSize val="0"/>
+        </c:dLbls>
         <c:marker val="1"/>
-        <c:axId val="55298688"/>
-        <c:axId val="55325056"/>
+        <c:smooth val="0"/>
+        <c:axId val="31930880"/>
+        <c:axId val="98798400"/>
       </c:lineChart>
       <c:catAx>
-        <c:axId val="55298688"/>
+        <c:axId val="31930880"/>
         <c:scaling>
           <c:orientation val="minMax"/>
         </c:scaling>
+        <c:delete val="0"/>
         <c:axPos val="b"/>
-        <c:numFmt formatCode="General" sourceLinked="1"/>
+        <c:majorTickMark val="out"/>
+        <c:minorTickMark val="none"/>
         <c:tickLblPos val="nextTo"/>
-        <c:crossAx val="55325056"/>
+        <c:crossAx val="98798400"/>
         <c:crosses val="autoZero"/>
         <c:auto val="1"/>
         <c:lblAlgn val="ctr"/>
         <c:lblOffset val="100"/>
+        <c:noMultiLvlLbl val="0"/>
       </c:catAx>
       <c:valAx>
-        <c:axId val="55325056"/>
+        <c:axId val="98798400"/>
         <c:scaling>
           <c:orientation val="minMax"/>
         </c:scaling>
+        <c:delete val="0"/>
         <c:axPos val="l"/>
         <c:majorGridlines/>
         <c:numFmt formatCode="General" sourceLinked="1"/>
+        <c:majorTickMark val="out"/>
+        <c:minorTickMark val="none"/>
         <c:tickLblPos val="nextTo"/>
-        <c:crossAx val="55298688"/>
+        <c:crossAx val="31930880"/>
         <c:crosses val="autoZero"/>
         <c:crossBetween val="between"/>
       </c:valAx>
     </c:plotArea>
     <c:legend>
       <c:legendPos val="r"/>
-      <c:layout>
-        <c:manualLayout>
-          <c:xMode val="edge"/>
-          <c:yMode val="edge"/>
-          <c:x val="0.65963141460765773"/>
-          <c:y val="0.23904122278832807"/>
-          <c:w val="0.33174789573717106"/>
-          <c:h val="0.75476069167824666"/>
-        </c:manualLayout>
-      </c:layout>
+      <c:layout/>
+      <c:overlay val="0"/>
+      <c:txPr>
+        <a:bodyPr/>
+        <a:lstStyle/>
+        <a:p>
+          <a:pPr>
+            <a:defRPr sz="1200">
+              <a:latin typeface="Arial" pitchFamily="34" charset="0"/>
+              <a:cs typeface="Arial" pitchFamily="34" charset="0"/>
+            </a:defRPr>
+          </a:pPr>
+          <a:endParaRPr lang="en-US"/>
+        </a:p>
+      </c:txPr>
     </c:legend>
     <c:plotVisOnly val="1"/>
     <c:dispBlanksAs val="gap"/>
+    <c:showDLblsOverMax val="0"/>
   </c:chart>
   <c:txPr>
     <a:bodyPr/>
@@ -698,19 +804,33 @@
       <a:endParaRPr lang="en-US"/>
     </a:p>
   </c:txPr>
-  <c:externalData r:id="rId1"/>
+  <c:externalData r:id="rId1">
+    <c:autoUpdate val="0"/>
+  </c:externalData>
 </c:chartSpace>
 </file>
 
 <file path=ppt/charts/chart3.xml><?xml version="1.0" encoding="utf-8"?>
 <c:chartSpace xmlns:c="http://schemas.openxmlformats.org/drawingml/2006/chart" xmlns:a="http://schemas.openxmlformats.org/drawingml/2006/main" xmlns:r="http://schemas.openxmlformats.org/officeDocument/2006/relationships">
+  <c:date1904 val="0"/>
   <c:lang val="en-US"/>
+  <c:roundedCorners val="0"/>
+  <mc:AlternateContent xmlns:mc="http://schemas.openxmlformats.org/markup-compatibility/2006">
+    <mc:Choice xmlns:c14="http://schemas.microsoft.com/office/drawing/2007/8/2/chart" Requires="c14">
+      <c14:style val="102"/>
+    </mc:Choice>
+    <mc:Fallback>
+      <c:style val="2"/>
+    </mc:Fallback>
+  </mc:AlternateContent>
   <c:chart>
+    <c:autoTitleDeleted val="0"/>
     <c:plotArea>
       <c:layout/>
       <c:barChart>
         <c:barDir val="col"/>
         <c:grouping val="clustered"/>
+        <c:varyColors val="0"/>
         <c:ser>
           <c:idx val="0"/>
           <c:order val="0"/>
@@ -727,28 +847,37 @@
           </c:tx>
           <c:spPr>
             <a:solidFill>
-              <a:srgbClr val="59A583"/>
+              <a:srgbClr val="73B496"/>
             </a:solidFill>
+            <a:ln>
+              <a:solidFill>
+                <a:srgbClr val="73B496"/>
+              </a:solidFill>
+            </a:ln>
           </c:spPr>
+          <c:invertIfNegative val="0"/>
           <c:cat>
             <c:strRef>
-              <c:f>Sheet1!$A$2:$A$6</c:f>
+              <c:f>Sheet1!$A$2:$A$11</c:f>
               <c:strCache>
                 <c:ptCount val="1"/>
                 <c:pt idx="0">
-                  <c:v>Cat</c:v>
+                  <c:v>Category 1</c:v>
                 </c:pt>
               </c:strCache>
             </c:strRef>
           </c:cat>
           <c:val>
             <c:numRef>
-              <c:f>Sheet1!$B$2:$B$6</c:f>
+              <c:f>Sheet1!$B$2:$B$11</c:f>
               <c:numCache>
                 <c:formatCode>General</c:formatCode>
-                <c:ptCount val="5"/>
+                <c:ptCount val="10"/>
                 <c:pt idx="0">
                   <c:v>1</c:v>
+                </c:pt>
+                <c:pt idx="6">
+                  <c:v>0</c:v>
                 </c:pt>
               </c:numCache>
             </c:numRef>
@@ -759,37 +888,43 @@
           <c:order val="1"/>
           <c:tx>
             <c:strRef>
-              <c:f>Sheet1!$D$1</c:f>
+              <c:f>Sheet1!$C$1</c:f>
               <c:strCache>
                 <c:ptCount val="1"/>
                 <c:pt idx="0">
-                  <c:v>Deliquent Finishes</c:v>
+                  <c:v>Forecast Completed Finishes</c:v>
                 </c:pt>
               </c:strCache>
             </c:strRef>
           </c:tx>
           <c:spPr>
             <a:solidFill>
-              <a:srgbClr val="CD6B57"/>
+              <a:srgbClr val="E0E0E0"/>
             </a:solidFill>
+            <a:ln>
+              <a:solidFill>
+                <a:srgbClr val="E0E0E0"/>
+              </a:solidFill>
+            </a:ln>
           </c:spPr>
+          <c:invertIfNegative val="0"/>
           <c:cat>
             <c:strRef>
-              <c:f>Sheet1!$A$2:$A$6</c:f>
+              <c:f>Sheet1!$A$2:$A$11</c:f>
               <c:strCache>
                 <c:ptCount val="1"/>
                 <c:pt idx="0">
-                  <c:v>Cat</c:v>
+                  <c:v>Category 1</c:v>
                 </c:pt>
               </c:strCache>
             </c:strRef>
           </c:cat>
           <c:val>
             <c:numRef>
-              <c:f>Sheet1!$D$2:$D$6</c:f>
+              <c:f>Sheet1!$C$2:$C$11</c:f>
               <c:numCache>
                 <c:formatCode>General</c:formatCode>
-                <c:ptCount val="5"/>
+                <c:ptCount val="10"/>
                 <c:pt idx="0">
                   <c:v>1</c:v>
                 </c:pt>
@@ -802,37 +937,43 @@
           <c:order val="2"/>
           <c:tx>
             <c:strRef>
-              <c:f>Sheet1!$C$1</c:f>
+              <c:f>Sheet1!$D$1</c:f>
               <c:strCache>
                 <c:ptCount val="1"/>
                 <c:pt idx="0">
-                  <c:v>Forecasted Completed Finishes</c:v>
+                  <c:v>DelinquentFinishes</c:v>
                 </c:pt>
               </c:strCache>
             </c:strRef>
           </c:tx>
           <c:spPr>
             <a:solidFill>
-              <a:srgbClr val="E0E0E0"/>
+              <a:srgbClr val="CD6B57"/>
             </a:solidFill>
+            <a:ln>
+              <a:solidFill>
+                <a:srgbClr val="CD6B57"/>
+              </a:solidFill>
+            </a:ln>
           </c:spPr>
+          <c:invertIfNegative val="0"/>
           <c:cat>
             <c:strRef>
-              <c:f>Sheet1!$A$2:$A$6</c:f>
+              <c:f>Sheet1!$A$2:$A$11</c:f>
               <c:strCache>
                 <c:ptCount val="1"/>
                 <c:pt idx="0">
-                  <c:v>Cat</c:v>
+                  <c:v>Category 1</c:v>
                 </c:pt>
               </c:strCache>
             </c:strRef>
           </c:cat>
           <c:val>
             <c:numRef>
-              <c:f>Sheet1!$C$2:$C$6</c:f>
+              <c:f>Sheet1!$D$2:$D$11</c:f>
               <c:numCache>
                 <c:formatCode>General</c:formatCode>
-                <c:ptCount val="5"/>
+                <c:ptCount val="10"/>
                 <c:pt idx="0">
                   <c:v>1</c:v>
                 </c:pt>
@@ -849,7 +990,7 @@
               <c:strCache>
                 <c:ptCount val="1"/>
                 <c:pt idx="0">
-                  <c:v>Forecasted Delequint Finishes</c:v>
+                  <c:v>Forecast Delinquent Finishes</c:v>
                 </c:pt>
               </c:strCache>
             </c:strRef>
@@ -860,24 +1001,32 @@
                 <a:lumMod val="65000"/>
               </a:schemeClr>
             </a:solidFill>
+            <a:ln>
+              <a:solidFill>
+                <a:schemeClr val="bg1">
+                  <a:lumMod val="65000"/>
+                </a:schemeClr>
+              </a:solidFill>
+            </a:ln>
           </c:spPr>
+          <c:invertIfNegative val="0"/>
           <c:cat>
             <c:strRef>
-              <c:f>Sheet1!$A$2:$A$6</c:f>
+              <c:f>Sheet1!$A$2:$A$11</c:f>
               <c:strCache>
                 <c:ptCount val="1"/>
                 <c:pt idx="0">
-                  <c:v>Cat</c:v>
+                  <c:v>Category 1</c:v>
                 </c:pt>
               </c:strCache>
             </c:strRef>
           </c:cat>
           <c:val>
             <c:numRef>
-              <c:f>Sheet1!$E$2:$E$6</c:f>
+              <c:f>Sheet1!$E$2:$E$11</c:f>
               <c:numCache>
                 <c:formatCode>General</c:formatCode>
-                <c:ptCount val="5"/>
+                <c:ptCount val="10"/>
                 <c:pt idx="0">
                   <c:v>1</c:v>
                 </c:pt>
@@ -885,14 +1034,23 @@
             </c:numRef>
           </c:val>
         </c:ser>
-        <c:dLbls/>
-        <c:axId val="64390656"/>
-        <c:axId val="64392192"/>
+        <c:dLbls>
+          <c:showLegendKey val="0"/>
+          <c:showVal val="0"/>
+          <c:showCatName val="0"/>
+          <c:showSerName val="0"/>
+          <c:showPercent val="0"/>
+          <c:showBubbleSize val="0"/>
+        </c:dLbls>
+        <c:gapWidth val="150"/>
+        <c:axId val="64968192"/>
+        <c:axId val="31583040"/>
       </c:barChart>
       <c:lineChart>
         <c:grouping val="standard"/>
+        <c:varyColors val="0"/>
         <c:ser>
-          <c:idx val="5"/>
+          <c:idx val="4"/>
           <c:order val="4"/>
           <c:tx>
             <c:strRef>
@@ -900,7 +1058,7 @@
               <c:strCache>
                 <c:ptCount val="1"/>
                 <c:pt idx="0">
-                  <c:v>Cum Open Delequient Finishes</c:v>
+                  <c:v>Cum Open Delinquent Finishes</c:v>
                 </c:pt>
               </c:strCache>
             </c:strRef>
@@ -911,83 +1069,13 @@
                 <a:schemeClr val="tx1"/>
               </a:solidFill>
             </a:ln>
-            <a:effectLst>
-              <a:outerShdw blurRad="50800" dist="50800" dir="5400000" algn="ctr" rotWithShape="0">
-                <a:schemeClr val="tx1"/>
-              </a:outerShdw>
-            </a:effectLst>
           </c:spPr>
           <c:marker>
-            <c:symbol val="x"/>
-            <c:size val="7"/>
+            <c:symbol val="square"/>
+            <c:size val="4"/>
             <c:spPr>
               <a:solidFill>
                 <a:schemeClr val="tx1"/>
-              </a:solidFill>
-              <a:ln>
-                <a:solidFill>
-                  <a:schemeClr val="tx1"/>
-                </a:solidFill>
-              </a:ln>
-              <a:effectLst>
-                <a:outerShdw blurRad="50800" dist="50800" dir="5400000" algn="ctr" rotWithShape="0">
-                  <a:schemeClr val="tx1"/>
-                </a:outerShdw>
-              </a:effectLst>
-            </c:spPr>
-          </c:marker>
-          <c:cat>
-            <c:strRef>
-              <c:f>Sheet1!$A$2:$A$6</c:f>
-              <c:strCache>
-                <c:ptCount val="1"/>
-                <c:pt idx="0">
-                  <c:v>Cat</c:v>
-                </c:pt>
-              </c:strCache>
-            </c:strRef>
-          </c:cat>
-          <c:val>
-            <c:numRef>
-              <c:f>Sheet1!$F$2:$F$6</c:f>
-              <c:numCache>
-                <c:formatCode>General</c:formatCode>
-                <c:ptCount val="5"/>
-                <c:pt idx="0">
-                  <c:v>1</c:v>
-                </c:pt>
-              </c:numCache>
-            </c:numRef>
-          </c:val>
-        </c:ser>
-        <c:ser>
-          <c:idx val="4"/>
-          <c:order val="5"/>
-          <c:tx>
-            <c:strRef>
-              <c:f>Sheet1!$G$1</c:f>
-              <c:strCache>
-                <c:ptCount val="1"/>
-                <c:pt idx="0">
-                  <c:v>Forecasted Cum Open Delequeint Finishes</c:v>
-                </c:pt>
-              </c:strCache>
-            </c:strRef>
-          </c:tx>
-          <c:spPr>
-            <a:ln>
-              <a:solidFill>
-                <a:prstClr val="black"/>
-              </a:solidFill>
-              <a:prstDash val="sysDash"/>
-            </a:ln>
-          </c:spPr>
-          <c:marker>
-            <c:symbol val="square"/>
-            <c:size val="7"/>
-            <c:spPr>
-              <a:solidFill>
-                <a:prstClr val="black"/>
               </a:solidFill>
               <a:ln>
                 <a:solidFill>
@@ -998,76 +1086,153 @@
           </c:marker>
           <c:cat>
             <c:strRef>
-              <c:f>Sheet1!$A$2:$A$6</c:f>
+              <c:f>Sheet1!$A$2:$A$11</c:f>
               <c:strCache>
                 <c:ptCount val="1"/>
                 <c:pt idx="0">
-                  <c:v>Cat</c:v>
+                  <c:v>Category 1</c:v>
                 </c:pt>
               </c:strCache>
             </c:strRef>
           </c:cat>
           <c:val>
             <c:numRef>
-              <c:f>Sheet1!$G$2:$G$6</c:f>
+              <c:f>Sheet1!$F$2:$F$11</c:f>
               <c:numCache>
                 <c:formatCode>General</c:formatCode>
-                <c:ptCount val="5"/>
+                <c:ptCount val="10"/>
                 <c:pt idx="0">
                   <c:v>1</c:v>
                 </c:pt>
               </c:numCache>
             </c:numRef>
           </c:val>
+          <c:smooth val="0"/>
         </c:ser>
-        <c:dLbls/>
+        <c:ser>
+          <c:idx val="5"/>
+          <c:order val="5"/>
+          <c:tx>
+            <c:strRef>
+              <c:f>Sheet1!$G$1</c:f>
+              <c:strCache>
+                <c:ptCount val="1"/>
+                <c:pt idx="0">
+                  <c:v>Forecast Cum Open Delinquent Finishes</c:v>
+                </c:pt>
+              </c:strCache>
+            </c:strRef>
+          </c:tx>
+          <c:spPr>
+            <a:ln>
+              <a:solidFill>
+                <a:prstClr val="black"/>
+              </a:solidFill>
+              <a:prstDash val="dash"/>
+            </a:ln>
+          </c:spPr>
+          <c:marker>
+            <c:symbol val="square"/>
+            <c:size val="4"/>
+            <c:spPr>
+              <a:solidFill>
+                <a:prstClr val="black"/>
+              </a:solidFill>
+            </c:spPr>
+          </c:marker>
+          <c:cat>
+            <c:strRef>
+              <c:f>Sheet1!$A$2:$A$11</c:f>
+              <c:strCache>
+                <c:ptCount val="1"/>
+                <c:pt idx="0">
+                  <c:v>Category 1</c:v>
+                </c:pt>
+              </c:strCache>
+            </c:strRef>
+          </c:cat>
+          <c:val>
+            <c:numRef>
+              <c:f>Sheet1!$G$2:$G$11</c:f>
+              <c:numCache>
+                <c:formatCode>General</c:formatCode>
+                <c:ptCount val="10"/>
+                <c:pt idx="0">
+                  <c:v>1</c:v>
+                </c:pt>
+              </c:numCache>
+            </c:numRef>
+          </c:val>
+          <c:smooth val="0"/>
+        </c:ser>
+        <c:dLbls>
+          <c:showLegendKey val="0"/>
+          <c:showVal val="0"/>
+          <c:showCatName val="0"/>
+          <c:showSerName val="0"/>
+          <c:showPercent val="0"/>
+          <c:showBubbleSize val="0"/>
+        </c:dLbls>
         <c:marker val="1"/>
-        <c:axId val="64390656"/>
-        <c:axId val="64392192"/>
+        <c:smooth val="0"/>
+        <c:axId val="64968192"/>
+        <c:axId val="31583040"/>
       </c:lineChart>
       <c:catAx>
-        <c:axId val="64390656"/>
+        <c:axId val="64968192"/>
         <c:scaling>
           <c:orientation val="minMax"/>
         </c:scaling>
+        <c:delete val="0"/>
         <c:axPos val="b"/>
-        <c:numFmt formatCode="General" sourceLinked="1"/>
+        <c:majorTickMark val="out"/>
+        <c:minorTickMark val="none"/>
         <c:tickLblPos val="nextTo"/>
-        <c:crossAx val="64392192"/>
+        <c:crossAx val="31583040"/>
         <c:crosses val="autoZero"/>
         <c:auto val="1"/>
         <c:lblAlgn val="ctr"/>
         <c:lblOffset val="100"/>
+        <c:noMultiLvlLbl val="0"/>
       </c:catAx>
       <c:valAx>
-        <c:axId val="64392192"/>
+        <c:axId val="31583040"/>
         <c:scaling>
           <c:orientation val="minMax"/>
         </c:scaling>
+        <c:delete val="0"/>
         <c:axPos val="l"/>
         <c:majorGridlines/>
         <c:numFmt formatCode="General" sourceLinked="1"/>
+        <c:majorTickMark val="out"/>
+        <c:minorTickMark val="none"/>
         <c:tickLblPos val="nextTo"/>
-        <c:crossAx val="64390656"/>
+        <c:crossAx val="64968192"/>
         <c:crosses val="autoZero"/>
         <c:crossBetween val="between"/>
       </c:valAx>
     </c:plotArea>
     <c:legend>
       <c:legendPos val="r"/>
-      <c:layout>
-        <c:manualLayout>
-          <c:xMode val="edge"/>
-          <c:yMode val="edge"/>
-          <c:x val="0.65963141460765773"/>
-          <c:y val="0.23904122278832807"/>
-          <c:w val="0.33174789573717106"/>
-          <c:h val="0.75476069167824666"/>
-        </c:manualLayout>
-      </c:layout>
+      <c:layout/>
+      <c:overlay val="0"/>
+      <c:txPr>
+        <a:bodyPr/>
+        <a:lstStyle/>
+        <a:p>
+          <a:pPr>
+            <a:defRPr sz="1200">
+              <a:latin typeface="Arial" pitchFamily="34" charset="0"/>
+              <a:cs typeface="Arial" pitchFamily="34" charset="0"/>
+            </a:defRPr>
+          </a:pPr>
+          <a:endParaRPr lang="en-US"/>
+        </a:p>
+      </c:txPr>
     </c:legend>
     <c:plotVisOnly val="1"/>
     <c:dispBlanksAs val="gap"/>
+    <c:showDLblsOverMax val="0"/>
   </c:chart>
   <c:txPr>
     <a:bodyPr/>
@@ -1079,21 +1244,55 @@
       <a:endParaRPr lang="en-US"/>
     </a:p>
   </c:txPr>
-  <c:externalData r:id="rId1"/>
+  <c:externalData r:id="rId1">
+    <c:autoUpdate val="0"/>
+  </c:externalData>
 </c:chartSpace>
 </file>
 
 <file path=ppt/charts/chart4.xml><?xml version="1.0" encoding="utf-8"?>
 <c:chartSpace xmlns:c="http://schemas.openxmlformats.org/drawingml/2006/chart" xmlns:a="http://schemas.openxmlformats.org/drawingml/2006/main" xmlns:r="http://schemas.openxmlformats.org/officeDocument/2006/relationships">
+  <c:date1904 val="0"/>
   <c:lang val="en-US"/>
+  <c:roundedCorners val="0"/>
+  <mc:AlternateContent xmlns:mc="http://schemas.openxmlformats.org/markup-compatibility/2006">
+    <mc:Choice xmlns:c14="http://schemas.microsoft.com/office/drawing/2007/8/2/chart" Requires="c14">
+      <c14:style val="102"/>
+    </mc:Choice>
+    <mc:Fallback>
+      <c:style val="2"/>
+    </mc:Fallback>
+  </mc:AlternateContent>
   <c:chart>
     <c:title>
+      <c:tx>
+        <c:rich>
+          <a:bodyPr/>
+          <a:lstStyle/>
+          <a:p>
+            <a:pPr>
+              <a:defRPr sz="1600">
+                <a:latin typeface="Arial" pitchFamily="34" charset="0"/>
+                <a:cs typeface="Arial" pitchFamily="34" charset="0"/>
+              </a:defRPr>
+            </a:pPr>
+            <a:r>
+              <a:rPr lang="en-US" dirty="0" smtClean="0"/>
+              <a:t>NGJ TM EXT(Baseline Execution Index)</a:t>
+            </a:r>
+            <a:endParaRPr lang="en-US" dirty="0"/>
+          </a:p>
+        </c:rich>
+      </c:tx>
       <c:layout/>
+      <c:overlay val="0"/>
     </c:title>
+    <c:autoTitleDeleted val="0"/>
     <c:plotArea>
       <c:layout/>
       <c:lineChart>
         <c:grouping val="standard"/>
+        <c:varyColors val="0"/>
         <c:ser>
           <c:idx val="0"/>
           <c:order val="0"/>
@@ -1131,7 +1330,7 @@
           </c:marker>
           <c:cat>
             <c:strRef>
-              <c:f>Sheet1!$A$2:$A$5</c:f>
+              <c:f>Sheet1!$A$2:$A$11</c:f>
               <c:strCache>
                 <c:ptCount val="1"/>
                 <c:pt idx="0">
@@ -1142,16 +1341,17 @@
           </c:cat>
           <c:val>
             <c:numRef>
-              <c:f>Sheet1!$B$2:$B$5</c:f>
+              <c:f>Sheet1!$B$2:$B$11</c:f>
               <c:numCache>
                 <c:formatCode>General</c:formatCode>
-                <c:ptCount val="4"/>
+                <c:ptCount val="10"/>
                 <c:pt idx="0">
-                  <c:v>4.3</c:v>
+                  <c:v>0</c:v>
                 </c:pt>
               </c:numCache>
             </c:numRef>
           </c:val>
+          <c:smooth val="0"/>
         </c:ser>
         <c:ser>
           <c:idx val="1"/>
@@ -1190,7 +1390,7 @@
           </c:marker>
           <c:cat>
             <c:strRef>
-              <c:f>Sheet1!$A$2:$A$5</c:f>
+              <c:f>Sheet1!$A$2:$A$11</c:f>
               <c:strCache>
                 <c:ptCount val="1"/>
                 <c:pt idx="0">
@@ -1201,16 +1401,17 @@
           </c:cat>
           <c:val>
             <c:numRef>
-              <c:f>Sheet1!$C$2:$C$5</c:f>
+              <c:f>Sheet1!$C$2:$C$11</c:f>
               <c:numCache>
                 <c:formatCode>General</c:formatCode>
-                <c:ptCount val="4"/>
+                <c:ptCount val="10"/>
                 <c:pt idx="0">
-                  <c:v>2.4</c:v>
+                  <c:v>0</c:v>
                 </c:pt>
               </c:numCache>
             </c:numRef>
           </c:val>
+          <c:smooth val="0"/>
         </c:ser>
         <c:ser>
           <c:idx val="2"/>
@@ -1257,7 +1458,7 @@
           </c:marker>
           <c:cat>
             <c:strRef>
-              <c:f>Sheet1!$A$2:$A$5</c:f>
+              <c:f>Sheet1!$A$2:$A$11</c:f>
               <c:strCache>
                 <c:ptCount val="1"/>
                 <c:pt idx="0">
@@ -1268,16 +1469,17 @@
           </c:cat>
           <c:val>
             <c:numRef>
-              <c:f>Sheet1!$D$2:$D$5</c:f>
+              <c:f>Sheet1!$D$2:$D$11</c:f>
               <c:numCache>
                 <c:formatCode>General</c:formatCode>
-                <c:ptCount val="4"/>
+                <c:ptCount val="10"/>
                 <c:pt idx="0">
-                  <c:v>2</c:v>
+                  <c:v>0</c:v>
                 </c:pt>
               </c:numCache>
             </c:numRef>
           </c:val>
+          <c:smooth val="0"/>
         </c:ser>
         <c:ser>
           <c:idx val="3"/>
@@ -1326,7 +1528,7 @@
           </c:marker>
           <c:cat>
             <c:strRef>
-              <c:f>Sheet1!$A$2:$A$5</c:f>
+              <c:f>Sheet1!$A$2:$A$11</c:f>
               <c:strCache>
                 <c:ptCount val="1"/>
                 <c:pt idx="0">
@@ -1337,50 +1539,84 @@
           </c:cat>
           <c:val>
             <c:numRef>
-              <c:f>Sheet1!$E$2:$E$5</c:f>
+              <c:f>Sheet1!$E$2:$E$11</c:f>
               <c:numCache>
                 <c:formatCode>General</c:formatCode>
-                <c:ptCount val="4"/>
+                <c:ptCount val="10"/>
                 <c:pt idx="0">
-                  <c:v>1</c:v>
+                  <c:v>0</c:v>
                 </c:pt>
               </c:numCache>
             </c:numRef>
           </c:val>
+          <c:smooth val="0"/>
         </c:ser>
-        <c:dLbls/>
+        <c:dLbls>
+          <c:showLegendKey val="0"/>
+          <c:showVal val="0"/>
+          <c:showCatName val="0"/>
+          <c:showSerName val="0"/>
+          <c:showPercent val="0"/>
+          <c:showBubbleSize val="0"/>
+        </c:dLbls>
         <c:marker val="1"/>
-        <c:axId val="73914240"/>
-        <c:axId val="74166272"/>
+        <c:smooth val="0"/>
+        <c:axId val="31475200"/>
+        <c:axId val="98803008"/>
       </c:lineChart>
       <c:catAx>
-        <c:axId val="73914240"/>
+        <c:axId val="31475200"/>
         <c:scaling>
           <c:orientation val="minMax"/>
         </c:scaling>
+        <c:delete val="0"/>
         <c:axPos val="b"/>
         <c:majorTickMark val="none"/>
+        <c:minorTickMark val="none"/>
         <c:tickLblPos val="nextTo"/>
-        <c:crossAx val="74166272"/>
+        <c:crossAx val="98803008"/>
         <c:crosses val="autoZero"/>
         <c:auto val="1"/>
         <c:lblAlgn val="ctr"/>
         <c:lblOffset val="100"/>
+        <c:noMultiLvlLbl val="0"/>
       </c:catAx>
       <c:valAx>
-        <c:axId val="74166272"/>
+        <c:axId val="98803008"/>
         <c:scaling>
           <c:orientation val="minMax"/>
         </c:scaling>
+        <c:delete val="0"/>
         <c:axPos val="l"/>
         <c:majorGridlines/>
         <c:title>
+          <c:tx>
+            <c:rich>
+              <a:bodyPr/>
+              <a:lstStyle/>
+              <a:p>
+                <a:pPr>
+                  <a:defRPr sz="1600">
+                    <a:latin typeface="Arial" pitchFamily="34" charset="0"/>
+                    <a:cs typeface="Arial" pitchFamily="34" charset="0"/>
+                  </a:defRPr>
+                </a:pPr>
+                <a:r>
+                  <a:rPr lang="en-US" dirty="0" smtClean="0"/>
+                  <a:t>Task Count</a:t>
+                </a:r>
+                <a:endParaRPr lang="en-US" dirty="0"/>
+              </a:p>
+            </c:rich>
+          </c:tx>
           <c:layout/>
+          <c:overlay val="0"/>
         </c:title>
         <c:numFmt formatCode="General" sourceLinked="1"/>
         <c:majorTickMark val="none"/>
+        <c:minorTickMark val="none"/>
         <c:tickLblPos val="nextTo"/>
-        <c:crossAx val="73914240"/>
+        <c:crossAx val="31475200"/>
         <c:crosses val="autoZero"/>
         <c:crossBetween val="between"/>
       </c:valAx>
@@ -1389,9 +1625,24 @@
         <c:showVertBorder val="1"/>
         <c:showOutline val="1"/>
         <c:showKeys val="1"/>
+        <c:txPr>
+          <a:bodyPr/>
+          <a:lstStyle/>
+          <a:p>
+            <a:pPr rtl="0">
+              <a:defRPr sz="1100">
+                <a:latin typeface="Arial" pitchFamily="34" charset="0"/>
+                <a:cs typeface="Arial" pitchFamily="34" charset="0"/>
+              </a:defRPr>
+            </a:pPr>
+            <a:endParaRPr lang="en-US"/>
+          </a:p>
+        </c:txPr>
       </c:dTable>
     </c:plotArea>
     <c:plotVisOnly val="1"/>
+    <c:dispBlanksAs val="gap"/>
+    <c:showDLblsOverMax val="0"/>
   </c:chart>
   <c:txPr>
     <a:bodyPr/>
@@ -1403,7 +1654,9 @@
       <a:endParaRPr lang="en-US"/>
     </a:p>
   </c:txPr>
-  <c:externalData r:id="rId1"/>
+  <c:externalData r:id="rId1">
+    <c:autoUpdate val="0"/>
+  </c:externalData>
 </c:chartSpace>
 </file>
 
@@ -1612,7 +1865,7 @@
     </p:spTree>
     <p:extLst>
       <p:ext uri="{BB962C8B-B14F-4D97-AF65-F5344CB8AC3E}">
-        <p14:creationId xmlns:p14="http://schemas.microsoft.com/office/powerpoint/2010/main" xmlns="" val="3029235075"/>
+        <p14:creationId xmlns:p14="http://schemas.microsoft.com/office/powerpoint/2010/main" val="3029235075"/>
       </p:ext>
     </p:extLst>
   </p:cSld>
@@ -1935,7 +2188,7 @@
     </p:spTree>
     <p:extLst>
       <p:ext uri="{BB962C8B-B14F-4D97-AF65-F5344CB8AC3E}">
-        <p14:creationId xmlns:p14="http://schemas.microsoft.com/office/powerpoint/2010/main" xmlns="" val="1174054565"/>
+        <p14:creationId xmlns:p14="http://schemas.microsoft.com/office/powerpoint/2010/main" val="1174054565"/>
       </p:ext>
     </p:extLst>
   </p:cSld>
@@ -3535,7 +3788,7 @@
           <a:blip r:embed="rId2" cstate="print">
             <a:extLst>
               <a:ext uri="{28A0092B-C50C-407E-A947-70E740481C1C}">
-                <a14:useLocalDpi xmlns:a14="http://schemas.microsoft.com/office/drawing/2010/main" xmlns="" val="0"/>
+                <a14:useLocalDpi xmlns:a14="http://schemas.microsoft.com/office/drawing/2010/main" val="0"/>
               </a:ext>
             </a:extLst>
           </a:blip>
@@ -3558,14 +3811,14 @@
           </a:ln>
           <a:extLst>
             <a:ext uri="{909E8E84-426E-40DD-AFC4-6F175D3DCCD1}">
-              <a14:hiddenFill xmlns:a14="http://schemas.microsoft.com/office/drawing/2010/main" xmlns="">
+              <a14:hiddenFill xmlns:a14="http://schemas.microsoft.com/office/drawing/2010/main">
                 <a:solidFill>
                   <a:schemeClr val="accent1"/>
                 </a:solidFill>
               </a14:hiddenFill>
             </a:ext>
             <a:ext uri="{91240B29-F687-4F45-9708-019B960494DF}">
-              <a14:hiddenLine xmlns:a14="http://schemas.microsoft.com/office/drawing/2010/main" xmlns="" w="9525">
+              <a14:hiddenLine xmlns:a14="http://schemas.microsoft.com/office/drawing/2010/main" w="9525">
                 <a:solidFill>
                   <a:schemeClr val="tx1"/>
                 </a:solidFill>
@@ -3589,7 +3842,7 @@
           <a:blip r:embed="rId3" cstate="print">
             <a:extLst>
               <a:ext uri="{28A0092B-C50C-407E-A947-70E740481C1C}">
-                <a14:useLocalDpi xmlns:a14="http://schemas.microsoft.com/office/drawing/2010/main" xmlns="" val="0"/>
+                <a14:useLocalDpi xmlns:a14="http://schemas.microsoft.com/office/drawing/2010/main" val="0"/>
               </a:ext>
             </a:extLst>
           </a:blip>
@@ -3612,14 +3865,14 @@
           </a:ln>
           <a:extLst>
             <a:ext uri="{909E8E84-426E-40DD-AFC4-6F175D3DCCD1}">
-              <a14:hiddenFill xmlns:a14="http://schemas.microsoft.com/office/drawing/2010/main" xmlns="">
+              <a14:hiddenFill xmlns:a14="http://schemas.microsoft.com/office/drawing/2010/main">
                 <a:solidFill>
                   <a:schemeClr val="accent1"/>
                 </a:solidFill>
               </a14:hiddenFill>
             </a:ext>
             <a:ext uri="{91240B29-F687-4F45-9708-019B960494DF}">
-              <a14:hiddenLine xmlns:a14="http://schemas.microsoft.com/office/drawing/2010/main" xmlns="" w="9525">
+              <a14:hiddenLine xmlns:a14="http://schemas.microsoft.com/office/drawing/2010/main" w="9525">
                 <a:solidFill>
                   <a:schemeClr val="tx1"/>
                 </a:solidFill>
@@ -3694,6 +3947,11 @@
           </p:cNvGraphicFramePr>
           <p:nvPr>
             <p:ph idx="1"/>
+            <p:extLst>
+              <p:ext uri="{D42A27DB-BD31-4B8C-83A1-F6EECF244321}">
+                <p14:modId xmlns:p14="http://schemas.microsoft.com/office/powerpoint/2010/main" val="206068729"/>
+              </p:ext>
+            </p:extLst>
           </p:nvPr>
         </p:nvGraphicFramePr>
         <p:xfrm>
@@ -3796,7 +4054,7 @@
     </p:spTree>
     <p:extLst>
       <p:ext uri="{BB962C8B-B14F-4D97-AF65-F5344CB8AC3E}">
-        <p14:creationId xmlns:p14="http://schemas.microsoft.com/office/powerpoint/2010/main" xmlns="" val="623995057"/>
+        <p14:creationId xmlns:p14="http://schemas.microsoft.com/office/powerpoint/2010/main" val="623995057"/>
       </p:ext>
     </p:extLst>
   </p:cSld>
@@ -3858,7 +4116,7 @@
         </p:nvSpPr>
         <p:spPr>
           <a:xfrm>
-            <a:off x="323849" y="1504949"/>
+            <a:off x="371474" y="1704974"/>
             <a:ext cx="8315325" cy="4581525"/>
           </a:xfrm>
         </p:spPr>
@@ -3903,7 +4161,7 @@
     </p:spTree>
     <p:extLst>
       <p:ext uri="{BB962C8B-B14F-4D97-AF65-F5344CB8AC3E}">
-        <p14:creationId xmlns:p14="http://schemas.microsoft.com/office/powerpoint/2010/main" xmlns="" val="4106593142"/>
+        <p14:creationId xmlns:p14="http://schemas.microsoft.com/office/powerpoint/2010/main" val="4106593142"/>
       </p:ext>
     </p:extLst>
   </p:cSld>
@@ -3953,20 +4211,16 @@
           <a:lstStyle/>
           <a:p>
             <a:r>
-              <a:rPr lang="en-US" dirty="0"/>
-              <a:t>Driving </a:t>
+              <a:rPr lang="en-US" dirty="0" smtClean="0"/>
+              <a:t>Driving Path</a:t>
             </a:r>
-            <a:r>
-              <a:rPr lang="en-US" dirty="0" smtClean="0"/>
-              <a:t>Path</a:t>
-            </a:r>
-            <a:endParaRPr lang="en-US" dirty="0"/>
+            <a:endParaRPr dirty="0"/>
           </a:p>
         </p:txBody>
       </p:sp>
       <p:sp>
         <p:nvSpPr>
-          <p:cNvPr id="5" name="Content Placeholder 4"/>
+          <p:cNvPr id="6" name="Content Placeholder 5"/>
           <p:cNvSpPr>
             <a:spLocks noGrp="1"/>
           </p:cNvSpPr>
@@ -3992,14 +4246,14 @@
           <p:nvPr>
             <p:extLst>
               <p:ext uri="{D42A27DB-BD31-4B8C-83A1-F6EECF244321}">
-                <p14:modId xmlns:p14="http://schemas.microsoft.com/office/powerpoint/2010/main" xmlns="" val="3618147038"/>
+                <p14:modId xmlns:p14="http://schemas.microsoft.com/office/powerpoint/2010/main" val="1184730788"/>
               </p:ext>
             </p:extLst>
           </p:nvPr>
         </p:nvGraphicFramePr>
         <p:xfrm>
           <a:off x="142875" y="1303317"/>
-          <a:ext cx="8857632" cy="213360"/>
+          <a:ext cx="8857632" cy="422316"/>
         </p:xfrm>
         <a:graphic>
           <a:graphicData uri="http://schemas.openxmlformats.org/drawingml/2006/table">
@@ -4012,9 +4266,9 @@
                 <a:gridCol w="2733675"/>
                 <a:gridCol w="2638425"/>
                 <a:gridCol w="542925"/>
-                <a:gridCol w="1047750"/>
-                <a:gridCol w="733425"/>
-                <a:gridCol w="789957"/>
+                <a:gridCol w="676275"/>
+                <a:gridCol w="866775"/>
+                <a:gridCol w="1028082"/>
               </a:tblGrid>
               <a:tr h="211158">
                 <a:tc>
@@ -4023,13 +4277,13 @@
                     <a:lstStyle/>
                     <a:p>
                       <a:r>
-                        <a:rPr lang="en-US" sz="800" b="0" dirty="0" smtClean="0">
+                        <a:rPr lang="en-US" sz="700" b="0" dirty="0" smtClean="0">
                           <a:latin typeface="Arial" pitchFamily="34" charset="0"/>
                           <a:cs typeface="Arial" pitchFamily="34" charset="0"/>
                         </a:rPr>
                         <a:t>ID</a:t>
                       </a:r>
-                      <a:endParaRPr lang="en-US" sz="800" b="0" dirty="0">
+                      <a:endParaRPr lang="en-US" sz="700" b="0" dirty="0">
                         <a:latin typeface="Arial" pitchFamily="34" charset="0"/>
                         <a:cs typeface="Arial" pitchFamily="34" charset="0"/>
                       </a:endParaRPr>
@@ -4043,13 +4297,13 @@
                     <a:lstStyle/>
                     <a:p>
                       <a:r>
-                        <a:rPr lang="en-US" sz="800" b="0" dirty="0" smtClean="0">
+                        <a:rPr lang="en-US" sz="700" b="0" dirty="0" smtClean="0">
                           <a:latin typeface="Arial" pitchFamily="34" charset="0"/>
                           <a:cs typeface="Arial" pitchFamily="34" charset="0"/>
                         </a:rPr>
                         <a:t>Unique ID</a:t>
                       </a:r>
-                      <a:endParaRPr lang="en-US" sz="800" b="0" dirty="0">
+                      <a:endParaRPr lang="en-US" sz="700" b="0" dirty="0">
                         <a:latin typeface="Arial" pitchFamily="34" charset="0"/>
                         <a:cs typeface="Arial" pitchFamily="34" charset="0"/>
                       </a:endParaRPr>
@@ -4063,13 +4317,13 @@
                     <a:lstStyle/>
                     <a:p>
                       <a:r>
-                        <a:rPr lang="en-US" sz="800" b="0" dirty="0" smtClean="0">
+                        <a:rPr lang="en-US" sz="700" b="0" dirty="0" smtClean="0">
                           <a:latin typeface="Arial" pitchFamily="34" charset="0"/>
                           <a:cs typeface="Arial" pitchFamily="34" charset="0"/>
                         </a:rPr>
                         <a:t>Task Name</a:t>
                       </a:r>
-                      <a:endParaRPr lang="en-US" sz="800" b="0" dirty="0">
+                      <a:endParaRPr lang="en-US" sz="700" b="0" dirty="0">
                         <a:latin typeface="Arial" pitchFamily="34" charset="0"/>
                         <a:cs typeface="Arial" pitchFamily="34" charset="0"/>
                       </a:endParaRPr>
@@ -4083,13 +4337,13 @@
                     <a:lstStyle/>
                     <a:p>
                       <a:r>
-                        <a:rPr lang="en-US" sz="800" b="0" dirty="0" err="1" smtClean="0">
+                        <a:rPr lang="en-US" sz="700" b="0" dirty="0" err="1" smtClean="0">
                           <a:latin typeface="Arial" pitchFamily="34" charset="0"/>
                           <a:cs typeface="Arial" pitchFamily="34" charset="0"/>
                         </a:rPr>
                         <a:t>Dur</a:t>
                       </a:r>
-                      <a:endParaRPr lang="en-US" sz="800" b="0" dirty="0">
+                      <a:endParaRPr lang="en-US" sz="700" b="0" dirty="0">
                         <a:latin typeface="Arial" pitchFamily="34" charset="0"/>
                         <a:cs typeface="Arial" pitchFamily="34" charset="0"/>
                       </a:endParaRPr>
@@ -4103,13 +4357,13 @@
                     <a:lstStyle/>
                     <a:p>
                       <a:r>
-                        <a:rPr lang="en-US" sz="800" b="0" dirty="0" smtClean="0">
+                        <a:rPr lang="en-US" sz="700" b="0" dirty="0" smtClean="0">
                           <a:latin typeface="Arial" pitchFamily="34" charset="0"/>
                           <a:cs typeface="Arial" pitchFamily="34" charset="0"/>
                         </a:rPr>
                         <a:t>Predecessor</a:t>
                       </a:r>
-                      <a:endParaRPr lang="en-US" sz="800" b="0" dirty="0">
+                      <a:endParaRPr lang="en-US" sz="700" b="0" dirty="0">
                         <a:latin typeface="Arial" pitchFamily="34" charset="0"/>
                         <a:cs typeface="Arial" pitchFamily="34" charset="0"/>
                       </a:endParaRPr>
@@ -4123,13 +4377,13 @@
                     <a:lstStyle/>
                     <a:p>
                       <a:r>
-                        <a:rPr lang="en-US" sz="800" b="0" dirty="0" smtClean="0">
+                        <a:rPr lang="en-US" sz="700" b="0" dirty="0" smtClean="0">
                           <a:latin typeface="Arial" pitchFamily="34" charset="0"/>
                           <a:cs typeface="Arial" pitchFamily="34" charset="0"/>
                         </a:rPr>
                         <a:t>Start</a:t>
                       </a:r>
-                      <a:endParaRPr lang="en-US" sz="800" b="0" dirty="0">
+                      <a:endParaRPr lang="en-US" sz="700" b="0" dirty="0">
                         <a:latin typeface="Arial" pitchFamily="34" charset="0"/>
                         <a:cs typeface="Arial" pitchFamily="34" charset="0"/>
                       </a:endParaRPr>
@@ -4143,13 +4397,181 @@
                     <a:lstStyle/>
                     <a:p>
                       <a:r>
-                        <a:rPr lang="en-US" sz="800" b="0" dirty="0" smtClean="0">
+                        <a:rPr lang="en-US" sz="700" b="0" dirty="0" smtClean="0">
                           <a:latin typeface="Arial" pitchFamily="34" charset="0"/>
                           <a:cs typeface="Arial" pitchFamily="34" charset="0"/>
                         </a:rPr>
                         <a:t>Fin</a:t>
                       </a:r>
-                      <a:endParaRPr lang="en-US" sz="800" b="0" dirty="0">
+                      <a:endParaRPr lang="en-US" sz="700" b="0" dirty="0">
+                        <a:latin typeface="Arial" pitchFamily="34" charset="0"/>
+                        <a:cs typeface="Arial" pitchFamily="34" charset="0"/>
+                      </a:endParaRPr>
+                    </a:p>
+                  </a:txBody>
+                  <a:tcPr marL="45720" marR="45720"/>
+                </a:tc>
+              </a:tr>
+              <a:tr h="211158">
+                <a:tc>
+                  <a:txBody>
+                    <a:bodyPr/>
+                    <a:lstStyle/>
+                    <a:p>
+                      <a:r>
+                        <a:rPr lang="en-US" sz="700" b="0" dirty="0" smtClean="0">
+                          <a:latin typeface="Arial" pitchFamily="34" charset="0"/>
+                          <a:cs typeface="Arial" pitchFamily="34" charset="0"/>
+                        </a:rPr>
+                        <a:t>NA</a:t>
+                      </a:r>
+                      <a:endParaRPr lang="en-US" sz="700" b="0" dirty="0">
+                        <a:latin typeface="Arial" pitchFamily="34" charset="0"/>
+                        <a:cs typeface="Arial" pitchFamily="34" charset="0"/>
+                      </a:endParaRPr>
+                    </a:p>
+                  </a:txBody>
+                  <a:tcPr marL="45720" marR="45720"/>
+                </a:tc>
+                <a:tc>
+                  <a:txBody>
+                    <a:bodyPr/>
+                    <a:lstStyle/>
+                    <a:p>
+                      <a:pPr marL="0" marR="0" indent="0" algn="l" defTabSz="914400" rtl="0" eaLnBrk="1" fontAlgn="auto" latinLnBrk="0" hangingPunct="1">
+                        <a:lnSpc>
+                          <a:spcPct val="100000"/>
+                        </a:lnSpc>
+                        <a:spcBef>
+                          <a:spcPts val="0"/>
+                        </a:spcBef>
+                        <a:spcAft>
+                          <a:spcPts val="0"/>
+                        </a:spcAft>
+                        <a:buClrTx/>
+                        <a:buSzTx/>
+                        <a:buFontTx/>
+                        <a:buNone/>
+                        <a:tabLst/>
+                        <a:defRPr/>
+                      </a:pPr>
+                      <a:r>
+                        <a:rPr lang="en-US" sz="500" b="0" dirty="0" smtClean="0">
+                          <a:latin typeface="Arial" pitchFamily="34" charset="0"/>
+                          <a:cs typeface="Arial" pitchFamily="34" charset="0"/>
+                        </a:rPr>
+                        <a:t>NA</a:t>
+                      </a:r>
+                    </a:p>
+                  </a:txBody>
+                  <a:tcPr marL="45720" marR="45720"/>
+                </a:tc>
+                <a:tc>
+                  <a:txBody>
+                    <a:bodyPr/>
+                    <a:lstStyle/>
+                    <a:p>
+                      <a:pPr marL="0" marR="0" indent="0" algn="l" defTabSz="914400" rtl="0" eaLnBrk="1" fontAlgn="auto" latinLnBrk="0" hangingPunct="1">
+                        <a:lnSpc>
+                          <a:spcPct val="100000"/>
+                        </a:lnSpc>
+                        <a:spcBef>
+                          <a:spcPts val="0"/>
+                        </a:spcBef>
+                        <a:spcAft>
+                          <a:spcPts val="0"/>
+                        </a:spcAft>
+                        <a:buClrTx/>
+                        <a:buSzTx/>
+                        <a:buFontTx/>
+                        <a:buNone/>
+                        <a:tabLst/>
+                        <a:defRPr/>
+                      </a:pPr>
+                      <a:r>
+                        <a:rPr lang="en-US" sz="700" b="0" dirty="0" smtClean="0">
+                          <a:latin typeface="Arial" pitchFamily="34" charset="0"/>
+                          <a:cs typeface="Arial" pitchFamily="34" charset="0"/>
+                        </a:rPr>
+                        <a:t>NA</a:t>
+                      </a:r>
+                    </a:p>
+                  </a:txBody>
+                  <a:tcPr marL="45720" marR="45720"/>
+                </a:tc>
+                <a:tc>
+                  <a:txBody>
+                    <a:bodyPr/>
+                    <a:lstStyle/>
+                    <a:p>
+                      <a:r>
+                        <a:rPr lang="en-US" sz="700" b="0" dirty="0" smtClean="0">
+                          <a:latin typeface="Arial" pitchFamily="34" charset="0"/>
+                          <a:cs typeface="Arial" pitchFamily="34" charset="0"/>
+                        </a:rPr>
+                        <a:t>NA</a:t>
+                      </a:r>
+                      <a:endParaRPr lang="en-US" sz="700" b="0" dirty="0">
+                        <a:latin typeface="Arial" pitchFamily="34" charset="0"/>
+                        <a:cs typeface="Arial" pitchFamily="34" charset="0"/>
+                      </a:endParaRPr>
+                    </a:p>
+                  </a:txBody>
+                  <a:tcPr marL="45720" marR="45720"/>
+                </a:tc>
+                <a:tc>
+                  <a:txBody>
+                    <a:bodyPr/>
+                    <a:lstStyle/>
+                    <a:p>
+                      <a:r>
+                        <a:rPr lang="en-US" sz="700" b="0" dirty="0" smtClean="0">
+                          <a:latin typeface="Arial" pitchFamily="34" charset="0"/>
+                          <a:cs typeface="Arial" pitchFamily="34" charset="0"/>
+                        </a:rPr>
+                        <a:t>NA</a:t>
+                      </a:r>
+                      <a:endParaRPr lang="en-US" sz="700" b="0" dirty="0">
+                        <a:latin typeface="Arial" pitchFamily="34" charset="0"/>
+                        <a:cs typeface="Arial" pitchFamily="34" charset="0"/>
+                      </a:endParaRPr>
+                    </a:p>
+                  </a:txBody>
+                  <a:tcPr marL="45720" marR="45720"/>
+                </a:tc>
+                <a:tc>
+                  <a:txBody>
+                    <a:bodyPr/>
+                    <a:lstStyle/>
+                    <a:p>
+                      <a:r>
+                        <a:rPr lang="en-US" sz="700" b="0" dirty="0" smtClean="0">
+                          <a:latin typeface="Arial" pitchFamily="34" charset="0"/>
+                          <a:cs typeface="Arial" pitchFamily="34" charset="0"/>
+                        </a:rPr>
+                        <a:t>NA</a:t>
+                      </a:r>
+                      <a:endParaRPr lang="en-US" sz="700" b="0" dirty="0">
+                        <a:latin typeface="Arial" pitchFamily="34" charset="0"/>
+                        <a:cs typeface="Arial" pitchFamily="34" charset="0"/>
+                      </a:endParaRPr>
+                    </a:p>
+                  </a:txBody>
+                  <a:tcPr marL="45720" marR="45720"/>
+                </a:tc>
+                <a:tc>
+                  <a:txBody>
+                    <a:bodyPr/>
+                    <a:lstStyle/>
+                    <a:p>
+                      <a:r>
+                        <a:rPr lang="en-US" sz="700" b="0" dirty="0" smtClean="0">
+                          <a:latin typeface="Arial" pitchFamily="34" charset="0"/>
+                          <a:cs typeface="Arial" pitchFamily="34" charset="0"/>
+                        </a:rPr>
+                        <a:t>NA</a:t>
+                      </a:r>
+                      <a:endParaRPr lang="en-US" sz="700" b="0" dirty="0">
                         <a:latin typeface="Arial" pitchFamily="34" charset="0"/>
                         <a:cs typeface="Arial" pitchFamily="34" charset="0"/>
                       </a:endParaRPr>
@@ -4202,7 +4624,7 @@
     </p:spTree>
     <p:extLst>
       <p:ext uri="{BB962C8B-B14F-4D97-AF65-F5344CB8AC3E}">
-        <p14:creationId xmlns:p14="http://schemas.microsoft.com/office/powerpoint/2010/main" xmlns="" val="325862024"/>
+        <p14:creationId xmlns:p14="http://schemas.microsoft.com/office/powerpoint/2010/main" val="325862024"/>
       </p:ext>
     </p:extLst>
   </p:cSld>
@@ -4289,22 +4711,15 @@
           <a:p>
             <a:r>
               <a:rPr lang="en-US" dirty="0" smtClean="0"/>
-              <a:t>Bullet1</a:t>
+              <a:t>None this month</a:t>
             </a:r>
-          </a:p>
-          <a:p>
-            <a:r>
-              <a:rPr lang="en-US" dirty="0" smtClean="0"/>
-              <a:t>Bullet2</a:t>
-            </a:r>
-            <a:endParaRPr lang="en-US" dirty="0"/>
           </a:p>
         </p:txBody>
       </p:sp>
     </p:spTree>
     <p:extLst>
       <p:ext uri="{BB962C8B-B14F-4D97-AF65-F5344CB8AC3E}">
-        <p14:creationId xmlns:p14="http://schemas.microsoft.com/office/powerpoint/2010/main" xmlns="" val="2878378399"/>
+        <p14:creationId xmlns:p14="http://schemas.microsoft.com/office/powerpoint/2010/main" val="2878378399"/>
       </p:ext>
     </p:extLst>
   </p:cSld>
@@ -4367,22 +4782,21 @@
       </p:sp>
       <p:graphicFrame>
         <p:nvGraphicFramePr>
-          <p:cNvPr id="6" name="Content Placeholder 5"/>
+          <p:cNvPr id="8" name="Content Placeholder 5"/>
           <p:cNvGraphicFramePr>
-            <a:graphicFrameLocks noGrp="1"/>
+            <a:graphicFrameLocks/>
           </p:cNvGraphicFramePr>
           <p:nvPr>
-            <p:ph idx="1"/>
             <p:extLst>
               <p:ext uri="{D42A27DB-BD31-4B8C-83A1-F6EECF244321}">
-                <p14:modId xmlns:p14="http://schemas.microsoft.com/office/powerpoint/2010/main" xmlns="" val="2402396504"/>
+                <p14:modId xmlns:p14="http://schemas.microsoft.com/office/powerpoint/2010/main" val="329279912"/>
               </p:ext>
             </p:extLst>
           </p:nvPr>
         </p:nvGraphicFramePr>
         <p:xfrm>
-          <a:off x="211776" y="1531917"/>
-          <a:ext cx="8839195" cy="235941"/>
+          <a:off x="211776" y="1246167"/>
+          <a:ext cx="8839195" cy="495021"/>
         </p:xfrm>
         <a:graphic>
           <a:graphicData uri="http://schemas.openxmlformats.org/drawingml/2006/table">
@@ -4391,21 +4805,21 @@
                 <a:tableStyleId>{5C22544A-7EE6-4342-B048-85BDC9FD1C3A}</a:tableStyleId>
               </a:tblPr>
               <a:tblGrid>
-                <a:gridCol w="405740"/>
-                <a:gridCol w="344385"/>
-                <a:gridCol w="1852550"/>
-                <a:gridCol w="308759"/>
-                <a:gridCol w="475013"/>
-                <a:gridCol w="510639"/>
-                <a:gridCol w="581891"/>
-                <a:gridCol w="629392"/>
-                <a:gridCol w="403761"/>
-                <a:gridCol w="356509"/>
-                <a:gridCol w="654338"/>
-                <a:gridCol w="829828"/>
-                <a:gridCol w="415637"/>
-                <a:gridCol w="533528"/>
-                <a:gridCol w="537225"/>
+                <a:gridCol w="1521774"/>
+                <a:gridCol w="876300"/>
+                <a:gridCol w="2085975"/>
+                <a:gridCol w="371475"/>
+                <a:gridCol w="361950"/>
+                <a:gridCol w="400050"/>
+                <a:gridCol w="352425"/>
+                <a:gridCol w="352425"/>
+                <a:gridCol w="381000"/>
+                <a:gridCol w="323850"/>
+                <a:gridCol w="428625"/>
+                <a:gridCol w="476250"/>
+                <a:gridCol w="276225"/>
+                <a:gridCol w="314325"/>
+                <a:gridCol w="316546"/>
               </a:tblGrid>
               <a:tr h="235941">
                 <a:tc>
@@ -4414,7 +4828,7 @@
                     <a:lstStyle/>
                     <a:p>
                       <a:r>
-                        <a:rPr lang="en-US" sz="900" b="0" i="0" kern="1200" baseline="0" dirty="0" smtClean="0">
+                        <a:rPr lang="en-US" sz="700" b="0" i="0" kern="1200" baseline="0" dirty="0" smtClean="0">
                           <a:solidFill>
                             <a:schemeClr val="lt1"/>
                           </a:solidFill>
@@ -4425,7 +4839,7 @@
                         </a:rPr>
                         <a:t>UID</a:t>
                       </a:r>
-                      <a:endParaRPr lang="en-US" sz="900" baseline="0" dirty="0">
+                      <a:endParaRPr lang="en-US" sz="700" baseline="0" dirty="0">
                         <a:latin typeface="Arial" pitchFamily="34" charset="0"/>
                         <a:cs typeface="Arial" pitchFamily="34" charset="0"/>
                       </a:endParaRPr>
@@ -4439,7 +4853,7 @@
                     <a:lstStyle/>
                     <a:p>
                       <a:r>
-                        <a:rPr lang="en-US" sz="900" b="0" i="0" kern="1200" baseline="0" dirty="0" smtClean="0">
+                        <a:rPr lang="en-US" sz="700" b="0" i="0" kern="1200" baseline="0" dirty="0" smtClean="0">
                           <a:solidFill>
                             <a:schemeClr val="lt1"/>
                           </a:solidFill>
@@ -4450,7 +4864,7 @@
                         </a:rPr>
                         <a:t>CA </a:t>
                       </a:r>
-                      <a:endParaRPr lang="en-US" sz="900" baseline="0" dirty="0">
+                      <a:endParaRPr lang="en-US" sz="700" baseline="0" dirty="0">
                         <a:latin typeface="Arial" pitchFamily="34" charset="0"/>
                         <a:cs typeface="Arial" pitchFamily="34" charset="0"/>
                       </a:endParaRPr>
@@ -4464,13 +4878,13 @@
                     <a:lstStyle/>
                     <a:p>
                       <a:r>
-                        <a:rPr lang="en-US" sz="900" b="0" baseline="0" dirty="0" smtClean="0">
+                        <a:rPr lang="en-US" sz="700" b="0" baseline="0" dirty="0" smtClean="0">
                           <a:latin typeface="Arial" pitchFamily="34" charset="0"/>
                           <a:cs typeface="Arial" pitchFamily="34" charset="0"/>
                         </a:rPr>
                         <a:t>TASK NAME</a:t>
                       </a:r>
-                      <a:endParaRPr lang="en-US" sz="900" b="0" baseline="0" dirty="0">
+                      <a:endParaRPr lang="en-US" sz="700" b="0" baseline="0" dirty="0">
                         <a:latin typeface="Arial" pitchFamily="34" charset="0"/>
                         <a:cs typeface="Arial" pitchFamily="34" charset="0"/>
                       </a:endParaRPr>
@@ -4484,7 +4898,7 @@
                     <a:lstStyle/>
                     <a:p>
                       <a:r>
-                        <a:rPr lang="en-US" sz="900" b="0" i="0" kern="1200" baseline="0" dirty="0" smtClean="0">
+                        <a:rPr lang="en-US" sz="700" b="0" i="0" kern="1200" baseline="0" dirty="0" smtClean="0">
                           <a:solidFill>
                             <a:schemeClr val="lt1"/>
                           </a:solidFill>
@@ -4495,7 +4909,7 @@
                         </a:rPr>
                         <a:t>TS </a:t>
                       </a:r>
-                      <a:endParaRPr lang="en-US" sz="900" baseline="0" dirty="0">
+                      <a:endParaRPr lang="en-US" sz="700" baseline="0" dirty="0">
                         <a:latin typeface="Arial" pitchFamily="34" charset="0"/>
                         <a:cs typeface="Arial" pitchFamily="34" charset="0"/>
                       </a:endParaRPr>
@@ -4509,7 +4923,7 @@
                     <a:lstStyle/>
                     <a:p>
                       <a:r>
-                        <a:rPr lang="en-US" sz="900" b="0" i="0" kern="1200" baseline="0" dirty="0" smtClean="0">
+                        <a:rPr lang="en-US" sz="700" b="0" i="0" kern="1200" baseline="0" dirty="0" smtClean="0">
                           <a:solidFill>
                             <a:schemeClr val="lt1"/>
                           </a:solidFill>
@@ -4520,7 +4934,7 @@
                         </a:rPr>
                         <a:t>Start</a:t>
                       </a:r>
-                      <a:endParaRPr lang="en-US" sz="900" baseline="0" dirty="0">
+                      <a:endParaRPr lang="en-US" sz="700" baseline="0" dirty="0">
                         <a:latin typeface="Arial" pitchFamily="34" charset="0"/>
                         <a:cs typeface="Arial" pitchFamily="34" charset="0"/>
                       </a:endParaRPr>
@@ -4534,7 +4948,7 @@
                     <a:lstStyle/>
                     <a:p>
                       <a:r>
-                        <a:rPr lang="en-US" sz="900" b="0" i="0" kern="1200" baseline="0" dirty="0" smtClean="0">
+                        <a:rPr lang="en-US" sz="700" b="0" i="0" kern="1200" baseline="0" dirty="0" smtClean="0">
                           <a:solidFill>
                             <a:schemeClr val="lt1"/>
                           </a:solidFill>
@@ -4545,7 +4959,7 @@
                         </a:rPr>
                         <a:t>Finish</a:t>
                       </a:r>
-                      <a:endParaRPr lang="en-US" sz="900" baseline="0" dirty="0">
+                      <a:endParaRPr lang="en-US" sz="700" baseline="0" dirty="0">
                         <a:latin typeface="Arial" pitchFamily="34" charset="0"/>
                         <a:cs typeface="Arial" pitchFamily="34" charset="0"/>
                       </a:endParaRPr>
@@ -4559,7 +4973,7 @@
                     <a:lstStyle/>
                     <a:p>
                       <a:r>
-                        <a:rPr lang="en-US" sz="900" b="0" i="0" kern="1200" baseline="0" dirty="0" smtClean="0">
+                        <a:rPr lang="en-US" sz="700" b="0" i="0" kern="1200" baseline="0" dirty="0" smtClean="0">
                           <a:solidFill>
                             <a:schemeClr val="lt1"/>
                           </a:solidFill>
@@ -4570,7 +4984,7 @@
                         </a:rPr>
                         <a:t>BL Start</a:t>
                       </a:r>
-                      <a:endParaRPr lang="en-US" sz="900" baseline="0" dirty="0">
+                      <a:endParaRPr lang="en-US" sz="700" baseline="0" dirty="0">
                         <a:latin typeface="Arial" pitchFamily="34" charset="0"/>
                         <a:cs typeface="Arial" pitchFamily="34" charset="0"/>
                       </a:endParaRPr>
@@ -4584,7 +4998,7 @@
                     <a:lstStyle/>
                     <a:p>
                       <a:r>
-                        <a:rPr lang="en-US" sz="900" b="0" i="0" kern="1200" baseline="0" dirty="0" smtClean="0">
+                        <a:rPr lang="en-US" sz="700" b="0" i="0" kern="1200" baseline="0" dirty="0" smtClean="0">
                           <a:solidFill>
                             <a:schemeClr val="lt1"/>
                           </a:solidFill>
@@ -4595,7 +5009,7 @@
                         </a:rPr>
                         <a:t>BL Finish</a:t>
                       </a:r>
-                      <a:endParaRPr lang="en-US" sz="900" baseline="0" dirty="0">
+                      <a:endParaRPr lang="en-US" sz="700" baseline="0" dirty="0">
                         <a:latin typeface="Arial" pitchFamily="34" charset="0"/>
                         <a:cs typeface="Arial" pitchFamily="34" charset="0"/>
                       </a:endParaRPr>
@@ -4609,7 +5023,7 @@
                     <a:lstStyle/>
                     <a:p>
                       <a:r>
-                        <a:rPr lang="en-US" sz="800" b="0" i="0" kern="1200" baseline="0" dirty="0" smtClean="0">
+                        <a:rPr lang="en-US" sz="700" b="0" i="0" kern="1200" baseline="0" dirty="0" smtClean="0">
                           <a:solidFill>
                             <a:schemeClr val="lt1"/>
                           </a:solidFill>
@@ -4620,7 +5034,7 @@
                         </a:rPr>
                         <a:t>HRs</a:t>
                       </a:r>
-                      <a:endParaRPr lang="en-US" sz="900" baseline="0" dirty="0">
+                      <a:endParaRPr lang="en-US" sz="700" baseline="0" dirty="0">
                         <a:latin typeface="Arial" pitchFamily="34" charset="0"/>
                         <a:cs typeface="Arial" pitchFamily="34" charset="0"/>
                       </a:endParaRPr>
@@ -4634,7 +5048,7 @@
                     <a:lstStyle/>
                     <a:p>
                       <a:r>
-                        <a:rPr lang="en-US" sz="900" b="0" i="0" kern="1200" baseline="0" dirty="0" smtClean="0">
+                        <a:rPr lang="en-US" sz="700" b="0" i="0" kern="1200" baseline="0" dirty="0" smtClean="0">
                           <a:solidFill>
                             <a:schemeClr val="lt1"/>
                           </a:solidFill>
@@ -4645,7 +5059,7 @@
                         </a:rPr>
                         <a:t>PMT</a:t>
                       </a:r>
-                      <a:endParaRPr lang="en-US" sz="900" baseline="0" dirty="0">
+                      <a:endParaRPr lang="en-US" sz="700" baseline="0" dirty="0">
                         <a:latin typeface="Arial" pitchFamily="34" charset="0"/>
                         <a:cs typeface="Arial" pitchFamily="34" charset="0"/>
                       </a:endParaRPr>
@@ -4659,7 +5073,7 @@
                     <a:lstStyle/>
                     <a:p>
                       <a:r>
-                        <a:rPr lang="en-US" sz="900" b="0" i="0" kern="1200" baseline="0" dirty="0" smtClean="0">
+                        <a:rPr lang="en-US" sz="700" b="0" i="0" kern="1200" baseline="0" dirty="0" smtClean="0">
                           <a:solidFill>
                             <a:schemeClr val="lt1"/>
                           </a:solidFill>
@@ -4670,7 +5084,7 @@
                         </a:rPr>
                         <a:t>Reason</a:t>
                       </a:r>
-                      <a:endParaRPr lang="en-US" sz="900" baseline="0" dirty="0">
+                      <a:endParaRPr lang="en-US" sz="700" baseline="0" dirty="0">
                         <a:latin typeface="Arial" pitchFamily="34" charset="0"/>
                         <a:cs typeface="Arial" pitchFamily="34" charset="0"/>
                       </a:endParaRPr>
@@ -4684,7 +5098,7 @@
                     <a:lstStyle/>
                     <a:p>
                       <a:r>
-                        <a:rPr lang="en-US" sz="900" b="0" i="0" kern="1200" baseline="0" dirty="0" smtClean="0">
+                        <a:rPr lang="en-US" sz="700" b="0" i="0" kern="1200" baseline="0" dirty="0" smtClean="0">
                           <a:solidFill>
                             <a:schemeClr val="lt1"/>
                           </a:solidFill>
@@ -4695,7 +5109,7 @@
                         </a:rPr>
                         <a:t>Impacted</a:t>
                       </a:r>
-                      <a:endParaRPr lang="en-US" sz="900" baseline="0" dirty="0">
+                      <a:endParaRPr lang="en-US" sz="700" baseline="0" dirty="0">
                         <a:latin typeface="Arial" pitchFamily="34" charset="0"/>
                         <a:cs typeface="Arial" pitchFamily="34" charset="0"/>
                       </a:endParaRPr>
@@ -4751,7 +5165,7 @@
                         <a:defRPr/>
                       </a:pPr>
                       <a:r>
-                        <a:rPr lang="en-US" sz="900" b="0" i="0" kern="1200" baseline="0" dirty="0" err="1" smtClean="0">
+                        <a:rPr lang="en-US" sz="700" b="0" i="0" kern="1200" baseline="0" dirty="0" err="1" smtClean="0">
                           <a:solidFill>
                             <a:schemeClr val="lt1"/>
                           </a:solidFill>
@@ -4763,7 +5177,7 @@
                         <a:t>Est</a:t>
                       </a:r>
                       <a:r>
-                        <a:rPr lang="en-US" sz="900" b="0" i="0" kern="1200" baseline="0" dirty="0" smtClean="0">
+                        <a:rPr lang="en-US" sz="700" b="0" i="0" kern="1200" baseline="0" dirty="0" smtClean="0">
                           <a:solidFill>
                             <a:schemeClr val="lt1"/>
                           </a:solidFill>
@@ -4774,7 +5188,7 @@
                         </a:rPr>
                         <a:t> Start</a:t>
                       </a:r>
-                      <a:endParaRPr lang="en-US" sz="900" baseline="0" dirty="0">
+                      <a:endParaRPr lang="en-US" sz="700" baseline="0" dirty="0">
                         <a:latin typeface="Arial" pitchFamily="34" charset="0"/>
                         <a:cs typeface="Arial" pitchFamily="34" charset="0"/>
                       </a:endParaRPr>
@@ -4788,7 +5202,7 @@
                     <a:lstStyle/>
                     <a:p>
                       <a:r>
-                        <a:rPr lang="en-US" sz="900" b="0" i="0" kern="1200" baseline="0" dirty="0" err="1" smtClean="0">
+                        <a:rPr lang="en-US" sz="700" b="0" i="0" kern="1200" baseline="0" dirty="0" err="1" smtClean="0">
                           <a:solidFill>
                             <a:schemeClr val="lt1"/>
                           </a:solidFill>
@@ -4800,7 +5214,7 @@
                         <a:t>Est</a:t>
                       </a:r>
                       <a:r>
-                        <a:rPr lang="en-US" sz="900" b="0" i="0" kern="1200" baseline="0" dirty="0" smtClean="0">
+                        <a:rPr lang="en-US" sz="700" b="0" i="0" kern="1200" baseline="0" dirty="0" smtClean="0">
                           <a:solidFill>
                             <a:schemeClr val="lt1"/>
                           </a:solidFill>
@@ -4811,7 +5225,371 @@
                         </a:rPr>
                         <a:t> Fin</a:t>
                       </a:r>
-                      <a:endParaRPr lang="en-US" sz="900" baseline="0" dirty="0">
+                      <a:endParaRPr lang="en-US" sz="700" baseline="0" dirty="0">
+                        <a:latin typeface="Arial" pitchFamily="34" charset="0"/>
+                        <a:cs typeface="Arial" pitchFamily="34" charset="0"/>
+                      </a:endParaRPr>
+                    </a:p>
+                  </a:txBody>
+                  <a:tcPr marL="45720" marR="45720" marB="0"/>
+                </a:tc>
+              </a:tr>
+              <a:tr h="235941">
+                <a:tc>
+                  <a:txBody>
+                    <a:bodyPr/>
+                    <a:lstStyle/>
+                    <a:p>
+                      <a:r>
+                        <a:rPr lang="en-US" sz="400" b="0" dirty="0" smtClean="0">
+                          <a:latin typeface="Arial" pitchFamily="34" charset="0"/>
+                          <a:cs typeface="Arial" pitchFamily="34" charset="0"/>
+                        </a:rPr>
+                        <a:t>NA</a:t>
+                      </a:r>
+                      <a:endParaRPr lang="en-US" sz="400" baseline="0" dirty="0">
+                        <a:solidFill>
+                          <a:schemeClr val="tx1"/>
+                        </a:solidFill>
+                        <a:latin typeface="Arial" pitchFamily="34" charset="0"/>
+                        <a:cs typeface="Arial" pitchFamily="34" charset="0"/>
+                      </a:endParaRPr>
+                    </a:p>
+                  </a:txBody>
+                  <a:tcPr marL="45720" marR="45720" marB="0"/>
+                </a:tc>
+                <a:tc>
+                  <a:txBody>
+                    <a:bodyPr/>
+                    <a:lstStyle/>
+                    <a:p>
+                      <a:r>
+                        <a:rPr lang="en-US" sz="700" b="0" smtClean="0">
+                          <a:latin typeface="Arial" pitchFamily="34" charset="0"/>
+                          <a:cs typeface="Arial" pitchFamily="34" charset="0"/>
+                        </a:rPr>
+                        <a:t>NA</a:t>
+                      </a:r>
+                      <a:endParaRPr lang="en-US" sz="700" baseline="0" dirty="0">
+                        <a:solidFill>
+                          <a:schemeClr val="tx1"/>
+                        </a:solidFill>
+                        <a:latin typeface="Arial" pitchFamily="34" charset="0"/>
+                        <a:cs typeface="Arial" pitchFamily="34" charset="0"/>
+                      </a:endParaRPr>
+                    </a:p>
+                  </a:txBody>
+                  <a:tcPr marL="45720" marR="45720" marB="0"/>
+                </a:tc>
+                <a:tc>
+                  <a:txBody>
+                    <a:bodyPr/>
+                    <a:lstStyle/>
+                    <a:p>
+                      <a:r>
+                        <a:rPr lang="en-US" sz="700" b="0" smtClean="0">
+                          <a:latin typeface="Arial" pitchFamily="34" charset="0"/>
+                          <a:cs typeface="Arial" pitchFamily="34" charset="0"/>
+                        </a:rPr>
+                        <a:t>NA</a:t>
+                      </a:r>
+                      <a:endParaRPr lang="en-US" sz="700" b="0" baseline="0" dirty="0">
+                        <a:solidFill>
+                          <a:schemeClr val="tx1"/>
+                        </a:solidFill>
+                        <a:latin typeface="Arial" pitchFamily="34" charset="0"/>
+                        <a:cs typeface="Arial" pitchFamily="34" charset="0"/>
+                      </a:endParaRPr>
+                    </a:p>
+                  </a:txBody>
+                  <a:tcPr marL="45720" marR="45720" marB="0"/>
+                </a:tc>
+                <a:tc>
+                  <a:txBody>
+                    <a:bodyPr/>
+                    <a:lstStyle/>
+                    <a:p>
+                      <a:r>
+                        <a:rPr lang="en-US" sz="700" b="0" smtClean="0">
+                          <a:latin typeface="Arial" pitchFamily="34" charset="0"/>
+                          <a:cs typeface="Arial" pitchFamily="34" charset="0"/>
+                        </a:rPr>
+                        <a:t>NA</a:t>
+                      </a:r>
+                      <a:endParaRPr lang="en-US" sz="700" baseline="0" dirty="0">
+                        <a:solidFill>
+                          <a:schemeClr val="tx1"/>
+                        </a:solidFill>
+                        <a:latin typeface="Arial" pitchFamily="34" charset="0"/>
+                        <a:cs typeface="Arial" pitchFamily="34" charset="0"/>
+                      </a:endParaRPr>
+                    </a:p>
+                  </a:txBody>
+                  <a:tcPr marL="45720" marR="45720" marB="0"/>
+                </a:tc>
+                <a:tc>
+                  <a:txBody>
+                    <a:bodyPr/>
+                    <a:lstStyle/>
+                    <a:p>
+                      <a:r>
+                        <a:rPr lang="en-US" sz="700" b="0" smtClean="0">
+                          <a:latin typeface="Arial" pitchFamily="34" charset="0"/>
+                          <a:cs typeface="Arial" pitchFamily="34" charset="0"/>
+                        </a:rPr>
+                        <a:t>NA</a:t>
+                      </a:r>
+                      <a:endParaRPr lang="en-US" sz="700" baseline="0" dirty="0">
+                        <a:solidFill>
+                          <a:schemeClr val="tx1"/>
+                        </a:solidFill>
+                        <a:latin typeface="Arial" pitchFamily="34" charset="0"/>
+                        <a:cs typeface="Arial" pitchFamily="34" charset="0"/>
+                      </a:endParaRPr>
+                    </a:p>
+                  </a:txBody>
+                  <a:tcPr marL="45720" marR="45720" marB="0"/>
+                </a:tc>
+                <a:tc>
+                  <a:txBody>
+                    <a:bodyPr/>
+                    <a:lstStyle/>
+                    <a:p>
+                      <a:r>
+                        <a:rPr lang="en-US" sz="700" b="0" smtClean="0">
+                          <a:latin typeface="Arial" pitchFamily="34" charset="0"/>
+                          <a:cs typeface="Arial" pitchFamily="34" charset="0"/>
+                        </a:rPr>
+                        <a:t>NA</a:t>
+                      </a:r>
+                      <a:endParaRPr lang="en-US" sz="700" baseline="0" dirty="0">
+                        <a:solidFill>
+                          <a:schemeClr val="tx1"/>
+                        </a:solidFill>
+                        <a:latin typeface="Arial" pitchFamily="34" charset="0"/>
+                        <a:cs typeface="Arial" pitchFamily="34" charset="0"/>
+                      </a:endParaRPr>
+                    </a:p>
+                  </a:txBody>
+                  <a:tcPr marL="45720" marR="45720" marB="0"/>
+                </a:tc>
+                <a:tc>
+                  <a:txBody>
+                    <a:bodyPr/>
+                    <a:lstStyle/>
+                    <a:p>
+                      <a:r>
+                        <a:rPr lang="en-US" sz="700" b="0" smtClean="0">
+                          <a:latin typeface="Arial" pitchFamily="34" charset="0"/>
+                          <a:cs typeface="Arial" pitchFamily="34" charset="0"/>
+                        </a:rPr>
+                        <a:t>NA</a:t>
+                      </a:r>
+                      <a:endParaRPr lang="en-US" sz="700" baseline="0" dirty="0">
+                        <a:solidFill>
+                          <a:schemeClr val="tx1"/>
+                        </a:solidFill>
+                        <a:latin typeface="Arial" pitchFamily="34" charset="0"/>
+                        <a:cs typeface="Arial" pitchFamily="34" charset="0"/>
+                      </a:endParaRPr>
+                    </a:p>
+                  </a:txBody>
+                  <a:tcPr marL="45720" marR="45720" marB="0"/>
+                </a:tc>
+                <a:tc>
+                  <a:txBody>
+                    <a:bodyPr/>
+                    <a:lstStyle/>
+                    <a:p>
+                      <a:r>
+                        <a:rPr lang="en-US" sz="700" b="0" smtClean="0">
+                          <a:latin typeface="Arial" pitchFamily="34" charset="0"/>
+                          <a:cs typeface="Arial" pitchFamily="34" charset="0"/>
+                        </a:rPr>
+                        <a:t>NA</a:t>
+                      </a:r>
+                      <a:endParaRPr lang="en-US" sz="700" baseline="0" dirty="0">
+                        <a:solidFill>
+                          <a:schemeClr val="tx1"/>
+                        </a:solidFill>
+                        <a:latin typeface="Arial" pitchFamily="34" charset="0"/>
+                        <a:cs typeface="Arial" pitchFamily="34" charset="0"/>
+                      </a:endParaRPr>
+                    </a:p>
+                  </a:txBody>
+                  <a:tcPr marL="45720" marR="45720" marB="0"/>
+                </a:tc>
+                <a:tc>
+                  <a:txBody>
+                    <a:bodyPr/>
+                    <a:lstStyle/>
+                    <a:p>
+                      <a:r>
+                        <a:rPr lang="en-US" sz="700" b="0" smtClean="0">
+                          <a:latin typeface="Arial" pitchFamily="34" charset="0"/>
+                          <a:cs typeface="Arial" pitchFamily="34" charset="0"/>
+                        </a:rPr>
+                        <a:t>NA</a:t>
+                      </a:r>
+                      <a:endParaRPr lang="en-US" sz="700" baseline="0" dirty="0">
+                        <a:solidFill>
+                          <a:schemeClr val="tx1"/>
+                        </a:solidFill>
+                        <a:latin typeface="Arial" pitchFamily="34" charset="0"/>
+                        <a:cs typeface="Arial" pitchFamily="34" charset="0"/>
+                      </a:endParaRPr>
+                    </a:p>
+                  </a:txBody>
+                  <a:tcPr marL="45720" marR="45720" marB="0"/>
+                </a:tc>
+                <a:tc>
+                  <a:txBody>
+                    <a:bodyPr/>
+                    <a:lstStyle/>
+                    <a:p>
+                      <a:r>
+                        <a:rPr lang="en-US" sz="700" b="0" smtClean="0">
+                          <a:latin typeface="Arial" pitchFamily="34" charset="0"/>
+                          <a:cs typeface="Arial" pitchFamily="34" charset="0"/>
+                        </a:rPr>
+                        <a:t>NA</a:t>
+                      </a:r>
+                      <a:endParaRPr lang="en-US" sz="700" baseline="0" dirty="0">
+                        <a:solidFill>
+                          <a:schemeClr val="tx1"/>
+                        </a:solidFill>
+                        <a:latin typeface="Arial" pitchFamily="34" charset="0"/>
+                        <a:cs typeface="Arial" pitchFamily="34" charset="0"/>
+                      </a:endParaRPr>
+                    </a:p>
+                  </a:txBody>
+                  <a:tcPr marL="45720" marR="45720" marB="0"/>
+                </a:tc>
+                <a:tc>
+                  <a:txBody>
+                    <a:bodyPr/>
+                    <a:lstStyle/>
+                    <a:p>
+                      <a:r>
+                        <a:rPr lang="en-US" sz="700" b="0" smtClean="0">
+                          <a:latin typeface="Arial" pitchFamily="34" charset="0"/>
+                          <a:cs typeface="Arial" pitchFamily="34" charset="0"/>
+                        </a:rPr>
+                        <a:t>NA</a:t>
+                      </a:r>
+                      <a:endParaRPr lang="en-US" sz="700" baseline="0" dirty="0">
+                        <a:solidFill>
+                          <a:schemeClr val="tx1"/>
+                        </a:solidFill>
+                        <a:latin typeface="Arial" pitchFamily="34" charset="0"/>
+                        <a:cs typeface="Arial" pitchFamily="34" charset="0"/>
+                      </a:endParaRPr>
+                    </a:p>
+                  </a:txBody>
+                  <a:tcPr marL="45720" marR="45720" marB="0"/>
+                </a:tc>
+                <a:tc>
+                  <a:txBody>
+                    <a:bodyPr/>
+                    <a:lstStyle/>
+                    <a:p>
+                      <a:r>
+                        <a:rPr lang="en-US" sz="700" b="0" smtClean="0">
+                          <a:latin typeface="Arial" pitchFamily="34" charset="0"/>
+                          <a:cs typeface="Arial" pitchFamily="34" charset="0"/>
+                        </a:rPr>
+                        <a:t>NA</a:t>
+                      </a:r>
+                      <a:endParaRPr lang="en-US" sz="700" baseline="0" dirty="0">
+                        <a:solidFill>
+                          <a:schemeClr val="tx1"/>
+                        </a:solidFill>
+                        <a:latin typeface="Arial" pitchFamily="34" charset="0"/>
+                        <a:cs typeface="Arial" pitchFamily="34" charset="0"/>
+                      </a:endParaRPr>
+                    </a:p>
+                  </a:txBody>
+                  <a:tcPr marL="45720" marR="45720" marB="0"/>
+                </a:tc>
+                <a:tc>
+                  <a:txBody>
+                    <a:bodyPr/>
+                    <a:lstStyle/>
+                    <a:p>
+                      <a:r>
+                        <a:rPr lang="en-US" sz="700" b="0" smtClean="0">
+                          <a:latin typeface="Arial" pitchFamily="34" charset="0"/>
+                          <a:cs typeface="Arial" pitchFamily="34" charset="0"/>
+                        </a:rPr>
+                        <a:t>NA</a:t>
+                      </a:r>
+                      <a:endParaRPr lang="en-US" sz="700" baseline="0" dirty="0">
+                        <a:solidFill>
+                          <a:schemeClr val="tx1"/>
+                        </a:solidFill>
+                        <a:latin typeface="Arial" pitchFamily="34" charset="0"/>
+                        <a:cs typeface="Arial" pitchFamily="34" charset="0"/>
+                      </a:endParaRPr>
+                    </a:p>
+                  </a:txBody>
+                  <a:tcPr marL="45720" marR="45720" marB="0"/>
+                </a:tc>
+                <a:tc>
+                  <a:txBody>
+                    <a:bodyPr/>
+                    <a:lstStyle/>
+                    <a:p>
+                      <a:pPr marL="0" marR="0" indent="0" algn="l" defTabSz="914400" rtl="0" eaLnBrk="1" fontAlgn="auto" latinLnBrk="0" hangingPunct="1">
+                        <a:lnSpc>
+                          <a:spcPct val="100000"/>
+                        </a:lnSpc>
+                        <a:spcBef>
+                          <a:spcPts val="0"/>
+                        </a:spcBef>
+                        <a:spcAft>
+                          <a:spcPts val="0"/>
+                        </a:spcAft>
+                        <a:buClrTx/>
+                        <a:buSzTx/>
+                        <a:buFontTx/>
+                        <a:buNone/>
+                        <a:tabLst/>
+                        <a:defRPr/>
+                      </a:pPr>
+                      <a:r>
+                        <a:rPr lang="en-US" sz="600" b="0" smtClean="0">
+                          <a:latin typeface="Arial" pitchFamily="34" charset="0"/>
+                          <a:cs typeface="Arial" pitchFamily="34" charset="0"/>
+                        </a:rPr>
+                        <a:t>NA</a:t>
+                      </a:r>
+                      <a:endParaRPr lang="en-US" sz="600" baseline="0" dirty="0">
+                        <a:solidFill>
+                          <a:schemeClr val="tx1"/>
+                        </a:solidFill>
+                        <a:latin typeface="Arial" pitchFamily="34" charset="0"/>
+                        <a:cs typeface="Arial" pitchFamily="34" charset="0"/>
+                      </a:endParaRPr>
+                    </a:p>
+                  </a:txBody>
+                  <a:tcPr marL="45720" marR="45720" marB="0"/>
+                </a:tc>
+                <a:tc>
+                  <a:txBody>
+                    <a:bodyPr/>
+                    <a:lstStyle/>
+                    <a:p>
+                      <a:r>
+                        <a:rPr lang="en-US" sz="600" b="0" dirty="0" smtClean="0">
+                          <a:latin typeface="Arial" pitchFamily="34" charset="0"/>
+                          <a:cs typeface="Arial" pitchFamily="34" charset="0"/>
+                        </a:rPr>
+                        <a:t>NA</a:t>
+                      </a:r>
+                      <a:endParaRPr lang="en-US" sz="600" baseline="0" dirty="0">
+                        <a:solidFill>
+                          <a:schemeClr val="tx1"/>
+                        </a:solidFill>
                         <a:latin typeface="Arial" pitchFamily="34" charset="0"/>
                         <a:cs typeface="Arial" pitchFamily="34" charset="0"/>
                       </a:endParaRPr>
@@ -4827,7 +5605,7 @@
     </p:spTree>
     <p:extLst>
       <p:ext uri="{BB962C8B-B14F-4D97-AF65-F5344CB8AC3E}">
-        <p14:creationId xmlns:p14="http://schemas.microsoft.com/office/powerpoint/2010/main" xmlns="" val="3217937833"/>
+        <p14:creationId xmlns:p14="http://schemas.microsoft.com/office/powerpoint/2010/main" val="3217937833"/>
       </p:ext>
     </p:extLst>
   </p:cSld>
@@ -4898,14 +5676,14 @@
             <p:ph idx="1"/>
             <p:extLst>
               <p:ext uri="{D42A27DB-BD31-4B8C-83A1-F6EECF244321}">
-                <p14:modId xmlns:p14="http://schemas.microsoft.com/office/powerpoint/2010/main" xmlns="" val="952249025"/>
+                <p14:modId xmlns:p14="http://schemas.microsoft.com/office/powerpoint/2010/main" val="205318668"/>
               </p:ext>
             </p:extLst>
           </p:nvPr>
         </p:nvGraphicFramePr>
         <p:xfrm>
-          <a:off x="211776" y="1531917"/>
-          <a:ext cx="8839195" cy="235941"/>
+          <a:off x="152400" y="1295400"/>
+          <a:ext cx="8839195" cy="495021"/>
         </p:xfrm>
         <a:graphic>
           <a:graphicData uri="http://schemas.openxmlformats.org/drawingml/2006/table">
@@ -4914,21 +5692,21 @@
                 <a:tableStyleId>{5C22544A-7EE6-4342-B048-85BDC9FD1C3A}</a:tableStyleId>
               </a:tblPr>
               <a:tblGrid>
-                <a:gridCol w="405740"/>
-                <a:gridCol w="344385"/>
-                <a:gridCol w="1852550"/>
-                <a:gridCol w="308759"/>
-                <a:gridCol w="475013"/>
-                <a:gridCol w="510639"/>
-                <a:gridCol w="581891"/>
-                <a:gridCol w="629392"/>
-                <a:gridCol w="403761"/>
-                <a:gridCol w="356509"/>
-                <a:gridCol w="654338"/>
-                <a:gridCol w="829828"/>
-                <a:gridCol w="415637"/>
-                <a:gridCol w="533528"/>
-                <a:gridCol w="537225"/>
+                <a:gridCol w="1724025"/>
+                <a:gridCol w="714375"/>
+                <a:gridCol w="1952625"/>
+                <a:gridCol w="419100"/>
+                <a:gridCol w="407349"/>
+                <a:gridCol w="400050"/>
+                <a:gridCol w="352425"/>
+                <a:gridCol w="352425"/>
+                <a:gridCol w="381000"/>
+                <a:gridCol w="323850"/>
+                <a:gridCol w="428625"/>
+                <a:gridCol w="411801"/>
+                <a:gridCol w="323850"/>
+                <a:gridCol w="333375"/>
+                <a:gridCol w="314320"/>
               </a:tblGrid>
               <a:tr h="235941">
                 <a:tc>
@@ -4937,7 +5715,7 @@
                     <a:lstStyle/>
                     <a:p>
                       <a:r>
-                        <a:rPr lang="en-US" sz="900" b="0" i="0" kern="1200" baseline="0" dirty="0" smtClean="0">
+                        <a:rPr lang="en-US" sz="700" b="0" i="0" kern="1200" baseline="0" dirty="0" smtClean="0">
                           <a:solidFill>
                             <a:schemeClr val="lt1"/>
                           </a:solidFill>
@@ -4948,7 +5726,7 @@
                         </a:rPr>
                         <a:t>UID</a:t>
                       </a:r>
-                      <a:endParaRPr lang="en-US" sz="900" baseline="0" dirty="0">
+                      <a:endParaRPr lang="en-US" sz="700" baseline="0" dirty="0">
                         <a:latin typeface="Arial" pitchFamily="34" charset="0"/>
                         <a:cs typeface="Arial" pitchFamily="34" charset="0"/>
                       </a:endParaRPr>
@@ -4962,7 +5740,7 @@
                     <a:lstStyle/>
                     <a:p>
                       <a:r>
-                        <a:rPr lang="en-US" sz="900" b="0" i="0" kern="1200" baseline="0" dirty="0" smtClean="0">
+                        <a:rPr lang="en-US" sz="700" b="0" i="0" kern="1200" baseline="0" dirty="0" smtClean="0">
                           <a:solidFill>
                             <a:schemeClr val="lt1"/>
                           </a:solidFill>
@@ -4973,7 +5751,7 @@
                         </a:rPr>
                         <a:t>CA </a:t>
                       </a:r>
-                      <a:endParaRPr lang="en-US" sz="900" baseline="0" dirty="0">
+                      <a:endParaRPr lang="en-US" sz="700" baseline="0" dirty="0">
                         <a:latin typeface="Arial" pitchFamily="34" charset="0"/>
                         <a:cs typeface="Arial" pitchFamily="34" charset="0"/>
                       </a:endParaRPr>
@@ -4987,13 +5765,13 @@
                     <a:lstStyle/>
                     <a:p>
                       <a:r>
-                        <a:rPr lang="en-US" sz="900" b="0" baseline="0" dirty="0" smtClean="0">
+                        <a:rPr lang="en-US" sz="700" b="0" baseline="0" dirty="0" smtClean="0">
                           <a:latin typeface="Arial" pitchFamily="34" charset="0"/>
                           <a:cs typeface="Arial" pitchFamily="34" charset="0"/>
                         </a:rPr>
                         <a:t>TASK NAME</a:t>
                       </a:r>
-                      <a:endParaRPr lang="en-US" sz="900" b="0" baseline="0" dirty="0">
+                      <a:endParaRPr lang="en-US" sz="700" b="0" baseline="0" dirty="0">
                         <a:latin typeface="Arial" pitchFamily="34" charset="0"/>
                         <a:cs typeface="Arial" pitchFamily="34" charset="0"/>
                       </a:endParaRPr>
@@ -5007,7 +5785,7 @@
                     <a:lstStyle/>
                     <a:p>
                       <a:r>
-                        <a:rPr lang="en-US" sz="900" b="0" i="0" kern="1200" baseline="0" dirty="0" smtClean="0">
+                        <a:rPr lang="en-US" sz="700" b="0" i="0" kern="1200" baseline="0" dirty="0" smtClean="0">
                           <a:solidFill>
                             <a:schemeClr val="lt1"/>
                           </a:solidFill>
@@ -5018,7 +5796,7 @@
                         </a:rPr>
                         <a:t>TS </a:t>
                       </a:r>
-                      <a:endParaRPr lang="en-US" sz="900" baseline="0" dirty="0">
+                      <a:endParaRPr lang="en-US" sz="700" baseline="0" dirty="0">
                         <a:latin typeface="Arial" pitchFamily="34" charset="0"/>
                         <a:cs typeface="Arial" pitchFamily="34" charset="0"/>
                       </a:endParaRPr>
@@ -5032,7 +5810,7 @@
                     <a:lstStyle/>
                     <a:p>
                       <a:r>
-                        <a:rPr lang="en-US" sz="900" b="0" i="0" kern="1200" baseline="0" dirty="0" smtClean="0">
+                        <a:rPr lang="en-US" sz="700" b="0" i="0" kern="1200" baseline="0" dirty="0" smtClean="0">
                           <a:solidFill>
                             <a:schemeClr val="lt1"/>
                           </a:solidFill>
@@ -5043,7 +5821,7 @@
                         </a:rPr>
                         <a:t>Start</a:t>
                       </a:r>
-                      <a:endParaRPr lang="en-US" sz="900" baseline="0" dirty="0">
+                      <a:endParaRPr lang="en-US" sz="700" baseline="0" dirty="0">
                         <a:latin typeface="Arial" pitchFamily="34" charset="0"/>
                         <a:cs typeface="Arial" pitchFamily="34" charset="0"/>
                       </a:endParaRPr>
@@ -5057,7 +5835,7 @@
                     <a:lstStyle/>
                     <a:p>
                       <a:r>
-                        <a:rPr lang="en-US" sz="900" b="0" i="0" kern="1200" baseline="0" dirty="0" smtClean="0">
+                        <a:rPr lang="en-US" sz="700" b="0" i="0" kern="1200" baseline="0" dirty="0" smtClean="0">
                           <a:solidFill>
                             <a:schemeClr val="lt1"/>
                           </a:solidFill>
@@ -5068,7 +5846,7 @@
                         </a:rPr>
                         <a:t>Finish</a:t>
                       </a:r>
-                      <a:endParaRPr lang="en-US" sz="900" baseline="0" dirty="0">
+                      <a:endParaRPr lang="en-US" sz="700" baseline="0" dirty="0">
                         <a:latin typeface="Arial" pitchFamily="34" charset="0"/>
                         <a:cs typeface="Arial" pitchFamily="34" charset="0"/>
                       </a:endParaRPr>
@@ -5082,7 +5860,7 @@
                     <a:lstStyle/>
                     <a:p>
                       <a:r>
-                        <a:rPr lang="en-US" sz="900" b="0" i="0" kern="1200" baseline="0" dirty="0" smtClean="0">
+                        <a:rPr lang="en-US" sz="700" b="0" i="0" kern="1200" baseline="0" dirty="0" smtClean="0">
                           <a:solidFill>
                             <a:schemeClr val="lt1"/>
                           </a:solidFill>
@@ -5093,7 +5871,7 @@
                         </a:rPr>
                         <a:t>BL Start</a:t>
                       </a:r>
-                      <a:endParaRPr lang="en-US" sz="900" baseline="0" dirty="0">
+                      <a:endParaRPr lang="en-US" sz="700" baseline="0" dirty="0">
                         <a:latin typeface="Arial" pitchFamily="34" charset="0"/>
                         <a:cs typeface="Arial" pitchFamily="34" charset="0"/>
                       </a:endParaRPr>
@@ -5107,7 +5885,7 @@
                     <a:lstStyle/>
                     <a:p>
                       <a:r>
-                        <a:rPr lang="en-US" sz="900" b="0" i="0" kern="1200" baseline="0" dirty="0" smtClean="0">
+                        <a:rPr lang="en-US" sz="700" b="0" i="0" kern="1200" baseline="0" dirty="0" smtClean="0">
                           <a:solidFill>
                             <a:schemeClr val="lt1"/>
                           </a:solidFill>
@@ -5118,7 +5896,7 @@
                         </a:rPr>
                         <a:t>BL Finish</a:t>
                       </a:r>
-                      <a:endParaRPr lang="en-US" sz="900" baseline="0" dirty="0">
+                      <a:endParaRPr lang="en-US" sz="700" baseline="0" dirty="0">
                         <a:latin typeface="Arial" pitchFamily="34" charset="0"/>
                         <a:cs typeface="Arial" pitchFamily="34" charset="0"/>
                       </a:endParaRPr>
@@ -5132,7 +5910,7 @@
                     <a:lstStyle/>
                     <a:p>
                       <a:r>
-                        <a:rPr lang="en-US" sz="800" b="0" i="0" kern="1200" baseline="0" dirty="0" smtClean="0">
+                        <a:rPr lang="en-US" sz="700" b="0" i="0" kern="1200" baseline="0" dirty="0" smtClean="0">
                           <a:solidFill>
                             <a:schemeClr val="lt1"/>
                           </a:solidFill>
@@ -5143,7 +5921,7 @@
                         </a:rPr>
                         <a:t>HRs</a:t>
                       </a:r>
-                      <a:endParaRPr lang="en-US" sz="900" baseline="0" dirty="0">
+                      <a:endParaRPr lang="en-US" sz="700" baseline="0" dirty="0">
                         <a:latin typeface="Arial" pitchFamily="34" charset="0"/>
                         <a:cs typeface="Arial" pitchFamily="34" charset="0"/>
                       </a:endParaRPr>
@@ -5157,7 +5935,7 @@
                     <a:lstStyle/>
                     <a:p>
                       <a:r>
-                        <a:rPr lang="en-US" sz="900" b="0" i="0" kern="1200" baseline="0" dirty="0" smtClean="0">
+                        <a:rPr lang="en-US" sz="700" b="0" i="0" kern="1200" baseline="0" dirty="0" smtClean="0">
                           <a:solidFill>
                             <a:schemeClr val="lt1"/>
                           </a:solidFill>
@@ -5168,7 +5946,7 @@
                         </a:rPr>
                         <a:t>PMT</a:t>
                       </a:r>
-                      <a:endParaRPr lang="en-US" sz="900" baseline="0" dirty="0">
+                      <a:endParaRPr lang="en-US" sz="700" baseline="0" dirty="0">
                         <a:latin typeface="Arial" pitchFamily="34" charset="0"/>
                         <a:cs typeface="Arial" pitchFamily="34" charset="0"/>
                       </a:endParaRPr>
@@ -5182,7 +5960,7 @@
                     <a:lstStyle/>
                     <a:p>
                       <a:r>
-                        <a:rPr lang="en-US" sz="900" b="0" i="0" kern="1200" baseline="0" dirty="0" smtClean="0">
+                        <a:rPr lang="en-US" sz="700" b="0" i="0" kern="1200" baseline="0" dirty="0" smtClean="0">
                           <a:solidFill>
                             <a:schemeClr val="lt1"/>
                           </a:solidFill>
@@ -5193,7 +5971,7 @@
                         </a:rPr>
                         <a:t>Reason</a:t>
                       </a:r>
-                      <a:endParaRPr lang="en-US" sz="900" baseline="0" dirty="0">
+                      <a:endParaRPr lang="en-US" sz="700" baseline="0" dirty="0">
                         <a:latin typeface="Arial" pitchFamily="34" charset="0"/>
                         <a:cs typeface="Arial" pitchFamily="34" charset="0"/>
                       </a:endParaRPr>
@@ -5207,7 +5985,7 @@
                     <a:lstStyle/>
                     <a:p>
                       <a:r>
-                        <a:rPr lang="en-US" sz="900" b="0" i="0" kern="1200" baseline="0" dirty="0" smtClean="0">
+                        <a:rPr lang="en-US" sz="700" b="0" i="0" kern="1200" baseline="0" dirty="0" smtClean="0">
                           <a:solidFill>
                             <a:schemeClr val="lt1"/>
                           </a:solidFill>
@@ -5218,7 +5996,7 @@
                         </a:rPr>
                         <a:t>Impacted</a:t>
                       </a:r>
-                      <a:endParaRPr lang="en-US" sz="900" baseline="0" dirty="0">
+                      <a:endParaRPr lang="en-US" sz="700" baseline="0" dirty="0">
                         <a:latin typeface="Arial" pitchFamily="34" charset="0"/>
                         <a:cs typeface="Arial" pitchFamily="34" charset="0"/>
                       </a:endParaRPr>
@@ -5274,7 +6052,7 @@
                         <a:defRPr/>
                       </a:pPr>
                       <a:r>
-                        <a:rPr lang="en-US" sz="900" b="0" i="0" kern="1200" baseline="0" dirty="0" err="1" smtClean="0">
+                        <a:rPr lang="en-US" sz="700" b="0" i="0" kern="1200" baseline="0" dirty="0" err="1" smtClean="0">
                           <a:solidFill>
                             <a:schemeClr val="lt1"/>
                           </a:solidFill>
@@ -5286,7 +6064,7 @@
                         <a:t>Est</a:t>
                       </a:r>
                       <a:r>
-                        <a:rPr lang="en-US" sz="900" b="0" i="0" kern="1200" baseline="0" dirty="0" smtClean="0">
+                        <a:rPr lang="en-US" sz="700" b="0" i="0" kern="1200" baseline="0" dirty="0" smtClean="0">
                           <a:solidFill>
                             <a:schemeClr val="lt1"/>
                           </a:solidFill>
@@ -5297,7 +6075,7 @@
                         </a:rPr>
                         <a:t> Start</a:t>
                       </a:r>
-                      <a:endParaRPr lang="en-US" sz="900" baseline="0" dirty="0">
+                      <a:endParaRPr lang="en-US" sz="700" baseline="0" dirty="0">
                         <a:latin typeface="Arial" pitchFamily="34" charset="0"/>
                         <a:cs typeface="Arial" pitchFamily="34" charset="0"/>
                       </a:endParaRPr>
@@ -5311,7 +6089,7 @@
                     <a:lstStyle/>
                     <a:p>
                       <a:r>
-                        <a:rPr lang="en-US" sz="900" b="0" i="0" kern="1200" baseline="0" dirty="0" err="1" smtClean="0">
+                        <a:rPr lang="en-US" sz="700" b="0" i="0" kern="1200" baseline="0" dirty="0" err="1" smtClean="0">
                           <a:solidFill>
                             <a:schemeClr val="lt1"/>
                           </a:solidFill>
@@ -5323,7 +6101,7 @@
                         <a:t>Est</a:t>
                       </a:r>
                       <a:r>
-                        <a:rPr lang="en-US" sz="900" b="0" i="0" kern="1200" baseline="0" dirty="0" smtClean="0">
+                        <a:rPr lang="en-US" sz="700" b="0" i="0" kern="1200" baseline="0" dirty="0" smtClean="0">
                           <a:solidFill>
                             <a:schemeClr val="lt1"/>
                           </a:solidFill>
@@ -5334,7 +6112,371 @@
                         </a:rPr>
                         <a:t> Fin</a:t>
                       </a:r>
-                      <a:endParaRPr lang="en-US" sz="900" baseline="0" dirty="0">
+                      <a:endParaRPr lang="en-US" sz="700" baseline="0" dirty="0">
+                        <a:latin typeface="Arial" pitchFamily="34" charset="0"/>
+                        <a:cs typeface="Arial" pitchFamily="34" charset="0"/>
+                      </a:endParaRPr>
+                    </a:p>
+                  </a:txBody>
+                  <a:tcPr marL="45720" marR="45720" marB="0"/>
+                </a:tc>
+              </a:tr>
+              <a:tr h="235941">
+                <a:tc>
+                  <a:txBody>
+                    <a:bodyPr/>
+                    <a:lstStyle/>
+                    <a:p>
+                      <a:r>
+                        <a:rPr lang="en-US" sz="500" b="0" dirty="0" smtClean="0">
+                          <a:latin typeface="Arial" pitchFamily="34" charset="0"/>
+                          <a:cs typeface="Arial" pitchFamily="34" charset="0"/>
+                        </a:rPr>
+                        <a:t>NA</a:t>
+                      </a:r>
+                      <a:endParaRPr lang="en-US" sz="500" baseline="0" dirty="0">
+                        <a:solidFill>
+                          <a:schemeClr val="tx1"/>
+                        </a:solidFill>
+                        <a:latin typeface="Arial" pitchFamily="34" charset="0"/>
+                        <a:cs typeface="Arial" pitchFamily="34" charset="0"/>
+                      </a:endParaRPr>
+                    </a:p>
+                  </a:txBody>
+                  <a:tcPr marL="45720" marR="45720" marB="0"/>
+                </a:tc>
+                <a:tc>
+                  <a:txBody>
+                    <a:bodyPr/>
+                    <a:lstStyle/>
+                    <a:p>
+                      <a:r>
+                        <a:rPr lang="en-US" sz="700" b="0" smtClean="0">
+                          <a:latin typeface="Arial" pitchFamily="34" charset="0"/>
+                          <a:cs typeface="Arial" pitchFamily="34" charset="0"/>
+                        </a:rPr>
+                        <a:t>NA</a:t>
+                      </a:r>
+                      <a:endParaRPr lang="en-US" sz="700" baseline="0" dirty="0">
+                        <a:solidFill>
+                          <a:schemeClr val="tx1"/>
+                        </a:solidFill>
+                        <a:latin typeface="Arial" pitchFamily="34" charset="0"/>
+                        <a:cs typeface="Arial" pitchFamily="34" charset="0"/>
+                      </a:endParaRPr>
+                    </a:p>
+                  </a:txBody>
+                  <a:tcPr marL="45720" marR="45720" marB="0"/>
+                </a:tc>
+                <a:tc>
+                  <a:txBody>
+                    <a:bodyPr/>
+                    <a:lstStyle/>
+                    <a:p>
+                      <a:r>
+                        <a:rPr lang="en-US" sz="700" b="0" smtClean="0">
+                          <a:latin typeface="Arial" pitchFamily="34" charset="0"/>
+                          <a:cs typeface="Arial" pitchFamily="34" charset="0"/>
+                        </a:rPr>
+                        <a:t>NA</a:t>
+                      </a:r>
+                      <a:endParaRPr lang="en-US" sz="700" b="0" baseline="0" dirty="0">
+                        <a:solidFill>
+                          <a:schemeClr val="tx1"/>
+                        </a:solidFill>
+                        <a:latin typeface="Arial" pitchFamily="34" charset="0"/>
+                        <a:cs typeface="Arial" pitchFamily="34" charset="0"/>
+                      </a:endParaRPr>
+                    </a:p>
+                  </a:txBody>
+                  <a:tcPr marL="45720" marR="45720" marB="0"/>
+                </a:tc>
+                <a:tc>
+                  <a:txBody>
+                    <a:bodyPr/>
+                    <a:lstStyle/>
+                    <a:p>
+                      <a:r>
+                        <a:rPr lang="en-US" sz="700" b="0" smtClean="0">
+                          <a:latin typeface="Arial" pitchFamily="34" charset="0"/>
+                          <a:cs typeface="Arial" pitchFamily="34" charset="0"/>
+                        </a:rPr>
+                        <a:t>NA</a:t>
+                      </a:r>
+                      <a:endParaRPr lang="en-US" sz="700" baseline="0" dirty="0">
+                        <a:solidFill>
+                          <a:schemeClr val="tx1"/>
+                        </a:solidFill>
+                        <a:latin typeface="Arial" pitchFamily="34" charset="0"/>
+                        <a:cs typeface="Arial" pitchFamily="34" charset="0"/>
+                      </a:endParaRPr>
+                    </a:p>
+                  </a:txBody>
+                  <a:tcPr marL="45720" marR="45720" marB="0"/>
+                </a:tc>
+                <a:tc>
+                  <a:txBody>
+                    <a:bodyPr/>
+                    <a:lstStyle/>
+                    <a:p>
+                      <a:r>
+                        <a:rPr lang="en-US" sz="700" b="0" smtClean="0">
+                          <a:latin typeface="Arial" pitchFamily="34" charset="0"/>
+                          <a:cs typeface="Arial" pitchFamily="34" charset="0"/>
+                        </a:rPr>
+                        <a:t>NA</a:t>
+                      </a:r>
+                      <a:endParaRPr lang="en-US" sz="700" baseline="0" dirty="0">
+                        <a:solidFill>
+                          <a:schemeClr val="tx1"/>
+                        </a:solidFill>
+                        <a:latin typeface="Arial" pitchFamily="34" charset="0"/>
+                        <a:cs typeface="Arial" pitchFamily="34" charset="0"/>
+                      </a:endParaRPr>
+                    </a:p>
+                  </a:txBody>
+                  <a:tcPr marL="45720" marR="45720" marB="0"/>
+                </a:tc>
+                <a:tc>
+                  <a:txBody>
+                    <a:bodyPr/>
+                    <a:lstStyle/>
+                    <a:p>
+                      <a:r>
+                        <a:rPr lang="en-US" sz="700" b="0" smtClean="0">
+                          <a:latin typeface="Arial" pitchFamily="34" charset="0"/>
+                          <a:cs typeface="Arial" pitchFamily="34" charset="0"/>
+                        </a:rPr>
+                        <a:t>NA</a:t>
+                      </a:r>
+                      <a:endParaRPr lang="en-US" sz="700" baseline="0" dirty="0">
+                        <a:solidFill>
+                          <a:schemeClr val="tx1"/>
+                        </a:solidFill>
+                        <a:latin typeface="Arial" pitchFamily="34" charset="0"/>
+                        <a:cs typeface="Arial" pitchFamily="34" charset="0"/>
+                      </a:endParaRPr>
+                    </a:p>
+                  </a:txBody>
+                  <a:tcPr marL="45720" marR="45720" marB="0"/>
+                </a:tc>
+                <a:tc>
+                  <a:txBody>
+                    <a:bodyPr/>
+                    <a:lstStyle/>
+                    <a:p>
+                      <a:r>
+                        <a:rPr lang="en-US" sz="700" b="0" smtClean="0">
+                          <a:latin typeface="Arial" pitchFamily="34" charset="0"/>
+                          <a:cs typeface="Arial" pitchFamily="34" charset="0"/>
+                        </a:rPr>
+                        <a:t>NA</a:t>
+                      </a:r>
+                      <a:endParaRPr lang="en-US" sz="700" baseline="0" dirty="0">
+                        <a:solidFill>
+                          <a:schemeClr val="tx1"/>
+                        </a:solidFill>
+                        <a:latin typeface="Arial" pitchFamily="34" charset="0"/>
+                        <a:cs typeface="Arial" pitchFamily="34" charset="0"/>
+                      </a:endParaRPr>
+                    </a:p>
+                  </a:txBody>
+                  <a:tcPr marL="45720" marR="45720" marB="0"/>
+                </a:tc>
+                <a:tc>
+                  <a:txBody>
+                    <a:bodyPr/>
+                    <a:lstStyle/>
+                    <a:p>
+                      <a:r>
+                        <a:rPr lang="en-US" sz="700" b="0" smtClean="0">
+                          <a:latin typeface="Arial" pitchFamily="34" charset="0"/>
+                          <a:cs typeface="Arial" pitchFamily="34" charset="0"/>
+                        </a:rPr>
+                        <a:t>NA</a:t>
+                      </a:r>
+                      <a:endParaRPr lang="en-US" sz="700" baseline="0" dirty="0">
+                        <a:solidFill>
+                          <a:schemeClr val="tx1"/>
+                        </a:solidFill>
+                        <a:latin typeface="Arial" pitchFamily="34" charset="0"/>
+                        <a:cs typeface="Arial" pitchFamily="34" charset="0"/>
+                      </a:endParaRPr>
+                    </a:p>
+                  </a:txBody>
+                  <a:tcPr marL="45720" marR="45720" marB="0"/>
+                </a:tc>
+                <a:tc>
+                  <a:txBody>
+                    <a:bodyPr/>
+                    <a:lstStyle/>
+                    <a:p>
+                      <a:r>
+                        <a:rPr lang="en-US" sz="700" b="0" smtClean="0">
+                          <a:latin typeface="Arial" pitchFamily="34" charset="0"/>
+                          <a:cs typeface="Arial" pitchFamily="34" charset="0"/>
+                        </a:rPr>
+                        <a:t>NA</a:t>
+                      </a:r>
+                      <a:endParaRPr lang="en-US" sz="700" baseline="0" dirty="0">
+                        <a:solidFill>
+                          <a:schemeClr val="tx1"/>
+                        </a:solidFill>
+                        <a:latin typeface="Arial" pitchFamily="34" charset="0"/>
+                        <a:cs typeface="Arial" pitchFamily="34" charset="0"/>
+                      </a:endParaRPr>
+                    </a:p>
+                  </a:txBody>
+                  <a:tcPr marL="45720" marR="45720" marB="0"/>
+                </a:tc>
+                <a:tc>
+                  <a:txBody>
+                    <a:bodyPr/>
+                    <a:lstStyle/>
+                    <a:p>
+                      <a:r>
+                        <a:rPr lang="en-US" sz="700" b="0" smtClean="0">
+                          <a:latin typeface="Arial" pitchFamily="34" charset="0"/>
+                          <a:cs typeface="Arial" pitchFamily="34" charset="0"/>
+                        </a:rPr>
+                        <a:t>NA</a:t>
+                      </a:r>
+                      <a:endParaRPr lang="en-US" sz="700" baseline="0" dirty="0">
+                        <a:solidFill>
+                          <a:schemeClr val="tx1"/>
+                        </a:solidFill>
+                        <a:latin typeface="Arial" pitchFamily="34" charset="0"/>
+                        <a:cs typeface="Arial" pitchFamily="34" charset="0"/>
+                      </a:endParaRPr>
+                    </a:p>
+                  </a:txBody>
+                  <a:tcPr marL="45720" marR="45720" marB="0"/>
+                </a:tc>
+                <a:tc>
+                  <a:txBody>
+                    <a:bodyPr/>
+                    <a:lstStyle/>
+                    <a:p>
+                      <a:r>
+                        <a:rPr lang="en-US" sz="700" b="0" smtClean="0">
+                          <a:latin typeface="Arial" pitchFamily="34" charset="0"/>
+                          <a:cs typeface="Arial" pitchFamily="34" charset="0"/>
+                        </a:rPr>
+                        <a:t>NA</a:t>
+                      </a:r>
+                      <a:endParaRPr lang="en-US" sz="700" baseline="0" dirty="0">
+                        <a:solidFill>
+                          <a:schemeClr val="tx1"/>
+                        </a:solidFill>
+                        <a:latin typeface="Arial" pitchFamily="34" charset="0"/>
+                        <a:cs typeface="Arial" pitchFamily="34" charset="0"/>
+                      </a:endParaRPr>
+                    </a:p>
+                  </a:txBody>
+                  <a:tcPr marL="45720" marR="45720" marB="0"/>
+                </a:tc>
+                <a:tc>
+                  <a:txBody>
+                    <a:bodyPr/>
+                    <a:lstStyle/>
+                    <a:p>
+                      <a:r>
+                        <a:rPr lang="en-US" sz="700" b="0" smtClean="0">
+                          <a:latin typeface="Arial" pitchFamily="34" charset="0"/>
+                          <a:cs typeface="Arial" pitchFamily="34" charset="0"/>
+                        </a:rPr>
+                        <a:t>NA</a:t>
+                      </a:r>
+                      <a:endParaRPr lang="en-US" sz="700" baseline="0" dirty="0">
+                        <a:solidFill>
+                          <a:schemeClr val="tx1"/>
+                        </a:solidFill>
+                        <a:latin typeface="Arial" pitchFamily="34" charset="0"/>
+                        <a:cs typeface="Arial" pitchFamily="34" charset="0"/>
+                      </a:endParaRPr>
+                    </a:p>
+                  </a:txBody>
+                  <a:tcPr marL="45720" marR="45720" marB="0"/>
+                </a:tc>
+                <a:tc>
+                  <a:txBody>
+                    <a:bodyPr/>
+                    <a:lstStyle/>
+                    <a:p>
+                      <a:r>
+                        <a:rPr lang="en-US" sz="700" b="0" smtClean="0">
+                          <a:latin typeface="Arial" pitchFamily="34" charset="0"/>
+                          <a:cs typeface="Arial" pitchFamily="34" charset="0"/>
+                        </a:rPr>
+                        <a:t>NA</a:t>
+                      </a:r>
+                      <a:endParaRPr lang="en-US" sz="700" baseline="0" dirty="0">
+                        <a:solidFill>
+                          <a:schemeClr val="tx1"/>
+                        </a:solidFill>
+                        <a:latin typeface="Arial" pitchFamily="34" charset="0"/>
+                        <a:cs typeface="Arial" pitchFamily="34" charset="0"/>
+                      </a:endParaRPr>
+                    </a:p>
+                  </a:txBody>
+                  <a:tcPr marL="45720" marR="45720" marB="0"/>
+                </a:tc>
+                <a:tc>
+                  <a:txBody>
+                    <a:bodyPr/>
+                    <a:lstStyle/>
+                    <a:p>
+                      <a:pPr marL="0" marR="0" indent="0" algn="l" defTabSz="914400" rtl="0" eaLnBrk="1" fontAlgn="auto" latinLnBrk="0" hangingPunct="1">
+                        <a:lnSpc>
+                          <a:spcPct val="100000"/>
+                        </a:lnSpc>
+                        <a:spcBef>
+                          <a:spcPts val="0"/>
+                        </a:spcBef>
+                        <a:spcAft>
+                          <a:spcPts val="0"/>
+                        </a:spcAft>
+                        <a:buClrTx/>
+                        <a:buSzTx/>
+                        <a:buFontTx/>
+                        <a:buNone/>
+                        <a:tabLst/>
+                        <a:defRPr/>
+                      </a:pPr>
+                      <a:r>
+                        <a:rPr lang="en-US" sz="700" b="0" smtClean="0">
+                          <a:latin typeface="Arial" pitchFamily="34" charset="0"/>
+                          <a:cs typeface="Arial" pitchFamily="34" charset="0"/>
+                        </a:rPr>
+                        <a:t>NA</a:t>
+                      </a:r>
+                      <a:endParaRPr lang="en-US" sz="700" baseline="0" dirty="0">
+                        <a:solidFill>
+                          <a:schemeClr val="tx1"/>
+                        </a:solidFill>
+                        <a:latin typeface="Arial" pitchFamily="34" charset="0"/>
+                        <a:cs typeface="Arial" pitchFamily="34" charset="0"/>
+                      </a:endParaRPr>
+                    </a:p>
+                  </a:txBody>
+                  <a:tcPr marL="45720" marR="45720" marB="0"/>
+                </a:tc>
+                <a:tc>
+                  <a:txBody>
+                    <a:bodyPr/>
+                    <a:lstStyle/>
+                    <a:p>
+                      <a:r>
+                        <a:rPr lang="en-US" sz="700" b="0" dirty="0" smtClean="0">
+                          <a:latin typeface="Arial" pitchFamily="34" charset="0"/>
+                          <a:cs typeface="Arial" pitchFamily="34" charset="0"/>
+                        </a:rPr>
+                        <a:t>NA</a:t>
+                      </a:r>
+                      <a:endParaRPr lang="en-US" sz="700" baseline="0" dirty="0">
+                        <a:solidFill>
+                          <a:schemeClr val="tx1"/>
+                        </a:solidFill>
                         <a:latin typeface="Arial" pitchFamily="34" charset="0"/>
                         <a:cs typeface="Arial" pitchFamily="34" charset="0"/>
                       </a:endParaRPr>
@@ -5350,7 +6492,7 @@
     </p:spTree>
     <p:extLst>
       <p:ext uri="{BB962C8B-B14F-4D97-AF65-F5344CB8AC3E}">
-        <p14:creationId xmlns:p14="http://schemas.microsoft.com/office/powerpoint/2010/main" xmlns="" val="2616550347"/>
+        <p14:creationId xmlns:p14="http://schemas.microsoft.com/office/powerpoint/2010/main" val="2616550347"/>
       </p:ext>
     </p:extLst>
   </p:cSld>
@@ -5409,7 +6551,7 @@
       </p:sp>
       <p:sp>
         <p:nvSpPr>
-          <p:cNvPr id="3" name="Content Placeholder 2"/>
+          <p:cNvPr id="5" name="Content Placeholder 4"/>
           <p:cNvSpPr>
             <a:spLocks noGrp="1"/>
           </p:cNvSpPr>
@@ -5422,7 +6564,7 @@
           <a:bodyPr/>
           <a:lstStyle/>
           <a:p>
-            <a:endParaRPr lang="en-US" dirty="0"/>
+            <a:endParaRPr lang="en-US"/>
           </a:p>
         </p:txBody>
       </p:sp>
@@ -5435,7 +6577,7 @@
           <p:nvPr>
             <p:extLst>
               <p:ext uri="{D42A27DB-BD31-4B8C-83A1-F6EECF244321}">
-                <p14:modId xmlns:p14="http://schemas.microsoft.com/office/powerpoint/2010/main" xmlns="" val="1273810074"/>
+                <p14:modId xmlns:p14="http://schemas.microsoft.com/office/powerpoint/2010/main" val="1610601936"/>
               </p:ext>
             </p:extLst>
           </p:nvPr>
@@ -5453,7 +6595,7 @@
     </p:spTree>
     <p:extLst>
       <p:ext uri="{BB962C8B-B14F-4D97-AF65-F5344CB8AC3E}">
-        <p14:creationId xmlns:p14="http://schemas.microsoft.com/office/powerpoint/2010/main" xmlns="" val="2601612557"/>
+        <p14:creationId xmlns:p14="http://schemas.microsoft.com/office/powerpoint/2010/main" val="2601612557"/>
       </p:ext>
     </p:extLst>
   </p:cSld>
@@ -5512,7 +6654,7 @@
       </p:sp>
       <p:graphicFrame>
         <p:nvGraphicFramePr>
-          <p:cNvPr id="4" name="Content Placeholder 3"/>
+          <p:cNvPr id="6" name="Content Placeholder 5"/>
           <p:cNvGraphicFramePr>
             <a:graphicFrameLocks noGrp="1"/>
           </p:cNvGraphicFramePr>
@@ -5520,7 +6662,7 @@
             <p:ph idx="1"/>
             <p:extLst>
               <p:ext uri="{D42A27DB-BD31-4B8C-83A1-F6EECF244321}">
-                <p14:modId xmlns:p14="http://schemas.microsoft.com/office/powerpoint/2010/main" xmlns="" val="452837976"/>
+                <p14:modId xmlns:p14="http://schemas.microsoft.com/office/powerpoint/2010/main" val="752138407"/>
               </p:ext>
             </p:extLst>
           </p:nvPr>
@@ -5538,7 +6680,7 @@
     </p:spTree>
     <p:extLst>
       <p:ext uri="{BB962C8B-B14F-4D97-AF65-F5344CB8AC3E}">
-        <p14:creationId xmlns:p14="http://schemas.microsoft.com/office/powerpoint/2010/main" xmlns="" val="1098855275"/>
+        <p14:creationId xmlns:p14="http://schemas.microsoft.com/office/powerpoint/2010/main" val="1098855275"/>
       </p:ext>
     </p:extLst>
   </p:cSld>
@@ -5587,23 +6729,41 @@
           </a:p>
         </p:txBody>
       </p:sp>
+      <p:sp>
+        <p:nvSpPr>
+          <p:cNvPr id="3" name="Content Placeholder 2"/>
+          <p:cNvSpPr>
+            <a:spLocks noGrp="1"/>
+          </p:cNvSpPr>
+          <p:nvPr>
+            <p:ph idx="1"/>
+          </p:nvPr>
+        </p:nvSpPr>
+        <p:spPr/>
+        <p:txBody>
+          <a:bodyPr/>
+          <a:lstStyle/>
+          <a:p>
+            <a:endParaRPr lang="en-US"/>
+          </a:p>
+        </p:txBody>
+      </p:sp>
       <p:graphicFrame>
         <p:nvGraphicFramePr>
-          <p:cNvPr id="4" name="Content Placeholder 3"/>
+          <p:cNvPr id="5" name="Content Placeholder 5"/>
           <p:cNvGraphicFramePr>
-            <a:graphicFrameLocks noGrp="1"/>
+            <a:graphicFrameLocks/>
           </p:cNvGraphicFramePr>
           <p:nvPr>
-            <p:ph idx="1"/>
             <p:extLst>
               <p:ext uri="{D42A27DB-BD31-4B8C-83A1-F6EECF244321}">
-                <p14:modId xmlns:p14="http://schemas.microsoft.com/office/powerpoint/2010/main" xmlns="" val="1851299246"/>
+                <p14:modId xmlns:p14="http://schemas.microsoft.com/office/powerpoint/2010/main" val="2022418859"/>
               </p:ext>
             </p:extLst>
           </p:nvPr>
         </p:nvGraphicFramePr>
         <p:xfrm>
-          <a:off x="152400" y="1295400"/>
+          <a:off x="304800" y="1447800"/>
           <a:ext cx="8839200" cy="5181600"/>
         </p:xfrm>
         <a:graphic>
@@ -5615,7 +6775,7 @@
     </p:spTree>
     <p:extLst>
       <p:ext uri="{BB962C8B-B14F-4D97-AF65-F5344CB8AC3E}">
-        <p14:creationId xmlns:p14="http://schemas.microsoft.com/office/powerpoint/2010/main" xmlns="" val="3713926316"/>
+        <p14:creationId xmlns:p14="http://schemas.microsoft.com/office/powerpoint/2010/main" val="3713926316"/>
       </p:ext>
     </p:extLst>
   </p:cSld>
@@ -7035,21 +8195,6 @@
 </file>
 
 <file path=customXml/item1.xml><?xml version="1.0" encoding="utf-8"?>
-<?mso-contentType ?>
-<FormTemplates xmlns="http://schemas.microsoft.com/sharepoint/v3/contenttype/forms">
-  <Display>DocumentLibraryForm</Display>
-  <Edit>DocumentLibraryForm</Edit>
-  <New>DocumentLibraryForm</New>
-</FormTemplates>
-</file>
-
-<file path=customXml/item2.xml><?xml version="1.0" encoding="utf-8"?>
-<p:properties xmlns:p="http://schemas.microsoft.com/office/2006/metadata/properties" xmlns:xsi="http://www.w3.org/2001/XMLSchema-instance" xmlns:pc="http://schemas.microsoft.com/office/infopath/2007/PartnerControls">
-  <documentManagement/>
-</p:properties>
-</file>
-
-<file path=customXml/item3.xml><?xml version="1.0" encoding="utf-8"?>
 <ct:contentTypeSchema xmlns:ct="http://schemas.microsoft.com/office/2006/metadata/contentType" xmlns:ma="http://schemas.microsoft.com/office/2006/metadata/properties/metaAttributes" ct:_="" ma:_="" ma:contentTypeName="Document" ma:contentTypeID="0x010100EF867D41FF4F6741B2566D0C48EB59D2" ma:contentTypeVersion="0" ma:contentTypeDescription="Create a new document." ma:contentTypeScope="" ma:versionID="c6cc6be9b7085f5a7c9c7d9b3dbd5dc1">
   <xsd:schema xmlns:xsd="http://www.w3.org/2001/XMLSchema" xmlns:xs="http://www.w3.org/2001/XMLSchema" xmlns:p="http://schemas.microsoft.com/office/2006/metadata/properties" targetNamespace="http://schemas.microsoft.com/office/2006/metadata/properties" ma:root="true" ma:fieldsID="c64490b4aec6201516c3a874156f37b2">
     <xsd:element name="properties">
@@ -7163,30 +8308,22 @@
 </ct:contentTypeSchema>
 </file>
 
-<file path=customXml/itemProps1.xml><?xml version="1.0" encoding="utf-8"?>
-<ds:datastoreItem xmlns:ds="http://schemas.openxmlformats.org/officeDocument/2006/customXml" ds:itemID="{362DF851-7E51-44C7-BE33-35BF0C957E71}">
-  <ds:schemaRefs>
-    <ds:schemaRef ds:uri="http://schemas.microsoft.com/sharepoint/v3/contenttype/forms"/>
-  </ds:schemaRefs>
-</ds:datastoreItem>
+<file path=customXml/item2.xml><?xml version="1.0" encoding="utf-8"?>
+<p:properties xmlns:p="http://schemas.microsoft.com/office/2006/metadata/properties" xmlns:xsi="http://www.w3.org/2001/XMLSchema-instance" xmlns:pc="http://schemas.microsoft.com/office/infopath/2007/PartnerControls">
+  <documentManagement/>
+</p:properties>
 </file>
 
-<file path=customXml/itemProps2.xml><?xml version="1.0" encoding="utf-8"?>
-<ds:datastoreItem xmlns:ds="http://schemas.openxmlformats.org/officeDocument/2006/customXml" ds:itemID="{F08FFFF7-6ACE-4B4C-AA05-EAF8BD457E72}">
-  <ds:schemaRefs>
-    <ds:schemaRef ds:uri="http://www.w3.org/XML/1998/namespace"/>
-    <ds:schemaRef ds:uri="http://schemas.microsoft.com/office/2006/documentManagement/types"/>
-    <ds:schemaRef ds:uri="http://purl.org/dc/elements/1.1/"/>
-    <ds:schemaRef ds:uri="http://purl.org/dc/terms/"/>
-    <ds:schemaRef ds:uri="http://schemas.openxmlformats.org/package/2006/metadata/core-properties"/>
-    <ds:schemaRef ds:uri="http://schemas.microsoft.com/office/infopath/2007/PartnerControls"/>
-    <ds:schemaRef ds:uri="http://schemas.microsoft.com/office/2006/metadata/properties"/>
-    <ds:schemaRef ds:uri="http://purl.org/dc/dcmitype/"/>
-  </ds:schemaRefs>
-</ds:datastoreItem>
+<file path=customXml/item3.xml><?xml version="1.0" encoding="utf-8"?>
+<?mso-contentType ?>
+<FormTemplates xmlns="http://schemas.microsoft.com/sharepoint/v3/contenttype/forms">
+  <Display>DocumentLibraryForm</Display>
+  <Edit>DocumentLibraryForm</Edit>
+  <New>DocumentLibraryForm</New>
+</FormTemplates>
 </file>
 
-<file path=customXml/itemProps3.xml><?xml version="1.0" encoding="utf-8"?>
+<file path=customXml/itemProps1.xml><?xml version="1.0" encoding="utf-8"?>
 <ds:datastoreItem xmlns:ds="http://schemas.openxmlformats.org/officeDocument/2006/customXml" ds:itemID="{776C13B3-8EDC-4A1B-8FE1-1561EBD711EC}">
   <ds:schemaRefs>
     <ds:schemaRef ds:uri="http://schemas.microsoft.com/office/2006/metadata/contentType"/>
@@ -7200,4 +8337,27 @@
     <ds:schemaRef ds:uri="http://schemas.microsoft.com/office/infopath/2007/PartnerControls"/>
   </ds:schemaRefs>
 </ds:datastoreItem>
+</file>
+
+<file path=customXml/itemProps2.xml><?xml version="1.0" encoding="utf-8"?>
+<ds:datastoreItem xmlns:ds="http://schemas.openxmlformats.org/officeDocument/2006/customXml" ds:itemID="{F08FFFF7-6ACE-4B4C-AA05-EAF8BD457E72}">
+  <ds:schemaRefs>
+    <ds:schemaRef ds:uri="http://purl.org/dc/elements/1.1/"/>
+    <ds:schemaRef ds:uri="http://schemas.microsoft.com/office/2006/documentManagement/types"/>
+    <ds:schemaRef ds:uri="http://schemas.openxmlformats.org/package/2006/metadata/core-properties"/>
+    <ds:schemaRef ds:uri="http://schemas.microsoft.com/office/2006/metadata/properties"/>
+    <ds:schemaRef ds:uri="http://purl.org/dc/terms/"/>
+    <ds:schemaRef ds:uri="http://purl.org/dc/dcmitype/"/>
+    <ds:schemaRef ds:uri="http://schemas.microsoft.com/office/infopath/2007/PartnerControls"/>
+    <ds:schemaRef ds:uri="http://www.w3.org/XML/1998/namespace"/>
+  </ds:schemaRefs>
+</ds:datastoreItem>
+</file>
+
+<file path=customXml/itemProps3.xml><?xml version="1.0" encoding="utf-8"?>
+<ds:datastoreItem xmlns:ds="http://schemas.openxmlformats.org/officeDocument/2006/customXml" ds:itemID="{362DF851-7E51-44C7-BE33-35BF0C957E71}">
+  <ds:schemaRefs>
+    <ds:schemaRef ds:uri="http://schemas.microsoft.com/sharepoint/v3/contenttype/forms"/>
+  </ds:schemaRefs>
+</ds:datastoreItem>
 </file>
</xml_diff>

<commit_message>
removed the dependency on having only one bulleted item on Completed tasks
</commit_message>
<xml_diff>
--- a/PMMPresentation/Modules/Templates/PMM Template.pptx
+++ b/PMMPresentation/Modules/Templates/PMM Template.pptx
@@ -311,11 +311,11 @@
         </c:dLbls>
         <c:gapWidth val="150"/>
         <c:overlap val="100"/>
-        <c:axId val="31929856"/>
-        <c:axId val="53109888"/>
+        <c:axId val="31754240"/>
+        <c:axId val="98780864"/>
       </c:barChart>
       <c:catAx>
-        <c:axId val="31929856"/>
+        <c:axId val="31754240"/>
         <c:scaling>
           <c:orientation val="maxMin"/>
         </c:scaling>
@@ -336,7 +336,7 @@
             <a:endParaRPr lang="en-US"/>
           </a:p>
         </c:txPr>
-        <c:crossAx val="53109888"/>
+        <c:crossAx val="98780864"/>
         <c:crosses val="autoZero"/>
         <c:auto val="0"/>
         <c:lblAlgn val="ctr"/>
@@ -344,7 +344,7 @@
         <c:noMultiLvlLbl val="0"/>
       </c:catAx>
       <c:valAx>
-        <c:axId val="53109888"/>
+        <c:axId val="98780864"/>
         <c:scaling>
           <c:orientation val="minMax"/>
         </c:scaling>
@@ -355,7 +355,7 @@
         <c:majorTickMark val="out"/>
         <c:minorTickMark val="none"/>
         <c:tickLblPos val="nextTo"/>
-        <c:crossAx val="31929856"/>
+        <c:crossAx val="31754240"/>
         <c:crosses val="autoZero"/>
         <c:crossBetween val="between"/>
       </c:valAx>
@@ -603,8 +603,8 @@
           <c:showBubbleSize val="0"/>
         </c:dLbls>
         <c:gapWidth val="150"/>
-        <c:axId val="31930880"/>
-        <c:axId val="98798400"/>
+        <c:axId val="31755264"/>
+        <c:axId val="98783168"/>
       </c:barChart>
       <c:lineChart>
         <c:grouping val="standard"/>
@@ -735,11 +735,11 @@
         </c:dLbls>
         <c:marker val="1"/>
         <c:smooth val="0"/>
-        <c:axId val="31930880"/>
-        <c:axId val="98798400"/>
+        <c:axId val="31755264"/>
+        <c:axId val="98783168"/>
       </c:lineChart>
       <c:catAx>
-        <c:axId val="31930880"/>
+        <c:axId val="31755264"/>
         <c:scaling>
           <c:orientation val="minMax"/>
         </c:scaling>
@@ -748,7 +748,7 @@
         <c:majorTickMark val="out"/>
         <c:minorTickMark val="none"/>
         <c:tickLblPos val="nextTo"/>
-        <c:crossAx val="98798400"/>
+        <c:crossAx val="98783168"/>
         <c:crosses val="autoZero"/>
         <c:auto val="1"/>
         <c:lblAlgn val="ctr"/>
@@ -756,7 +756,7 @@
         <c:noMultiLvlLbl val="0"/>
       </c:catAx>
       <c:valAx>
-        <c:axId val="98798400"/>
+        <c:axId val="98783168"/>
         <c:scaling>
           <c:orientation val="minMax"/>
         </c:scaling>
@@ -767,7 +767,7 @@
         <c:majorTickMark val="out"/>
         <c:minorTickMark val="none"/>
         <c:tickLblPos val="nextTo"/>
-        <c:crossAx val="31930880"/>
+        <c:crossAx val="31755264"/>
         <c:crosses val="autoZero"/>
         <c:crossBetween val="between"/>
       </c:valAx>
@@ -1043,8 +1043,8 @@
           <c:showBubbleSize val="0"/>
         </c:dLbls>
         <c:gapWidth val="150"/>
-        <c:axId val="64968192"/>
-        <c:axId val="31583040"/>
+        <c:axId val="33082368"/>
+        <c:axId val="98784896"/>
       </c:barChart>
       <c:lineChart>
         <c:grouping val="standard"/>
@@ -1175,11 +1175,11 @@
         </c:dLbls>
         <c:marker val="1"/>
         <c:smooth val="0"/>
-        <c:axId val="64968192"/>
-        <c:axId val="31583040"/>
+        <c:axId val="33082368"/>
+        <c:axId val="98784896"/>
       </c:lineChart>
       <c:catAx>
-        <c:axId val="64968192"/>
+        <c:axId val="33082368"/>
         <c:scaling>
           <c:orientation val="minMax"/>
         </c:scaling>
@@ -1188,7 +1188,7 @@
         <c:majorTickMark val="out"/>
         <c:minorTickMark val="none"/>
         <c:tickLblPos val="nextTo"/>
-        <c:crossAx val="31583040"/>
+        <c:crossAx val="98784896"/>
         <c:crosses val="autoZero"/>
         <c:auto val="1"/>
         <c:lblAlgn val="ctr"/>
@@ -1196,7 +1196,7 @@
         <c:noMultiLvlLbl val="0"/>
       </c:catAx>
       <c:valAx>
-        <c:axId val="31583040"/>
+        <c:axId val="98784896"/>
         <c:scaling>
           <c:orientation val="minMax"/>
         </c:scaling>
@@ -1207,7 +1207,7 @@
         <c:majorTickMark val="out"/>
         <c:minorTickMark val="none"/>
         <c:tickLblPos val="nextTo"/>
-        <c:crossAx val="64968192"/>
+        <c:crossAx val="33082368"/>
         <c:crosses val="autoZero"/>
         <c:crossBetween val="between"/>
       </c:valAx>
@@ -1561,11 +1561,11 @@
         </c:dLbls>
         <c:marker val="1"/>
         <c:smooth val="0"/>
-        <c:axId val="31475200"/>
-        <c:axId val="98803008"/>
+        <c:axId val="33079808"/>
+        <c:axId val="31326208"/>
       </c:lineChart>
       <c:catAx>
-        <c:axId val="31475200"/>
+        <c:axId val="33079808"/>
         <c:scaling>
           <c:orientation val="minMax"/>
         </c:scaling>
@@ -1574,7 +1574,7 @@
         <c:majorTickMark val="none"/>
         <c:minorTickMark val="none"/>
         <c:tickLblPos val="nextTo"/>
-        <c:crossAx val="98803008"/>
+        <c:crossAx val="31326208"/>
         <c:crosses val="autoZero"/>
         <c:auto val="1"/>
         <c:lblAlgn val="ctr"/>
@@ -1582,7 +1582,7 @@
         <c:noMultiLvlLbl val="0"/>
       </c:catAx>
       <c:valAx>
-        <c:axId val="98803008"/>
+        <c:axId val="31326208"/>
         <c:scaling>
           <c:orientation val="minMax"/>
         </c:scaling>
@@ -1616,7 +1616,7 @@
         <c:majorTickMark val="none"/>
         <c:minorTickMark val="none"/>
         <c:tickLblPos val="nextTo"/>
-        <c:crossAx val="31475200"/>
+        <c:crossAx val="33079808"/>
         <c:crosses val="autoZero"/>
         <c:crossBetween val="between"/>
       </c:valAx>
@@ -4711,8 +4711,17 @@
           <a:p>
             <a:r>
               <a:rPr lang="en-US" dirty="0" smtClean="0"/>
-              <a:t>None this month</a:t>
+              <a:t>None </a:t>
             </a:r>
+            <a:r>
+              <a:rPr lang="en-US" smtClean="0"/>
+              <a:t>this </a:t>
+            </a:r>
+            <a:r>
+              <a:rPr lang="en-US" smtClean="0"/>
+              <a:t>month</a:t>
+            </a:r>
+            <a:endParaRPr lang="en-US" dirty="0" smtClean="0"/>
           </a:p>
         </p:txBody>
       </p:sp>

</xml_diff>

<commit_message>
a Stable version with Gantt chart for the chart slides
</commit_message>
<xml_diff>
--- a/PMMPresentation/Modules/Templates/PMM Template.pptx
+++ b/PMMPresentation/Modules/Templates/PMM Template.pptx
@@ -17,7 +17,7 @@
     <p:sldId id="634" r:id="rId8"/>
     <p:sldId id="641" r:id="rId9"/>
     <p:sldId id="642" r:id="rId10"/>
-    <p:sldId id="632" r:id="rId11"/>
+    <p:sldId id="646" r:id="rId11"/>
     <p:sldId id="643" r:id="rId12"/>
     <p:sldId id="644" r:id="rId13"/>
     <p:sldId id="639" r:id="rId14"/>
@@ -169,17 +169,7 @@
   <c:chart>
     <c:autoTitleDeleted val="0"/>
     <c:plotArea>
-      <c:layout>
-        <c:manualLayout>
-          <c:layoutTarget val="inner"/>
-          <c:xMode val="edge"/>
-          <c:yMode val="edge"/>
-          <c:x val="0.30479549431321085"/>
-          <c:y val="6.5983968494660691E-2"/>
-          <c:w val="0.66836808593370289"/>
-          <c:h val="0.90314967223550313"/>
-        </c:manualLayout>
-      </c:layout>
+      <c:layout/>
       <c:barChart>
         <c:barDir val="bar"/>
         <c:grouping val="stacked"/>
@@ -187,29 +177,58 @@
         <c:ser>
           <c:idx val="0"/>
           <c:order val="0"/>
+          <c:tx>
+            <c:strRef>
+              <c:f>Sheet1!$B$1</c:f>
+              <c:strCache>
+                <c:ptCount val="1"/>
+                <c:pt idx="0">
+                  <c:v>TASK_START</c:v>
+                </c:pt>
+              </c:strCache>
+            </c:strRef>
+          </c:tx>
           <c:spPr>
             <a:noFill/>
           </c:spPr>
           <c:invertIfNegative val="0"/>
           <c:cat>
             <c:strRef>
-              <c:f>Sheet1!$A$2</c:f>
+              <c:f>Sheet1!$A$2:$A$5</c:f>
               <c:strCache>
-                <c:ptCount val="1"/>
+                <c:ptCount val="4"/>
                 <c:pt idx="0">
-                  <c:v>Task 1:  12/20</c:v>
+                  <c:v>Task 4 | 04/10</c:v>
+                </c:pt>
+                <c:pt idx="1">
+                  <c:v>Task 3 | 05/02</c:v>
+                </c:pt>
+                <c:pt idx="2">
+                  <c:v>Task 2 | 02/10</c:v>
+                </c:pt>
+                <c:pt idx="3">
+                  <c:v>Task1 | 01/10</c:v>
                 </c:pt>
               </c:strCache>
             </c:strRef>
           </c:cat>
           <c:val>
             <c:numRef>
-              <c:f>Sheet1!$B$2</c:f>
+              <c:f>Sheet1!$B$2:$B$5</c:f>
               <c:numCache>
-                <c:formatCode>m/d/yy;@</c:formatCode>
-                <c:ptCount val="1"/>
+                <c:formatCode>m/d/yyyy</c:formatCode>
+                <c:ptCount val="4"/>
                 <c:pt idx="0">
-                  <c:v>41628</c:v>
+                  <c:v>41365</c:v>
+                </c:pt>
+                <c:pt idx="1">
+                  <c:v>41334</c:v>
+                </c:pt>
+                <c:pt idx="2">
+                  <c:v>41306</c:v>
+                </c:pt>
+                <c:pt idx="3">
+                  <c:v>41275</c:v>
                 </c:pt>
               </c:numCache>
             </c:numRef>
@@ -218,11 +237,164 @@
         <c:ser>
           <c:idx val="1"/>
           <c:order val="1"/>
+          <c:tx>
+            <c:strRef>
+              <c:f>Sheet1!$C$1</c:f>
+              <c:strCache>
+                <c:ptCount val="1"/>
+                <c:pt idx="0">
+                  <c:v>TaskDuration</c:v>
+                </c:pt>
+              </c:strCache>
+            </c:strRef>
+          </c:tx>
+          <c:spPr>
+            <a:solidFill>
+              <a:srgbClr val="002060"/>
+            </a:solidFill>
+          </c:spPr>
+          <c:invertIfNegative val="0"/>
+          <c:cat>
+            <c:strRef>
+              <c:f>Sheet1!$A$2:$A$5</c:f>
+              <c:strCache>
+                <c:ptCount val="4"/>
+                <c:pt idx="0">
+                  <c:v>Task 4 | 04/10</c:v>
+                </c:pt>
+                <c:pt idx="1">
+                  <c:v>Task 3 | 05/02</c:v>
+                </c:pt>
+                <c:pt idx="2">
+                  <c:v>Task 2 | 02/10</c:v>
+                </c:pt>
+                <c:pt idx="3">
+                  <c:v>Task1 | 01/10</c:v>
+                </c:pt>
+              </c:strCache>
+            </c:strRef>
+          </c:cat>
+          <c:val>
+            <c:numRef>
+              <c:f>Sheet1!$C$2:$C$5</c:f>
+              <c:numCache>
+                <c:formatCode>General</c:formatCode>
+                <c:ptCount val="4"/>
+                <c:pt idx="0">
+                  <c:v>153</c:v>
+                </c:pt>
+                <c:pt idx="1">
+                  <c:v>61</c:v>
+                </c:pt>
+                <c:pt idx="2">
+                  <c:v>59</c:v>
+                </c:pt>
+                <c:pt idx="3">
+                  <c:v>59</c:v>
+                </c:pt>
+              </c:numCache>
+            </c:numRef>
+          </c:val>
+        </c:ser>
+        <c:dLbls>
+          <c:showLegendKey val="0"/>
+          <c:showVal val="0"/>
+          <c:showCatName val="0"/>
+          <c:showSerName val="0"/>
+          <c:showPercent val="0"/>
+          <c:showBubbleSize val="0"/>
+        </c:dLbls>
+        <c:gapWidth val="151"/>
+        <c:overlap val="-100"/>
+        <c:axId val="31885312"/>
+        <c:axId val="68177280"/>
+      </c:barChart>
+      <c:barChart>
+        <c:barDir val="bar"/>
+        <c:grouping val="stacked"/>
+        <c:varyColors val="0"/>
+        <c:ser>
+          <c:idx val="2"/>
+          <c:order val="2"/>
+          <c:tx>
+            <c:strRef>
+              <c:f>Sheet1!$D$1</c:f>
+              <c:strCache>
+                <c:ptCount val="1"/>
+                <c:pt idx="0">
+                  <c:v>TB_START</c:v>
+                </c:pt>
+              </c:strCache>
+            </c:strRef>
+          </c:tx>
+          <c:spPr>
+            <a:noFill/>
+          </c:spPr>
+          <c:invertIfNegative val="0"/>
+          <c:cat>
+            <c:strRef>
+              <c:f>Sheet1!$A$2:$A$5</c:f>
+              <c:strCache>
+                <c:ptCount val="4"/>
+                <c:pt idx="0">
+                  <c:v>Task 4 | 04/10</c:v>
+                </c:pt>
+                <c:pt idx="1">
+                  <c:v>Task 3 | 05/02</c:v>
+                </c:pt>
+                <c:pt idx="2">
+                  <c:v>Task 2 | 02/10</c:v>
+                </c:pt>
+                <c:pt idx="3">
+                  <c:v>Task1 | 01/10</c:v>
+                </c:pt>
+              </c:strCache>
+            </c:strRef>
+          </c:cat>
+          <c:val>
+            <c:numRef>
+              <c:f>Sheet1!$D$2:$D$5</c:f>
+              <c:numCache>
+                <c:formatCode>m/d/yyyy</c:formatCode>
+                <c:ptCount val="4"/>
+                <c:pt idx="0">
+                  <c:v>41365</c:v>
+                </c:pt>
+                <c:pt idx="1">
+                  <c:v>41334</c:v>
+                </c:pt>
+                <c:pt idx="2">
+                  <c:v>41306</c:v>
+                </c:pt>
+                <c:pt idx="3">
+                  <c:v>41275</c:v>
+                </c:pt>
+              </c:numCache>
+            </c:numRef>
+          </c:val>
+        </c:ser>
+        <c:ser>
+          <c:idx val="3"/>
+          <c:order val="3"/>
+          <c:tx>
+            <c:strRef>
+              <c:f>Sheet1!$E$1</c:f>
+              <c:strCache>
+                <c:ptCount val="1"/>
+                <c:pt idx="0">
+                  <c:v>BaseDuration</c:v>
+                </c:pt>
+              </c:strCache>
+            </c:strRef>
+          </c:tx>
           <c:spPr>
             <a:gradFill>
               <a:gsLst>
                 <a:gs pos="0">
-                  <a:srgbClr val="002060"/>
+                  <a:schemeClr val="accent1">
+                    <a:tint val="66000"/>
+                    <a:satMod val="160000"/>
+                  </a:schemeClr>
                 </a:gs>
                 <a:gs pos="50000">
                   <a:schemeClr val="accent1">
@@ -241,61 +413,43 @@
             </a:gradFill>
           </c:spPr>
           <c:invertIfNegative val="0"/>
-          <c:dLbls>
-            <c:dLbl>
-              <c:idx val="0"/>
-              <c:layout>
-                <c:manualLayout>
-                  <c:x val="0.17404466802760771"/>
-                  <c:y val="-2.8055907659872755E-3"/>
-                </c:manualLayout>
-              </c:layout>
-              <c:dLblPos val="ctr"/>
-              <c:showLegendKey val="0"/>
-              <c:showVal val="0"/>
-              <c:showCatName val="1"/>
-              <c:showSerName val="0"/>
-              <c:showPercent val="0"/>
-              <c:showBubbleSize val="0"/>
-            </c:dLbl>
-            <c:txPr>
-              <a:bodyPr/>
-              <a:lstStyle/>
-              <a:p>
-                <a:pPr>
-                  <a:defRPr sz="700" baseline="0"/>
-                </a:pPr>
-                <a:endParaRPr lang="en-US"/>
-              </a:p>
-            </c:txPr>
-            <c:dLblPos val="inEnd"/>
-            <c:showLegendKey val="0"/>
-            <c:showVal val="0"/>
-            <c:showCatName val="1"/>
-            <c:showSerName val="0"/>
-            <c:showPercent val="0"/>
-            <c:showBubbleSize val="0"/>
-            <c:showLeaderLines val="0"/>
-          </c:dLbls>
           <c:cat>
             <c:strRef>
-              <c:f>Sheet1!$A$2</c:f>
+              <c:f>Sheet1!$A$2:$A$5</c:f>
               <c:strCache>
-                <c:ptCount val="1"/>
+                <c:ptCount val="4"/>
                 <c:pt idx="0">
-                  <c:v>Task 1:  12/20</c:v>
+                  <c:v>Task 4 | 04/10</c:v>
+                </c:pt>
+                <c:pt idx="1">
+                  <c:v>Task 3 | 05/02</c:v>
+                </c:pt>
+                <c:pt idx="2">
+                  <c:v>Task 2 | 02/10</c:v>
+                </c:pt>
+                <c:pt idx="3">
+                  <c:v>Task1 | 01/10</c:v>
                 </c:pt>
               </c:strCache>
             </c:strRef>
           </c:cat>
           <c:val>
             <c:numRef>
-              <c:f>Sheet1!$C$2</c:f>
+              <c:f>Sheet1!$E$2:$E$5</c:f>
               <c:numCache>
                 <c:formatCode>General</c:formatCode>
-                <c:ptCount val="1"/>
+                <c:ptCount val="4"/>
                 <c:pt idx="0">
-                  <c:v>1</c:v>
+                  <c:v>9</c:v>
+                </c:pt>
+                <c:pt idx="1">
+                  <c:v>62</c:v>
+                </c:pt>
+                <c:pt idx="2">
+                  <c:v>9</c:v>
+                </c:pt>
+                <c:pt idx="3">
+                  <c:v>9</c:v>
                 </c:pt>
               </c:numCache>
             </c:numRef>
@@ -309,18 +463,19 @@
           <c:showPercent val="0"/>
           <c:showBubbleSize val="0"/>
         </c:dLbls>
-        <c:gapWidth val="150"/>
-        <c:overlap val="100"/>
-        <c:axId val="31754240"/>
-        <c:axId val="98780864"/>
+        <c:gapWidth val="500"/>
+        <c:overlap val="-91"/>
+        <c:axId val="31886848"/>
+        <c:axId val="68178432"/>
       </c:barChart>
       <c:catAx>
-        <c:axId val="31754240"/>
+        <c:axId val="31885312"/>
         <c:scaling>
-          <c:orientation val="maxMin"/>
+          <c:orientation val="minMax"/>
         </c:scaling>
         <c:delete val="0"/>
         <c:axPos val="l"/>
+        <c:numFmt formatCode="General" sourceLinked="1"/>
         <c:majorTickMark val="out"/>
         <c:minorTickMark val="none"/>
         <c:tickLblPos val="nextTo"/>
@@ -329,41 +484,120 @@
           <a:lstStyle/>
           <a:p>
             <a:pPr>
-              <a:defRPr sz="700" baseline="0">
-                <a:latin typeface="Arial" pitchFamily="34" charset="0"/>
+              <a:defRPr sz="1200" b="1" spc="-150">
+                <a:latin typeface="Verdana" pitchFamily="34" charset="0"/>
+                <a:ea typeface="Verdana" pitchFamily="34" charset="0"/>
+                <a:cs typeface="Verdana" pitchFamily="34" charset="0"/>
               </a:defRPr>
             </a:pPr>
             <a:endParaRPr lang="en-US"/>
           </a:p>
         </c:txPr>
-        <c:crossAx val="98780864"/>
+        <c:crossAx val="68177280"/>
         <c:crosses val="autoZero"/>
-        <c:auto val="0"/>
+        <c:auto val="1"/>
         <c:lblAlgn val="ctr"/>
-        <c:lblOffset val="1000"/>
+        <c:lblOffset val="100"/>
         <c:noMultiLvlLbl val="0"/>
       </c:catAx>
       <c:valAx>
-        <c:axId val="98780864"/>
+        <c:axId val="68177280"/>
+        <c:scaling>
+          <c:orientation val="minMax"/>
+          <c:max val="41650"/>
+          <c:min val="41150"/>
+        </c:scaling>
+        <c:delete val="0"/>
+        <c:axPos val="b"/>
+        <c:majorGridlines/>
+        <c:numFmt formatCode="m/d/yy;@" sourceLinked="0"/>
+        <c:majorTickMark val="out"/>
+        <c:minorTickMark val="none"/>
+        <c:tickLblPos val="nextTo"/>
+        <c:txPr>
+          <a:bodyPr/>
+          <a:lstStyle/>
+          <a:p>
+            <a:pPr>
+              <a:defRPr sz="1200" b="1">
+                <a:latin typeface="Arial" pitchFamily="34" charset="0"/>
+                <a:cs typeface="Arial" pitchFamily="34" charset="0"/>
+              </a:defRPr>
+            </a:pPr>
+            <a:endParaRPr lang="en-US"/>
+          </a:p>
+        </c:txPr>
+        <c:crossAx val="31885312"/>
+        <c:crosses val="autoZero"/>
+        <c:crossBetween val="between"/>
+        <c:majorUnit val="100"/>
+        <c:minorUnit val="100"/>
+      </c:valAx>
+      <c:valAx>
+        <c:axId val="68178432"/>
+        <c:scaling>
+          <c:orientation val="minMax"/>
+          <c:max val="41650"/>
+          <c:min val="41150"/>
+        </c:scaling>
+        <c:delete val="0"/>
+        <c:axPos val="t"/>
+        <c:numFmt formatCode="m/d/yy;@" sourceLinked="0"/>
+        <c:majorTickMark val="out"/>
+        <c:minorTickMark val="none"/>
+        <c:tickLblPos val="nextTo"/>
+        <c:txPr>
+          <a:bodyPr/>
+          <a:lstStyle/>
+          <a:p>
+            <a:pPr>
+              <a:defRPr sz="1200" b="1" baseline="0">
+                <a:latin typeface="Arial" pitchFamily="34" charset="0"/>
+                <a:cs typeface="Arial" pitchFamily="34" charset="0"/>
+              </a:defRPr>
+            </a:pPr>
+            <a:endParaRPr lang="en-US"/>
+          </a:p>
+        </c:txPr>
+        <c:crossAx val="31886848"/>
+        <c:crosses val="max"/>
+        <c:crossBetween val="between"/>
+        <c:majorUnit val="100"/>
+        <c:minorUnit val="100"/>
+      </c:valAx>
+      <c:catAx>
+        <c:axId val="31886848"/>
         <c:scaling>
           <c:orientation val="minMax"/>
         </c:scaling>
-        <c:delete val="0"/>
-        <c:axPos val="t"/>
-        <c:majorGridlines/>
-        <c:numFmt formatCode="m/d;@" sourceLinked="0"/>
+        <c:delete val="1"/>
+        <c:axPos val="l"/>
+        <c:numFmt formatCode="m/d/yyyy" sourceLinked="1"/>
         <c:majorTickMark val="out"/>
         <c:minorTickMark val="none"/>
-        <c:tickLblPos val="nextTo"/>
-        <c:crossAx val="31754240"/>
+        <c:tickLblPos val="none"/>
+        <c:crossAx val="68178432"/>
         <c:crosses val="autoZero"/>
-        <c:crossBetween val="between"/>
-      </c:valAx>
+        <c:auto val="1"/>
+        <c:lblAlgn val="ctr"/>
+        <c:lblOffset val="100"/>
+        <c:noMultiLvlLbl val="0"/>
+      </c:catAx>
     </c:plotArea>
     <c:plotVisOnly val="1"/>
     <c:dispBlanksAs val="gap"/>
     <c:showDLblsOverMax val="0"/>
   </c:chart>
+  <c:txPr>
+    <a:bodyPr/>
+    <a:lstStyle/>
+    <a:p>
+      <a:pPr>
+        <a:defRPr sz="1800"/>
+      </a:pPr>
+      <a:endParaRPr lang="en-US"/>
+    </a:p>
+  </c:txPr>
   <c:externalData r:id="rId1">
     <c:autoUpdate val="0"/>
   </c:externalData>
@@ -420,9 +654,12 @@
             <c:strRef>
               <c:f>Sheet1!$A$2:$A$11</c:f>
               <c:strCache>
-                <c:ptCount val="1"/>
+                <c:ptCount val="2"/>
                 <c:pt idx="0">
                   <c:v>Category 1</c:v>
+                </c:pt>
+                <c:pt idx="1">
+                  <c:v>Category 2</c:v>
                 </c:pt>
               </c:strCache>
             </c:strRef>
@@ -435,6 +672,9 @@
                 <c:ptCount val="10"/>
                 <c:pt idx="0">
                   <c:v>1</c:v>
+                </c:pt>
+                <c:pt idx="1">
+                  <c:v>2</c:v>
                 </c:pt>
                 <c:pt idx="6">
                   <c:v>0</c:v>
@@ -472,9 +712,12 @@
             <c:strRef>
               <c:f>Sheet1!$A$2:$A$11</c:f>
               <c:strCache>
-                <c:ptCount val="1"/>
+                <c:ptCount val="2"/>
                 <c:pt idx="0">
                   <c:v>Category 1</c:v>
+                </c:pt>
+                <c:pt idx="1">
+                  <c:v>Category 2</c:v>
                 </c:pt>
               </c:strCache>
             </c:strRef>
@@ -487,6 +730,9 @@
                 <c:ptCount val="10"/>
                 <c:pt idx="0">
                   <c:v>1</c:v>
+                </c:pt>
+                <c:pt idx="1">
+                  <c:v>2</c:v>
                 </c:pt>
               </c:numCache>
             </c:numRef>
@@ -521,9 +767,12 @@
             <c:strRef>
               <c:f>Sheet1!$A$2:$A$11</c:f>
               <c:strCache>
-                <c:ptCount val="1"/>
+                <c:ptCount val="2"/>
                 <c:pt idx="0">
                   <c:v>Category 1</c:v>
+                </c:pt>
+                <c:pt idx="1">
+                  <c:v>Category 2</c:v>
                 </c:pt>
               </c:strCache>
             </c:strRef>
@@ -536,6 +785,9 @@
                 <c:ptCount val="10"/>
                 <c:pt idx="0">
                   <c:v>1</c:v>
+                </c:pt>
+                <c:pt idx="1">
+                  <c:v>2</c:v>
                 </c:pt>
               </c:numCache>
             </c:numRef>
@@ -574,9 +826,12 @@
             <c:strRef>
               <c:f>Sheet1!$A$2:$A$11</c:f>
               <c:strCache>
-                <c:ptCount val="1"/>
+                <c:ptCount val="2"/>
                 <c:pt idx="0">
                   <c:v>Category 1</c:v>
+                </c:pt>
+                <c:pt idx="1">
+                  <c:v>Category 2</c:v>
                 </c:pt>
               </c:strCache>
             </c:strRef>
@@ -589,6 +844,9 @@
                 <c:ptCount val="10"/>
                 <c:pt idx="0">
                   <c:v>1</c:v>
+                </c:pt>
+                <c:pt idx="1">
+                  <c:v>2</c:v>
                 </c:pt>
               </c:numCache>
             </c:numRef>
@@ -603,8 +861,8 @@
           <c:showBubbleSize val="0"/>
         </c:dLbls>
         <c:gapWidth val="150"/>
-        <c:axId val="31755264"/>
-        <c:axId val="98783168"/>
+        <c:axId val="33476608"/>
+        <c:axId val="68177856"/>
       </c:barChart>
       <c:lineChart>
         <c:grouping val="standard"/>
@@ -648,9 +906,12 @@
             <c:strRef>
               <c:f>Sheet1!$A$2:$A$11</c:f>
               <c:strCache>
-                <c:ptCount val="1"/>
+                <c:ptCount val="2"/>
                 <c:pt idx="0">
                   <c:v>Category 1</c:v>
+                </c:pt>
+                <c:pt idx="1">
+                  <c:v>Category 2</c:v>
                 </c:pt>
               </c:strCache>
             </c:strRef>
@@ -663,6 +924,9 @@
                 <c:ptCount val="10"/>
                 <c:pt idx="0">
                   <c:v>1</c:v>
+                </c:pt>
+                <c:pt idx="1">
+                  <c:v>2</c:v>
                 </c:pt>
               </c:numCache>
             </c:numRef>
@@ -704,9 +968,12 @@
             <c:strRef>
               <c:f>Sheet1!$A$2:$A$11</c:f>
               <c:strCache>
-                <c:ptCount val="1"/>
+                <c:ptCount val="2"/>
                 <c:pt idx="0">
                   <c:v>Category 1</c:v>
+                </c:pt>
+                <c:pt idx="1">
+                  <c:v>Category 2</c:v>
                 </c:pt>
               </c:strCache>
             </c:strRef>
@@ -718,6 +985,9 @@
                 <c:formatCode>General</c:formatCode>
                 <c:ptCount val="10"/>
                 <c:pt idx="0">
+                  <c:v>1</c:v>
+                </c:pt>
+                <c:pt idx="1">
                   <c:v>1</c:v>
                 </c:pt>
               </c:numCache>
@@ -735,11 +1005,11 @@
         </c:dLbls>
         <c:marker val="1"/>
         <c:smooth val="0"/>
-        <c:axId val="31755264"/>
-        <c:axId val="98783168"/>
+        <c:axId val="33476608"/>
+        <c:axId val="68177856"/>
       </c:lineChart>
       <c:catAx>
-        <c:axId val="31755264"/>
+        <c:axId val="33476608"/>
         <c:scaling>
           <c:orientation val="minMax"/>
         </c:scaling>
@@ -748,7 +1018,7 @@
         <c:majorTickMark val="out"/>
         <c:minorTickMark val="none"/>
         <c:tickLblPos val="nextTo"/>
-        <c:crossAx val="98783168"/>
+        <c:crossAx val="68177856"/>
         <c:crosses val="autoZero"/>
         <c:auto val="1"/>
         <c:lblAlgn val="ctr"/>
@@ -756,7 +1026,7 @@
         <c:noMultiLvlLbl val="0"/>
       </c:catAx>
       <c:valAx>
-        <c:axId val="98783168"/>
+        <c:axId val="68177856"/>
         <c:scaling>
           <c:orientation val="minMax"/>
         </c:scaling>
@@ -767,7 +1037,7 @@
         <c:majorTickMark val="out"/>
         <c:minorTickMark val="none"/>
         <c:tickLblPos val="nextTo"/>
-        <c:crossAx val="31755264"/>
+        <c:crossAx val="33476608"/>
         <c:crosses val="autoZero"/>
         <c:crossBetween val="between"/>
       </c:valAx>
@@ -860,9 +1130,12 @@
             <c:strRef>
               <c:f>Sheet1!$A$2:$A$11</c:f>
               <c:strCache>
-                <c:ptCount val="1"/>
+                <c:ptCount val="2"/>
                 <c:pt idx="0">
                   <c:v>Category 1</c:v>
+                </c:pt>
+                <c:pt idx="1">
+                  <c:v>Category 2</c:v>
                 </c:pt>
               </c:strCache>
             </c:strRef>
@@ -875,6 +1148,9 @@
                 <c:ptCount val="10"/>
                 <c:pt idx="0">
                   <c:v>1</c:v>
+                </c:pt>
+                <c:pt idx="1">
+                  <c:v>2</c:v>
                 </c:pt>
                 <c:pt idx="6">
                   <c:v>0</c:v>
@@ -912,9 +1188,12 @@
             <c:strRef>
               <c:f>Sheet1!$A$2:$A$11</c:f>
               <c:strCache>
-                <c:ptCount val="1"/>
+                <c:ptCount val="2"/>
                 <c:pt idx="0">
                   <c:v>Category 1</c:v>
+                </c:pt>
+                <c:pt idx="1">
+                  <c:v>Category 2</c:v>
                 </c:pt>
               </c:strCache>
             </c:strRef>
@@ -927,6 +1206,9 @@
                 <c:ptCount val="10"/>
                 <c:pt idx="0">
                   <c:v>1</c:v>
+                </c:pt>
+                <c:pt idx="1">
+                  <c:v>2</c:v>
                 </c:pt>
               </c:numCache>
             </c:numRef>
@@ -961,9 +1243,12 @@
             <c:strRef>
               <c:f>Sheet1!$A$2:$A$11</c:f>
               <c:strCache>
-                <c:ptCount val="1"/>
+                <c:ptCount val="2"/>
                 <c:pt idx="0">
                   <c:v>Category 1</c:v>
+                </c:pt>
+                <c:pt idx="1">
+                  <c:v>Category 2</c:v>
                 </c:pt>
               </c:strCache>
             </c:strRef>
@@ -976,6 +1261,9 @@
                 <c:ptCount val="10"/>
                 <c:pt idx="0">
                   <c:v>1</c:v>
+                </c:pt>
+                <c:pt idx="1">
+                  <c:v>2</c:v>
                 </c:pt>
               </c:numCache>
             </c:numRef>
@@ -1014,9 +1302,12 @@
             <c:strRef>
               <c:f>Sheet1!$A$2:$A$11</c:f>
               <c:strCache>
-                <c:ptCount val="1"/>
+                <c:ptCount val="2"/>
                 <c:pt idx="0">
                   <c:v>Category 1</c:v>
+                </c:pt>
+                <c:pt idx="1">
+                  <c:v>Category 2</c:v>
                 </c:pt>
               </c:strCache>
             </c:strRef>
@@ -1029,6 +1320,9 @@
                 <c:ptCount val="10"/>
                 <c:pt idx="0">
                   <c:v>1</c:v>
+                </c:pt>
+                <c:pt idx="1">
+                  <c:v>2</c:v>
                 </c:pt>
               </c:numCache>
             </c:numRef>
@@ -1043,8 +1337,8 @@
           <c:showBubbleSize val="0"/>
         </c:dLbls>
         <c:gapWidth val="150"/>
-        <c:axId val="33082368"/>
-        <c:axId val="98784896"/>
+        <c:axId val="31885824"/>
+        <c:axId val="68180160"/>
       </c:barChart>
       <c:lineChart>
         <c:grouping val="standard"/>
@@ -1088,9 +1382,12 @@
             <c:strRef>
               <c:f>Sheet1!$A$2:$A$11</c:f>
               <c:strCache>
-                <c:ptCount val="1"/>
+                <c:ptCount val="2"/>
                 <c:pt idx="0">
                   <c:v>Category 1</c:v>
+                </c:pt>
+                <c:pt idx="1">
+                  <c:v>Category 2</c:v>
                 </c:pt>
               </c:strCache>
             </c:strRef>
@@ -1103,6 +1400,9 @@
                 <c:ptCount val="10"/>
                 <c:pt idx="0">
                   <c:v>1</c:v>
+                </c:pt>
+                <c:pt idx="1">
+                  <c:v>2</c:v>
                 </c:pt>
               </c:numCache>
             </c:numRef>
@@ -1144,9 +1444,12 @@
             <c:strRef>
               <c:f>Sheet1!$A$2:$A$11</c:f>
               <c:strCache>
-                <c:ptCount val="1"/>
+                <c:ptCount val="2"/>
                 <c:pt idx="0">
                   <c:v>Category 1</c:v>
+                </c:pt>
+                <c:pt idx="1">
+                  <c:v>Category 2</c:v>
                 </c:pt>
               </c:strCache>
             </c:strRef>
@@ -1158,6 +1461,9 @@
                 <c:formatCode>General</c:formatCode>
                 <c:ptCount val="10"/>
                 <c:pt idx="0">
+                  <c:v>1</c:v>
+                </c:pt>
+                <c:pt idx="1">
                   <c:v>1</c:v>
                 </c:pt>
               </c:numCache>
@@ -1175,11 +1481,11 @@
         </c:dLbls>
         <c:marker val="1"/>
         <c:smooth val="0"/>
-        <c:axId val="33082368"/>
-        <c:axId val="98784896"/>
+        <c:axId val="31885824"/>
+        <c:axId val="68180160"/>
       </c:lineChart>
       <c:catAx>
-        <c:axId val="33082368"/>
+        <c:axId val="31885824"/>
         <c:scaling>
           <c:orientation val="minMax"/>
         </c:scaling>
@@ -1188,7 +1494,7 @@
         <c:majorTickMark val="out"/>
         <c:minorTickMark val="none"/>
         <c:tickLblPos val="nextTo"/>
-        <c:crossAx val="98784896"/>
+        <c:crossAx val="68180160"/>
         <c:crosses val="autoZero"/>
         <c:auto val="1"/>
         <c:lblAlgn val="ctr"/>
@@ -1196,7 +1502,7 @@
         <c:noMultiLvlLbl val="0"/>
       </c:catAx>
       <c:valAx>
-        <c:axId val="98784896"/>
+        <c:axId val="68180160"/>
         <c:scaling>
           <c:orientation val="minMax"/>
         </c:scaling>
@@ -1207,7 +1513,7 @@
         <c:majorTickMark val="out"/>
         <c:minorTickMark val="none"/>
         <c:tickLblPos val="nextTo"/>
-        <c:crossAx val="33082368"/>
+        <c:crossAx val="31885824"/>
         <c:crosses val="autoZero"/>
         <c:crossBetween val="between"/>
       </c:valAx>
@@ -1332,9 +1638,12 @@
             <c:strRef>
               <c:f>Sheet1!$A$2:$A$11</c:f>
               <c:strCache>
-                <c:ptCount val="1"/>
+                <c:ptCount val="2"/>
                 <c:pt idx="0">
                   <c:v>Category 1</c:v>
+                </c:pt>
+                <c:pt idx="1">
+                  <c:v>Category 2</c:v>
                 </c:pt>
               </c:strCache>
             </c:strRef>
@@ -1347,6 +1656,9 @@
                 <c:ptCount val="10"/>
                 <c:pt idx="0">
                   <c:v>0</c:v>
+                </c:pt>
+                <c:pt idx="1">
+                  <c:v>1</c:v>
                 </c:pt>
               </c:numCache>
             </c:numRef>
@@ -1392,9 +1704,12 @@
             <c:strRef>
               <c:f>Sheet1!$A$2:$A$11</c:f>
               <c:strCache>
-                <c:ptCount val="1"/>
+                <c:ptCount val="2"/>
                 <c:pt idx="0">
                   <c:v>Category 1</c:v>
+                </c:pt>
+                <c:pt idx="1">
+                  <c:v>Category 2</c:v>
                 </c:pt>
               </c:strCache>
             </c:strRef>
@@ -1407,6 +1722,9 @@
                 <c:ptCount val="10"/>
                 <c:pt idx="0">
                   <c:v>0</c:v>
+                </c:pt>
+                <c:pt idx="1">
+                  <c:v>1</c:v>
                 </c:pt>
               </c:numCache>
             </c:numRef>
@@ -1460,9 +1778,12 @@
             <c:strRef>
               <c:f>Sheet1!$A$2:$A$11</c:f>
               <c:strCache>
-                <c:ptCount val="1"/>
+                <c:ptCount val="2"/>
                 <c:pt idx="0">
                   <c:v>Category 1</c:v>
+                </c:pt>
+                <c:pt idx="1">
+                  <c:v>Category 2</c:v>
                 </c:pt>
               </c:strCache>
             </c:strRef>
@@ -1475,6 +1796,9 @@
                 <c:ptCount val="10"/>
                 <c:pt idx="0">
                   <c:v>0</c:v>
+                </c:pt>
+                <c:pt idx="1">
+                  <c:v>1</c:v>
                 </c:pt>
               </c:numCache>
             </c:numRef>
@@ -1530,9 +1854,12 @@
             <c:strRef>
               <c:f>Sheet1!$A$2:$A$11</c:f>
               <c:strCache>
-                <c:ptCount val="1"/>
+                <c:ptCount val="2"/>
                 <c:pt idx="0">
                   <c:v>Category 1</c:v>
+                </c:pt>
+                <c:pt idx="1">
+                  <c:v>Category 2</c:v>
                 </c:pt>
               </c:strCache>
             </c:strRef>
@@ -1544,6 +1871,9 @@
                 <c:formatCode>General</c:formatCode>
                 <c:ptCount val="10"/>
                 <c:pt idx="0">
+                  <c:v>0</c:v>
+                </c:pt>
+                <c:pt idx="1">
                   <c:v>0</c:v>
                 </c:pt>
               </c:numCache>
@@ -1561,11 +1891,11 @@
         </c:dLbls>
         <c:marker val="1"/>
         <c:smooth val="0"/>
-        <c:axId val="33079808"/>
-        <c:axId val="31326208"/>
+        <c:axId val="31558144"/>
+        <c:axId val="31613504"/>
       </c:lineChart>
       <c:catAx>
-        <c:axId val="33079808"/>
+        <c:axId val="31558144"/>
         <c:scaling>
           <c:orientation val="minMax"/>
         </c:scaling>
@@ -1574,7 +1904,7 @@
         <c:majorTickMark val="none"/>
         <c:minorTickMark val="none"/>
         <c:tickLblPos val="nextTo"/>
-        <c:crossAx val="31326208"/>
+        <c:crossAx val="31613504"/>
         <c:crosses val="autoZero"/>
         <c:auto val="1"/>
         <c:lblAlgn val="ctr"/>
@@ -1582,7 +1912,7 @@
         <c:noMultiLvlLbl val="0"/>
       </c:catAx>
       <c:valAx>
-        <c:axId val="31326208"/>
+        <c:axId val="31613504"/>
         <c:scaling>
           <c:orientation val="minMax"/>
         </c:scaling>
@@ -1616,7 +1946,7 @@
         <c:majorTickMark val="none"/>
         <c:minorTickMark val="none"/>
         <c:tickLblPos val="nextTo"/>
-        <c:crossAx val="33079808"/>
+        <c:crossAx val="31558144"/>
         <c:crosses val="autoZero"/>
         <c:crossBetween val="between"/>
       </c:valAx>
@@ -3949,7 +4279,7 @@
             <p:ph idx="1"/>
             <p:extLst>
               <p:ext uri="{D42A27DB-BD31-4B8C-83A1-F6EECF244321}">
-                <p14:modId xmlns:p14="http://schemas.microsoft.com/office/powerpoint/2010/main" val="206068729"/>
+                <p14:modId xmlns:p14="http://schemas.microsoft.com/office/powerpoint/2010/main" val="3413845338"/>
               </p:ext>
             </p:extLst>
           </p:nvPr>
@@ -4715,11 +5045,7 @@
             </a:r>
             <a:r>
               <a:rPr lang="en-US" smtClean="0"/>
-              <a:t>this </a:t>
-            </a:r>
-            <a:r>
-              <a:rPr lang="en-US" smtClean="0"/>
-              <a:t>month</a:t>
+              <a:t>this month</a:t>
             </a:r>
             <a:endParaRPr lang="en-US" dirty="0" smtClean="0"/>
           </a:p>
@@ -6551,49 +6877,31 @@
           <a:lstStyle/>
           <a:p>
             <a:r>
-              <a:rPr lang="en-US" sz="2400" dirty="0" smtClean="0"/>
+              <a:rPr lang="en-US" dirty="0" smtClean="0"/>
               <a:t>Chart</a:t>
             </a:r>
             <a:endParaRPr lang="en-US" dirty="0"/>
           </a:p>
         </p:txBody>
       </p:sp>
-      <p:sp>
-        <p:nvSpPr>
-          <p:cNvPr id="5" name="Content Placeholder 4"/>
-          <p:cNvSpPr>
-            <a:spLocks noGrp="1"/>
-          </p:cNvSpPr>
+      <p:graphicFrame>
+        <p:nvGraphicFramePr>
+          <p:cNvPr id="4" name="Content Placeholder 3"/>
+          <p:cNvGraphicFramePr>
+            <a:graphicFrameLocks noGrp="1"/>
+          </p:cNvGraphicFramePr>
           <p:nvPr>
             <p:ph idx="1"/>
-          </p:nvPr>
-        </p:nvSpPr>
-        <p:spPr/>
-        <p:txBody>
-          <a:bodyPr/>
-          <a:lstStyle/>
-          <a:p>
-            <a:endParaRPr lang="en-US"/>
-          </a:p>
-        </p:txBody>
-      </p:sp>
-      <p:graphicFrame>
-        <p:nvGraphicFramePr>
-          <p:cNvPr id="4" name="Content Placeholder 14"/>
-          <p:cNvGraphicFramePr>
-            <a:graphicFrameLocks/>
-          </p:cNvGraphicFramePr>
-          <p:nvPr>
             <p:extLst>
               <p:ext uri="{D42A27DB-BD31-4B8C-83A1-F6EECF244321}">
-                <p14:modId xmlns:p14="http://schemas.microsoft.com/office/powerpoint/2010/main" val="1610601936"/>
+                <p14:modId xmlns:p14="http://schemas.microsoft.com/office/powerpoint/2010/main" val="2657142194"/>
               </p:ext>
             </p:extLst>
           </p:nvPr>
         </p:nvGraphicFramePr>
         <p:xfrm>
-          <a:off x="457200" y="1600200"/>
-          <a:ext cx="8229600" cy="4525963"/>
+          <a:off x="166914" y="1204686"/>
+          <a:ext cx="8839200" cy="5144702"/>
         </p:xfrm>
         <a:graphic>
           <a:graphicData uri="http://schemas.openxmlformats.org/drawingml/2006/chart">
@@ -6601,23 +6909,232 @@
           </a:graphicData>
         </a:graphic>
       </p:graphicFrame>
+      <p:sp>
+        <p:nvSpPr>
+          <p:cNvPr id="3" name="Rectangle 2"/>
+          <p:cNvSpPr/>
+          <p:nvPr/>
+        </p:nvSpPr>
+        <p:spPr bwMode="auto">
+          <a:xfrm>
+            <a:off x="2492820" y="6418638"/>
+            <a:ext cx="631371" cy="138499"/>
+          </a:xfrm>
+          <a:prstGeom prst="rect">
+            <a:avLst/>
+          </a:prstGeom>
+          <a:gradFill>
+            <a:gsLst>
+              <a:gs pos="0">
+                <a:schemeClr val="accent1">
+                  <a:lumMod val="60000"/>
+                  <a:lumOff val="40000"/>
+                </a:schemeClr>
+              </a:gs>
+              <a:gs pos="100000">
+                <a:schemeClr val="accent1">
+                  <a:tint val="23500"/>
+                  <a:satMod val="160000"/>
+                </a:schemeClr>
+              </a:gs>
+            </a:gsLst>
+            <a:lin ang="5400000" scaled="0"/>
+          </a:gradFill>
+          <a:ln w="9525" cap="flat" cmpd="sng" algn="ctr">
+            <a:noFill/>
+            <a:prstDash val="solid"/>
+            <a:round/>
+            <a:headEnd type="none" w="med" len="med"/>
+            <a:tailEnd type="none" w="med" len="med"/>
+          </a:ln>
+          <a:effectLst/>
+        </p:spPr>
+        <p:txBody>
+          <a:bodyPr vert="horz" wrap="square" lIns="91440" tIns="45720" rIns="91440" bIns="45720" numCol="1" rtlCol="0" anchor="t" anchorCtr="0" compatLnSpc="1">
+            <a:prstTxWarp prst="textNoShape">
+              <a:avLst/>
+            </a:prstTxWarp>
+          </a:bodyPr>
+          <a:lstStyle/>
+          <a:p>
+            <a:pPr marL="0" marR="0" indent="0" algn="l" defTabSz="914400" rtl="0" eaLnBrk="0" fontAlgn="base" latinLnBrk="0" hangingPunct="0">
+              <a:lnSpc>
+                <a:spcPct val="100000"/>
+              </a:lnSpc>
+              <a:spcBef>
+                <a:spcPct val="0"/>
+              </a:spcBef>
+              <a:spcAft>
+                <a:spcPct val="0"/>
+              </a:spcAft>
+              <a:buClrTx/>
+              <a:buSzTx/>
+              <a:buFontTx/>
+              <a:buNone/>
+              <a:tabLst/>
+            </a:pPr>
+            <a:endParaRPr kumimoji="0" lang="en-US" sz="2400" b="0" i="0" u="none" strike="noStrike" cap="none" normalizeH="0" baseline="0" smtClean="0">
+              <a:ln>
+                <a:noFill/>
+              </a:ln>
+              <a:solidFill>
+                <a:schemeClr val="tx1"/>
+              </a:solidFill>
+              <a:effectLst/>
+              <a:latin typeface="Times" pitchFamily="18" charset="0"/>
+            </a:endParaRPr>
+          </a:p>
+        </p:txBody>
+      </p:sp>
+      <p:sp>
+        <p:nvSpPr>
+          <p:cNvPr id="5" name="TextBox 4"/>
+          <p:cNvSpPr txBox="1"/>
+          <p:nvPr/>
+        </p:nvSpPr>
+        <p:spPr>
+          <a:xfrm>
+            <a:off x="3262079" y="6349388"/>
+            <a:ext cx="2249714" cy="276999"/>
+          </a:xfrm>
+          <a:prstGeom prst="rect">
+            <a:avLst/>
+          </a:prstGeom>
+          <a:noFill/>
+        </p:spPr>
+        <p:txBody>
+          <a:bodyPr wrap="square" rtlCol="0">
+            <a:spAutoFit/>
+          </a:bodyPr>
+          <a:lstStyle/>
+          <a:p>
+            <a:r>
+              <a:rPr lang="en-US" sz="1200" dirty="0" smtClean="0">
+                <a:latin typeface="Verdana" pitchFamily="34" charset="0"/>
+                <a:ea typeface="Verdana" pitchFamily="34" charset="0"/>
+                <a:cs typeface="Verdana" pitchFamily="34" charset="0"/>
+              </a:rPr>
+              <a:t>Baseline</a:t>
+            </a:r>
+            <a:endParaRPr lang="en-US" sz="1200" dirty="0">
+              <a:latin typeface="Verdana" pitchFamily="34" charset="0"/>
+              <a:ea typeface="Verdana" pitchFamily="34" charset="0"/>
+              <a:cs typeface="Verdana" pitchFamily="34" charset="0"/>
+            </a:endParaRPr>
+          </a:p>
+        </p:txBody>
+      </p:sp>
+      <p:sp>
+        <p:nvSpPr>
+          <p:cNvPr id="6" name="Rectangle 5"/>
+          <p:cNvSpPr/>
+          <p:nvPr/>
+        </p:nvSpPr>
+        <p:spPr bwMode="auto">
+          <a:xfrm>
+            <a:off x="4444956" y="6418638"/>
+            <a:ext cx="631371" cy="138499"/>
+          </a:xfrm>
+          <a:prstGeom prst="rect">
+            <a:avLst/>
+          </a:prstGeom>
+          <a:solidFill>
+            <a:srgbClr val="002060"/>
+          </a:solidFill>
+          <a:ln w="9525" cap="flat" cmpd="sng" algn="ctr">
+            <a:noFill/>
+            <a:prstDash val="solid"/>
+            <a:round/>
+            <a:headEnd type="none" w="med" len="med"/>
+            <a:tailEnd type="none" w="med" len="med"/>
+          </a:ln>
+          <a:effectLst/>
+        </p:spPr>
+        <p:txBody>
+          <a:bodyPr vert="horz" wrap="square" lIns="91440" tIns="45720" rIns="91440" bIns="45720" numCol="1" rtlCol="0" anchor="t" anchorCtr="0" compatLnSpc="1">
+            <a:prstTxWarp prst="textNoShape">
+              <a:avLst/>
+            </a:prstTxWarp>
+          </a:bodyPr>
+          <a:lstStyle/>
+          <a:p>
+            <a:pPr marL="0" marR="0" indent="0" algn="l" defTabSz="914400" rtl="0" eaLnBrk="0" fontAlgn="base" latinLnBrk="0" hangingPunct="0">
+              <a:lnSpc>
+                <a:spcPct val="100000"/>
+              </a:lnSpc>
+              <a:spcBef>
+                <a:spcPct val="0"/>
+              </a:spcBef>
+              <a:spcAft>
+                <a:spcPct val="0"/>
+              </a:spcAft>
+              <a:buClrTx/>
+              <a:buSzTx/>
+              <a:buFontTx/>
+              <a:buNone/>
+              <a:tabLst/>
+            </a:pPr>
+            <a:endParaRPr kumimoji="0" lang="en-US" sz="2400" b="0" i="0" u="none" strike="noStrike" cap="none" normalizeH="0" baseline="0" smtClean="0">
+              <a:ln>
+                <a:noFill/>
+              </a:ln>
+              <a:solidFill>
+                <a:schemeClr val="tx1"/>
+              </a:solidFill>
+              <a:effectLst/>
+              <a:latin typeface="Times" pitchFamily="18" charset="0"/>
+            </a:endParaRPr>
+          </a:p>
+        </p:txBody>
+      </p:sp>
+      <p:sp>
+        <p:nvSpPr>
+          <p:cNvPr id="7" name="TextBox 6"/>
+          <p:cNvSpPr txBox="1"/>
+          <p:nvPr/>
+        </p:nvSpPr>
+        <p:spPr>
+          <a:xfrm>
+            <a:off x="5206989" y="6349388"/>
+            <a:ext cx="2249714" cy="276999"/>
+          </a:xfrm>
+          <a:prstGeom prst="rect">
+            <a:avLst/>
+          </a:prstGeom>
+          <a:noFill/>
+        </p:spPr>
+        <p:txBody>
+          <a:bodyPr wrap="square" rtlCol="0">
+            <a:spAutoFit/>
+          </a:bodyPr>
+          <a:lstStyle/>
+          <a:p>
+            <a:r>
+              <a:rPr lang="en-US" sz="1200" dirty="0" smtClean="0">
+                <a:latin typeface="Verdana" pitchFamily="34" charset="0"/>
+                <a:ea typeface="Verdana" pitchFamily="34" charset="0"/>
+                <a:cs typeface="Verdana" pitchFamily="34" charset="0"/>
+              </a:rPr>
+              <a:t>Forecast</a:t>
+            </a:r>
+            <a:endParaRPr lang="en-US" sz="1200" dirty="0">
+              <a:latin typeface="Verdana" pitchFamily="34" charset="0"/>
+              <a:ea typeface="Verdana" pitchFamily="34" charset="0"/>
+              <a:cs typeface="Verdana" pitchFamily="34" charset="0"/>
+            </a:endParaRPr>
+          </a:p>
+        </p:txBody>
+      </p:sp>
     </p:spTree>
     <p:extLst>
       <p:ext uri="{BB962C8B-B14F-4D97-AF65-F5344CB8AC3E}">
-        <p14:creationId xmlns:p14="http://schemas.microsoft.com/office/powerpoint/2010/main" val="2601612557"/>
+        <p14:creationId xmlns:p14="http://schemas.microsoft.com/office/powerpoint/2010/main" val="1684708940"/>
       </p:ext>
     </p:extLst>
   </p:cSld>
   <p:clrMapOvr>
     <a:masterClrMapping/>
   </p:clrMapOvr>
-  <p:timing>
-    <p:tnLst>
-      <p:par>
-        <p:cTn id="1" dur="indefinite" restart="never" nodeType="tmRoot"/>
-      </p:par>
-    </p:tnLst>
-  </p:timing>
 </p:sld>
 </file>
 
@@ -6671,7 +7188,7 @@
             <p:ph idx="1"/>
             <p:extLst>
               <p:ext uri="{D42A27DB-BD31-4B8C-83A1-F6EECF244321}">
-                <p14:modId xmlns:p14="http://schemas.microsoft.com/office/powerpoint/2010/main" val="752138407"/>
+                <p14:modId xmlns:p14="http://schemas.microsoft.com/office/powerpoint/2010/main" val="200525498"/>
               </p:ext>
             </p:extLst>
           </p:nvPr>
@@ -6766,7 +7283,7 @@
           <p:nvPr>
             <p:extLst>
               <p:ext uri="{D42A27DB-BD31-4B8C-83A1-F6EECF244321}">
-                <p14:modId xmlns:p14="http://schemas.microsoft.com/office/powerpoint/2010/main" val="2022418859"/>
+                <p14:modId xmlns:p14="http://schemas.microsoft.com/office/powerpoint/2010/main" val="1825505218"/>
               </p:ext>
             </p:extLst>
           </p:nvPr>
@@ -8351,13 +8868,13 @@
 <file path=customXml/itemProps2.xml><?xml version="1.0" encoding="utf-8"?>
 <ds:datastoreItem xmlns:ds="http://schemas.openxmlformats.org/officeDocument/2006/customXml" ds:itemID="{F08FFFF7-6ACE-4B4C-AA05-EAF8BD457E72}">
   <ds:schemaRefs>
+    <ds:schemaRef ds:uri="http://purl.org/dc/dcmitype/"/>
+    <ds:schemaRef ds:uri="http://purl.org/dc/terms/"/>
+    <ds:schemaRef ds:uri="http://schemas.microsoft.com/office/2006/metadata/properties"/>
+    <ds:schemaRef ds:uri="http://schemas.microsoft.com/office/2006/documentManagement/types"/>
     <ds:schemaRef ds:uri="http://purl.org/dc/elements/1.1/"/>
-    <ds:schemaRef ds:uri="http://schemas.microsoft.com/office/2006/documentManagement/types"/>
+    <ds:schemaRef ds:uri="http://schemas.microsoft.com/office/infopath/2007/PartnerControls"/>
     <ds:schemaRef ds:uri="http://schemas.openxmlformats.org/package/2006/metadata/core-properties"/>
-    <ds:schemaRef ds:uri="http://schemas.microsoft.com/office/2006/metadata/properties"/>
-    <ds:schemaRef ds:uri="http://purl.org/dc/terms/"/>
-    <ds:schemaRef ds:uri="http://purl.org/dc/dcmitype/"/>
-    <ds:schemaRef ds:uri="http://schemas.microsoft.com/office/infopath/2007/PartnerControls"/>
     <ds:schemaRef ds:uri="http://www.w3.org/XML/1998/namespace"/>
   </ds:schemaRefs>
 </ds:datastoreItem>

</xml_diff>